<commit_message>
change from last commit
</commit_message>
<xml_diff>
--- a/ux_course/מצגת סופית להגשה.pptx
+++ b/ux_course/מצגת סופית להגשה.pptx
@@ -12981,8 +12981,8 @@
         </p:nvCxnSpPr>
         <p:spPr>
           <a:xfrm flipH="1" flipV="1">
-            <a:off x="5335480" y="4199138"/>
-            <a:ext cx="2201662" cy="275208"/>
+            <a:off x="5299969" y="4128117"/>
+            <a:ext cx="2299317" cy="1402671"/>
           </a:xfrm>
           <a:prstGeom prst="straightConnector1">
             <a:avLst/>

</xml_diff>

<commit_message>
add more things to login and register
</commit_message>
<xml_diff>
--- a/ux_course/מצגת סופית להגשה.pptx
+++ b/ux_course/מצגת סופית להגשה.pptx
@@ -5,7 +5,7 @@
     <p:sldMasterId id="2147483828" r:id="rId1"/>
   </p:sldMasterIdLst>
   <p:notesMasterIdLst>
-    <p:notesMasterId r:id="rId59"/>
+    <p:notesMasterId r:id="rId65"/>
   </p:notesMasterIdLst>
   <p:sldIdLst>
     <p:sldId id="262" r:id="rId2"/>
@@ -36,35 +36,41 @@
     <p:sldId id="275" r:id="rId27"/>
     <p:sldId id="276" r:id="rId28"/>
     <p:sldId id="277" r:id="rId29"/>
-    <p:sldId id="278" r:id="rId30"/>
-    <p:sldId id="279" r:id="rId31"/>
-    <p:sldId id="280" r:id="rId32"/>
-    <p:sldId id="282" r:id="rId33"/>
-    <p:sldId id="283" r:id="rId34"/>
-    <p:sldId id="284" r:id="rId35"/>
-    <p:sldId id="285" r:id="rId36"/>
-    <p:sldId id="286" r:id="rId37"/>
-    <p:sldId id="287" r:id="rId38"/>
-    <p:sldId id="288" r:id="rId39"/>
-    <p:sldId id="289" r:id="rId40"/>
-    <p:sldId id="297" r:id="rId41"/>
-    <p:sldId id="299" r:id="rId42"/>
-    <p:sldId id="310" r:id="rId43"/>
-    <p:sldId id="300" r:id="rId44"/>
-    <p:sldId id="301" r:id="rId45"/>
-    <p:sldId id="302" r:id="rId46"/>
-    <p:sldId id="303" r:id="rId47"/>
-    <p:sldId id="305" r:id="rId48"/>
-    <p:sldId id="304" r:id="rId49"/>
-    <p:sldId id="306" r:id="rId50"/>
-    <p:sldId id="296" r:id="rId51"/>
-    <p:sldId id="295" r:id="rId52"/>
-    <p:sldId id="311" r:id="rId53"/>
-    <p:sldId id="313" r:id="rId54"/>
-    <p:sldId id="314" r:id="rId55"/>
-    <p:sldId id="315" r:id="rId56"/>
-    <p:sldId id="316" r:id="rId57"/>
-    <p:sldId id="312" r:id="rId58"/>
+    <p:sldId id="317" r:id="rId30"/>
+    <p:sldId id="318" r:id="rId31"/>
+    <p:sldId id="278" r:id="rId32"/>
+    <p:sldId id="279" r:id="rId33"/>
+    <p:sldId id="280" r:id="rId34"/>
+    <p:sldId id="320" r:id="rId35"/>
+    <p:sldId id="321" r:id="rId36"/>
+    <p:sldId id="322" r:id="rId37"/>
+    <p:sldId id="319" r:id="rId38"/>
+    <p:sldId id="282" r:id="rId39"/>
+    <p:sldId id="283" r:id="rId40"/>
+    <p:sldId id="284" r:id="rId41"/>
+    <p:sldId id="285" r:id="rId42"/>
+    <p:sldId id="286" r:id="rId43"/>
+    <p:sldId id="287" r:id="rId44"/>
+    <p:sldId id="288" r:id="rId45"/>
+    <p:sldId id="289" r:id="rId46"/>
+    <p:sldId id="297" r:id="rId47"/>
+    <p:sldId id="299" r:id="rId48"/>
+    <p:sldId id="310" r:id="rId49"/>
+    <p:sldId id="300" r:id="rId50"/>
+    <p:sldId id="301" r:id="rId51"/>
+    <p:sldId id="302" r:id="rId52"/>
+    <p:sldId id="303" r:id="rId53"/>
+    <p:sldId id="305" r:id="rId54"/>
+    <p:sldId id="304" r:id="rId55"/>
+    <p:sldId id="306" r:id="rId56"/>
+    <p:sldId id="296" r:id="rId57"/>
+    <p:sldId id="295" r:id="rId58"/>
+    <p:sldId id="311" r:id="rId59"/>
+    <p:sldId id="313" r:id="rId60"/>
+    <p:sldId id="314" r:id="rId61"/>
+    <p:sldId id="315" r:id="rId62"/>
+    <p:sldId id="316" r:id="rId63"/>
+    <p:sldId id="312" r:id="rId64"/>
   </p:sldIdLst>
   <p:sldSz cx="12192000" cy="6858000"/>
   <p:notesSz cx="6858000" cy="9144000"/>
@@ -585,7 +591,7 @@
           <a:p>
             <a:fld id="{6E084796-162D-476E-82D2-4B26235D4C2C}" type="slidenum">
               <a:rPr lang="en-US" smtClean="0"/>
-              <a:t>46</a:t>
+              <a:t>52</a:t>
             </a:fld>
             <a:endParaRPr lang="en-US"/>
           </a:p>
@@ -16885,7 +16891,7 @@
           <p:cNvPr id="2" name="כותרת 1">
             <a:extLst>
               <a:ext uri="{FF2B5EF4-FFF2-40B4-BE49-F238E27FC236}">
-                <a16:creationId xmlns:a16="http://schemas.microsoft.com/office/drawing/2014/main" id="{DE777293-170B-4164-A212-000191C56DFE}"/>
+                <a16:creationId xmlns:a16="http://schemas.microsoft.com/office/drawing/2014/main" id="{92A500EE-F6C5-4C79-92F1-D2FDEE8174A4}"/>
               </a:ext>
             </a:extLst>
           </p:cNvPr>
@@ -16896,29 +16902,31 @@
             <p:ph type="title"/>
           </p:nvPr>
         </p:nvSpPr>
-        <p:spPr/>
+        <p:spPr>
+          <a:xfrm>
+            <a:off x="1154954" y="973669"/>
+            <a:ext cx="8825659" cy="706964"/>
+          </a:xfrm>
+        </p:spPr>
         <p:txBody>
           <a:bodyPr/>
           <a:lstStyle/>
           <a:p>
-            <a:pPr algn="ctr" rtl="1"/>
+            <a:pPr algn="ctr"/>
             <a:r>
               <a:rPr lang="he-IL"/>
-              <a:t>מסך </a:t>
-            </a:r>
-            <a:r>
-              <a:rPr lang="he-IL" dirty="0"/>
-              <a:t>הרשמה</a:t>
-            </a:r>
+              <a:t>מסך התחברות</a:t>
+            </a:r>
+            <a:endParaRPr lang="he-IL" dirty="0"/>
           </a:p>
         </p:txBody>
       </p:sp>
       <p:sp>
         <p:nvSpPr>
-          <p:cNvPr id="5" name="תיבת טקסט 4">
+          <p:cNvPr id="17" name="תיבת טקסט 16">
             <a:extLst>
               <a:ext uri="{FF2B5EF4-FFF2-40B4-BE49-F238E27FC236}">
-                <a16:creationId xmlns:a16="http://schemas.microsoft.com/office/drawing/2014/main" id="{49C1F48E-4344-478F-B955-03346A467B7E}"/>
+                <a16:creationId xmlns:a16="http://schemas.microsoft.com/office/drawing/2014/main" id="{2F642565-7D83-416E-A7D1-4FA3B48B83E1}"/>
               </a:ext>
             </a:extLst>
           </p:cNvPr>
@@ -16927,8 +16935,8 @@
         </p:nvSpPr>
         <p:spPr>
           <a:xfrm>
-            <a:off x="7919696" y="2477527"/>
-            <a:ext cx="4121834" cy="3970318"/>
+            <a:off x="7540282" y="2739271"/>
+            <a:ext cx="4487594" cy="646331"/>
           </a:xfrm>
           <a:prstGeom prst="rect">
             <a:avLst/>
@@ -16947,61 +16955,17 @@
             </a:pPr>
             <a:r>
               <a:rPr lang="he-IL" dirty="0"/>
-              <a:t>שינינו את עיצוב השדות כך שיראו יותר מעודכנים.</a:t>
-            </a:r>
-          </a:p>
-          <a:p>
-            <a:pPr marL="285750" indent="-285750" algn="r" rtl="1">
-              <a:buFont typeface="Arial" panose="020B0604020202020204" pitchFamily="34" charset="0"/>
-              <a:buChar char="•"/>
-            </a:pPr>
-            <a:r>
-              <a:rPr lang="he-IL" dirty="0"/>
-              <a:t>הוספנו סמלים מתאימים בצד כל שדה כך שיהיה ברור למשתמש מה עליו להכניס בשדה אותו הוא ממלא – </a:t>
-            </a:r>
-            <a:r>
-              <a:rPr lang="he-IL" b="1" dirty="0"/>
-              <a:t>זיהוי ולא זיכרון.</a:t>
-            </a:r>
-            <a:endParaRPr lang="he-IL" dirty="0"/>
-          </a:p>
-          <a:p>
-            <a:pPr marL="285750" indent="-285750" algn="r" rtl="1">
-              <a:buFont typeface="Arial" panose="020B0604020202020204" pitchFamily="34" charset="0"/>
-              <a:buChar char="•"/>
-            </a:pPr>
-            <a:r>
-              <a:rPr lang="he-IL" dirty="0"/>
-              <a:t>הוספנו תיאור לבחירת המין כדי שיהיה ברור יותר למשתמש מה עליו לבחור, בנוסף סימנו את המין "זכר" כברירת מחדל – </a:t>
-            </a:r>
-            <a:r>
-              <a:rPr lang="he-IL" b="1" dirty="0"/>
-              <a:t>מניעת טעויות.</a:t>
-            </a:r>
-            <a:endParaRPr lang="he-IL" dirty="0"/>
-          </a:p>
-          <a:p>
-            <a:pPr marL="285750" indent="-285750" algn="r" rtl="1">
-              <a:buFont typeface="Arial" panose="020B0604020202020204" pitchFamily="34" charset="0"/>
-              <a:buChar char="•"/>
-            </a:pPr>
-            <a:r>
-              <a:rPr lang="he-IL" dirty="0"/>
-              <a:t>הוספנו את אותה התנהגות של השדות כמו במסך ההתחברות (הדגשת השדה כאשר המשתמש מפוקס עליו + קיצורי מקשים) - </a:t>
-            </a:r>
-            <a:r>
-              <a:rPr lang="he-IL" b="1" dirty="0"/>
-              <a:t>חיווי מצב המערכת + גמישות ויעילות שימוש.</a:t>
+              <a:t>שינינו את צבע כפתור ההתחברות שיהיה מודגש וברור יותר.</a:t>
             </a:r>
           </a:p>
         </p:txBody>
       </p:sp>
       <p:pic>
         <p:nvPicPr>
-          <p:cNvPr id="3" name="תמונה 2">
+          <p:cNvPr id="4" name="תמונה 3">
             <a:extLst>
               <a:ext uri="{FF2B5EF4-FFF2-40B4-BE49-F238E27FC236}">
-                <a16:creationId xmlns:a16="http://schemas.microsoft.com/office/drawing/2014/main" id="{EDBDBFCF-CC0C-44D5-822E-F5193ADFCEC5}"/>
+                <a16:creationId xmlns:a16="http://schemas.microsoft.com/office/drawing/2014/main" id="{475C9141-FB1D-421F-9F8D-0B97A56DA1FB}"/>
               </a:ext>
             </a:extLst>
           </p:cNvPr>
@@ -17018,8 +16982,8 @@
         </p:blipFill>
         <p:spPr>
           <a:xfrm>
-            <a:off x="0" y="2477527"/>
-            <a:ext cx="7795603" cy="4380473"/>
+            <a:off x="0" y="2424386"/>
+            <a:ext cx="7877908" cy="4433613"/>
           </a:xfrm>
           <a:prstGeom prst="rect">
             <a:avLst/>
@@ -17029,7 +16993,7 @@
     </p:spTree>
     <p:extLst>
       <p:ext uri="{BB962C8B-B14F-4D97-AF65-F5344CB8AC3E}">
-        <p14:creationId xmlns:p14="http://schemas.microsoft.com/office/powerpoint/2010/main" val="1933346331"/>
+        <p14:creationId xmlns:p14="http://schemas.microsoft.com/office/powerpoint/2010/main" val="3155172046"/>
       </p:ext>
     </p:extLst>
   </p:cSld>
@@ -17489,7 +17453,7 @@
           <p:cNvPr id="2" name="כותרת 1">
             <a:extLst>
               <a:ext uri="{FF2B5EF4-FFF2-40B4-BE49-F238E27FC236}">
-                <a16:creationId xmlns:a16="http://schemas.microsoft.com/office/drawing/2014/main" id="{DE777293-170B-4164-A212-000191C56DFE}"/>
+                <a16:creationId xmlns:a16="http://schemas.microsoft.com/office/drawing/2014/main" id="{92A500EE-F6C5-4C79-92F1-D2FDEE8174A4}"/>
               </a:ext>
             </a:extLst>
           </p:cNvPr>
@@ -17500,29 +17464,31 @@
             <p:ph type="title"/>
           </p:nvPr>
         </p:nvSpPr>
-        <p:spPr/>
+        <p:spPr>
+          <a:xfrm>
+            <a:off x="1154954" y="973669"/>
+            <a:ext cx="8825659" cy="706964"/>
+          </a:xfrm>
+        </p:spPr>
         <p:txBody>
           <a:bodyPr/>
           <a:lstStyle/>
           <a:p>
-            <a:pPr algn="ctr" rtl="1"/>
+            <a:pPr algn="ctr"/>
             <a:r>
               <a:rPr lang="he-IL"/>
-              <a:t>מסך </a:t>
-            </a:r>
-            <a:r>
-              <a:rPr lang="he-IL" dirty="0"/>
-              <a:t>הרשמה</a:t>
-            </a:r>
+              <a:t>מסך התחברות</a:t>
+            </a:r>
+            <a:endParaRPr lang="he-IL" dirty="0"/>
           </a:p>
         </p:txBody>
       </p:sp>
       <p:sp>
         <p:nvSpPr>
-          <p:cNvPr id="5" name="תיבת טקסט 4">
+          <p:cNvPr id="17" name="תיבת טקסט 16">
             <a:extLst>
               <a:ext uri="{FF2B5EF4-FFF2-40B4-BE49-F238E27FC236}">
-                <a16:creationId xmlns:a16="http://schemas.microsoft.com/office/drawing/2014/main" id="{49C1F48E-4344-478F-B955-03346A467B7E}"/>
+                <a16:creationId xmlns:a16="http://schemas.microsoft.com/office/drawing/2014/main" id="{2F642565-7D83-416E-A7D1-4FA3B48B83E1}"/>
               </a:ext>
             </a:extLst>
           </p:cNvPr>
@@ -17531,8 +17497,8 @@
         </p:nvSpPr>
         <p:spPr>
           <a:xfrm>
-            <a:off x="7919696" y="2477527"/>
-            <a:ext cx="4121834" cy="923330"/>
+            <a:off x="7877908" y="2739271"/>
+            <a:ext cx="4149968" cy="1200329"/>
           </a:xfrm>
           <a:prstGeom prst="rect">
             <a:avLst/>
@@ -17551,7 +17517,15 @@
             </a:pPr>
             <a:r>
               <a:rPr lang="he-IL" dirty="0"/>
-              <a:t>הוספנו הדגשה עבור כל שדה חובה והסבר בתחתית העמוד המסביר מהי ההדגשה – </a:t>
+              <a:t>כאשר המשתמש לא הכניס את פרטיו עדיין, נמנע ממנו ללחוץ על כפתור ההתחברות או לחילופין ללחוץ על כפתור ה</a:t>
+            </a:r>
+            <a:r>
+              <a:rPr lang="en-US" dirty="0"/>
+              <a:t>ENTER</a:t>
+            </a:r>
+            <a:r>
+              <a:rPr lang="he-IL" dirty="0"/>
+              <a:t> – </a:t>
             </a:r>
             <a:r>
               <a:rPr lang="he-IL" b="1" dirty="0"/>
@@ -17563,10 +17537,10 @@
       </p:sp>
       <p:pic>
         <p:nvPicPr>
-          <p:cNvPr id="4" name="תמונה 3">
+          <p:cNvPr id="3" name="תמונה 2">
             <a:extLst>
               <a:ext uri="{FF2B5EF4-FFF2-40B4-BE49-F238E27FC236}">
-                <a16:creationId xmlns:a16="http://schemas.microsoft.com/office/drawing/2014/main" id="{F7A459F8-8EB4-4454-BC2E-F42597AF3D89}"/>
+                <a16:creationId xmlns:a16="http://schemas.microsoft.com/office/drawing/2014/main" id="{E9D24780-DDFD-48A1-AB3A-E9FDE2443D98}"/>
               </a:ext>
             </a:extLst>
           </p:cNvPr>
@@ -17583,8 +17557,8 @@
         </p:blipFill>
         <p:spPr>
           <a:xfrm>
-            <a:off x="1" y="2393328"/>
-            <a:ext cx="7919696" cy="4464671"/>
+            <a:off x="0" y="2349304"/>
+            <a:ext cx="8025851" cy="4508695"/>
           </a:xfrm>
           <a:prstGeom prst="rect">
             <a:avLst/>
@@ -17594,7 +17568,7 @@
     </p:spTree>
     <p:extLst>
       <p:ext uri="{BB962C8B-B14F-4D97-AF65-F5344CB8AC3E}">
-        <p14:creationId xmlns:p14="http://schemas.microsoft.com/office/powerpoint/2010/main" val="567271253"/>
+        <p14:creationId xmlns:p14="http://schemas.microsoft.com/office/powerpoint/2010/main" val="3511654369"/>
       </p:ext>
     </p:extLst>
   </p:cSld>
@@ -17669,6 +17643,319 @@
         <p:spPr>
           <a:xfrm>
             <a:off x="7919696" y="2477527"/>
+            <a:ext cx="4121834" cy="3970318"/>
+          </a:xfrm>
+          <a:prstGeom prst="rect">
+            <a:avLst/>
+          </a:prstGeom>
+          <a:noFill/>
+        </p:spPr>
+        <p:txBody>
+          <a:bodyPr wrap="square" rtlCol="1">
+            <a:spAutoFit/>
+          </a:bodyPr>
+          <a:lstStyle/>
+          <a:p>
+            <a:pPr marL="285750" indent="-285750" algn="r" rtl="1">
+              <a:buFont typeface="Arial" panose="020B0604020202020204" pitchFamily="34" charset="0"/>
+              <a:buChar char="•"/>
+            </a:pPr>
+            <a:r>
+              <a:rPr lang="he-IL" dirty="0"/>
+              <a:t>שינינו את עיצוב השדות כך שיראו יותר מעודכנים.</a:t>
+            </a:r>
+          </a:p>
+          <a:p>
+            <a:pPr marL="285750" indent="-285750" algn="r" rtl="1">
+              <a:buFont typeface="Arial" panose="020B0604020202020204" pitchFamily="34" charset="0"/>
+              <a:buChar char="•"/>
+            </a:pPr>
+            <a:r>
+              <a:rPr lang="he-IL" dirty="0"/>
+              <a:t>הוספנו סמלים מתאימים בצד כל שדה כך שיהיה ברור למשתמש מה עליו להכניס בשדה אותו הוא ממלא – </a:t>
+            </a:r>
+            <a:r>
+              <a:rPr lang="he-IL" b="1" dirty="0"/>
+              <a:t>זיהוי ולא זיכרון.</a:t>
+            </a:r>
+            <a:endParaRPr lang="he-IL" dirty="0"/>
+          </a:p>
+          <a:p>
+            <a:pPr marL="285750" indent="-285750" algn="r" rtl="1">
+              <a:buFont typeface="Arial" panose="020B0604020202020204" pitchFamily="34" charset="0"/>
+              <a:buChar char="•"/>
+            </a:pPr>
+            <a:r>
+              <a:rPr lang="he-IL" dirty="0"/>
+              <a:t>הוספנו תיאור לבחירת המין כדי שיהיה ברור יותר למשתמש מה עליו לבחור, בנוסף סימנו את המין "זכר" כברירת מחדל – </a:t>
+            </a:r>
+            <a:r>
+              <a:rPr lang="he-IL" b="1" dirty="0"/>
+              <a:t>מניעת טעויות.</a:t>
+            </a:r>
+            <a:endParaRPr lang="he-IL" dirty="0"/>
+          </a:p>
+          <a:p>
+            <a:pPr marL="285750" indent="-285750" algn="r" rtl="1">
+              <a:buFont typeface="Arial" panose="020B0604020202020204" pitchFamily="34" charset="0"/>
+              <a:buChar char="•"/>
+            </a:pPr>
+            <a:r>
+              <a:rPr lang="he-IL" dirty="0"/>
+              <a:t>הוספנו את אותה התנהגות של השדות כמו במסך ההתחברות (הדגשת השדה כאשר המשתמש מפוקס עליו + קיצורי מקשים) - </a:t>
+            </a:r>
+            <a:r>
+              <a:rPr lang="he-IL" b="1" dirty="0"/>
+              <a:t>חיווי מצב המערכת + גמישות ויעילות שימוש.</a:t>
+            </a:r>
+          </a:p>
+        </p:txBody>
+      </p:sp>
+      <p:pic>
+        <p:nvPicPr>
+          <p:cNvPr id="3" name="תמונה 2">
+            <a:extLst>
+              <a:ext uri="{FF2B5EF4-FFF2-40B4-BE49-F238E27FC236}">
+                <a16:creationId xmlns:a16="http://schemas.microsoft.com/office/drawing/2014/main" id="{EDBDBFCF-CC0C-44D5-822E-F5193ADFCEC5}"/>
+              </a:ext>
+            </a:extLst>
+          </p:cNvPr>
+          <p:cNvPicPr>
+            <a:picLocks noChangeAspect="1"/>
+          </p:cNvPicPr>
+          <p:nvPr/>
+        </p:nvPicPr>
+        <p:blipFill>
+          <a:blip r:embed="rId2"/>
+          <a:stretch>
+            <a:fillRect/>
+          </a:stretch>
+        </p:blipFill>
+        <p:spPr>
+          <a:xfrm>
+            <a:off x="0" y="2477527"/>
+            <a:ext cx="7795603" cy="4380473"/>
+          </a:xfrm>
+          <a:prstGeom prst="rect">
+            <a:avLst/>
+          </a:prstGeom>
+        </p:spPr>
+      </p:pic>
+    </p:spTree>
+    <p:extLst>
+      <p:ext uri="{BB962C8B-B14F-4D97-AF65-F5344CB8AC3E}">
+        <p14:creationId xmlns:p14="http://schemas.microsoft.com/office/powerpoint/2010/main" val="1933346331"/>
+      </p:ext>
+    </p:extLst>
+  </p:cSld>
+  <p:clrMapOvr>
+    <a:masterClrMapping/>
+  </p:clrMapOvr>
+</p:sld>
+</file>
+
+<file path=ppt/slides/slide32.xml><?xml version="1.0" encoding="utf-8"?>
+<p:sld xmlns:a="http://schemas.openxmlformats.org/drawingml/2006/main" xmlns:r="http://schemas.openxmlformats.org/officeDocument/2006/relationships" xmlns:p="http://schemas.openxmlformats.org/presentationml/2006/main">
+  <p:cSld>
+    <p:spTree>
+      <p:nvGrpSpPr>
+        <p:cNvPr id="1" name=""/>
+        <p:cNvGrpSpPr/>
+        <p:nvPr/>
+      </p:nvGrpSpPr>
+      <p:grpSpPr>
+        <a:xfrm>
+          <a:off x="0" y="0"/>
+          <a:ext cx="0" cy="0"/>
+          <a:chOff x="0" y="0"/>
+          <a:chExt cx="0" cy="0"/>
+        </a:xfrm>
+      </p:grpSpPr>
+      <p:sp>
+        <p:nvSpPr>
+          <p:cNvPr id="2" name="כותרת 1">
+            <a:extLst>
+              <a:ext uri="{FF2B5EF4-FFF2-40B4-BE49-F238E27FC236}">
+                <a16:creationId xmlns:a16="http://schemas.microsoft.com/office/drawing/2014/main" id="{DE777293-170B-4164-A212-000191C56DFE}"/>
+              </a:ext>
+            </a:extLst>
+          </p:cNvPr>
+          <p:cNvSpPr>
+            <a:spLocks noGrp="1"/>
+          </p:cNvSpPr>
+          <p:nvPr>
+            <p:ph type="title"/>
+          </p:nvPr>
+        </p:nvSpPr>
+        <p:spPr/>
+        <p:txBody>
+          <a:bodyPr/>
+          <a:lstStyle/>
+          <a:p>
+            <a:pPr algn="ctr" rtl="1"/>
+            <a:r>
+              <a:rPr lang="he-IL"/>
+              <a:t>מסך </a:t>
+            </a:r>
+            <a:r>
+              <a:rPr lang="he-IL" dirty="0"/>
+              <a:t>הרשמה</a:t>
+            </a:r>
+          </a:p>
+        </p:txBody>
+      </p:sp>
+      <p:sp>
+        <p:nvSpPr>
+          <p:cNvPr id="5" name="תיבת טקסט 4">
+            <a:extLst>
+              <a:ext uri="{FF2B5EF4-FFF2-40B4-BE49-F238E27FC236}">
+                <a16:creationId xmlns:a16="http://schemas.microsoft.com/office/drawing/2014/main" id="{49C1F48E-4344-478F-B955-03346A467B7E}"/>
+              </a:ext>
+            </a:extLst>
+          </p:cNvPr>
+          <p:cNvSpPr txBox="1"/>
+          <p:nvPr/>
+        </p:nvSpPr>
+        <p:spPr>
+          <a:xfrm>
+            <a:off x="7919696" y="2477527"/>
+            <a:ext cx="4121834" cy="923330"/>
+          </a:xfrm>
+          <a:prstGeom prst="rect">
+            <a:avLst/>
+          </a:prstGeom>
+          <a:noFill/>
+        </p:spPr>
+        <p:txBody>
+          <a:bodyPr wrap="square" rtlCol="1">
+            <a:spAutoFit/>
+          </a:bodyPr>
+          <a:lstStyle/>
+          <a:p>
+            <a:pPr marL="285750" indent="-285750" algn="r" rtl="1">
+              <a:buFont typeface="Arial" panose="020B0604020202020204" pitchFamily="34" charset="0"/>
+              <a:buChar char="•"/>
+            </a:pPr>
+            <a:r>
+              <a:rPr lang="he-IL" dirty="0"/>
+              <a:t>הוספנו הדגשה עבור כל שדה חובה והסבר בתחתית העמוד המסביר מהי ההדגשה – </a:t>
+            </a:r>
+            <a:r>
+              <a:rPr lang="he-IL" b="1" dirty="0"/>
+              <a:t>מניעת טעויות.</a:t>
+            </a:r>
+            <a:endParaRPr lang="he-IL" dirty="0"/>
+          </a:p>
+        </p:txBody>
+      </p:sp>
+      <p:pic>
+        <p:nvPicPr>
+          <p:cNvPr id="4" name="תמונה 3">
+            <a:extLst>
+              <a:ext uri="{FF2B5EF4-FFF2-40B4-BE49-F238E27FC236}">
+                <a16:creationId xmlns:a16="http://schemas.microsoft.com/office/drawing/2014/main" id="{F7A459F8-8EB4-4454-BC2E-F42597AF3D89}"/>
+              </a:ext>
+            </a:extLst>
+          </p:cNvPr>
+          <p:cNvPicPr>
+            <a:picLocks noChangeAspect="1"/>
+          </p:cNvPicPr>
+          <p:nvPr/>
+        </p:nvPicPr>
+        <p:blipFill>
+          <a:blip r:embed="rId2"/>
+          <a:stretch>
+            <a:fillRect/>
+          </a:stretch>
+        </p:blipFill>
+        <p:spPr>
+          <a:xfrm>
+            <a:off x="1" y="2393328"/>
+            <a:ext cx="7919696" cy="4464671"/>
+          </a:xfrm>
+          <a:prstGeom prst="rect">
+            <a:avLst/>
+          </a:prstGeom>
+        </p:spPr>
+      </p:pic>
+    </p:spTree>
+    <p:extLst>
+      <p:ext uri="{BB962C8B-B14F-4D97-AF65-F5344CB8AC3E}">
+        <p14:creationId xmlns:p14="http://schemas.microsoft.com/office/powerpoint/2010/main" val="567271253"/>
+      </p:ext>
+    </p:extLst>
+  </p:cSld>
+  <p:clrMapOvr>
+    <a:masterClrMapping/>
+  </p:clrMapOvr>
+</p:sld>
+</file>
+
+<file path=ppt/slides/slide33.xml><?xml version="1.0" encoding="utf-8"?>
+<p:sld xmlns:a="http://schemas.openxmlformats.org/drawingml/2006/main" xmlns:r="http://schemas.openxmlformats.org/officeDocument/2006/relationships" xmlns:p="http://schemas.openxmlformats.org/presentationml/2006/main">
+  <p:cSld>
+    <p:spTree>
+      <p:nvGrpSpPr>
+        <p:cNvPr id="1" name=""/>
+        <p:cNvGrpSpPr/>
+        <p:nvPr/>
+      </p:nvGrpSpPr>
+      <p:grpSpPr>
+        <a:xfrm>
+          <a:off x="0" y="0"/>
+          <a:ext cx="0" cy="0"/>
+          <a:chOff x="0" y="0"/>
+          <a:chExt cx="0" cy="0"/>
+        </a:xfrm>
+      </p:grpSpPr>
+      <p:sp>
+        <p:nvSpPr>
+          <p:cNvPr id="2" name="כותרת 1">
+            <a:extLst>
+              <a:ext uri="{FF2B5EF4-FFF2-40B4-BE49-F238E27FC236}">
+                <a16:creationId xmlns:a16="http://schemas.microsoft.com/office/drawing/2014/main" id="{DE777293-170B-4164-A212-000191C56DFE}"/>
+              </a:ext>
+            </a:extLst>
+          </p:cNvPr>
+          <p:cNvSpPr>
+            <a:spLocks noGrp="1"/>
+          </p:cNvSpPr>
+          <p:nvPr>
+            <p:ph type="title"/>
+          </p:nvPr>
+        </p:nvSpPr>
+        <p:spPr/>
+        <p:txBody>
+          <a:bodyPr/>
+          <a:lstStyle/>
+          <a:p>
+            <a:pPr algn="ctr" rtl="1"/>
+            <a:r>
+              <a:rPr lang="he-IL"/>
+              <a:t>מסך </a:t>
+            </a:r>
+            <a:r>
+              <a:rPr lang="he-IL" dirty="0"/>
+              <a:t>הרשמה</a:t>
+            </a:r>
+          </a:p>
+        </p:txBody>
+      </p:sp>
+      <p:sp>
+        <p:nvSpPr>
+          <p:cNvPr id="5" name="תיבת טקסט 4">
+            <a:extLst>
+              <a:ext uri="{FF2B5EF4-FFF2-40B4-BE49-F238E27FC236}">
+                <a16:creationId xmlns:a16="http://schemas.microsoft.com/office/drawing/2014/main" id="{49C1F48E-4344-478F-B955-03346A467B7E}"/>
+              </a:ext>
+            </a:extLst>
+          </p:cNvPr>
+          <p:cNvSpPr txBox="1"/>
+          <p:nvPr/>
+        </p:nvSpPr>
+        <p:spPr>
+          <a:xfrm>
+            <a:off x="7919696" y="2477527"/>
             <a:ext cx="4121834" cy="1477328"/>
           </a:xfrm>
           <a:prstGeom prst="rect">
@@ -17751,7 +18038,563 @@
 </p:sld>
 </file>
 
-<file path=ppt/slides/slide32.xml><?xml version="1.0" encoding="utf-8"?>
+<file path=ppt/slides/slide34.xml><?xml version="1.0" encoding="utf-8"?>
+<p:sld xmlns:a="http://schemas.openxmlformats.org/drawingml/2006/main" xmlns:r="http://schemas.openxmlformats.org/officeDocument/2006/relationships" xmlns:p="http://schemas.openxmlformats.org/presentationml/2006/main">
+  <p:cSld>
+    <p:spTree>
+      <p:nvGrpSpPr>
+        <p:cNvPr id="1" name=""/>
+        <p:cNvGrpSpPr/>
+        <p:nvPr/>
+      </p:nvGrpSpPr>
+      <p:grpSpPr>
+        <a:xfrm>
+          <a:off x="0" y="0"/>
+          <a:ext cx="0" cy="0"/>
+          <a:chOff x="0" y="0"/>
+          <a:chExt cx="0" cy="0"/>
+        </a:xfrm>
+      </p:grpSpPr>
+      <p:sp>
+        <p:nvSpPr>
+          <p:cNvPr id="2" name="כותרת 1">
+            <a:extLst>
+              <a:ext uri="{FF2B5EF4-FFF2-40B4-BE49-F238E27FC236}">
+                <a16:creationId xmlns:a16="http://schemas.microsoft.com/office/drawing/2014/main" id="{DE777293-170B-4164-A212-000191C56DFE}"/>
+              </a:ext>
+            </a:extLst>
+          </p:cNvPr>
+          <p:cNvSpPr>
+            <a:spLocks noGrp="1"/>
+          </p:cNvSpPr>
+          <p:nvPr>
+            <p:ph type="title"/>
+          </p:nvPr>
+        </p:nvSpPr>
+        <p:spPr/>
+        <p:txBody>
+          <a:bodyPr/>
+          <a:lstStyle/>
+          <a:p>
+            <a:pPr algn="ctr" rtl="1"/>
+            <a:r>
+              <a:rPr lang="he-IL"/>
+              <a:t>מסך </a:t>
+            </a:r>
+            <a:r>
+              <a:rPr lang="he-IL" dirty="0"/>
+              <a:t>הרשמה</a:t>
+            </a:r>
+          </a:p>
+        </p:txBody>
+      </p:sp>
+      <p:sp>
+        <p:nvSpPr>
+          <p:cNvPr id="5" name="תיבת טקסט 4">
+            <a:extLst>
+              <a:ext uri="{FF2B5EF4-FFF2-40B4-BE49-F238E27FC236}">
+                <a16:creationId xmlns:a16="http://schemas.microsoft.com/office/drawing/2014/main" id="{49C1F48E-4344-478F-B955-03346A467B7E}"/>
+              </a:ext>
+            </a:extLst>
+          </p:cNvPr>
+          <p:cNvSpPr txBox="1"/>
+          <p:nvPr/>
+        </p:nvSpPr>
+        <p:spPr>
+          <a:xfrm>
+            <a:off x="7919696" y="2477527"/>
+            <a:ext cx="4121834" cy="1200329"/>
+          </a:xfrm>
+          <a:prstGeom prst="rect">
+            <a:avLst/>
+          </a:prstGeom>
+          <a:noFill/>
+        </p:spPr>
+        <p:txBody>
+          <a:bodyPr wrap="square" rtlCol="1">
+            <a:spAutoFit/>
+          </a:bodyPr>
+          <a:lstStyle/>
+          <a:p>
+            <a:pPr marL="285750" indent="-285750" algn="r" rtl="1">
+              <a:buFont typeface="Arial" panose="020B0604020202020204" pitchFamily="34" charset="0"/>
+              <a:buChar char="•"/>
+            </a:pPr>
+            <a:r>
+              <a:rPr lang="he-IL" dirty="0"/>
+              <a:t>הוספנו שדה "אימות סיסמה" על מנת שהמשתמש לא יזין בטעות סיסמה שלא רצה – </a:t>
+            </a:r>
+            <a:r>
+              <a:rPr lang="he-IL" b="1" dirty="0"/>
+              <a:t>מניעת טעויות.</a:t>
+            </a:r>
+          </a:p>
+          <a:p>
+            <a:pPr marL="285750" indent="-285750" algn="r" rtl="1">
+              <a:buFont typeface="Arial" panose="020B0604020202020204" pitchFamily="34" charset="0"/>
+              <a:buChar char="•"/>
+            </a:pPr>
+            <a:r>
+              <a:rPr lang="he-IL" dirty="0"/>
+              <a:t>נוסיף סמל של "עזרה" ליד השדה סיסמה.</a:t>
+            </a:r>
+          </a:p>
+        </p:txBody>
+      </p:sp>
+      <p:pic>
+        <p:nvPicPr>
+          <p:cNvPr id="4" name="תמונה 3">
+            <a:extLst>
+              <a:ext uri="{FF2B5EF4-FFF2-40B4-BE49-F238E27FC236}">
+                <a16:creationId xmlns:a16="http://schemas.microsoft.com/office/drawing/2014/main" id="{0E31DD51-C1AC-4F56-8FC6-3D97FC3714E2}"/>
+              </a:ext>
+            </a:extLst>
+          </p:cNvPr>
+          <p:cNvPicPr>
+            <a:picLocks noChangeAspect="1"/>
+          </p:cNvPicPr>
+          <p:nvPr/>
+        </p:nvPicPr>
+        <p:blipFill>
+          <a:blip r:embed="rId2"/>
+          <a:stretch>
+            <a:fillRect/>
+          </a:stretch>
+        </p:blipFill>
+        <p:spPr>
+          <a:xfrm>
+            <a:off x="18757" y="2477527"/>
+            <a:ext cx="7781461" cy="4380473"/>
+          </a:xfrm>
+          <a:prstGeom prst="rect">
+            <a:avLst/>
+          </a:prstGeom>
+        </p:spPr>
+      </p:pic>
+    </p:spTree>
+    <p:extLst>
+      <p:ext uri="{BB962C8B-B14F-4D97-AF65-F5344CB8AC3E}">
+        <p14:creationId xmlns:p14="http://schemas.microsoft.com/office/powerpoint/2010/main" val="1077792874"/>
+      </p:ext>
+    </p:extLst>
+  </p:cSld>
+  <p:clrMapOvr>
+    <a:masterClrMapping/>
+  </p:clrMapOvr>
+</p:sld>
+</file>
+
+<file path=ppt/slides/slide35.xml><?xml version="1.0" encoding="utf-8"?>
+<p:sld xmlns:a="http://schemas.openxmlformats.org/drawingml/2006/main" xmlns:r="http://schemas.openxmlformats.org/officeDocument/2006/relationships" xmlns:p="http://schemas.openxmlformats.org/presentationml/2006/main">
+  <p:cSld>
+    <p:spTree>
+      <p:nvGrpSpPr>
+        <p:cNvPr id="1" name=""/>
+        <p:cNvGrpSpPr/>
+        <p:nvPr/>
+      </p:nvGrpSpPr>
+      <p:grpSpPr>
+        <a:xfrm>
+          <a:off x="0" y="0"/>
+          <a:ext cx="0" cy="0"/>
+          <a:chOff x="0" y="0"/>
+          <a:chExt cx="0" cy="0"/>
+        </a:xfrm>
+      </p:grpSpPr>
+      <p:sp>
+        <p:nvSpPr>
+          <p:cNvPr id="2" name="כותרת 1">
+            <a:extLst>
+              <a:ext uri="{FF2B5EF4-FFF2-40B4-BE49-F238E27FC236}">
+                <a16:creationId xmlns:a16="http://schemas.microsoft.com/office/drawing/2014/main" id="{DE777293-170B-4164-A212-000191C56DFE}"/>
+              </a:ext>
+            </a:extLst>
+          </p:cNvPr>
+          <p:cNvSpPr>
+            <a:spLocks noGrp="1"/>
+          </p:cNvSpPr>
+          <p:nvPr>
+            <p:ph type="title"/>
+          </p:nvPr>
+        </p:nvSpPr>
+        <p:spPr/>
+        <p:txBody>
+          <a:bodyPr/>
+          <a:lstStyle/>
+          <a:p>
+            <a:pPr algn="ctr" rtl="1"/>
+            <a:r>
+              <a:rPr lang="he-IL"/>
+              <a:t>מסך </a:t>
+            </a:r>
+            <a:r>
+              <a:rPr lang="he-IL" dirty="0"/>
+              <a:t>הרשמה</a:t>
+            </a:r>
+          </a:p>
+        </p:txBody>
+      </p:sp>
+      <p:sp>
+        <p:nvSpPr>
+          <p:cNvPr id="5" name="תיבת טקסט 4">
+            <a:extLst>
+              <a:ext uri="{FF2B5EF4-FFF2-40B4-BE49-F238E27FC236}">
+                <a16:creationId xmlns:a16="http://schemas.microsoft.com/office/drawing/2014/main" id="{49C1F48E-4344-478F-B955-03346A467B7E}"/>
+              </a:ext>
+            </a:extLst>
+          </p:cNvPr>
+          <p:cNvSpPr txBox="1"/>
+          <p:nvPr/>
+        </p:nvSpPr>
+        <p:spPr>
+          <a:xfrm>
+            <a:off x="7919696" y="2477527"/>
+            <a:ext cx="4121834" cy="923330"/>
+          </a:xfrm>
+          <a:prstGeom prst="rect">
+            <a:avLst/>
+          </a:prstGeom>
+          <a:noFill/>
+        </p:spPr>
+        <p:txBody>
+          <a:bodyPr wrap="square" rtlCol="1">
+            <a:spAutoFit/>
+          </a:bodyPr>
+          <a:lstStyle/>
+          <a:p>
+            <a:pPr marL="285750" indent="-285750" algn="r" rtl="1">
+              <a:buFont typeface="Arial" panose="020B0604020202020204" pitchFamily="34" charset="0"/>
+              <a:buChar char="•"/>
+            </a:pPr>
+            <a:r>
+              <a:rPr lang="he-IL" dirty="0"/>
+              <a:t>כאשר המשתמש יעמוד עם העכבר על סמל העזרה, יפתח פופ-אפ שיסביר לו על דרישות הסיסמה – </a:t>
+            </a:r>
+            <a:r>
+              <a:rPr lang="he-IL" b="1" dirty="0"/>
+              <a:t>עזרה ומסמכים.</a:t>
+            </a:r>
+            <a:endParaRPr lang="he-IL" dirty="0"/>
+          </a:p>
+        </p:txBody>
+      </p:sp>
+      <p:pic>
+        <p:nvPicPr>
+          <p:cNvPr id="3" name="תמונה 2">
+            <a:extLst>
+              <a:ext uri="{FF2B5EF4-FFF2-40B4-BE49-F238E27FC236}">
+                <a16:creationId xmlns:a16="http://schemas.microsoft.com/office/drawing/2014/main" id="{CF7F28FA-F2A3-4BF5-B0BE-9ABE3FAF5129}"/>
+              </a:ext>
+            </a:extLst>
+          </p:cNvPr>
+          <p:cNvPicPr>
+            <a:picLocks noChangeAspect="1"/>
+          </p:cNvPicPr>
+          <p:nvPr/>
+        </p:nvPicPr>
+        <p:blipFill>
+          <a:blip r:embed="rId2"/>
+          <a:stretch>
+            <a:fillRect/>
+          </a:stretch>
+        </p:blipFill>
+        <p:spPr>
+          <a:xfrm>
+            <a:off x="1" y="2477527"/>
+            <a:ext cx="7823508" cy="4391024"/>
+          </a:xfrm>
+          <a:prstGeom prst="rect">
+            <a:avLst/>
+          </a:prstGeom>
+        </p:spPr>
+      </p:pic>
+    </p:spTree>
+    <p:extLst>
+      <p:ext uri="{BB962C8B-B14F-4D97-AF65-F5344CB8AC3E}">
+        <p14:creationId xmlns:p14="http://schemas.microsoft.com/office/powerpoint/2010/main" val="275190794"/>
+      </p:ext>
+    </p:extLst>
+  </p:cSld>
+  <p:clrMapOvr>
+    <a:masterClrMapping/>
+  </p:clrMapOvr>
+</p:sld>
+</file>
+
+<file path=ppt/slides/slide36.xml><?xml version="1.0" encoding="utf-8"?>
+<p:sld xmlns:a="http://schemas.openxmlformats.org/drawingml/2006/main" xmlns:r="http://schemas.openxmlformats.org/officeDocument/2006/relationships" xmlns:p="http://schemas.openxmlformats.org/presentationml/2006/main">
+  <p:cSld>
+    <p:spTree>
+      <p:nvGrpSpPr>
+        <p:cNvPr id="1" name=""/>
+        <p:cNvGrpSpPr/>
+        <p:nvPr/>
+      </p:nvGrpSpPr>
+      <p:grpSpPr>
+        <a:xfrm>
+          <a:off x="0" y="0"/>
+          <a:ext cx="0" cy="0"/>
+          <a:chOff x="0" y="0"/>
+          <a:chExt cx="0" cy="0"/>
+        </a:xfrm>
+      </p:grpSpPr>
+      <p:sp>
+        <p:nvSpPr>
+          <p:cNvPr id="2" name="כותרת 1">
+            <a:extLst>
+              <a:ext uri="{FF2B5EF4-FFF2-40B4-BE49-F238E27FC236}">
+                <a16:creationId xmlns:a16="http://schemas.microsoft.com/office/drawing/2014/main" id="{DE777293-170B-4164-A212-000191C56DFE}"/>
+              </a:ext>
+            </a:extLst>
+          </p:cNvPr>
+          <p:cNvSpPr>
+            <a:spLocks noGrp="1"/>
+          </p:cNvSpPr>
+          <p:nvPr>
+            <p:ph type="title"/>
+          </p:nvPr>
+        </p:nvSpPr>
+        <p:spPr/>
+        <p:txBody>
+          <a:bodyPr/>
+          <a:lstStyle/>
+          <a:p>
+            <a:pPr algn="ctr" rtl="1"/>
+            <a:r>
+              <a:rPr lang="he-IL"/>
+              <a:t>מסך </a:t>
+            </a:r>
+            <a:r>
+              <a:rPr lang="he-IL" dirty="0"/>
+              <a:t>הרשמה</a:t>
+            </a:r>
+          </a:p>
+        </p:txBody>
+      </p:sp>
+      <p:sp>
+        <p:nvSpPr>
+          <p:cNvPr id="5" name="תיבת טקסט 4">
+            <a:extLst>
+              <a:ext uri="{FF2B5EF4-FFF2-40B4-BE49-F238E27FC236}">
+                <a16:creationId xmlns:a16="http://schemas.microsoft.com/office/drawing/2014/main" id="{49C1F48E-4344-478F-B955-03346A467B7E}"/>
+              </a:ext>
+            </a:extLst>
+          </p:cNvPr>
+          <p:cNvSpPr txBox="1"/>
+          <p:nvPr/>
+        </p:nvSpPr>
+        <p:spPr>
+          <a:xfrm>
+            <a:off x="7919696" y="2477527"/>
+            <a:ext cx="4121834" cy="1477328"/>
+          </a:xfrm>
+          <a:prstGeom prst="rect">
+            <a:avLst/>
+          </a:prstGeom>
+          <a:noFill/>
+        </p:spPr>
+        <p:txBody>
+          <a:bodyPr wrap="square" rtlCol="1">
+            <a:spAutoFit/>
+          </a:bodyPr>
+          <a:lstStyle/>
+          <a:p>
+            <a:pPr marL="285750" indent="-285750" algn="r" rtl="1">
+              <a:buFont typeface="Arial" panose="020B0604020202020204" pitchFamily="34" charset="0"/>
+              <a:buChar char="•"/>
+            </a:pPr>
+            <a:r>
+              <a:rPr lang="he-IL" dirty="0"/>
+              <a:t>במידה ואחד הערכים בשדות אינם תקינים, נחזיר הודעת שגיאה מתאימה ואינפורמטיבית עבור כל בעיה בקלט - </a:t>
+            </a:r>
+            <a:r>
+              <a:rPr lang="he-IL" b="1" dirty="0"/>
+              <a:t>עזרה בזיהוי, ניתוח והתאוששות מטעויות.</a:t>
+            </a:r>
+          </a:p>
+        </p:txBody>
+      </p:sp>
+      <p:pic>
+        <p:nvPicPr>
+          <p:cNvPr id="4" name="תמונה 3">
+            <a:extLst>
+              <a:ext uri="{FF2B5EF4-FFF2-40B4-BE49-F238E27FC236}">
+                <a16:creationId xmlns:a16="http://schemas.microsoft.com/office/drawing/2014/main" id="{8F2B87F0-BFF7-443B-B7D8-EE64A307640C}"/>
+              </a:ext>
+            </a:extLst>
+          </p:cNvPr>
+          <p:cNvPicPr>
+            <a:picLocks noChangeAspect="1"/>
+          </p:cNvPicPr>
+          <p:nvPr/>
+        </p:nvPicPr>
+        <p:blipFill>
+          <a:blip r:embed="rId2"/>
+          <a:stretch>
+            <a:fillRect/>
+          </a:stretch>
+        </p:blipFill>
+        <p:spPr>
+          <a:xfrm>
+            <a:off x="1" y="2305582"/>
+            <a:ext cx="8060788" cy="4552417"/>
+          </a:xfrm>
+          <a:prstGeom prst="rect">
+            <a:avLst/>
+          </a:prstGeom>
+        </p:spPr>
+      </p:pic>
+    </p:spTree>
+    <p:extLst>
+      <p:ext uri="{BB962C8B-B14F-4D97-AF65-F5344CB8AC3E}">
+        <p14:creationId xmlns:p14="http://schemas.microsoft.com/office/powerpoint/2010/main" val="2631093111"/>
+      </p:ext>
+    </p:extLst>
+  </p:cSld>
+  <p:clrMapOvr>
+    <a:masterClrMapping/>
+  </p:clrMapOvr>
+</p:sld>
+</file>
+
+<file path=ppt/slides/slide37.xml><?xml version="1.0" encoding="utf-8"?>
+<p:sld xmlns:a="http://schemas.openxmlformats.org/drawingml/2006/main" xmlns:r="http://schemas.openxmlformats.org/officeDocument/2006/relationships" xmlns:p="http://schemas.openxmlformats.org/presentationml/2006/main">
+  <p:cSld>
+    <p:spTree>
+      <p:nvGrpSpPr>
+        <p:cNvPr id="1" name=""/>
+        <p:cNvGrpSpPr/>
+        <p:nvPr/>
+      </p:nvGrpSpPr>
+      <p:grpSpPr>
+        <a:xfrm>
+          <a:off x="0" y="0"/>
+          <a:ext cx="0" cy="0"/>
+          <a:chOff x="0" y="0"/>
+          <a:chExt cx="0" cy="0"/>
+        </a:xfrm>
+      </p:grpSpPr>
+      <p:sp>
+        <p:nvSpPr>
+          <p:cNvPr id="2" name="כותרת 1">
+            <a:extLst>
+              <a:ext uri="{FF2B5EF4-FFF2-40B4-BE49-F238E27FC236}">
+                <a16:creationId xmlns:a16="http://schemas.microsoft.com/office/drawing/2014/main" id="{DE777293-170B-4164-A212-000191C56DFE}"/>
+              </a:ext>
+            </a:extLst>
+          </p:cNvPr>
+          <p:cNvSpPr>
+            <a:spLocks noGrp="1"/>
+          </p:cNvSpPr>
+          <p:nvPr>
+            <p:ph type="title"/>
+          </p:nvPr>
+        </p:nvSpPr>
+        <p:spPr/>
+        <p:txBody>
+          <a:bodyPr/>
+          <a:lstStyle/>
+          <a:p>
+            <a:pPr algn="ctr" rtl="1"/>
+            <a:r>
+              <a:rPr lang="he-IL"/>
+              <a:t>מסך </a:t>
+            </a:r>
+            <a:r>
+              <a:rPr lang="he-IL" dirty="0"/>
+              <a:t>הרשמה</a:t>
+            </a:r>
+          </a:p>
+        </p:txBody>
+      </p:sp>
+      <p:sp>
+        <p:nvSpPr>
+          <p:cNvPr id="5" name="תיבת טקסט 4">
+            <a:extLst>
+              <a:ext uri="{FF2B5EF4-FFF2-40B4-BE49-F238E27FC236}">
+                <a16:creationId xmlns:a16="http://schemas.microsoft.com/office/drawing/2014/main" id="{49C1F48E-4344-478F-B955-03346A467B7E}"/>
+              </a:ext>
+            </a:extLst>
+          </p:cNvPr>
+          <p:cNvSpPr txBox="1"/>
+          <p:nvPr/>
+        </p:nvSpPr>
+        <p:spPr>
+          <a:xfrm>
+            <a:off x="7919696" y="2477527"/>
+            <a:ext cx="4121834" cy="923330"/>
+          </a:xfrm>
+          <a:prstGeom prst="rect">
+            <a:avLst/>
+          </a:prstGeom>
+          <a:noFill/>
+        </p:spPr>
+        <p:txBody>
+          <a:bodyPr wrap="square" rtlCol="1">
+            <a:spAutoFit/>
+          </a:bodyPr>
+          <a:lstStyle/>
+          <a:p>
+            <a:pPr marL="285750" indent="-285750" algn="r" rtl="1">
+              <a:buFont typeface="Arial" panose="020B0604020202020204" pitchFamily="34" charset="0"/>
+              <a:buChar char="•"/>
+            </a:pPr>
+            <a:r>
+              <a:rPr lang="he-IL" dirty="0"/>
+              <a:t>כאשר אחד או יותר מהשדות חובה ריקות לא נאפשר ללחוץ על כפתור ה"הירשם" – </a:t>
+            </a:r>
+            <a:r>
+              <a:rPr lang="he-IL" b="1" dirty="0"/>
+              <a:t>מניעת טעויות.</a:t>
+            </a:r>
+            <a:endParaRPr lang="he-IL" dirty="0"/>
+          </a:p>
+        </p:txBody>
+      </p:sp>
+      <p:pic>
+        <p:nvPicPr>
+          <p:cNvPr id="4" name="תמונה 3">
+            <a:extLst>
+              <a:ext uri="{FF2B5EF4-FFF2-40B4-BE49-F238E27FC236}">
+                <a16:creationId xmlns:a16="http://schemas.microsoft.com/office/drawing/2014/main" id="{407C7C72-7DE0-4C9C-963E-8C4B6AD52CAF}"/>
+              </a:ext>
+            </a:extLst>
+          </p:cNvPr>
+          <p:cNvPicPr>
+            <a:picLocks noChangeAspect="1"/>
+          </p:cNvPicPr>
+          <p:nvPr/>
+        </p:nvPicPr>
+        <p:blipFill>
+          <a:blip r:embed="rId2"/>
+          <a:stretch>
+            <a:fillRect/>
+          </a:stretch>
+        </p:blipFill>
+        <p:spPr>
+          <a:xfrm>
+            <a:off x="0" y="2477527"/>
+            <a:ext cx="7790531" cy="4380473"/>
+          </a:xfrm>
+          <a:prstGeom prst="rect">
+            <a:avLst/>
+          </a:prstGeom>
+        </p:spPr>
+      </p:pic>
+    </p:spTree>
+    <p:extLst>
+      <p:ext uri="{BB962C8B-B14F-4D97-AF65-F5344CB8AC3E}">
+        <p14:creationId xmlns:p14="http://schemas.microsoft.com/office/powerpoint/2010/main" val="2646762809"/>
+      </p:ext>
+    </p:extLst>
+  </p:cSld>
+  <p:clrMapOvr>
+    <a:masterClrMapping/>
+  </p:clrMapOvr>
+</p:sld>
+</file>
+
+<file path=ppt/slides/slide38.xml><?xml version="1.0" encoding="utf-8"?>
 <p:sld xmlns:a="http://schemas.openxmlformats.org/drawingml/2006/main" xmlns:r="http://schemas.openxmlformats.org/officeDocument/2006/relationships" xmlns:p="http://schemas.openxmlformats.org/presentationml/2006/main">
   <p:cSld>
     <p:spTree>
@@ -17891,7 +18734,7 @@
 </p:sld>
 </file>
 
-<file path=ppt/slides/slide33.xml><?xml version="1.0" encoding="utf-8"?>
+<file path=ppt/slides/slide39.xml><?xml version="1.0" encoding="utf-8"?>
 <p:sld xmlns:a="http://schemas.openxmlformats.org/drawingml/2006/main" xmlns:r="http://schemas.openxmlformats.org/officeDocument/2006/relationships" xmlns:p="http://schemas.openxmlformats.org/presentationml/2006/main">
   <p:cSld>
     <p:spTree>
@@ -18015,1050 +18858,6 @@
     <p:extLst>
       <p:ext uri="{BB962C8B-B14F-4D97-AF65-F5344CB8AC3E}">
         <p14:creationId xmlns:p14="http://schemas.microsoft.com/office/powerpoint/2010/main" val="3822788990"/>
-      </p:ext>
-    </p:extLst>
-  </p:cSld>
-  <p:clrMapOvr>
-    <a:masterClrMapping/>
-  </p:clrMapOvr>
-</p:sld>
-</file>
-
-<file path=ppt/slides/slide34.xml><?xml version="1.0" encoding="utf-8"?>
-<p:sld xmlns:a="http://schemas.openxmlformats.org/drawingml/2006/main" xmlns:r="http://schemas.openxmlformats.org/officeDocument/2006/relationships" xmlns:p="http://schemas.openxmlformats.org/presentationml/2006/main">
-  <p:cSld>
-    <p:spTree>
-      <p:nvGrpSpPr>
-        <p:cNvPr id="1" name=""/>
-        <p:cNvGrpSpPr/>
-        <p:nvPr/>
-      </p:nvGrpSpPr>
-      <p:grpSpPr>
-        <a:xfrm>
-          <a:off x="0" y="0"/>
-          <a:ext cx="0" cy="0"/>
-          <a:chOff x="0" y="0"/>
-          <a:chExt cx="0" cy="0"/>
-        </a:xfrm>
-      </p:grpSpPr>
-      <p:sp>
-        <p:nvSpPr>
-          <p:cNvPr id="4" name="כותרת 1">
-            <a:extLst>
-              <a:ext uri="{FF2B5EF4-FFF2-40B4-BE49-F238E27FC236}">
-                <a16:creationId xmlns:a16="http://schemas.microsoft.com/office/drawing/2014/main" id="{77A4D537-50C0-4CD4-8506-D044B5D076BB}"/>
-              </a:ext>
-            </a:extLst>
-          </p:cNvPr>
-          <p:cNvSpPr>
-            <a:spLocks noGrp="1"/>
-          </p:cNvSpPr>
-          <p:nvPr>
-            <p:ph type="title"/>
-          </p:nvPr>
-        </p:nvSpPr>
-        <p:spPr>
-          <a:xfrm>
-            <a:off x="1154954" y="973669"/>
-            <a:ext cx="8825659" cy="706964"/>
-          </a:xfrm>
-        </p:spPr>
-        <p:txBody>
-          <a:bodyPr/>
-          <a:lstStyle/>
-          <a:p>
-            <a:pPr algn="ctr" rtl="1"/>
-            <a:r>
-              <a:rPr lang="he-IL" dirty="0"/>
-              <a:t>אזור אישי</a:t>
-            </a:r>
-          </a:p>
-        </p:txBody>
-      </p:sp>
-      <p:sp>
-        <p:nvSpPr>
-          <p:cNvPr id="5" name="תיבת טקסט 4">
-            <a:extLst>
-              <a:ext uri="{FF2B5EF4-FFF2-40B4-BE49-F238E27FC236}">
-                <a16:creationId xmlns:a16="http://schemas.microsoft.com/office/drawing/2014/main" id="{104EA44E-BC8B-4DD0-B075-E012933F25AE}"/>
-              </a:ext>
-            </a:extLst>
-          </p:cNvPr>
-          <p:cNvSpPr txBox="1"/>
-          <p:nvPr/>
-        </p:nvSpPr>
-        <p:spPr>
-          <a:xfrm>
-            <a:off x="7919696" y="2534088"/>
-            <a:ext cx="4121834" cy="2862322"/>
-          </a:xfrm>
-          <a:prstGeom prst="rect">
-            <a:avLst/>
-          </a:prstGeom>
-          <a:noFill/>
-        </p:spPr>
-        <p:txBody>
-          <a:bodyPr wrap="square" rtlCol="1">
-            <a:spAutoFit/>
-          </a:bodyPr>
-          <a:lstStyle/>
-          <a:p>
-            <a:pPr marL="285750" indent="-285750" algn="r" rtl="1">
-              <a:buFont typeface="Arial" panose="020B0604020202020204" pitchFamily="34" charset="0"/>
-              <a:buChar char="•"/>
-            </a:pPr>
-            <a:r>
-              <a:rPr lang="he-IL" dirty="0"/>
-              <a:t>הבנו שחסר מידע משמעותי למשתמש, המערכת שלנו משבצת פגישות בצורה אוטומטית, כל יום ב12 בלילה.</a:t>
-            </a:r>
-            <a:br>
-              <a:rPr lang="en-US" dirty="0"/>
-            </a:br>
-            <a:r>
-              <a:rPr lang="he-IL" dirty="0"/>
-              <a:t>כל פעם שמשתמש פותח פגישה חדשה, היא עדיין לא משובצת, ולמשתמש אין אינדיקציה שאכן תהליך פתיחת הפגישה הסתיים בהצלחה.</a:t>
-            </a:r>
-            <a:br>
-              <a:rPr lang="en-US" dirty="0"/>
-            </a:br>
-            <a:r>
-              <a:rPr lang="he-IL" dirty="0"/>
-              <a:t>לכן, הוספנו משבצת נוספת בה המשתמש יכול לראות את הפגישות שמחכות לשיבוץ מהמערכת.</a:t>
-            </a:r>
-          </a:p>
-        </p:txBody>
-      </p:sp>
-      <p:pic>
-        <p:nvPicPr>
-          <p:cNvPr id="7" name="תמונה 6">
-            <a:extLst>
-              <a:ext uri="{FF2B5EF4-FFF2-40B4-BE49-F238E27FC236}">
-                <a16:creationId xmlns:a16="http://schemas.microsoft.com/office/drawing/2014/main" id="{CBC310CA-627D-4DF2-A1A9-301985A9CDE5}"/>
-              </a:ext>
-            </a:extLst>
-          </p:cNvPr>
-          <p:cNvPicPr>
-            <a:picLocks noChangeAspect="1"/>
-          </p:cNvPicPr>
-          <p:nvPr/>
-        </p:nvPicPr>
-        <p:blipFill>
-          <a:blip r:embed="rId2"/>
-          <a:stretch>
-            <a:fillRect/>
-          </a:stretch>
-        </p:blipFill>
-        <p:spPr>
-          <a:xfrm>
-            <a:off x="0" y="2696066"/>
-            <a:ext cx="7400235" cy="4158667"/>
-          </a:xfrm>
-          <a:prstGeom prst="rect">
-            <a:avLst/>
-          </a:prstGeom>
-        </p:spPr>
-      </p:pic>
-    </p:spTree>
-    <p:extLst>
-      <p:ext uri="{BB962C8B-B14F-4D97-AF65-F5344CB8AC3E}">
-        <p14:creationId xmlns:p14="http://schemas.microsoft.com/office/powerpoint/2010/main" val="828814305"/>
-      </p:ext>
-    </p:extLst>
-  </p:cSld>
-  <p:clrMapOvr>
-    <a:masterClrMapping/>
-  </p:clrMapOvr>
-</p:sld>
-</file>
-
-<file path=ppt/slides/slide35.xml><?xml version="1.0" encoding="utf-8"?>
-<p:sld xmlns:a="http://schemas.openxmlformats.org/drawingml/2006/main" xmlns:r="http://schemas.openxmlformats.org/officeDocument/2006/relationships" xmlns:p="http://schemas.openxmlformats.org/presentationml/2006/main">
-  <p:cSld>
-    <p:spTree>
-      <p:nvGrpSpPr>
-        <p:cNvPr id="1" name=""/>
-        <p:cNvGrpSpPr/>
-        <p:nvPr/>
-      </p:nvGrpSpPr>
-      <p:grpSpPr>
-        <a:xfrm>
-          <a:off x="0" y="0"/>
-          <a:ext cx="0" cy="0"/>
-          <a:chOff x="0" y="0"/>
-          <a:chExt cx="0" cy="0"/>
-        </a:xfrm>
-      </p:grpSpPr>
-      <p:sp>
-        <p:nvSpPr>
-          <p:cNvPr id="4" name="כותרת 1">
-            <a:extLst>
-              <a:ext uri="{FF2B5EF4-FFF2-40B4-BE49-F238E27FC236}">
-                <a16:creationId xmlns:a16="http://schemas.microsoft.com/office/drawing/2014/main" id="{1CF8AA43-7E97-492E-83E5-3498889D34BE}"/>
-              </a:ext>
-            </a:extLst>
-          </p:cNvPr>
-          <p:cNvSpPr>
-            <a:spLocks noGrp="1"/>
-          </p:cNvSpPr>
-          <p:nvPr>
-            <p:ph type="title"/>
-          </p:nvPr>
-        </p:nvSpPr>
-        <p:spPr>
-          <a:xfrm>
-            <a:off x="1154954" y="973669"/>
-            <a:ext cx="8825659" cy="706964"/>
-          </a:xfrm>
-        </p:spPr>
-        <p:txBody>
-          <a:bodyPr/>
-          <a:lstStyle/>
-          <a:p>
-            <a:pPr algn="ctr" rtl="1"/>
-            <a:r>
-              <a:rPr lang="he-IL" dirty="0"/>
-              <a:t>אזור אישי</a:t>
-            </a:r>
-          </a:p>
-        </p:txBody>
-      </p:sp>
-      <p:sp>
-        <p:nvSpPr>
-          <p:cNvPr id="5" name="תיבת טקסט 4">
-            <a:extLst>
-              <a:ext uri="{FF2B5EF4-FFF2-40B4-BE49-F238E27FC236}">
-                <a16:creationId xmlns:a16="http://schemas.microsoft.com/office/drawing/2014/main" id="{8A00D926-C93A-496C-A149-3AC29F2C6F5C}"/>
-              </a:ext>
-            </a:extLst>
-          </p:cNvPr>
-          <p:cNvSpPr txBox="1"/>
-          <p:nvPr/>
-        </p:nvSpPr>
-        <p:spPr>
-          <a:xfrm>
-            <a:off x="7685975" y="2534088"/>
-            <a:ext cx="4121834" cy="2031325"/>
-          </a:xfrm>
-          <a:prstGeom prst="rect">
-            <a:avLst/>
-          </a:prstGeom>
-          <a:noFill/>
-        </p:spPr>
-        <p:txBody>
-          <a:bodyPr wrap="square" rtlCol="1">
-            <a:spAutoFit/>
-          </a:bodyPr>
-          <a:lstStyle/>
-          <a:p>
-            <a:pPr algn="r" rtl="1"/>
-            <a:r>
-              <a:rPr lang="he-IL" b="1" u="sng" dirty="0"/>
-              <a:t>משבצת </a:t>
-            </a:r>
-            <a:r>
-              <a:rPr lang="en-US" b="1" u="sng" dirty="0"/>
-              <a:t>"</a:t>
-            </a:r>
-            <a:r>
-              <a:rPr lang="he-IL" b="1" u="sng" dirty="0"/>
-              <a:t>הפגישות שלי</a:t>
-            </a:r>
-            <a:r>
-              <a:rPr lang="en-US" b="1" u="sng" dirty="0"/>
-              <a:t>"</a:t>
-            </a:r>
-            <a:endParaRPr lang="he-IL" b="1" u="sng" dirty="0"/>
-          </a:p>
-          <a:p>
-            <a:pPr algn="r" rtl="1"/>
-            <a:endParaRPr lang="he-IL" dirty="0"/>
-          </a:p>
-          <a:p>
-            <a:pPr marL="285750" indent="-285750" algn="r" rtl="1">
-              <a:buFont typeface="Arial" panose="020B0604020202020204" pitchFamily="34" charset="0"/>
-              <a:buChar char="•"/>
-            </a:pPr>
-            <a:r>
-              <a:rPr lang="he-IL" dirty="0"/>
-              <a:t>שינינו את הרווחים בין השורות.</a:t>
-            </a:r>
-          </a:p>
-          <a:p>
-            <a:pPr marL="285750" indent="-285750" algn="r" rtl="1">
-              <a:buFont typeface="Arial" panose="020B0604020202020204" pitchFamily="34" charset="0"/>
-              <a:buChar char="•"/>
-            </a:pPr>
-            <a:endParaRPr lang="he-IL" dirty="0"/>
-          </a:p>
-          <a:p>
-            <a:pPr marL="285750" indent="-285750" algn="r" rtl="1">
-              <a:buFont typeface="Arial" panose="020B0604020202020204" pitchFamily="34" charset="0"/>
-              <a:buChar char="•"/>
-            </a:pPr>
-            <a:r>
-              <a:rPr lang="he-IL" dirty="0"/>
-              <a:t>עימדנו את הפגישות בהתאם לכותרת.</a:t>
-            </a:r>
-          </a:p>
-          <a:p>
-            <a:pPr marL="285750" indent="-285750" algn="r" rtl="1">
-              <a:buFont typeface="Arial" panose="020B0604020202020204" pitchFamily="34" charset="0"/>
-              <a:buChar char="•"/>
-            </a:pPr>
-            <a:endParaRPr lang="he-IL" dirty="0"/>
-          </a:p>
-          <a:p>
-            <a:pPr marL="285750" indent="-285750" algn="r" rtl="1">
-              <a:buFont typeface="Arial" panose="020B0604020202020204" pitchFamily="34" charset="0"/>
-              <a:buChar char="•"/>
-            </a:pPr>
-            <a:r>
-              <a:rPr lang="he-IL" dirty="0"/>
-              <a:t>הוספנו את שעת הפגישה.</a:t>
-            </a:r>
-          </a:p>
-        </p:txBody>
-      </p:sp>
-      <p:pic>
-        <p:nvPicPr>
-          <p:cNvPr id="7" name="תמונה 6">
-            <a:extLst>
-              <a:ext uri="{FF2B5EF4-FFF2-40B4-BE49-F238E27FC236}">
-                <a16:creationId xmlns:a16="http://schemas.microsoft.com/office/drawing/2014/main" id="{BBFFBFD0-75E2-45C7-9B03-55961CF682E3}"/>
-              </a:ext>
-            </a:extLst>
-          </p:cNvPr>
-          <p:cNvPicPr>
-            <a:picLocks noChangeAspect="1"/>
-          </p:cNvPicPr>
-          <p:nvPr/>
-        </p:nvPicPr>
-        <p:blipFill>
-          <a:blip r:embed="rId2"/>
-          <a:stretch>
-            <a:fillRect/>
-          </a:stretch>
-        </p:blipFill>
-        <p:spPr>
-          <a:xfrm>
-            <a:off x="384191" y="2877581"/>
-            <a:ext cx="6238875" cy="3648075"/>
-          </a:xfrm>
-          <a:prstGeom prst="rect">
-            <a:avLst/>
-          </a:prstGeom>
-        </p:spPr>
-      </p:pic>
-    </p:spTree>
-    <p:extLst>
-      <p:ext uri="{BB962C8B-B14F-4D97-AF65-F5344CB8AC3E}">
-        <p14:creationId xmlns:p14="http://schemas.microsoft.com/office/powerpoint/2010/main" val="2166048656"/>
-      </p:ext>
-    </p:extLst>
-  </p:cSld>
-  <p:clrMapOvr>
-    <a:masterClrMapping/>
-  </p:clrMapOvr>
-</p:sld>
-</file>
-
-<file path=ppt/slides/slide36.xml><?xml version="1.0" encoding="utf-8"?>
-<p:sld xmlns:a="http://schemas.openxmlformats.org/drawingml/2006/main" xmlns:r="http://schemas.openxmlformats.org/officeDocument/2006/relationships" xmlns:p="http://schemas.openxmlformats.org/presentationml/2006/main">
-  <p:cSld>
-    <p:spTree>
-      <p:nvGrpSpPr>
-        <p:cNvPr id="1" name=""/>
-        <p:cNvGrpSpPr/>
-        <p:nvPr/>
-      </p:nvGrpSpPr>
-      <p:grpSpPr>
-        <a:xfrm>
-          <a:off x="0" y="0"/>
-          <a:ext cx="0" cy="0"/>
-          <a:chOff x="0" y="0"/>
-          <a:chExt cx="0" cy="0"/>
-        </a:xfrm>
-      </p:grpSpPr>
-      <p:sp>
-        <p:nvSpPr>
-          <p:cNvPr id="4" name="כותרת 1">
-            <a:extLst>
-              <a:ext uri="{FF2B5EF4-FFF2-40B4-BE49-F238E27FC236}">
-                <a16:creationId xmlns:a16="http://schemas.microsoft.com/office/drawing/2014/main" id="{5A5BEC2D-F28F-4D55-96B7-3B9C6271AC58}"/>
-              </a:ext>
-            </a:extLst>
-          </p:cNvPr>
-          <p:cNvSpPr>
-            <a:spLocks noGrp="1"/>
-          </p:cNvSpPr>
-          <p:nvPr>
-            <p:ph type="title"/>
-          </p:nvPr>
-        </p:nvSpPr>
-        <p:spPr>
-          <a:xfrm>
-            <a:off x="1154954" y="973669"/>
-            <a:ext cx="8825659" cy="706964"/>
-          </a:xfrm>
-        </p:spPr>
-        <p:txBody>
-          <a:bodyPr/>
-          <a:lstStyle/>
-          <a:p>
-            <a:pPr algn="ctr" rtl="1"/>
-            <a:r>
-              <a:rPr lang="he-IL" dirty="0"/>
-              <a:t>אזור אישי</a:t>
-            </a:r>
-          </a:p>
-        </p:txBody>
-      </p:sp>
-      <p:sp>
-        <p:nvSpPr>
-          <p:cNvPr id="8" name="תיבת טקסט 7">
-            <a:extLst>
-              <a:ext uri="{FF2B5EF4-FFF2-40B4-BE49-F238E27FC236}">
-                <a16:creationId xmlns:a16="http://schemas.microsoft.com/office/drawing/2014/main" id="{C0192822-6DB4-482C-AEB0-960091DDCA35}"/>
-              </a:ext>
-            </a:extLst>
-          </p:cNvPr>
-          <p:cNvSpPr txBox="1"/>
-          <p:nvPr/>
-        </p:nvSpPr>
-        <p:spPr>
-          <a:xfrm>
-            <a:off x="7685975" y="2534088"/>
-            <a:ext cx="4121834" cy="3693319"/>
-          </a:xfrm>
-          <a:prstGeom prst="rect">
-            <a:avLst/>
-          </a:prstGeom>
-          <a:noFill/>
-        </p:spPr>
-        <p:txBody>
-          <a:bodyPr wrap="square" rtlCol="1">
-            <a:spAutoFit/>
-          </a:bodyPr>
-          <a:lstStyle/>
-          <a:p>
-            <a:pPr algn="r" rtl="1"/>
-            <a:r>
-              <a:rPr lang="he-IL" b="1" u="sng" dirty="0"/>
-              <a:t>משבצת </a:t>
-            </a:r>
-            <a:r>
-              <a:rPr lang="en-US" b="1" u="sng" dirty="0"/>
-              <a:t>"</a:t>
-            </a:r>
-            <a:r>
-              <a:rPr lang="he-IL" b="1" u="sng" dirty="0"/>
-              <a:t>פגישות ממתינות לאישור":</a:t>
-            </a:r>
-          </a:p>
-          <a:p>
-            <a:pPr algn="r" rtl="1"/>
-            <a:endParaRPr lang="he-IL" dirty="0"/>
-          </a:p>
-          <a:p>
-            <a:pPr marL="285750" indent="-285750" algn="r" rtl="1">
-              <a:buFont typeface="Arial" panose="020B0604020202020204" pitchFamily="34" charset="0"/>
-              <a:buChar char="•"/>
-            </a:pPr>
-            <a:r>
-              <a:rPr lang="he-IL" dirty="0"/>
-              <a:t>הזזנו את הביטול והאישור מצד ימין לצד שמאל כך שהם מעומדים יחד עם כפור הצפייה.</a:t>
-            </a:r>
-          </a:p>
-          <a:p>
-            <a:pPr marL="285750" indent="-285750" algn="r" rtl="1">
-              <a:buFont typeface="Arial" panose="020B0604020202020204" pitchFamily="34" charset="0"/>
-              <a:buChar char="•"/>
-            </a:pPr>
-            <a:endParaRPr lang="he-IL" dirty="0"/>
-          </a:p>
-          <a:p>
-            <a:pPr marL="285750" indent="-285750" algn="r" rtl="1">
-              <a:buFont typeface="Arial" panose="020B0604020202020204" pitchFamily="34" charset="0"/>
-              <a:buChar char="•"/>
-            </a:pPr>
-            <a:r>
-              <a:rPr lang="he-IL" dirty="0"/>
-              <a:t>שינינו את הגדלים ואת הצבעים של כפתורי האישור והביטול כך שיתאימו לכפתור הצפייה ולסטנדרט של המערכת.</a:t>
-            </a:r>
-          </a:p>
-          <a:p>
-            <a:pPr marL="285750" indent="-285750" algn="r" rtl="1">
-              <a:buFont typeface="Arial" panose="020B0604020202020204" pitchFamily="34" charset="0"/>
-              <a:buChar char="•"/>
-            </a:pPr>
-            <a:endParaRPr lang="he-IL" dirty="0"/>
-          </a:p>
-          <a:p>
-            <a:pPr marL="285750" indent="-285750" algn="r" rtl="1">
-              <a:buFont typeface="Arial" panose="020B0604020202020204" pitchFamily="34" charset="0"/>
-              <a:buChar char="•"/>
-            </a:pPr>
-            <a:r>
-              <a:rPr lang="he-IL" dirty="0"/>
-              <a:t>שינינו את המרווח בין הפריטים.</a:t>
-            </a:r>
-          </a:p>
-          <a:p>
-            <a:pPr algn="r" rtl="1"/>
-            <a:endParaRPr lang="he-IL" dirty="0"/>
-          </a:p>
-          <a:p>
-            <a:pPr marL="285750" indent="-285750" algn="r" rtl="1">
-              <a:buFont typeface="Arial" panose="020B0604020202020204" pitchFamily="34" charset="0"/>
-              <a:buChar char="•"/>
-            </a:pPr>
-            <a:r>
-              <a:rPr lang="he-IL" dirty="0"/>
-              <a:t>סדר הפגישות ממוין לפי התאריך.</a:t>
-            </a:r>
-          </a:p>
-        </p:txBody>
-      </p:sp>
-      <p:pic>
-        <p:nvPicPr>
-          <p:cNvPr id="9" name="תמונה 8">
-            <a:extLst>
-              <a:ext uri="{FF2B5EF4-FFF2-40B4-BE49-F238E27FC236}">
-                <a16:creationId xmlns:a16="http://schemas.microsoft.com/office/drawing/2014/main" id="{A5CD8385-62A6-4378-A56D-72D9E7E603C4}"/>
-              </a:ext>
-            </a:extLst>
-          </p:cNvPr>
-          <p:cNvPicPr>
-            <a:picLocks noChangeAspect="1"/>
-          </p:cNvPicPr>
-          <p:nvPr/>
-        </p:nvPicPr>
-        <p:blipFill>
-          <a:blip r:embed="rId2"/>
-          <a:stretch>
-            <a:fillRect/>
-          </a:stretch>
-        </p:blipFill>
-        <p:spPr>
-          <a:xfrm>
-            <a:off x="230709" y="3609852"/>
-            <a:ext cx="7642893" cy="3139322"/>
-          </a:xfrm>
-          <a:prstGeom prst="rect">
-            <a:avLst/>
-          </a:prstGeom>
-        </p:spPr>
-      </p:pic>
-    </p:spTree>
-    <p:extLst>
-      <p:ext uri="{BB962C8B-B14F-4D97-AF65-F5344CB8AC3E}">
-        <p14:creationId xmlns:p14="http://schemas.microsoft.com/office/powerpoint/2010/main" val="1793708727"/>
-      </p:ext>
-    </p:extLst>
-  </p:cSld>
-  <p:clrMapOvr>
-    <a:masterClrMapping/>
-  </p:clrMapOvr>
-</p:sld>
-</file>
-
-<file path=ppt/slides/slide37.xml><?xml version="1.0" encoding="utf-8"?>
-<p:sld xmlns:a="http://schemas.openxmlformats.org/drawingml/2006/main" xmlns:r="http://schemas.openxmlformats.org/officeDocument/2006/relationships" xmlns:p="http://schemas.openxmlformats.org/presentationml/2006/main">
-  <p:cSld>
-    <p:spTree>
-      <p:nvGrpSpPr>
-        <p:cNvPr id="1" name=""/>
-        <p:cNvGrpSpPr/>
-        <p:nvPr/>
-      </p:nvGrpSpPr>
-      <p:grpSpPr>
-        <a:xfrm>
-          <a:off x="0" y="0"/>
-          <a:ext cx="0" cy="0"/>
-          <a:chOff x="0" y="0"/>
-          <a:chExt cx="0" cy="0"/>
-        </a:xfrm>
-      </p:grpSpPr>
-      <p:sp>
-        <p:nvSpPr>
-          <p:cNvPr id="4" name="כותרת 1">
-            <a:extLst>
-              <a:ext uri="{FF2B5EF4-FFF2-40B4-BE49-F238E27FC236}">
-                <a16:creationId xmlns:a16="http://schemas.microsoft.com/office/drawing/2014/main" id="{9DC245D2-F8BC-422C-A2B9-39E3C7451A8C}"/>
-              </a:ext>
-            </a:extLst>
-          </p:cNvPr>
-          <p:cNvSpPr>
-            <a:spLocks noGrp="1"/>
-          </p:cNvSpPr>
-          <p:nvPr>
-            <p:ph type="title"/>
-          </p:nvPr>
-        </p:nvSpPr>
-        <p:spPr>
-          <a:xfrm>
-            <a:off x="1154954" y="973669"/>
-            <a:ext cx="8825659" cy="706964"/>
-          </a:xfrm>
-        </p:spPr>
-        <p:txBody>
-          <a:bodyPr/>
-          <a:lstStyle/>
-          <a:p>
-            <a:pPr algn="ctr" rtl="1"/>
-            <a:r>
-              <a:rPr lang="he-IL" dirty="0"/>
-              <a:t>אזור אישי</a:t>
-            </a:r>
-          </a:p>
-        </p:txBody>
-      </p:sp>
-      <p:sp>
-        <p:nvSpPr>
-          <p:cNvPr id="5" name="תיבת טקסט 4">
-            <a:extLst>
-              <a:ext uri="{FF2B5EF4-FFF2-40B4-BE49-F238E27FC236}">
-                <a16:creationId xmlns:a16="http://schemas.microsoft.com/office/drawing/2014/main" id="{DC64E9DF-030D-4F2E-BA9F-4D2CF7B30438}"/>
-              </a:ext>
-            </a:extLst>
-          </p:cNvPr>
-          <p:cNvSpPr txBox="1"/>
-          <p:nvPr/>
-        </p:nvSpPr>
-        <p:spPr>
-          <a:xfrm>
-            <a:off x="7685975" y="2534088"/>
-            <a:ext cx="4121834" cy="2862322"/>
-          </a:xfrm>
-          <a:prstGeom prst="rect">
-            <a:avLst/>
-          </a:prstGeom>
-          <a:noFill/>
-        </p:spPr>
-        <p:txBody>
-          <a:bodyPr wrap="square" rtlCol="1">
-            <a:spAutoFit/>
-          </a:bodyPr>
-          <a:lstStyle/>
-          <a:p>
-            <a:pPr algn="r" rtl="1"/>
-            <a:r>
-              <a:rPr lang="he-IL" b="1" u="sng" dirty="0"/>
-              <a:t>משבצת "המיקומים שלי":</a:t>
-            </a:r>
-          </a:p>
-          <a:p>
-            <a:pPr algn="r" rtl="1"/>
-            <a:endParaRPr lang="he-IL" dirty="0"/>
-          </a:p>
-          <a:p>
-            <a:pPr marL="285750" indent="-285750" algn="r" rtl="1">
-              <a:buFont typeface="Arial" panose="020B0604020202020204" pitchFamily="34" charset="0"/>
-              <a:buChar char="•"/>
-            </a:pPr>
-            <a:r>
-              <a:rPr lang="he-IL" dirty="0"/>
-              <a:t>שינינו את האייקון של המחיקה שיהיה אחיד לאייקונים במערכת.</a:t>
-            </a:r>
-          </a:p>
-          <a:p>
-            <a:pPr marL="285750" indent="-285750" algn="r" rtl="1">
-              <a:buFont typeface="Arial" panose="020B0604020202020204" pitchFamily="34" charset="0"/>
-              <a:buChar char="•"/>
-            </a:pPr>
-            <a:endParaRPr lang="he-IL" dirty="0"/>
-          </a:p>
-          <a:p>
-            <a:pPr marL="285750" indent="-285750" algn="r" rtl="1">
-              <a:buFont typeface="Arial" panose="020B0604020202020204" pitchFamily="34" charset="0"/>
-              <a:buChar char="•"/>
-            </a:pPr>
-            <a:r>
-              <a:rPr lang="he-IL" dirty="0"/>
-              <a:t>שינינו את כפתור הוספת מיקום, כך שיראה יותר יפה ואסתטי והשתמשנו באייקון במקום טקסט.</a:t>
-            </a:r>
-          </a:p>
-          <a:p>
-            <a:pPr marL="285750" indent="-285750" algn="r" rtl="1">
-              <a:buFont typeface="Arial" panose="020B0604020202020204" pitchFamily="34" charset="0"/>
-              <a:buChar char="•"/>
-            </a:pPr>
-            <a:endParaRPr lang="he-IL" dirty="0"/>
-          </a:p>
-          <a:p>
-            <a:pPr marL="285750" indent="-285750" algn="r" rtl="1">
-              <a:buFont typeface="Arial" panose="020B0604020202020204" pitchFamily="34" charset="0"/>
-              <a:buChar char="•"/>
-            </a:pPr>
-            <a:r>
-              <a:rPr lang="he-IL" dirty="0"/>
-              <a:t>שינינו את המרווח בין הפריטים.</a:t>
-            </a:r>
-          </a:p>
-        </p:txBody>
-      </p:sp>
-      <p:pic>
-        <p:nvPicPr>
-          <p:cNvPr id="8" name="תמונה 7">
-            <a:extLst>
-              <a:ext uri="{FF2B5EF4-FFF2-40B4-BE49-F238E27FC236}">
-                <a16:creationId xmlns:a16="http://schemas.microsoft.com/office/drawing/2014/main" id="{57A67FB7-6648-4E51-AF1B-676A350766EC}"/>
-              </a:ext>
-            </a:extLst>
-          </p:cNvPr>
-          <p:cNvPicPr>
-            <a:picLocks noChangeAspect="1"/>
-          </p:cNvPicPr>
-          <p:nvPr/>
-        </p:nvPicPr>
-        <p:blipFill>
-          <a:blip r:embed="rId2"/>
-          <a:stretch>
-            <a:fillRect/>
-          </a:stretch>
-        </p:blipFill>
-        <p:spPr>
-          <a:xfrm>
-            <a:off x="165116" y="3429000"/>
-            <a:ext cx="6315075" cy="3314700"/>
-          </a:xfrm>
-          <a:prstGeom prst="rect">
-            <a:avLst/>
-          </a:prstGeom>
-        </p:spPr>
-      </p:pic>
-    </p:spTree>
-    <p:extLst>
-      <p:ext uri="{BB962C8B-B14F-4D97-AF65-F5344CB8AC3E}">
-        <p14:creationId xmlns:p14="http://schemas.microsoft.com/office/powerpoint/2010/main" val="2706630592"/>
-      </p:ext>
-    </p:extLst>
-  </p:cSld>
-  <p:clrMapOvr>
-    <a:masterClrMapping/>
-  </p:clrMapOvr>
-</p:sld>
-</file>
-
-<file path=ppt/slides/slide38.xml><?xml version="1.0" encoding="utf-8"?>
-<p:sld xmlns:a="http://schemas.openxmlformats.org/drawingml/2006/main" xmlns:r="http://schemas.openxmlformats.org/officeDocument/2006/relationships" xmlns:p="http://schemas.openxmlformats.org/presentationml/2006/main">
-  <p:cSld>
-    <p:spTree>
-      <p:nvGrpSpPr>
-        <p:cNvPr id="1" name=""/>
-        <p:cNvGrpSpPr/>
-        <p:nvPr/>
-      </p:nvGrpSpPr>
-      <p:grpSpPr>
-        <a:xfrm>
-          <a:off x="0" y="0"/>
-          <a:ext cx="0" cy="0"/>
-          <a:chOff x="0" y="0"/>
-          <a:chExt cx="0" cy="0"/>
-        </a:xfrm>
-      </p:grpSpPr>
-      <p:sp>
-        <p:nvSpPr>
-          <p:cNvPr id="4" name="כותרת 1">
-            <a:extLst>
-              <a:ext uri="{FF2B5EF4-FFF2-40B4-BE49-F238E27FC236}">
-                <a16:creationId xmlns:a16="http://schemas.microsoft.com/office/drawing/2014/main" id="{73DBC8F2-C1B3-4457-A23C-DA9A46AE7EF5}"/>
-              </a:ext>
-            </a:extLst>
-          </p:cNvPr>
-          <p:cNvSpPr>
-            <a:spLocks noGrp="1"/>
-          </p:cNvSpPr>
-          <p:nvPr>
-            <p:ph type="title"/>
-          </p:nvPr>
-        </p:nvSpPr>
-        <p:spPr>
-          <a:xfrm>
-            <a:off x="1154954" y="973669"/>
-            <a:ext cx="8825659" cy="706964"/>
-          </a:xfrm>
-        </p:spPr>
-        <p:txBody>
-          <a:bodyPr/>
-          <a:lstStyle/>
-          <a:p>
-            <a:pPr algn="ctr" rtl="1"/>
-            <a:r>
-              <a:rPr lang="he-IL" dirty="0"/>
-              <a:t>אזור אישי</a:t>
-            </a:r>
-          </a:p>
-        </p:txBody>
-      </p:sp>
-      <p:sp>
-        <p:nvSpPr>
-          <p:cNvPr id="5" name="תיבת טקסט 4">
-            <a:extLst>
-              <a:ext uri="{FF2B5EF4-FFF2-40B4-BE49-F238E27FC236}">
-                <a16:creationId xmlns:a16="http://schemas.microsoft.com/office/drawing/2014/main" id="{A0B248C0-6A86-4C32-8EB5-4142E5A65D4E}"/>
-              </a:ext>
-            </a:extLst>
-          </p:cNvPr>
-          <p:cNvSpPr txBox="1"/>
-          <p:nvPr/>
-        </p:nvSpPr>
-        <p:spPr>
-          <a:xfrm>
-            <a:off x="7685975" y="2534088"/>
-            <a:ext cx="4121834" cy="2031325"/>
-          </a:xfrm>
-          <a:prstGeom prst="rect">
-            <a:avLst/>
-          </a:prstGeom>
-          <a:noFill/>
-        </p:spPr>
-        <p:txBody>
-          <a:bodyPr wrap="square" rtlCol="1">
-            <a:spAutoFit/>
-          </a:bodyPr>
-          <a:lstStyle/>
-          <a:p>
-            <a:pPr algn="r" rtl="1"/>
-            <a:r>
-              <a:rPr lang="he-IL" b="1" u="sng" dirty="0"/>
-              <a:t>משבצת "המיקומים שלי":</a:t>
-            </a:r>
-          </a:p>
-          <a:p>
-            <a:pPr algn="r" rtl="1"/>
-            <a:endParaRPr lang="he-IL" dirty="0"/>
-          </a:p>
-          <a:p>
-            <a:pPr marL="285750" indent="-285750" algn="r" rtl="1">
-              <a:buFont typeface="Arial" panose="020B0604020202020204" pitchFamily="34" charset="0"/>
-              <a:buChar char="•"/>
-            </a:pPr>
-            <a:r>
-              <a:rPr lang="he-IL" dirty="0"/>
-              <a:t>שינינו את כפתור ההוספה שוב כדי שיתאים לסטנדרט המערכת.</a:t>
-            </a:r>
-          </a:p>
-          <a:p>
-            <a:pPr algn="r" rtl="1"/>
-            <a:endParaRPr lang="he-IL" dirty="0"/>
-          </a:p>
-          <a:p>
-            <a:pPr marL="285750" indent="-285750" algn="r" rtl="1">
-              <a:buFont typeface="Arial" panose="020B0604020202020204" pitchFamily="34" charset="0"/>
-              <a:buChar char="•"/>
-            </a:pPr>
-            <a:r>
-              <a:rPr lang="he-IL" dirty="0"/>
-              <a:t>הכפתור עוצב על פי שיטת העיצוב </a:t>
-            </a:r>
-            <a:r>
-              <a:rPr lang="en-US" dirty="0"/>
-              <a:t>material design</a:t>
-            </a:r>
-            <a:r>
-              <a:rPr lang="he-IL" dirty="0"/>
-              <a:t> של גוגל.</a:t>
-            </a:r>
-          </a:p>
-        </p:txBody>
-      </p:sp>
-      <p:pic>
-        <p:nvPicPr>
-          <p:cNvPr id="8" name="תמונה 7">
-            <a:extLst>
-              <a:ext uri="{FF2B5EF4-FFF2-40B4-BE49-F238E27FC236}">
-                <a16:creationId xmlns:a16="http://schemas.microsoft.com/office/drawing/2014/main" id="{8D2EB5EF-5A32-43C6-A237-C28CA3A3D4DB}"/>
-              </a:ext>
-            </a:extLst>
-          </p:cNvPr>
-          <p:cNvPicPr>
-            <a:picLocks noChangeAspect="1"/>
-          </p:cNvPicPr>
-          <p:nvPr/>
-        </p:nvPicPr>
-        <p:blipFill>
-          <a:blip r:embed="rId2"/>
-          <a:stretch>
-            <a:fillRect/>
-          </a:stretch>
-        </p:blipFill>
-        <p:spPr>
-          <a:xfrm>
-            <a:off x="384191" y="3549750"/>
-            <a:ext cx="6172200" cy="3190875"/>
-          </a:xfrm>
-          <a:prstGeom prst="rect">
-            <a:avLst/>
-          </a:prstGeom>
-        </p:spPr>
-      </p:pic>
-    </p:spTree>
-    <p:extLst>
-      <p:ext uri="{BB962C8B-B14F-4D97-AF65-F5344CB8AC3E}">
-        <p14:creationId xmlns:p14="http://schemas.microsoft.com/office/powerpoint/2010/main" val="1431834300"/>
-      </p:ext>
-    </p:extLst>
-  </p:cSld>
-  <p:clrMapOvr>
-    <a:masterClrMapping/>
-  </p:clrMapOvr>
-</p:sld>
-</file>
-
-<file path=ppt/slides/slide39.xml><?xml version="1.0" encoding="utf-8"?>
-<p:sld xmlns:a="http://schemas.openxmlformats.org/drawingml/2006/main" xmlns:r="http://schemas.openxmlformats.org/officeDocument/2006/relationships" xmlns:p="http://schemas.openxmlformats.org/presentationml/2006/main">
-  <p:cSld>
-    <p:spTree>
-      <p:nvGrpSpPr>
-        <p:cNvPr id="1" name=""/>
-        <p:cNvGrpSpPr/>
-        <p:nvPr/>
-      </p:nvGrpSpPr>
-      <p:grpSpPr>
-        <a:xfrm>
-          <a:off x="0" y="0"/>
-          <a:ext cx="0" cy="0"/>
-          <a:chOff x="0" y="0"/>
-          <a:chExt cx="0" cy="0"/>
-        </a:xfrm>
-      </p:grpSpPr>
-      <p:sp>
-        <p:nvSpPr>
-          <p:cNvPr id="4" name="כותרת 1">
-            <a:extLst>
-              <a:ext uri="{FF2B5EF4-FFF2-40B4-BE49-F238E27FC236}">
-                <a16:creationId xmlns:a16="http://schemas.microsoft.com/office/drawing/2014/main" id="{BBC3B682-CCD3-40B0-B8FA-BB5FDA754345}"/>
-              </a:ext>
-            </a:extLst>
-          </p:cNvPr>
-          <p:cNvSpPr>
-            <a:spLocks noGrp="1"/>
-          </p:cNvSpPr>
-          <p:nvPr>
-            <p:ph type="title"/>
-          </p:nvPr>
-        </p:nvSpPr>
-        <p:spPr>
-          <a:xfrm>
-            <a:off x="1154954" y="973669"/>
-            <a:ext cx="8825659" cy="706964"/>
-          </a:xfrm>
-        </p:spPr>
-        <p:txBody>
-          <a:bodyPr/>
-          <a:lstStyle/>
-          <a:p>
-            <a:pPr algn="ctr" rtl="1"/>
-            <a:r>
-              <a:rPr lang="he-IL" dirty="0"/>
-              <a:t>אזור אישי</a:t>
-            </a:r>
-          </a:p>
-        </p:txBody>
-      </p:sp>
-      <p:sp>
-        <p:nvSpPr>
-          <p:cNvPr id="5" name="תיבת טקסט 4">
-            <a:extLst>
-              <a:ext uri="{FF2B5EF4-FFF2-40B4-BE49-F238E27FC236}">
-                <a16:creationId xmlns:a16="http://schemas.microsoft.com/office/drawing/2014/main" id="{71FF33C9-F0A1-4BB9-8DE3-BD1199DF4336}"/>
-              </a:ext>
-            </a:extLst>
-          </p:cNvPr>
-          <p:cNvSpPr txBox="1"/>
-          <p:nvPr/>
-        </p:nvSpPr>
-        <p:spPr>
-          <a:xfrm>
-            <a:off x="7685975" y="2534088"/>
-            <a:ext cx="4121834" cy="2308324"/>
-          </a:xfrm>
-          <a:prstGeom prst="rect">
-            <a:avLst/>
-          </a:prstGeom>
-          <a:noFill/>
-        </p:spPr>
-        <p:txBody>
-          <a:bodyPr wrap="square" rtlCol="1">
-            <a:spAutoFit/>
-          </a:bodyPr>
-          <a:lstStyle/>
-          <a:p>
-            <a:pPr algn="r" rtl="1"/>
-            <a:r>
-              <a:rPr lang="he-IL" b="1" u="sng" dirty="0"/>
-              <a:t>משבצת </a:t>
-            </a:r>
-            <a:r>
-              <a:rPr lang="en-US" b="1" u="sng" dirty="0"/>
-              <a:t>"</a:t>
-            </a:r>
-            <a:r>
-              <a:rPr lang="he-IL" b="1" u="sng" dirty="0"/>
-              <a:t>פגישות ממתינות לאישור":</a:t>
-            </a:r>
-          </a:p>
-          <a:p>
-            <a:pPr algn="r" rtl="1"/>
-            <a:endParaRPr lang="he-IL" dirty="0"/>
-          </a:p>
-          <a:p>
-            <a:pPr marL="285750" indent="-285750" algn="r" rtl="1">
-              <a:buFont typeface="Arial" panose="020B0604020202020204" pitchFamily="34" charset="0"/>
-              <a:buChar char="•"/>
-            </a:pPr>
-            <a:r>
-              <a:rPr lang="he-IL" dirty="0"/>
-              <a:t>המשבצת אחידה למשבצות האחרות בדף, (אייקונים, מרווחים).</a:t>
-            </a:r>
-          </a:p>
-          <a:p>
-            <a:pPr marL="285750" indent="-285750" algn="r" rtl="1">
-              <a:buFont typeface="Arial" panose="020B0604020202020204" pitchFamily="34" charset="0"/>
-              <a:buChar char="•"/>
-            </a:pPr>
-            <a:r>
-              <a:rPr lang="he-IL" dirty="0"/>
-              <a:t>הוספנו הודעה במקרה שאין מידע להצגה (כמו כן, במשבצות האחרות בעמוד), כדי שהמשתמש לא יחשוב שיש משהו לא בסדר במערכת.</a:t>
-            </a:r>
-          </a:p>
-        </p:txBody>
-      </p:sp>
-      <p:pic>
-        <p:nvPicPr>
-          <p:cNvPr id="7" name="תמונה 6">
-            <a:extLst>
-              <a:ext uri="{FF2B5EF4-FFF2-40B4-BE49-F238E27FC236}">
-                <a16:creationId xmlns:a16="http://schemas.microsoft.com/office/drawing/2014/main" id="{455F304E-C0D2-4802-A411-BD7F40CD43EB}"/>
-              </a:ext>
-            </a:extLst>
-          </p:cNvPr>
-          <p:cNvPicPr>
-            <a:picLocks noChangeAspect="1"/>
-          </p:cNvPicPr>
-          <p:nvPr/>
-        </p:nvPicPr>
-        <p:blipFill>
-          <a:blip r:embed="rId2"/>
-          <a:stretch>
-            <a:fillRect/>
-          </a:stretch>
-        </p:blipFill>
-        <p:spPr>
-          <a:xfrm>
-            <a:off x="0" y="3926104"/>
-            <a:ext cx="7821038" cy="2741395"/>
-          </a:xfrm>
-          <a:prstGeom prst="rect">
-            <a:avLst/>
-          </a:prstGeom>
-        </p:spPr>
-      </p:pic>
-    </p:spTree>
-    <p:extLst>
-      <p:ext uri="{BB962C8B-B14F-4D97-AF65-F5344CB8AC3E}">
-        <p14:creationId xmlns:p14="http://schemas.microsoft.com/office/powerpoint/2010/main" val="2753159462"/>
       </p:ext>
     </p:extLst>
   </p:cSld>
@@ -19283,6 +19082,1050 @@
 </file>
 
 <file path=ppt/slides/slide40.xml><?xml version="1.0" encoding="utf-8"?>
+<p:sld xmlns:a="http://schemas.openxmlformats.org/drawingml/2006/main" xmlns:r="http://schemas.openxmlformats.org/officeDocument/2006/relationships" xmlns:p="http://schemas.openxmlformats.org/presentationml/2006/main">
+  <p:cSld>
+    <p:spTree>
+      <p:nvGrpSpPr>
+        <p:cNvPr id="1" name=""/>
+        <p:cNvGrpSpPr/>
+        <p:nvPr/>
+      </p:nvGrpSpPr>
+      <p:grpSpPr>
+        <a:xfrm>
+          <a:off x="0" y="0"/>
+          <a:ext cx="0" cy="0"/>
+          <a:chOff x="0" y="0"/>
+          <a:chExt cx="0" cy="0"/>
+        </a:xfrm>
+      </p:grpSpPr>
+      <p:sp>
+        <p:nvSpPr>
+          <p:cNvPr id="4" name="כותרת 1">
+            <a:extLst>
+              <a:ext uri="{FF2B5EF4-FFF2-40B4-BE49-F238E27FC236}">
+                <a16:creationId xmlns:a16="http://schemas.microsoft.com/office/drawing/2014/main" id="{77A4D537-50C0-4CD4-8506-D044B5D076BB}"/>
+              </a:ext>
+            </a:extLst>
+          </p:cNvPr>
+          <p:cNvSpPr>
+            <a:spLocks noGrp="1"/>
+          </p:cNvSpPr>
+          <p:nvPr>
+            <p:ph type="title"/>
+          </p:nvPr>
+        </p:nvSpPr>
+        <p:spPr>
+          <a:xfrm>
+            <a:off x="1154954" y="973669"/>
+            <a:ext cx="8825659" cy="706964"/>
+          </a:xfrm>
+        </p:spPr>
+        <p:txBody>
+          <a:bodyPr/>
+          <a:lstStyle/>
+          <a:p>
+            <a:pPr algn="ctr" rtl="1"/>
+            <a:r>
+              <a:rPr lang="he-IL" dirty="0"/>
+              <a:t>אזור אישי</a:t>
+            </a:r>
+          </a:p>
+        </p:txBody>
+      </p:sp>
+      <p:sp>
+        <p:nvSpPr>
+          <p:cNvPr id="5" name="תיבת טקסט 4">
+            <a:extLst>
+              <a:ext uri="{FF2B5EF4-FFF2-40B4-BE49-F238E27FC236}">
+                <a16:creationId xmlns:a16="http://schemas.microsoft.com/office/drawing/2014/main" id="{104EA44E-BC8B-4DD0-B075-E012933F25AE}"/>
+              </a:ext>
+            </a:extLst>
+          </p:cNvPr>
+          <p:cNvSpPr txBox="1"/>
+          <p:nvPr/>
+        </p:nvSpPr>
+        <p:spPr>
+          <a:xfrm>
+            <a:off x="7919696" y="2534088"/>
+            <a:ext cx="4121834" cy="2862322"/>
+          </a:xfrm>
+          <a:prstGeom prst="rect">
+            <a:avLst/>
+          </a:prstGeom>
+          <a:noFill/>
+        </p:spPr>
+        <p:txBody>
+          <a:bodyPr wrap="square" rtlCol="1">
+            <a:spAutoFit/>
+          </a:bodyPr>
+          <a:lstStyle/>
+          <a:p>
+            <a:pPr marL="285750" indent="-285750" algn="r" rtl="1">
+              <a:buFont typeface="Arial" panose="020B0604020202020204" pitchFamily="34" charset="0"/>
+              <a:buChar char="•"/>
+            </a:pPr>
+            <a:r>
+              <a:rPr lang="he-IL" dirty="0"/>
+              <a:t>הבנו שחסר מידע משמעותי למשתמש, המערכת שלנו משבצת פגישות בצורה אוטומטית, כל יום ב12 בלילה.</a:t>
+            </a:r>
+            <a:br>
+              <a:rPr lang="en-US" dirty="0"/>
+            </a:br>
+            <a:r>
+              <a:rPr lang="he-IL" dirty="0"/>
+              <a:t>כל פעם שמשתמש פותח פגישה חדשה, היא עדיין לא משובצת, ולמשתמש אין אינדיקציה שאכן תהליך פתיחת הפגישה הסתיים בהצלחה.</a:t>
+            </a:r>
+            <a:br>
+              <a:rPr lang="en-US" dirty="0"/>
+            </a:br>
+            <a:r>
+              <a:rPr lang="he-IL" dirty="0"/>
+              <a:t>לכן, הוספנו משבצת נוספת בה המשתמש יכול לראות את הפגישות שמחכות לשיבוץ מהמערכת.</a:t>
+            </a:r>
+          </a:p>
+        </p:txBody>
+      </p:sp>
+      <p:pic>
+        <p:nvPicPr>
+          <p:cNvPr id="7" name="תמונה 6">
+            <a:extLst>
+              <a:ext uri="{FF2B5EF4-FFF2-40B4-BE49-F238E27FC236}">
+                <a16:creationId xmlns:a16="http://schemas.microsoft.com/office/drawing/2014/main" id="{CBC310CA-627D-4DF2-A1A9-301985A9CDE5}"/>
+              </a:ext>
+            </a:extLst>
+          </p:cNvPr>
+          <p:cNvPicPr>
+            <a:picLocks noChangeAspect="1"/>
+          </p:cNvPicPr>
+          <p:nvPr/>
+        </p:nvPicPr>
+        <p:blipFill>
+          <a:blip r:embed="rId2"/>
+          <a:stretch>
+            <a:fillRect/>
+          </a:stretch>
+        </p:blipFill>
+        <p:spPr>
+          <a:xfrm>
+            <a:off x="0" y="2696066"/>
+            <a:ext cx="7400235" cy="4158667"/>
+          </a:xfrm>
+          <a:prstGeom prst="rect">
+            <a:avLst/>
+          </a:prstGeom>
+        </p:spPr>
+      </p:pic>
+    </p:spTree>
+    <p:extLst>
+      <p:ext uri="{BB962C8B-B14F-4D97-AF65-F5344CB8AC3E}">
+        <p14:creationId xmlns:p14="http://schemas.microsoft.com/office/powerpoint/2010/main" val="828814305"/>
+      </p:ext>
+    </p:extLst>
+  </p:cSld>
+  <p:clrMapOvr>
+    <a:masterClrMapping/>
+  </p:clrMapOvr>
+</p:sld>
+</file>
+
+<file path=ppt/slides/slide41.xml><?xml version="1.0" encoding="utf-8"?>
+<p:sld xmlns:a="http://schemas.openxmlformats.org/drawingml/2006/main" xmlns:r="http://schemas.openxmlformats.org/officeDocument/2006/relationships" xmlns:p="http://schemas.openxmlformats.org/presentationml/2006/main">
+  <p:cSld>
+    <p:spTree>
+      <p:nvGrpSpPr>
+        <p:cNvPr id="1" name=""/>
+        <p:cNvGrpSpPr/>
+        <p:nvPr/>
+      </p:nvGrpSpPr>
+      <p:grpSpPr>
+        <a:xfrm>
+          <a:off x="0" y="0"/>
+          <a:ext cx="0" cy="0"/>
+          <a:chOff x="0" y="0"/>
+          <a:chExt cx="0" cy="0"/>
+        </a:xfrm>
+      </p:grpSpPr>
+      <p:sp>
+        <p:nvSpPr>
+          <p:cNvPr id="4" name="כותרת 1">
+            <a:extLst>
+              <a:ext uri="{FF2B5EF4-FFF2-40B4-BE49-F238E27FC236}">
+                <a16:creationId xmlns:a16="http://schemas.microsoft.com/office/drawing/2014/main" id="{1CF8AA43-7E97-492E-83E5-3498889D34BE}"/>
+              </a:ext>
+            </a:extLst>
+          </p:cNvPr>
+          <p:cNvSpPr>
+            <a:spLocks noGrp="1"/>
+          </p:cNvSpPr>
+          <p:nvPr>
+            <p:ph type="title"/>
+          </p:nvPr>
+        </p:nvSpPr>
+        <p:spPr>
+          <a:xfrm>
+            <a:off x="1154954" y="973669"/>
+            <a:ext cx="8825659" cy="706964"/>
+          </a:xfrm>
+        </p:spPr>
+        <p:txBody>
+          <a:bodyPr/>
+          <a:lstStyle/>
+          <a:p>
+            <a:pPr algn="ctr" rtl="1"/>
+            <a:r>
+              <a:rPr lang="he-IL" dirty="0"/>
+              <a:t>אזור אישי</a:t>
+            </a:r>
+          </a:p>
+        </p:txBody>
+      </p:sp>
+      <p:sp>
+        <p:nvSpPr>
+          <p:cNvPr id="5" name="תיבת טקסט 4">
+            <a:extLst>
+              <a:ext uri="{FF2B5EF4-FFF2-40B4-BE49-F238E27FC236}">
+                <a16:creationId xmlns:a16="http://schemas.microsoft.com/office/drawing/2014/main" id="{8A00D926-C93A-496C-A149-3AC29F2C6F5C}"/>
+              </a:ext>
+            </a:extLst>
+          </p:cNvPr>
+          <p:cNvSpPr txBox="1"/>
+          <p:nvPr/>
+        </p:nvSpPr>
+        <p:spPr>
+          <a:xfrm>
+            <a:off x="7685975" y="2534088"/>
+            <a:ext cx="4121834" cy="2031325"/>
+          </a:xfrm>
+          <a:prstGeom prst="rect">
+            <a:avLst/>
+          </a:prstGeom>
+          <a:noFill/>
+        </p:spPr>
+        <p:txBody>
+          <a:bodyPr wrap="square" rtlCol="1">
+            <a:spAutoFit/>
+          </a:bodyPr>
+          <a:lstStyle/>
+          <a:p>
+            <a:pPr algn="r" rtl="1"/>
+            <a:r>
+              <a:rPr lang="he-IL" b="1" u="sng" dirty="0"/>
+              <a:t>משבצת </a:t>
+            </a:r>
+            <a:r>
+              <a:rPr lang="en-US" b="1" u="sng" dirty="0"/>
+              <a:t>"</a:t>
+            </a:r>
+            <a:r>
+              <a:rPr lang="he-IL" b="1" u="sng" dirty="0"/>
+              <a:t>הפגישות שלי</a:t>
+            </a:r>
+            <a:r>
+              <a:rPr lang="en-US" b="1" u="sng" dirty="0"/>
+              <a:t>"</a:t>
+            </a:r>
+            <a:endParaRPr lang="he-IL" b="1" u="sng" dirty="0"/>
+          </a:p>
+          <a:p>
+            <a:pPr algn="r" rtl="1"/>
+            <a:endParaRPr lang="he-IL" dirty="0"/>
+          </a:p>
+          <a:p>
+            <a:pPr marL="285750" indent="-285750" algn="r" rtl="1">
+              <a:buFont typeface="Arial" panose="020B0604020202020204" pitchFamily="34" charset="0"/>
+              <a:buChar char="•"/>
+            </a:pPr>
+            <a:r>
+              <a:rPr lang="he-IL" dirty="0"/>
+              <a:t>שינינו את הרווחים בין השורות.</a:t>
+            </a:r>
+          </a:p>
+          <a:p>
+            <a:pPr marL="285750" indent="-285750" algn="r" rtl="1">
+              <a:buFont typeface="Arial" panose="020B0604020202020204" pitchFamily="34" charset="0"/>
+              <a:buChar char="•"/>
+            </a:pPr>
+            <a:endParaRPr lang="he-IL" dirty="0"/>
+          </a:p>
+          <a:p>
+            <a:pPr marL="285750" indent="-285750" algn="r" rtl="1">
+              <a:buFont typeface="Arial" panose="020B0604020202020204" pitchFamily="34" charset="0"/>
+              <a:buChar char="•"/>
+            </a:pPr>
+            <a:r>
+              <a:rPr lang="he-IL" dirty="0"/>
+              <a:t>עימדנו את הפגישות בהתאם לכותרת.</a:t>
+            </a:r>
+          </a:p>
+          <a:p>
+            <a:pPr marL="285750" indent="-285750" algn="r" rtl="1">
+              <a:buFont typeface="Arial" panose="020B0604020202020204" pitchFamily="34" charset="0"/>
+              <a:buChar char="•"/>
+            </a:pPr>
+            <a:endParaRPr lang="he-IL" dirty="0"/>
+          </a:p>
+          <a:p>
+            <a:pPr marL="285750" indent="-285750" algn="r" rtl="1">
+              <a:buFont typeface="Arial" panose="020B0604020202020204" pitchFamily="34" charset="0"/>
+              <a:buChar char="•"/>
+            </a:pPr>
+            <a:r>
+              <a:rPr lang="he-IL" dirty="0"/>
+              <a:t>הוספנו את שעת הפגישה.</a:t>
+            </a:r>
+          </a:p>
+        </p:txBody>
+      </p:sp>
+      <p:pic>
+        <p:nvPicPr>
+          <p:cNvPr id="7" name="תמונה 6">
+            <a:extLst>
+              <a:ext uri="{FF2B5EF4-FFF2-40B4-BE49-F238E27FC236}">
+                <a16:creationId xmlns:a16="http://schemas.microsoft.com/office/drawing/2014/main" id="{BBFFBFD0-75E2-45C7-9B03-55961CF682E3}"/>
+              </a:ext>
+            </a:extLst>
+          </p:cNvPr>
+          <p:cNvPicPr>
+            <a:picLocks noChangeAspect="1"/>
+          </p:cNvPicPr>
+          <p:nvPr/>
+        </p:nvPicPr>
+        <p:blipFill>
+          <a:blip r:embed="rId2"/>
+          <a:stretch>
+            <a:fillRect/>
+          </a:stretch>
+        </p:blipFill>
+        <p:spPr>
+          <a:xfrm>
+            <a:off x="384191" y="2877581"/>
+            <a:ext cx="6238875" cy="3648075"/>
+          </a:xfrm>
+          <a:prstGeom prst="rect">
+            <a:avLst/>
+          </a:prstGeom>
+        </p:spPr>
+      </p:pic>
+    </p:spTree>
+    <p:extLst>
+      <p:ext uri="{BB962C8B-B14F-4D97-AF65-F5344CB8AC3E}">
+        <p14:creationId xmlns:p14="http://schemas.microsoft.com/office/powerpoint/2010/main" val="2166048656"/>
+      </p:ext>
+    </p:extLst>
+  </p:cSld>
+  <p:clrMapOvr>
+    <a:masterClrMapping/>
+  </p:clrMapOvr>
+</p:sld>
+</file>
+
+<file path=ppt/slides/slide42.xml><?xml version="1.0" encoding="utf-8"?>
+<p:sld xmlns:a="http://schemas.openxmlformats.org/drawingml/2006/main" xmlns:r="http://schemas.openxmlformats.org/officeDocument/2006/relationships" xmlns:p="http://schemas.openxmlformats.org/presentationml/2006/main">
+  <p:cSld>
+    <p:spTree>
+      <p:nvGrpSpPr>
+        <p:cNvPr id="1" name=""/>
+        <p:cNvGrpSpPr/>
+        <p:nvPr/>
+      </p:nvGrpSpPr>
+      <p:grpSpPr>
+        <a:xfrm>
+          <a:off x="0" y="0"/>
+          <a:ext cx="0" cy="0"/>
+          <a:chOff x="0" y="0"/>
+          <a:chExt cx="0" cy="0"/>
+        </a:xfrm>
+      </p:grpSpPr>
+      <p:sp>
+        <p:nvSpPr>
+          <p:cNvPr id="4" name="כותרת 1">
+            <a:extLst>
+              <a:ext uri="{FF2B5EF4-FFF2-40B4-BE49-F238E27FC236}">
+                <a16:creationId xmlns:a16="http://schemas.microsoft.com/office/drawing/2014/main" id="{5A5BEC2D-F28F-4D55-96B7-3B9C6271AC58}"/>
+              </a:ext>
+            </a:extLst>
+          </p:cNvPr>
+          <p:cNvSpPr>
+            <a:spLocks noGrp="1"/>
+          </p:cNvSpPr>
+          <p:nvPr>
+            <p:ph type="title"/>
+          </p:nvPr>
+        </p:nvSpPr>
+        <p:spPr>
+          <a:xfrm>
+            <a:off x="1154954" y="973669"/>
+            <a:ext cx="8825659" cy="706964"/>
+          </a:xfrm>
+        </p:spPr>
+        <p:txBody>
+          <a:bodyPr/>
+          <a:lstStyle/>
+          <a:p>
+            <a:pPr algn="ctr" rtl="1"/>
+            <a:r>
+              <a:rPr lang="he-IL" dirty="0"/>
+              <a:t>אזור אישי</a:t>
+            </a:r>
+          </a:p>
+        </p:txBody>
+      </p:sp>
+      <p:sp>
+        <p:nvSpPr>
+          <p:cNvPr id="8" name="תיבת טקסט 7">
+            <a:extLst>
+              <a:ext uri="{FF2B5EF4-FFF2-40B4-BE49-F238E27FC236}">
+                <a16:creationId xmlns:a16="http://schemas.microsoft.com/office/drawing/2014/main" id="{C0192822-6DB4-482C-AEB0-960091DDCA35}"/>
+              </a:ext>
+            </a:extLst>
+          </p:cNvPr>
+          <p:cNvSpPr txBox="1"/>
+          <p:nvPr/>
+        </p:nvSpPr>
+        <p:spPr>
+          <a:xfrm>
+            <a:off x="7685975" y="2534088"/>
+            <a:ext cx="4121834" cy="3693319"/>
+          </a:xfrm>
+          <a:prstGeom prst="rect">
+            <a:avLst/>
+          </a:prstGeom>
+          <a:noFill/>
+        </p:spPr>
+        <p:txBody>
+          <a:bodyPr wrap="square" rtlCol="1">
+            <a:spAutoFit/>
+          </a:bodyPr>
+          <a:lstStyle/>
+          <a:p>
+            <a:pPr algn="r" rtl="1"/>
+            <a:r>
+              <a:rPr lang="he-IL" b="1" u="sng" dirty="0"/>
+              <a:t>משבצת </a:t>
+            </a:r>
+            <a:r>
+              <a:rPr lang="en-US" b="1" u="sng" dirty="0"/>
+              <a:t>"</a:t>
+            </a:r>
+            <a:r>
+              <a:rPr lang="he-IL" b="1" u="sng" dirty="0"/>
+              <a:t>פגישות ממתינות לאישור":</a:t>
+            </a:r>
+          </a:p>
+          <a:p>
+            <a:pPr algn="r" rtl="1"/>
+            <a:endParaRPr lang="he-IL" dirty="0"/>
+          </a:p>
+          <a:p>
+            <a:pPr marL="285750" indent="-285750" algn="r" rtl="1">
+              <a:buFont typeface="Arial" panose="020B0604020202020204" pitchFamily="34" charset="0"/>
+              <a:buChar char="•"/>
+            </a:pPr>
+            <a:r>
+              <a:rPr lang="he-IL" dirty="0"/>
+              <a:t>הזזנו את הביטול והאישור מצד ימין לצד שמאל כך שהם מעומדים יחד עם כפור הצפייה.</a:t>
+            </a:r>
+          </a:p>
+          <a:p>
+            <a:pPr marL="285750" indent="-285750" algn="r" rtl="1">
+              <a:buFont typeface="Arial" panose="020B0604020202020204" pitchFamily="34" charset="0"/>
+              <a:buChar char="•"/>
+            </a:pPr>
+            <a:endParaRPr lang="he-IL" dirty="0"/>
+          </a:p>
+          <a:p>
+            <a:pPr marL="285750" indent="-285750" algn="r" rtl="1">
+              <a:buFont typeface="Arial" panose="020B0604020202020204" pitchFamily="34" charset="0"/>
+              <a:buChar char="•"/>
+            </a:pPr>
+            <a:r>
+              <a:rPr lang="he-IL" dirty="0"/>
+              <a:t>שינינו את הגדלים ואת הצבעים של כפתורי האישור והביטול כך שיתאימו לכפתור הצפייה ולסטנדרט של המערכת.</a:t>
+            </a:r>
+          </a:p>
+          <a:p>
+            <a:pPr marL="285750" indent="-285750" algn="r" rtl="1">
+              <a:buFont typeface="Arial" panose="020B0604020202020204" pitchFamily="34" charset="0"/>
+              <a:buChar char="•"/>
+            </a:pPr>
+            <a:endParaRPr lang="he-IL" dirty="0"/>
+          </a:p>
+          <a:p>
+            <a:pPr marL="285750" indent="-285750" algn="r" rtl="1">
+              <a:buFont typeface="Arial" panose="020B0604020202020204" pitchFamily="34" charset="0"/>
+              <a:buChar char="•"/>
+            </a:pPr>
+            <a:r>
+              <a:rPr lang="he-IL" dirty="0"/>
+              <a:t>שינינו את המרווח בין הפריטים.</a:t>
+            </a:r>
+          </a:p>
+          <a:p>
+            <a:pPr algn="r" rtl="1"/>
+            <a:endParaRPr lang="he-IL" dirty="0"/>
+          </a:p>
+          <a:p>
+            <a:pPr marL="285750" indent="-285750" algn="r" rtl="1">
+              <a:buFont typeface="Arial" panose="020B0604020202020204" pitchFamily="34" charset="0"/>
+              <a:buChar char="•"/>
+            </a:pPr>
+            <a:r>
+              <a:rPr lang="he-IL" dirty="0"/>
+              <a:t>סדר הפגישות ממוין לפי התאריך.</a:t>
+            </a:r>
+          </a:p>
+        </p:txBody>
+      </p:sp>
+      <p:pic>
+        <p:nvPicPr>
+          <p:cNvPr id="9" name="תמונה 8">
+            <a:extLst>
+              <a:ext uri="{FF2B5EF4-FFF2-40B4-BE49-F238E27FC236}">
+                <a16:creationId xmlns:a16="http://schemas.microsoft.com/office/drawing/2014/main" id="{A5CD8385-62A6-4378-A56D-72D9E7E603C4}"/>
+              </a:ext>
+            </a:extLst>
+          </p:cNvPr>
+          <p:cNvPicPr>
+            <a:picLocks noChangeAspect="1"/>
+          </p:cNvPicPr>
+          <p:nvPr/>
+        </p:nvPicPr>
+        <p:blipFill>
+          <a:blip r:embed="rId2"/>
+          <a:stretch>
+            <a:fillRect/>
+          </a:stretch>
+        </p:blipFill>
+        <p:spPr>
+          <a:xfrm>
+            <a:off x="230709" y="3609852"/>
+            <a:ext cx="7642893" cy="3139322"/>
+          </a:xfrm>
+          <a:prstGeom prst="rect">
+            <a:avLst/>
+          </a:prstGeom>
+        </p:spPr>
+      </p:pic>
+    </p:spTree>
+    <p:extLst>
+      <p:ext uri="{BB962C8B-B14F-4D97-AF65-F5344CB8AC3E}">
+        <p14:creationId xmlns:p14="http://schemas.microsoft.com/office/powerpoint/2010/main" val="1793708727"/>
+      </p:ext>
+    </p:extLst>
+  </p:cSld>
+  <p:clrMapOvr>
+    <a:masterClrMapping/>
+  </p:clrMapOvr>
+</p:sld>
+</file>
+
+<file path=ppt/slides/slide43.xml><?xml version="1.0" encoding="utf-8"?>
+<p:sld xmlns:a="http://schemas.openxmlformats.org/drawingml/2006/main" xmlns:r="http://schemas.openxmlformats.org/officeDocument/2006/relationships" xmlns:p="http://schemas.openxmlformats.org/presentationml/2006/main">
+  <p:cSld>
+    <p:spTree>
+      <p:nvGrpSpPr>
+        <p:cNvPr id="1" name=""/>
+        <p:cNvGrpSpPr/>
+        <p:nvPr/>
+      </p:nvGrpSpPr>
+      <p:grpSpPr>
+        <a:xfrm>
+          <a:off x="0" y="0"/>
+          <a:ext cx="0" cy="0"/>
+          <a:chOff x="0" y="0"/>
+          <a:chExt cx="0" cy="0"/>
+        </a:xfrm>
+      </p:grpSpPr>
+      <p:sp>
+        <p:nvSpPr>
+          <p:cNvPr id="4" name="כותרת 1">
+            <a:extLst>
+              <a:ext uri="{FF2B5EF4-FFF2-40B4-BE49-F238E27FC236}">
+                <a16:creationId xmlns:a16="http://schemas.microsoft.com/office/drawing/2014/main" id="{9DC245D2-F8BC-422C-A2B9-39E3C7451A8C}"/>
+              </a:ext>
+            </a:extLst>
+          </p:cNvPr>
+          <p:cNvSpPr>
+            <a:spLocks noGrp="1"/>
+          </p:cNvSpPr>
+          <p:nvPr>
+            <p:ph type="title"/>
+          </p:nvPr>
+        </p:nvSpPr>
+        <p:spPr>
+          <a:xfrm>
+            <a:off x="1154954" y="973669"/>
+            <a:ext cx="8825659" cy="706964"/>
+          </a:xfrm>
+        </p:spPr>
+        <p:txBody>
+          <a:bodyPr/>
+          <a:lstStyle/>
+          <a:p>
+            <a:pPr algn="ctr" rtl="1"/>
+            <a:r>
+              <a:rPr lang="he-IL" dirty="0"/>
+              <a:t>אזור אישי</a:t>
+            </a:r>
+          </a:p>
+        </p:txBody>
+      </p:sp>
+      <p:sp>
+        <p:nvSpPr>
+          <p:cNvPr id="5" name="תיבת טקסט 4">
+            <a:extLst>
+              <a:ext uri="{FF2B5EF4-FFF2-40B4-BE49-F238E27FC236}">
+                <a16:creationId xmlns:a16="http://schemas.microsoft.com/office/drawing/2014/main" id="{DC64E9DF-030D-4F2E-BA9F-4D2CF7B30438}"/>
+              </a:ext>
+            </a:extLst>
+          </p:cNvPr>
+          <p:cNvSpPr txBox="1"/>
+          <p:nvPr/>
+        </p:nvSpPr>
+        <p:spPr>
+          <a:xfrm>
+            <a:off x="7685975" y="2534088"/>
+            <a:ext cx="4121834" cy="2862322"/>
+          </a:xfrm>
+          <a:prstGeom prst="rect">
+            <a:avLst/>
+          </a:prstGeom>
+          <a:noFill/>
+        </p:spPr>
+        <p:txBody>
+          <a:bodyPr wrap="square" rtlCol="1">
+            <a:spAutoFit/>
+          </a:bodyPr>
+          <a:lstStyle/>
+          <a:p>
+            <a:pPr algn="r" rtl="1"/>
+            <a:r>
+              <a:rPr lang="he-IL" b="1" u="sng" dirty="0"/>
+              <a:t>משבצת "המיקומים שלי":</a:t>
+            </a:r>
+          </a:p>
+          <a:p>
+            <a:pPr algn="r" rtl="1"/>
+            <a:endParaRPr lang="he-IL" dirty="0"/>
+          </a:p>
+          <a:p>
+            <a:pPr marL="285750" indent="-285750" algn="r" rtl="1">
+              <a:buFont typeface="Arial" panose="020B0604020202020204" pitchFamily="34" charset="0"/>
+              <a:buChar char="•"/>
+            </a:pPr>
+            <a:r>
+              <a:rPr lang="he-IL" dirty="0"/>
+              <a:t>שינינו את האייקון של המחיקה שיהיה אחיד לאייקונים במערכת.</a:t>
+            </a:r>
+          </a:p>
+          <a:p>
+            <a:pPr marL="285750" indent="-285750" algn="r" rtl="1">
+              <a:buFont typeface="Arial" panose="020B0604020202020204" pitchFamily="34" charset="0"/>
+              <a:buChar char="•"/>
+            </a:pPr>
+            <a:endParaRPr lang="he-IL" dirty="0"/>
+          </a:p>
+          <a:p>
+            <a:pPr marL="285750" indent="-285750" algn="r" rtl="1">
+              <a:buFont typeface="Arial" panose="020B0604020202020204" pitchFamily="34" charset="0"/>
+              <a:buChar char="•"/>
+            </a:pPr>
+            <a:r>
+              <a:rPr lang="he-IL" dirty="0"/>
+              <a:t>שינינו את כפתור הוספת מיקום, כך שיראה יותר יפה ואסתטי והשתמשנו באייקון במקום טקסט.</a:t>
+            </a:r>
+          </a:p>
+          <a:p>
+            <a:pPr marL="285750" indent="-285750" algn="r" rtl="1">
+              <a:buFont typeface="Arial" panose="020B0604020202020204" pitchFamily="34" charset="0"/>
+              <a:buChar char="•"/>
+            </a:pPr>
+            <a:endParaRPr lang="he-IL" dirty="0"/>
+          </a:p>
+          <a:p>
+            <a:pPr marL="285750" indent="-285750" algn="r" rtl="1">
+              <a:buFont typeface="Arial" panose="020B0604020202020204" pitchFamily="34" charset="0"/>
+              <a:buChar char="•"/>
+            </a:pPr>
+            <a:r>
+              <a:rPr lang="he-IL" dirty="0"/>
+              <a:t>שינינו את המרווח בין הפריטים.</a:t>
+            </a:r>
+          </a:p>
+        </p:txBody>
+      </p:sp>
+      <p:pic>
+        <p:nvPicPr>
+          <p:cNvPr id="8" name="תמונה 7">
+            <a:extLst>
+              <a:ext uri="{FF2B5EF4-FFF2-40B4-BE49-F238E27FC236}">
+                <a16:creationId xmlns:a16="http://schemas.microsoft.com/office/drawing/2014/main" id="{57A67FB7-6648-4E51-AF1B-676A350766EC}"/>
+              </a:ext>
+            </a:extLst>
+          </p:cNvPr>
+          <p:cNvPicPr>
+            <a:picLocks noChangeAspect="1"/>
+          </p:cNvPicPr>
+          <p:nvPr/>
+        </p:nvPicPr>
+        <p:blipFill>
+          <a:blip r:embed="rId2"/>
+          <a:stretch>
+            <a:fillRect/>
+          </a:stretch>
+        </p:blipFill>
+        <p:spPr>
+          <a:xfrm>
+            <a:off x="165116" y="3429000"/>
+            <a:ext cx="6315075" cy="3314700"/>
+          </a:xfrm>
+          <a:prstGeom prst="rect">
+            <a:avLst/>
+          </a:prstGeom>
+        </p:spPr>
+      </p:pic>
+    </p:spTree>
+    <p:extLst>
+      <p:ext uri="{BB962C8B-B14F-4D97-AF65-F5344CB8AC3E}">
+        <p14:creationId xmlns:p14="http://schemas.microsoft.com/office/powerpoint/2010/main" val="2706630592"/>
+      </p:ext>
+    </p:extLst>
+  </p:cSld>
+  <p:clrMapOvr>
+    <a:masterClrMapping/>
+  </p:clrMapOvr>
+</p:sld>
+</file>
+
+<file path=ppt/slides/slide44.xml><?xml version="1.0" encoding="utf-8"?>
+<p:sld xmlns:a="http://schemas.openxmlformats.org/drawingml/2006/main" xmlns:r="http://schemas.openxmlformats.org/officeDocument/2006/relationships" xmlns:p="http://schemas.openxmlformats.org/presentationml/2006/main">
+  <p:cSld>
+    <p:spTree>
+      <p:nvGrpSpPr>
+        <p:cNvPr id="1" name=""/>
+        <p:cNvGrpSpPr/>
+        <p:nvPr/>
+      </p:nvGrpSpPr>
+      <p:grpSpPr>
+        <a:xfrm>
+          <a:off x="0" y="0"/>
+          <a:ext cx="0" cy="0"/>
+          <a:chOff x="0" y="0"/>
+          <a:chExt cx="0" cy="0"/>
+        </a:xfrm>
+      </p:grpSpPr>
+      <p:sp>
+        <p:nvSpPr>
+          <p:cNvPr id="4" name="כותרת 1">
+            <a:extLst>
+              <a:ext uri="{FF2B5EF4-FFF2-40B4-BE49-F238E27FC236}">
+                <a16:creationId xmlns:a16="http://schemas.microsoft.com/office/drawing/2014/main" id="{73DBC8F2-C1B3-4457-A23C-DA9A46AE7EF5}"/>
+              </a:ext>
+            </a:extLst>
+          </p:cNvPr>
+          <p:cNvSpPr>
+            <a:spLocks noGrp="1"/>
+          </p:cNvSpPr>
+          <p:nvPr>
+            <p:ph type="title"/>
+          </p:nvPr>
+        </p:nvSpPr>
+        <p:spPr>
+          <a:xfrm>
+            <a:off x="1154954" y="973669"/>
+            <a:ext cx="8825659" cy="706964"/>
+          </a:xfrm>
+        </p:spPr>
+        <p:txBody>
+          <a:bodyPr/>
+          <a:lstStyle/>
+          <a:p>
+            <a:pPr algn="ctr" rtl="1"/>
+            <a:r>
+              <a:rPr lang="he-IL" dirty="0"/>
+              <a:t>אזור אישי</a:t>
+            </a:r>
+          </a:p>
+        </p:txBody>
+      </p:sp>
+      <p:sp>
+        <p:nvSpPr>
+          <p:cNvPr id="5" name="תיבת טקסט 4">
+            <a:extLst>
+              <a:ext uri="{FF2B5EF4-FFF2-40B4-BE49-F238E27FC236}">
+                <a16:creationId xmlns:a16="http://schemas.microsoft.com/office/drawing/2014/main" id="{A0B248C0-6A86-4C32-8EB5-4142E5A65D4E}"/>
+              </a:ext>
+            </a:extLst>
+          </p:cNvPr>
+          <p:cNvSpPr txBox="1"/>
+          <p:nvPr/>
+        </p:nvSpPr>
+        <p:spPr>
+          <a:xfrm>
+            <a:off x="7685975" y="2534088"/>
+            <a:ext cx="4121834" cy="2031325"/>
+          </a:xfrm>
+          <a:prstGeom prst="rect">
+            <a:avLst/>
+          </a:prstGeom>
+          <a:noFill/>
+        </p:spPr>
+        <p:txBody>
+          <a:bodyPr wrap="square" rtlCol="1">
+            <a:spAutoFit/>
+          </a:bodyPr>
+          <a:lstStyle/>
+          <a:p>
+            <a:pPr algn="r" rtl="1"/>
+            <a:r>
+              <a:rPr lang="he-IL" b="1" u="sng" dirty="0"/>
+              <a:t>משבצת "המיקומים שלי":</a:t>
+            </a:r>
+          </a:p>
+          <a:p>
+            <a:pPr algn="r" rtl="1"/>
+            <a:endParaRPr lang="he-IL" dirty="0"/>
+          </a:p>
+          <a:p>
+            <a:pPr marL="285750" indent="-285750" algn="r" rtl="1">
+              <a:buFont typeface="Arial" panose="020B0604020202020204" pitchFamily="34" charset="0"/>
+              <a:buChar char="•"/>
+            </a:pPr>
+            <a:r>
+              <a:rPr lang="he-IL" dirty="0"/>
+              <a:t>שינינו את כפתור ההוספה שוב כדי שיתאים לסטנדרט המערכת.</a:t>
+            </a:r>
+          </a:p>
+          <a:p>
+            <a:pPr algn="r" rtl="1"/>
+            <a:endParaRPr lang="he-IL" dirty="0"/>
+          </a:p>
+          <a:p>
+            <a:pPr marL="285750" indent="-285750" algn="r" rtl="1">
+              <a:buFont typeface="Arial" panose="020B0604020202020204" pitchFamily="34" charset="0"/>
+              <a:buChar char="•"/>
+            </a:pPr>
+            <a:r>
+              <a:rPr lang="he-IL" dirty="0"/>
+              <a:t>הכפתור עוצב על פי שיטת העיצוב </a:t>
+            </a:r>
+            <a:r>
+              <a:rPr lang="en-US" dirty="0"/>
+              <a:t>material design</a:t>
+            </a:r>
+            <a:r>
+              <a:rPr lang="he-IL" dirty="0"/>
+              <a:t> של גוגל.</a:t>
+            </a:r>
+          </a:p>
+        </p:txBody>
+      </p:sp>
+      <p:pic>
+        <p:nvPicPr>
+          <p:cNvPr id="8" name="תמונה 7">
+            <a:extLst>
+              <a:ext uri="{FF2B5EF4-FFF2-40B4-BE49-F238E27FC236}">
+                <a16:creationId xmlns:a16="http://schemas.microsoft.com/office/drawing/2014/main" id="{8D2EB5EF-5A32-43C6-A237-C28CA3A3D4DB}"/>
+              </a:ext>
+            </a:extLst>
+          </p:cNvPr>
+          <p:cNvPicPr>
+            <a:picLocks noChangeAspect="1"/>
+          </p:cNvPicPr>
+          <p:nvPr/>
+        </p:nvPicPr>
+        <p:blipFill>
+          <a:blip r:embed="rId2"/>
+          <a:stretch>
+            <a:fillRect/>
+          </a:stretch>
+        </p:blipFill>
+        <p:spPr>
+          <a:xfrm>
+            <a:off x="384191" y="3549750"/>
+            <a:ext cx="6172200" cy="3190875"/>
+          </a:xfrm>
+          <a:prstGeom prst="rect">
+            <a:avLst/>
+          </a:prstGeom>
+        </p:spPr>
+      </p:pic>
+    </p:spTree>
+    <p:extLst>
+      <p:ext uri="{BB962C8B-B14F-4D97-AF65-F5344CB8AC3E}">
+        <p14:creationId xmlns:p14="http://schemas.microsoft.com/office/powerpoint/2010/main" val="1431834300"/>
+      </p:ext>
+    </p:extLst>
+  </p:cSld>
+  <p:clrMapOvr>
+    <a:masterClrMapping/>
+  </p:clrMapOvr>
+</p:sld>
+</file>
+
+<file path=ppt/slides/slide45.xml><?xml version="1.0" encoding="utf-8"?>
+<p:sld xmlns:a="http://schemas.openxmlformats.org/drawingml/2006/main" xmlns:r="http://schemas.openxmlformats.org/officeDocument/2006/relationships" xmlns:p="http://schemas.openxmlformats.org/presentationml/2006/main">
+  <p:cSld>
+    <p:spTree>
+      <p:nvGrpSpPr>
+        <p:cNvPr id="1" name=""/>
+        <p:cNvGrpSpPr/>
+        <p:nvPr/>
+      </p:nvGrpSpPr>
+      <p:grpSpPr>
+        <a:xfrm>
+          <a:off x="0" y="0"/>
+          <a:ext cx="0" cy="0"/>
+          <a:chOff x="0" y="0"/>
+          <a:chExt cx="0" cy="0"/>
+        </a:xfrm>
+      </p:grpSpPr>
+      <p:sp>
+        <p:nvSpPr>
+          <p:cNvPr id="4" name="כותרת 1">
+            <a:extLst>
+              <a:ext uri="{FF2B5EF4-FFF2-40B4-BE49-F238E27FC236}">
+                <a16:creationId xmlns:a16="http://schemas.microsoft.com/office/drawing/2014/main" id="{BBC3B682-CCD3-40B0-B8FA-BB5FDA754345}"/>
+              </a:ext>
+            </a:extLst>
+          </p:cNvPr>
+          <p:cNvSpPr>
+            <a:spLocks noGrp="1"/>
+          </p:cNvSpPr>
+          <p:nvPr>
+            <p:ph type="title"/>
+          </p:nvPr>
+        </p:nvSpPr>
+        <p:spPr>
+          <a:xfrm>
+            <a:off x="1154954" y="973669"/>
+            <a:ext cx="8825659" cy="706964"/>
+          </a:xfrm>
+        </p:spPr>
+        <p:txBody>
+          <a:bodyPr/>
+          <a:lstStyle/>
+          <a:p>
+            <a:pPr algn="ctr" rtl="1"/>
+            <a:r>
+              <a:rPr lang="he-IL" dirty="0"/>
+              <a:t>אזור אישי</a:t>
+            </a:r>
+          </a:p>
+        </p:txBody>
+      </p:sp>
+      <p:sp>
+        <p:nvSpPr>
+          <p:cNvPr id="5" name="תיבת טקסט 4">
+            <a:extLst>
+              <a:ext uri="{FF2B5EF4-FFF2-40B4-BE49-F238E27FC236}">
+                <a16:creationId xmlns:a16="http://schemas.microsoft.com/office/drawing/2014/main" id="{71FF33C9-F0A1-4BB9-8DE3-BD1199DF4336}"/>
+              </a:ext>
+            </a:extLst>
+          </p:cNvPr>
+          <p:cNvSpPr txBox="1"/>
+          <p:nvPr/>
+        </p:nvSpPr>
+        <p:spPr>
+          <a:xfrm>
+            <a:off x="7685975" y="2534088"/>
+            <a:ext cx="4121834" cy="2308324"/>
+          </a:xfrm>
+          <a:prstGeom prst="rect">
+            <a:avLst/>
+          </a:prstGeom>
+          <a:noFill/>
+        </p:spPr>
+        <p:txBody>
+          <a:bodyPr wrap="square" rtlCol="1">
+            <a:spAutoFit/>
+          </a:bodyPr>
+          <a:lstStyle/>
+          <a:p>
+            <a:pPr algn="r" rtl="1"/>
+            <a:r>
+              <a:rPr lang="he-IL" b="1" u="sng" dirty="0"/>
+              <a:t>משבצת </a:t>
+            </a:r>
+            <a:r>
+              <a:rPr lang="en-US" b="1" u="sng" dirty="0"/>
+              <a:t>"</a:t>
+            </a:r>
+            <a:r>
+              <a:rPr lang="he-IL" b="1" u="sng" dirty="0"/>
+              <a:t>פגישות ממתינות לאישור":</a:t>
+            </a:r>
+          </a:p>
+          <a:p>
+            <a:pPr algn="r" rtl="1"/>
+            <a:endParaRPr lang="he-IL" dirty="0"/>
+          </a:p>
+          <a:p>
+            <a:pPr marL="285750" indent="-285750" algn="r" rtl="1">
+              <a:buFont typeface="Arial" panose="020B0604020202020204" pitchFamily="34" charset="0"/>
+              <a:buChar char="•"/>
+            </a:pPr>
+            <a:r>
+              <a:rPr lang="he-IL" dirty="0"/>
+              <a:t>המשבצת אחידה למשבצות האחרות בדף, (אייקונים, מרווחים).</a:t>
+            </a:r>
+          </a:p>
+          <a:p>
+            <a:pPr marL="285750" indent="-285750" algn="r" rtl="1">
+              <a:buFont typeface="Arial" panose="020B0604020202020204" pitchFamily="34" charset="0"/>
+              <a:buChar char="•"/>
+            </a:pPr>
+            <a:r>
+              <a:rPr lang="he-IL" dirty="0"/>
+              <a:t>הוספנו הודעה במקרה שאין מידע להצגה (כמו כן, במשבצות האחרות בעמוד), כדי שהמשתמש לא יחשוב שיש משהו לא בסדר במערכת.</a:t>
+            </a:r>
+          </a:p>
+        </p:txBody>
+      </p:sp>
+      <p:pic>
+        <p:nvPicPr>
+          <p:cNvPr id="7" name="תמונה 6">
+            <a:extLst>
+              <a:ext uri="{FF2B5EF4-FFF2-40B4-BE49-F238E27FC236}">
+                <a16:creationId xmlns:a16="http://schemas.microsoft.com/office/drawing/2014/main" id="{455F304E-C0D2-4802-A411-BD7F40CD43EB}"/>
+              </a:ext>
+            </a:extLst>
+          </p:cNvPr>
+          <p:cNvPicPr>
+            <a:picLocks noChangeAspect="1"/>
+          </p:cNvPicPr>
+          <p:nvPr/>
+        </p:nvPicPr>
+        <p:blipFill>
+          <a:blip r:embed="rId2"/>
+          <a:stretch>
+            <a:fillRect/>
+          </a:stretch>
+        </p:blipFill>
+        <p:spPr>
+          <a:xfrm>
+            <a:off x="0" y="3926104"/>
+            <a:ext cx="7821038" cy="2741395"/>
+          </a:xfrm>
+          <a:prstGeom prst="rect">
+            <a:avLst/>
+          </a:prstGeom>
+        </p:spPr>
+      </p:pic>
+    </p:spTree>
+    <p:extLst>
+      <p:ext uri="{BB962C8B-B14F-4D97-AF65-F5344CB8AC3E}">
+        <p14:creationId xmlns:p14="http://schemas.microsoft.com/office/powerpoint/2010/main" val="2753159462"/>
+      </p:ext>
+    </p:extLst>
+  </p:cSld>
+  <p:clrMapOvr>
+    <a:masterClrMapping/>
+  </p:clrMapOvr>
+</p:sld>
+</file>
+
+<file path=ppt/slides/slide46.xml><?xml version="1.0" encoding="utf-8"?>
 <p:sld xmlns:a="http://schemas.openxmlformats.org/drawingml/2006/main" xmlns:r="http://schemas.openxmlformats.org/officeDocument/2006/relationships" xmlns:p="http://schemas.openxmlformats.org/presentationml/2006/main">
   <p:cSld>
     <p:spTree>
@@ -19739,7 +20582,7 @@
 </p:sld>
 </file>
 
-<file path=ppt/slides/slide41.xml><?xml version="1.0" encoding="utf-8"?>
+<file path=ppt/slides/slide47.xml><?xml version="1.0" encoding="utf-8"?>
 <p:sld xmlns:a="http://schemas.openxmlformats.org/drawingml/2006/main" xmlns:r="http://schemas.openxmlformats.org/officeDocument/2006/relationships" xmlns:p="http://schemas.openxmlformats.org/presentationml/2006/main">
   <p:cSld>
     <p:spTree>
@@ -20336,7 +21179,7 @@
 </p:sld>
 </file>
 
-<file path=ppt/slides/slide42.xml><?xml version="1.0" encoding="utf-8"?>
+<file path=ppt/slides/slide48.xml><?xml version="1.0" encoding="utf-8"?>
 <p:sld xmlns:a="http://schemas.openxmlformats.org/drawingml/2006/main" xmlns:r="http://schemas.openxmlformats.org/officeDocument/2006/relationships" xmlns:p="http://schemas.openxmlformats.org/presentationml/2006/main">
   <p:cSld>
     <p:spTree>
@@ -20875,7 +21718,7 @@
 </p:sld>
 </file>
 
-<file path=ppt/slides/slide43.xml><?xml version="1.0" encoding="utf-8"?>
+<file path=ppt/slides/slide49.xml><?xml version="1.0" encoding="utf-8"?>
 <p:sld xmlns:a="http://schemas.openxmlformats.org/drawingml/2006/main" xmlns:r="http://schemas.openxmlformats.org/officeDocument/2006/relationships" xmlns:p="http://schemas.openxmlformats.org/presentationml/2006/main">
   <p:cSld>
     <p:spTree>
@@ -21414,7 +22257,208 @@
 </p:sld>
 </file>
 
-<file path=ppt/slides/slide44.xml><?xml version="1.0" encoding="utf-8"?>
+<file path=ppt/slides/slide5.xml><?xml version="1.0" encoding="utf-8"?>
+<p:sld xmlns:a="http://schemas.openxmlformats.org/drawingml/2006/main" xmlns:r="http://schemas.openxmlformats.org/officeDocument/2006/relationships" xmlns:p="http://schemas.openxmlformats.org/presentationml/2006/main">
+  <p:cSld>
+    <p:spTree>
+      <p:nvGrpSpPr>
+        <p:cNvPr id="1" name=""/>
+        <p:cNvGrpSpPr/>
+        <p:nvPr/>
+      </p:nvGrpSpPr>
+      <p:grpSpPr>
+        <a:xfrm>
+          <a:off x="0" y="0"/>
+          <a:ext cx="0" cy="0"/>
+          <a:chOff x="0" y="0"/>
+          <a:chExt cx="0" cy="0"/>
+        </a:xfrm>
+      </p:grpSpPr>
+      <p:sp>
+        <p:nvSpPr>
+          <p:cNvPr id="2" name="כותרת 1">
+            <a:extLst>
+              <a:ext uri="{FF2B5EF4-FFF2-40B4-BE49-F238E27FC236}">
+                <a16:creationId xmlns:a16="http://schemas.microsoft.com/office/drawing/2014/main" id="{92A500EE-F6C5-4C79-92F1-D2FDEE8174A4}"/>
+              </a:ext>
+            </a:extLst>
+          </p:cNvPr>
+          <p:cNvSpPr>
+            <a:spLocks noGrp="1"/>
+          </p:cNvSpPr>
+          <p:nvPr>
+            <p:ph type="title"/>
+          </p:nvPr>
+        </p:nvSpPr>
+        <p:spPr/>
+        <p:txBody>
+          <a:bodyPr/>
+          <a:lstStyle/>
+          <a:p>
+            <a:pPr algn="ctr"/>
+            <a:r>
+              <a:rPr lang="he-IL" dirty="0"/>
+              <a:t>מסך התחברות</a:t>
+            </a:r>
+          </a:p>
+        </p:txBody>
+      </p:sp>
+      <p:pic>
+        <p:nvPicPr>
+          <p:cNvPr id="16" name="תמונה 15">
+            <a:extLst>
+              <a:ext uri="{FF2B5EF4-FFF2-40B4-BE49-F238E27FC236}">
+                <a16:creationId xmlns:a16="http://schemas.microsoft.com/office/drawing/2014/main" id="{4FD9B8E5-98A3-4C79-8EC6-1523FF6B0199}"/>
+              </a:ext>
+            </a:extLst>
+          </p:cNvPr>
+          <p:cNvPicPr>
+            <a:picLocks noChangeAspect="1"/>
+          </p:cNvPicPr>
+          <p:nvPr/>
+        </p:nvPicPr>
+        <p:blipFill>
+          <a:blip r:embed="rId2"/>
+          <a:stretch>
+            <a:fillRect/>
+          </a:stretch>
+        </p:blipFill>
+        <p:spPr>
+          <a:xfrm>
+            <a:off x="531944" y="2813539"/>
+            <a:ext cx="6851533" cy="3844516"/>
+          </a:xfrm>
+          <a:prstGeom prst="rect">
+            <a:avLst/>
+          </a:prstGeom>
+        </p:spPr>
+      </p:pic>
+      <p:sp>
+        <p:nvSpPr>
+          <p:cNvPr id="17" name="תיבת טקסט 16">
+            <a:extLst>
+              <a:ext uri="{FF2B5EF4-FFF2-40B4-BE49-F238E27FC236}">
+                <a16:creationId xmlns:a16="http://schemas.microsoft.com/office/drawing/2014/main" id="{2F642565-7D83-416E-A7D1-4FA3B48B83E1}"/>
+              </a:ext>
+            </a:extLst>
+          </p:cNvPr>
+          <p:cNvSpPr txBox="1"/>
+          <p:nvPr/>
+        </p:nvSpPr>
+        <p:spPr>
+          <a:xfrm>
+            <a:off x="7540282" y="2610683"/>
+            <a:ext cx="4487594" cy="3693319"/>
+          </a:xfrm>
+          <a:prstGeom prst="rect">
+            <a:avLst/>
+          </a:prstGeom>
+          <a:noFill/>
+        </p:spPr>
+        <p:txBody>
+          <a:bodyPr wrap="square" rtlCol="1">
+            <a:spAutoFit/>
+          </a:bodyPr>
+          <a:lstStyle/>
+          <a:p>
+            <a:pPr marL="285750" indent="-285750" algn="r" rtl="1">
+              <a:buFont typeface="Arial" panose="020B0604020202020204" pitchFamily="34" charset="0"/>
+              <a:buChar char="•"/>
+            </a:pPr>
+            <a:r>
+              <a:rPr lang="he-IL" dirty="0"/>
+              <a:t>כפתור ההתחברות וההרשמה דומים ויכולים לגרום לבלבול בזמן ההתחברות.</a:t>
+            </a:r>
+          </a:p>
+          <a:p>
+            <a:pPr marL="285750" indent="-285750" algn="r" rtl="1">
+              <a:buFont typeface="Arial" panose="020B0604020202020204" pitchFamily="34" charset="0"/>
+              <a:buChar char="•"/>
+            </a:pPr>
+            <a:r>
+              <a:rPr lang="he-IL" dirty="0"/>
+              <a:t>אין אפשרות לשחזור סיסמת המשתמש – </a:t>
+            </a:r>
+            <a:r>
+              <a:rPr lang="he-IL" b="1" dirty="0"/>
+              <a:t>שליטת משתמש וחופש פעולה.</a:t>
+            </a:r>
+            <a:endParaRPr lang="he-IL" dirty="0"/>
+          </a:p>
+          <a:p>
+            <a:pPr marL="285750" indent="-285750" algn="r" rtl="1">
+              <a:buFont typeface="Arial" panose="020B0604020202020204" pitchFamily="34" charset="0"/>
+              <a:buChar char="•"/>
+            </a:pPr>
+            <a:r>
+              <a:rPr lang="he-IL" dirty="0"/>
+              <a:t>אין חיווי המראה למשתמש היכן הוא ממלא את פרטיו – </a:t>
+            </a:r>
+            <a:r>
+              <a:rPr lang="he-IL" b="1" dirty="0"/>
+              <a:t>חיווי מצב המערכת.</a:t>
+            </a:r>
+            <a:endParaRPr lang="he-IL" dirty="0"/>
+          </a:p>
+          <a:p>
+            <a:pPr marL="285750" indent="-285750" algn="r" rtl="1">
+              <a:buFont typeface="Arial" panose="020B0604020202020204" pitchFamily="34" charset="0"/>
+              <a:buChar char="•"/>
+            </a:pPr>
+            <a:r>
+              <a:rPr lang="he-IL" dirty="0"/>
+              <a:t>אין סמלים\אייקונים שמאפיינים את שדות הקלט – </a:t>
+            </a:r>
+            <a:r>
+              <a:rPr lang="he-IL" b="1" dirty="0"/>
+              <a:t>זיהוי ולא זיכרון.</a:t>
+            </a:r>
+          </a:p>
+          <a:p>
+            <a:pPr marL="285750" indent="-285750" algn="r" rtl="1">
+              <a:buFont typeface="Arial" panose="020B0604020202020204" pitchFamily="34" charset="0"/>
+              <a:buChar char="•"/>
+            </a:pPr>
+            <a:r>
+              <a:rPr lang="he-IL" dirty="0"/>
+              <a:t>על המשתמש ללחוץ על כל שדה קלט עם העכבר על מנת להכניס את הפרטים – </a:t>
+            </a:r>
+            <a:r>
+              <a:rPr lang="he-IL" b="1" dirty="0"/>
+              <a:t>גמישות ויעילות שימוש.</a:t>
+            </a:r>
+          </a:p>
+          <a:p>
+            <a:pPr marL="285750" indent="-285750" algn="r" rtl="1">
+              <a:buFont typeface="Arial" panose="020B0604020202020204" pitchFamily="34" charset="0"/>
+              <a:buChar char="•"/>
+            </a:pPr>
+            <a:r>
+              <a:rPr lang="he-IL" dirty="0"/>
+              <a:t>אין אפשרות "זכור אותי" – </a:t>
+            </a:r>
+            <a:r>
+              <a:rPr lang="he-IL" b="1" dirty="0"/>
+              <a:t>גמישות ויעילות שימוש.</a:t>
+            </a:r>
+            <a:endParaRPr lang="he-IL" dirty="0"/>
+          </a:p>
+        </p:txBody>
+      </p:sp>
+    </p:spTree>
+    <p:extLst>
+      <p:ext uri="{BB962C8B-B14F-4D97-AF65-F5344CB8AC3E}">
+        <p14:creationId xmlns:p14="http://schemas.microsoft.com/office/powerpoint/2010/main" val="2576447696"/>
+      </p:ext>
+    </p:extLst>
+  </p:cSld>
+  <p:clrMapOvr>
+    <a:masterClrMapping/>
+  </p:clrMapOvr>
+</p:sld>
+</file>
+
+<file path=ppt/slides/slide50.xml><?xml version="1.0" encoding="utf-8"?>
 <p:sld xmlns:a="http://schemas.openxmlformats.org/drawingml/2006/main" xmlns:r="http://schemas.openxmlformats.org/officeDocument/2006/relationships" xmlns:p="http://schemas.openxmlformats.org/presentationml/2006/main">
   <p:cSld>
     <p:spTree>
@@ -21887,7 +22931,7 @@
 </p:sld>
 </file>
 
-<file path=ppt/slides/slide45.xml><?xml version="1.0" encoding="utf-8"?>
+<file path=ppt/slides/slide51.xml><?xml version="1.0" encoding="utf-8"?>
 <p:sld xmlns:a="http://schemas.openxmlformats.org/drawingml/2006/main" xmlns:r="http://schemas.openxmlformats.org/officeDocument/2006/relationships" xmlns:p="http://schemas.openxmlformats.org/presentationml/2006/main">
   <p:cSld>
     <p:spTree>
@@ -22511,7 +23555,7 @@
 </p:sld>
 </file>
 
-<file path=ppt/slides/slide46.xml><?xml version="1.0" encoding="utf-8"?>
+<file path=ppt/slides/slide52.xml><?xml version="1.0" encoding="utf-8"?>
 <p:sld xmlns:a="http://schemas.openxmlformats.org/drawingml/2006/main" xmlns:r="http://schemas.openxmlformats.org/officeDocument/2006/relationships" xmlns:p="http://schemas.openxmlformats.org/presentationml/2006/main">
   <p:cSld>
     <p:spTree>
@@ -22999,7 +24043,7 @@
 </p:sld>
 </file>
 
-<file path=ppt/slides/slide47.xml><?xml version="1.0" encoding="utf-8"?>
+<file path=ppt/slides/slide53.xml><?xml version="1.0" encoding="utf-8"?>
 <p:sld xmlns:a="http://schemas.openxmlformats.org/drawingml/2006/main" xmlns:r="http://schemas.openxmlformats.org/officeDocument/2006/relationships" xmlns:p="http://schemas.openxmlformats.org/presentationml/2006/main">
   <p:cSld>
     <p:spTree>
@@ -23415,7 +24459,7 @@
 </p:sld>
 </file>
 
-<file path=ppt/slides/slide48.xml><?xml version="1.0" encoding="utf-8"?>
+<file path=ppt/slides/slide54.xml><?xml version="1.0" encoding="utf-8"?>
 <p:sld xmlns:a="http://schemas.openxmlformats.org/drawingml/2006/main" xmlns:r="http://schemas.openxmlformats.org/officeDocument/2006/relationships" xmlns:p="http://schemas.openxmlformats.org/presentationml/2006/main">
   <p:cSld>
     <p:spTree>
@@ -23889,7 +24933,7 @@
 </p:sld>
 </file>
 
-<file path=ppt/slides/slide49.xml><?xml version="1.0" encoding="utf-8"?>
+<file path=ppt/slides/slide55.xml><?xml version="1.0" encoding="utf-8"?>
 <p:sld xmlns:a="http://schemas.openxmlformats.org/drawingml/2006/main" xmlns:r="http://schemas.openxmlformats.org/officeDocument/2006/relationships" xmlns:p="http://schemas.openxmlformats.org/presentationml/2006/main">
   <p:cSld>
     <p:spTree>
@@ -24394,208 +25438,7 @@
 </p:sld>
 </file>
 
-<file path=ppt/slides/slide5.xml><?xml version="1.0" encoding="utf-8"?>
-<p:sld xmlns:a="http://schemas.openxmlformats.org/drawingml/2006/main" xmlns:r="http://schemas.openxmlformats.org/officeDocument/2006/relationships" xmlns:p="http://schemas.openxmlformats.org/presentationml/2006/main">
-  <p:cSld>
-    <p:spTree>
-      <p:nvGrpSpPr>
-        <p:cNvPr id="1" name=""/>
-        <p:cNvGrpSpPr/>
-        <p:nvPr/>
-      </p:nvGrpSpPr>
-      <p:grpSpPr>
-        <a:xfrm>
-          <a:off x="0" y="0"/>
-          <a:ext cx="0" cy="0"/>
-          <a:chOff x="0" y="0"/>
-          <a:chExt cx="0" cy="0"/>
-        </a:xfrm>
-      </p:grpSpPr>
-      <p:sp>
-        <p:nvSpPr>
-          <p:cNvPr id="2" name="כותרת 1">
-            <a:extLst>
-              <a:ext uri="{FF2B5EF4-FFF2-40B4-BE49-F238E27FC236}">
-                <a16:creationId xmlns:a16="http://schemas.microsoft.com/office/drawing/2014/main" id="{92A500EE-F6C5-4C79-92F1-D2FDEE8174A4}"/>
-              </a:ext>
-            </a:extLst>
-          </p:cNvPr>
-          <p:cNvSpPr>
-            <a:spLocks noGrp="1"/>
-          </p:cNvSpPr>
-          <p:nvPr>
-            <p:ph type="title"/>
-          </p:nvPr>
-        </p:nvSpPr>
-        <p:spPr/>
-        <p:txBody>
-          <a:bodyPr/>
-          <a:lstStyle/>
-          <a:p>
-            <a:pPr algn="ctr"/>
-            <a:r>
-              <a:rPr lang="he-IL" dirty="0"/>
-              <a:t>מסך התחברות</a:t>
-            </a:r>
-          </a:p>
-        </p:txBody>
-      </p:sp>
-      <p:pic>
-        <p:nvPicPr>
-          <p:cNvPr id="16" name="תמונה 15">
-            <a:extLst>
-              <a:ext uri="{FF2B5EF4-FFF2-40B4-BE49-F238E27FC236}">
-                <a16:creationId xmlns:a16="http://schemas.microsoft.com/office/drawing/2014/main" id="{4FD9B8E5-98A3-4C79-8EC6-1523FF6B0199}"/>
-              </a:ext>
-            </a:extLst>
-          </p:cNvPr>
-          <p:cNvPicPr>
-            <a:picLocks noChangeAspect="1"/>
-          </p:cNvPicPr>
-          <p:nvPr/>
-        </p:nvPicPr>
-        <p:blipFill>
-          <a:blip r:embed="rId2"/>
-          <a:stretch>
-            <a:fillRect/>
-          </a:stretch>
-        </p:blipFill>
-        <p:spPr>
-          <a:xfrm>
-            <a:off x="531944" y="2813539"/>
-            <a:ext cx="6851533" cy="3844516"/>
-          </a:xfrm>
-          <a:prstGeom prst="rect">
-            <a:avLst/>
-          </a:prstGeom>
-        </p:spPr>
-      </p:pic>
-      <p:sp>
-        <p:nvSpPr>
-          <p:cNvPr id="17" name="תיבת טקסט 16">
-            <a:extLst>
-              <a:ext uri="{FF2B5EF4-FFF2-40B4-BE49-F238E27FC236}">
-                <a16:creationId xmlns:a16="http://schemas.microsoft.com/office/drawing/2014/main" id="{2F642565-7D83-416E-A7D1-4FA3B48B83E1}"/>
-              </a:ext>
-            </a:extLst>
-          </p:cNvPr>
-          <p:cNvSpPr txBox="1"/>
-          <p:nvPr/>
-        </p:nvSpPr>
-        <p:spPr>
-          <a:xfrm>
-            <a:off x="7540282" y="2610683"/>
-            <a:ext cx="4487594" cy="3693319"/>
-          </a:xfrm>
-          <a:prstGeom prst="rect">
-            <a:avLst/>
-          </a:prstGeom>
-          <a:noFill/>
-        </p:spPr>
-        <p:txBody>
-          <a:bodyPr wrap="square" rtlCol="1">
-            <a:spAutoFit/>
-          </a:bodyPr>
-          <a:lstStyle/>
-          <a:p>
-            <a:pPr marL="285750" indent="-285750" algn="r" rtl="1">
-              <a:buFont typeface="Arial" panose="020B0604020202020204" pitchFamily="34" charset="0"/>
-              <a:buChar char="•"/>
-            </a:pPr>
-            <a:r>
-              <a:rPr lang="he-IL" dirty="0"/>
-              <a:t>כפתור ההתחברות וההרשמה דומים ויכולים לגרום לבלבול בזמן ההתחברות.</a:t>
-            </a:r>
-          </a:p>
-          <a:p>
-            <a:pPr marL="285750" indent="-285750" algn="r" rtl="1">
-              <a:buFont typeface="Arial" panose="020B0604020202020204" pitchFamily="34" charset="0"/>
-              <a:buChar char="•"/>
-            </a:pPr>
-            <a:r>
-              <a:rPr lang="he-IL" dirty="0"/>
-              <a:t>אין אפשרות לשחזור סיסמת המשתמש – </a:t>
-            </a:r>
-            <a:r>
-              <a:rPr lang="he-IL" b="1" dirty="0"/>
-              <a:t>שליטת משתמש וחופש פעולה.</a:t>
-            </a:r>
-            <a:endParaRPr lang="he-IL" dirty="0"/>
-          </a:p>
-          <a:p>
-            <a:pPr marL="285750" indent="-285750" algn="r" rtl="1">
-              <a:buFont typeface="Arial" panose="020B0604020202020204" pitchFamily="34" charset="0"/>
-              <a:buChar char="•"/>
-            </a:pPr>
-            <a:r>
-              <a:rPr lang="he-IL" dirty="0"/>
-              <a:t>אין חיווי המראה למשתמש היכן הוא ממלא את פרטיו – </a:t>
-            </a:r>
-            <a:r>
-              <a:rPr lang="he-IL" b="1" dirty="0"/>
-              <a:t>חיווי מצב המערכת.</a:t>
-            </a:r>
-            <a:endParaRPr lang="he-IL" dirty="0"/>
-          </a:p>
-          <a:p>
-            <a:pPr marL="285750" indent="-285750" algn="r" rtl="1">
-              <a:buFont typeface="Arial" panose="020B0604020202020204" pitchFamily="34" charset="0"/>
-              <a:buChar char="•"/>
-            </a:pPr>
-            <a:r>
-              <a:rPr lang="he-IL" dirty="0"/>
-              <a:t>אין סמלים\אייקונים שמאפיינים את שדות הקלט – </a:t>
-            </a:r>
-            <a:r>
-              <a:rPr lang="he-IL" b="1" dirty="0"/>
-              <a:t>זיהוי ולא זיכרון.</a:t>
-            </a:r>
-          </a:p>
-          <a:p>
-            <a:pPr marL="285750" indent="-285750" algn="r" rtl="1">
-              <a:buFont typeface="Arial" panose="020B0604020202020204" pitchFamily="34" charset="0"/>
-              <a:buChar char="•"/>
-            </a:pPr>
-            <a:r>
-              <a:rPr lang="he-IL" dirty="0"/>
-              <a:t>על המשתמש ללחוץ על כל שדה קלט עם העכבר על מנת להכניס את הפרטים – </a:t>
-            </a:r>
-            <a:r>
-              <a:rPr lang="he-IL" b="1" dirty="0"/>
-              <a:t>גמישות ויעילות שימוש.</a:t>
-            </a:r>
-          </a:p>
-          <a:p>
-            <a:pPr marL="285750" indent="-285750" algn="r" rtl="1">
-              <a:buFont typeface="Arial" panose="020B0604020202020204" pitchFamily="34" charset="0"/>
-              <a:buChar char="•"/>
-            </a:pPr>
-            <a:r>
-              <a:rPr lang="he-IL" dirty="0"/>
-              <a:t>אין אפשרות "זכור אותי" – </a:t>
-            </a:r>
-            <a:r>
-              <a:rPr lang="he-IL" b="1" dirty="0"/>
-              <a:t>גמישות ויעילות שימוש.</a:t>
-            </a:r>
-            <a:endParaRPr lang="he-IL" dirty="0"/>
-          </a:p>
-        </p:txBody>
-      </p:sp>
-    </p:spTree>
-    <p:extLst>
-      <p:ext uri="{BB962C8B-B14F-4D97-AF65-F5344CB8AC3E}">
-        <p14:creationId xmlns:p14="http://schemas.microsoft.com/office/powerpoint/2010/main" val="2576447696"/>
-      </p:ext>
-    </p:extLst>
-  </p:cSld>
-  <p:clrMapOvr>
-    <a:masterClrMapping/>
-  </p:clrMapOvr>
-</p:sld>
-</file>
-
-<file path=ppt/slides/slide50.xml><?xml version="1.0" encoding="utf-8"?>
+<file path=ppt/slides/slide56.xml><?xml version="1.0" encoding="utf-8"?>
 <p:sld xmlns:a="http://schemas.openxmlformats.org/drawingml/2006/main" xmlns:r="http://schemas.openxmlformats.org/officeDocument/2006/relationships" xmlns:p="http://schemas.openxmlformats.org/presentationml/2006/main">
   <p:cSld>
     <p:spTree>
@@ -24866,7 +25709,7 @@
 </p:sld>
 </file>
 
-<file path=ppt/slides/slide51.xml><?xml version="1.0" encoding="utf-8"?>
+<file path=ppt/slides/slide57.xml><?xml version="1.0" encoding="utf-8"?>
 <p:sld xmlns:a="http://schemas.openxmlformats.org/drawingml/2006/main" xmlns:r="http://schemas.openxmlformats.org/officeDocument/2006/relationships" xmlns:p="http://schemas.openxmlformats.org/presentationml/2006/main">
   <p:cSld>
     <p:spTree>
@@ -25141,7 +25984,7 @@
 </p:sld>
 </file>
 
-<file path=ppt/slides/slide52.xml><?xml version="1.0" encoding="utf-8"?>
+<file path=ppt/slides/slide58.xml><?xml version="1.0" encoding="utf-8"?>
 <p:sld xmlns:a="http://schemas.openxmlformats.org/drawingml/2006/main" xmlns:r="http://schemas.openxmlformats.org/officeDocument/2006/relationships" xmlns:p="http://schemas.openxmlformats.org/presentationml/2006/main">
   <p:cSld>
     <p:spTree>
@@ -25213,7 +26056,7 @@
 </p:sld>
 </file>
 
-<file path=ppt/slides/slide53.xml><?xml version="1.0" encoding="utf-8"?>
+<file path=ppt/slides/slide59.xml><?xml version="1.0" encoding="utf-8"?>
 <p:sld xmlns:a="http://schemas.openxmlformats.org/drawingml/2006/main" xmlns:r="http://schemas.openxmlformats.org/officeDocument/2006/relationships" xmlns:p="http://schemas.openxmlformats.org/presentationml/2006/main">
   <p:cSld>
     <p:spTree>
@@ -26686,7 +27529,200 @@
 </p:sld>
 </file>
 
-<file path=ppt/slides/slide54.xml><?xml version="1.0" encoding="utf-8"?>
+<file path=ppt/slides/slide6.xml><?xml version="1.0" encoding="utf-8"?>
+<p:sld xmlns:a="http://schemas.openxmlformats.org/drawingml/2006/main" xmlns:r="http://schemas.openxmlformats.org/officeDocument/2006/relationships" xmlns:p="http://schemas.openxmlformats.org/presentationml/2006/main">
+  <p:cSld>
+    <p:spTree>
+      <p:nvGrpSpPr>
+        <p:cNvPr id="1" name=""/>
+        <p:cNvGrpSpPr/>
+        <p:nvPr/>
+      </p:nvGrpSpPr>
+      <p:grpSpPr>
+        <a:xfrm>
+          <a:off x="0" y="0"/>
+          <a:ext cx="0" cy="0"/>
+          <a:chOff x="0" y="0"/>
+          <a:chExt cx="0" cy="0"/>
+        </a:xfrm>
+      </p:grpSpPr>
+      <p:sp>
+        <p:nvSpPr>
+          <p:cNvPr id="2" name="כותרת 1">
+            <a:extLst>
+              <a:ext uri="{FF2B5EF4-FFF2-40B4-BE49-F238E27FC236}">
+                <a16:creationId xmlns:a16="http://schemas.microsoft.com/office/drawing/2014/main" id="{DE777293-170B-4164-A212-000191C56DFE}"/>
+              </a:ext>
+            </a:extLst>
+          </p:cNvPr>
+          <p:cNvSpPr>
+            <a:spLocks noGrp="1"/>
+          </p:cNvSpPr>
+          <p:nvPr>
+            <p:ph type="title"/>
+          </p:nvPr>
+        </p:nvSpPr>
+        <p:spPr/>
+        <p:txBody>
+          <a:bodyPr/>
+          <a:lstStyle/>
+          <a:p>
+            <a:pPr algn="ctr" rtl="1"/>
+            <a:r>
+              <a:rPr lang="he-IL"/>
+              <a:t>מסך </a:t>
+            </a:r>
+            <a:r>
+              <a:rPr lang="he-IL" dirty="0"/>
+              <a:t>הרשמה</a:t>
+            </a:r>
+          </a:p>
+        </p:txBody>
+      </p:sp>
+      <p:pic>
+        <p:nvPicPr>
+          <p:cNvPr id="4" name="תמונה 3">
+            <a:extLst>
+              <a:ext uri="{FF2B5EF4-FFF2-40B4-BE49-F238E27FC236}">
+                <a16:creationId xmlns:a16="http://schemas.microsoft.com/office/drawing/2014/main" id="{2B8550E2-EBB3-4A16-B677-A16EF0998913}"/>
+              </a:ext>
+            </a:extLst>
+          </p:cNvPr>
+          <p:cNvPicPr>
+            <a:picLocks noChangeAspect="1"/>
+          </p:cNvPicPr>
+          <p:nvPr/>
+        </p:nvPicPr>
+        <p:blipFill>
+          <a:blip r:embed="rId2"/>
+          <a:stretch>
+            <a:fillRect/>
+          </a:stretch>
+        </p:blipFill>
+        <p:spPr>
+          <a:xfrm>
+            <a:off x="331177" y="2477527"/>
+            <a:ext cx="7434189" cy="4212128"/>
+          </a:xfrm>
+          <a:prstGeom prst="rect">
+            <a:avLst/>
+          </a:prstGeom>
+        </p:spPr>
+      </p:pic>
+      <p:sp>
+        <p:nvSpPr>
+          <p:cNvPr id="5" name="תיבת טקסט 4">
+            <a:extLst>
+              <a:ext uri="{FF2B5EF4-FFF2-40B4-BE49-F238E27FC236}">
+                <a16:creationId xmlns:a16="http://schemas.microsoft.com/office/drawing/2014/main" id="{49C1F48E-4344-478F-B955-03346A467B7E}"/>
+              </a:ext>
+            </a:extLst>
+          </p:cNvPr>
+          <p:cNvSpPr txBox="1"/>
+          <p:nvPr/>
+        </p:nvSpPr>
+        <p:spPr>
+          <a:xfrm>
+            <a:off x="7919696" y="2477527"/>
+            <a:ext cx="4121834" cy="3139321"/>
+          </a:xfrm>
+          <a:prstGeom prst="rect">
+            <a:avLst/>
+          </a:prstGeom>
+          <a:noFill/>
+        </p:spPr>
+        <p:txBody>
+          <a:bodyPr wrap="square" rtlCol="1">
+            <a:spAutoFit/>
+          </a:bodyPr>
+          <a:lstStyle/>
+          <a:p>
+            <a:pPr marL="285750" indent="-285750" algn="r" rtl="1">
+              <a:buFont typeface="Arial" panose="020B0604020202020204" pitchFamily="34" charset="0"/>
+              <a:buChar char="•"/>
+            </a:pPr>
+            <a:r>
+              <a:rPr lang="he-IL" dirty="0"/>
+              <a:t>אין כפתור חזרה למסך ההתחברות – </a:t>
+            </a:r>
+            <a:r>
+              <a:rPr lang="he-IL" b="1" dirty="0"/>
+              <a:t>שליטת משתמש וחופש פעולה.</a:t>
+            </a:r>
+          </a:p>
+          <a:p>
+            <a:pPr marL="285750" indent="-285750" algn="r" rtl="1">
+              <a:buFont typeface="Arial" panose="020B0604020202020204" pitchFamily="34" charset="0"/>
+              <a:buChar char="•"/>
+            </a:pPr>
+            <a:r>
+              <a:rPr lang="he-IL" dirty="0"/>
+              <a:t>אין שדה לאימות סיסמה בשנית – </a:t>
+            </a:r>
+            <a:r>
+              <a:rPr lang="he-IL" b="1" dirty="0"/>
+              <a:t>מניעת טעויות.</a:t>
+            </a:r>
+          </a:p>
+          <a:p>
+            <a:pPr marL="285750" indent="-285750" algn="r" rtl="1">
+              <a:buFont typeface="Arial" panose="020B0604020202020204" pitchFamily="34" charset="0"/>
+              <a:buChar char="•"/>
+            </a:pPr>
+            <a:r>
+              <a:rPr lang="he-IL" dirty="0"/>
+              <a:t>אין חיווי למשתמש לגביי מה הדרישות לסיסמה תקינה – </a:t>
+            </a:r>
+            <a:r>
+              <a:rPr lang="he-IL" b="1" dirty="0"/>
+              <a:t>עזרה ומסמכים.</a:t>
+            </a:r>
+            <a:endParaRPr lang="he-IL" dirty="0"/>
+          </a:p>
+          <a:p>
+            <a:pPr marL="285750" indent="-285750" algn="r" rtl="1">
+              <a:buFont typeface="Arial" panose="020B0604020202020204" pitchFamily="34" charset="0"/>
+              <a:buChar char="•"/>
+            </a:pPr>
+            <a:r>
+              <a:rPr lang="he-IL" dirty="0"/>
+              <a:t>אין ולידציה בעת מילוי האימייל (לפני לחיצת כפתור "הירשם") או תבנית של אימייל המונעות טעויות – </a:t>
+            </a:r>
+            <a:r>
+              <a:rPr lang="he-IL" b="1" dirty="0"/>
+              <a:t>מניעת טעויות.</a:t>
+            </a:r>
+          </a:p>
+          <a:p>
+            <a:pPr marL="285750" indent="-285750" algn="r" rtl="1">
+              <a:buFont typeface="Arial" panose="020B0604020202020204" pitchFamily="34" charset="0"/>
+              <a:buChar char="•"/>
+            </a:pPr>
+            <a:r>
+              <a:rPr lang="he-IL" dirty="0"/>
+              <a:t>אין סימון ברירת מחדל של מין –</a:t>
+            </a:r>
+            <a:r>
+              <a:rPr lang="he-IL" b="1" dirty="0"/>
+              <a:t> מניעת טעויות.</a:t>
+            </a:r>
+          </a:p>
+        </p:txBody>
+      </p:sp>
+    </p:spTree>
+    <p:extLst>
+      <p:ext uri="{BB962C8B-B14F-4D97-AF65-F5344CB8AC3E}">
+        <p14:creationId xmlns:p14="http://schemas.microsoft.com/office/powerpoint/2010/main" val="2598648921"/>
+      </p:ext>
+    </p:extLst>
+  </p:cSld>
+  <p:clrMapOvr>
+    <a:masterClrMapping/>
+  </p:clrMapOvr>
+</p:sld>
+</file>
+
+<file path=ppt/slides/slide60.xml><?xml version="1.0" encoding="utf-8"?>
 <p:sld xmlns:a="http://schemas.openxmlformats.org/drawingml/2006/main" xmlns:r="http://schemas.openxmlformats.org/officeDocument/2006/relationships" xmlns:p="http://schemas.openxmlformats.org/presentationml/2006/main">
   <p:cSld>
     <p:spTree>
@@ -28553,7 +29589,7 @@
 </p:sld>
 </file>
 
-<file path=ppt/slides/slide55.xml><?xml version="1.0" encoding="utf-8"?>
+<file path=ppt/slides/slide61.xml><?xml version="1.0" encoding="utf-8"?>
 <p:sld xmlns:a="http://schemas.openxmlformats.org/drawingml/2006/main" xmlns:r="http://schemas.openxmlformats.org/officeDocument/2006/relationships" xmlns:p="http://schemas.openxmlformats.org/presentationml/2006/main">
   <p:cSld>
     <p:spTree>
@@ -28618,7 +29654,7 @@
 </p:sld>
 </file>
 
-<file path=ppt/slides/slide56.xml><?xml version="1.0" encoding="utf-8"?>
+<file path=ppt/slides/slide62.xml><?xml version="1.0" encoding="utf-8"?>
 <p:sld xmlns:a="http://schemas.openxmlformats.org/drawingml/2006/main" xmlns:r="http://schemas.openxmlformats.org/officeDocument/2006/relationships" xmlns:p="http://schemas.openxmlformats.org/presentationml/2006/main">
   <p:cSld>
     <p:spTree>
@@ -28683,7 +29719,7 @@
 </p:sld>
 </file>
 
-<file path=ppt/slides/slide57.xml><?xml version="1.0" encoding="utf-8"?>
+<file path=ppt/slides/slide63.xml><?xml version="1.0" encoding="utf-8"?>
 <p:sld xmlns:a="http://schemas.openxmlformats.org/drawingml/2006/main" xmlns:r="http://schemas.openxmlformats.org/officeDocument/2006/relationships" xmlns:p="http://schemas.openxmlformats.org/presentationml/2006/main">
   <p:cSld>
     <p:spTree>
@@ -28739,199 +29775,6 @@
     <p:extLst>
       <p:ext uri="{BB962C8B-B14F-4D97-AF65-F5344CB8AC3E}">
         <p14:creationId xmlns:p14="http://schemas.microsoft.com/office/powerpoint/2010/main" val="37824935"/>
-      </p:ext>
-    </p:extLst>
-  </p:cSld>
-  <p:clrMapOvr>
-    <a:masterClrMapping/>
-  </p:clrMapOvr>
-</p:sld>
-</file>
-
-<file path=ppt/slides/slide6.xml><?xml version="1.0" encoding="utf-8"?>
-<p:sld xmlns:a="http://schemas.openxmlformats.org/drawingml/2006/main" xmlns:r="http://schemas.openxmlformats.org/officeDocument/2006/relationships" xmlns:p="http://schemas.openxmlformats.org/presentationml/2006/main">
-  <p:cSld>
-    <p:spTree>
-      <p:nvGrpSpPr>
-        <p:cNvPr id="1" name=""/>
-        <p:cNvGrpSpPr/>
-        <p:nvPr/>
-      </p:nvGrpSpPr>
-      <p:grpSpPr>
-        <a:xfrm>
-          <a:off x="0" y="0"/>
-          <a:ext cx="0" cy="0"/>
-          <a:chOff x="0" y="0"/>
-          <a:chExt cx="0" cy="0"/>
-        </a:xfrm>
-      </p:grpSpPr>
-      <p:sp>
-        <p:nvSpPr>
-          <p:cNvPr id="2" name="כותרת 1">
-            <a:extLst>
-              <a:ext uri="{FF2B5EF4-FFF2-40B4-BE49-F238E27FC236}">
-                <a16:creationId xmlns:a16="http://schemas.microsoft.com/office/drawing/2014/main" id="{DE777293-170B-4164-A212-000191C56DFE}"/>
-              </a:ext>
-            </a:extLst>
-          </p:cNvPr>
-          <p:cNvSpPr>
-            <a:spLocks noGrp="1"/>
-          </p:cNvSpPr>
-          <p:nvPr>
-            <p:ph type="title"/>
-          </p:nvPr>
-        </p:nvSpPr>
-        <p:spPr/>
-        <p:txBody>
-          <a:bodyPr/>
-          <a:lstStyle/>
-          <a:p>
-            <a:pPr algn="ctr" rtl="1"/>
-            <a:r>
-              <a:rPr lang="he-IL"/>
-              <a:t>מסך </a:t>
-            </a:r>
-            <a:r>
-              <a:rPr lang="he-IL" dirty="0"/>
-              <a:t>הרשמה</a:t>
-            </a:r>
-          </a:p>
-        </p:txBody>
-      </p:sp>
-      <p:pic>
-        <p:nvPicPr>
-          <p:cNvPr id="4" name="תמונה 3">
-            <a:extLst>
-              <a:ext uri="{FF2B5EF4-FFF2-40B4-BE49-F238E27FC236}">
-                <a16:creationId xmlns:a16="http://schemas.microsoft.com/office/drawing/2014/main" id="{2B8550E2-EBB3-4A16-B677-A16EF0998913}"/>
-              </a:ext>
-            </a:extLst>
-          </p:cNvPr>
-          <p:cNvPicPr>
-            <a:picLocks noChangeAspect="1"/>
-          </p:cNvPicPr>
-          <p:nvPr/>
-        </p:nvPicPr>
-        <p:blipFill>
-          <a:blip r:embed="rId2"/>
-          <a:stretch>
-            <a:fillRect/>
-          </a:stretch>
-        </p:blipFill>
-        <p:spPr>
-          <a:xfrm>
-            <a:off x="331177" y="2477527"/>
-            <a:ext cx="7434189" cy="4212128"/>
-          </a:xfrm>
-          <a:prstGeom prst="rect">
-            <a:avLst/>
-          </a:prstGeom>
-        </p:spPr>
-      </p:pic>
-      <p:sp>
-        <p:nvSpPr>
-          <p:cNvPr id="5" name="תיבת טקסט 4">
-            <a:extLst>
-              <a:ext uri="{FF2B5EF4-FFF2-40B4-BE49-F238E27FC236}">
-                <a16:creationId xmlns:a16="http://schemas.microsoft.com/office/drawing/2014/main" id="{49C1F48E-4344-478F-B955-03346A467B7E}"/>
-              </a:ext>
-            </a:extLst>
-          </p:cNvPr>
-          <p:cNvSpPr txBox="1"/>
-          <p:nvPr/>
-        </p:nvSpPr>
-        <p:spPr>
-          <a:xfrm>
-            <a:off x="7919696" y="2477527"/>
-            <a:ext cx="4121834" cy="3139321"/>
-          </a:xfrm>
-          <a:prstGeom prst="rect">
-            <a:avLst/>
-          </a:prstGeom>
-          <a:noFill/>
-        </p:spPr>
-        <p:txBody>
-          <a:bodyPr wrap="square" rtlCol="1">
-            <a:spAutoFit/>
-          </a:bodyPr>
-          <a:lstStyle/>
-          <a:p>
-            <a:pPr marL="285750" indent="-285750" algn="r" rtl="1">
-              <a:buFont typeface="Arial" panose="020B0604020202020204" pitchFamily="34" charset="0"/>
-              <a:buChar char="•"/>
-            </a:pPr>
-            <a:r>
-              <a:rPr lang="he-IL" dirty="0"/>
-              <a:t>אין כפתור חזרה למסך ההתחברות – </a:t>
-            </a:r>
-            <a:r>
-              <a:rPr lang="he-IL" b="1" dirty="0"/>
-              <a:t>שליטת משתמש וחופש פעולה.</a:t>
-            </a:r>
-          </a:p>
-          <a:p>
-            <a:pPr marL="285750" indent="-285750" algn="r" rtl="1">
-              <a:buFont typeface="Arial" panose="020B0604020202020204" pitchFamily="34" charset="0"/>
-              <a:buChar char="•"/>
-            </a:pPr>
-            <a:r>
-              <a:rPr lang="he-IL" dirty="0"/>
-              <a:t>אין שדה לאימות סיסמה בשנית – </a:t>
-            </a:r>
-            <a:r>
-              <a:rPr lang="he-IL" b="1" dirty="0"/>
-              <a:t>מניעת טעויות.</a:t>
-            </a:r>
-          </a:p>
-          <a:p>
-            <a:pPr marL="285750" indent="-285750" algn="r" rtl="1">
-              <a:buFont typeface="Arial" panose="020B0604020202020204" pitchFamily="34" charset="0"/>
-              <a:buChar char="•"/>
-            </a:pPr>
-            <a:r>
-              <a:rPr lang="he-IL" dirty="0"/>
-              <a:t>אין חיווי למשתמש לגביי מה הדרישות לסיסמה תקינה – </a:t>
-            </a:r>
-            <a:r>
-              <a:rPr lang="he-IL" b="1" dirty="0"/>
-              <a:t>עזרה ומסמכים.</a:t>
-            </a:r>
-            <a:endParaRPr lang="he-IL" dirty="0"/>
-          </a:p>
-          <a:p>
-            <a:pPr marL="285750" indent="-285750" algn="r" rtl="1">
-              <a:buFont typeface="Arial" panose="020B0604020202020204" pitchFamily="34" charset="0"/>
-              <a:buChar char="•"/>
-            </a:pPr>
-            <a:r>
-              <a:rPr lang="he-IL" dirty="0"/>
-              <a:t>אין ולידציה בעת מילוי האימייל (לפני לחיצת כפתור "הירשם") או תבנית של אימייל המונעות טעויות – </a:t>
-            </a:r>
-            <a:r>
-              <a:rPr lang="he-IL" b="1" dirty="0"/>
-              <a:t>מניעת טעויות.</a:t>
-            </a:r>
-          </a:p>
-          <a:p>
-            <a:pPr marL="285750" indent="-285750" algn="r" rtl="1">
-              <a:buFont typeface="Arial" panose="020B0604020202020204" pitchFamily="34" charset="0"/>
-              <a:buChar char="•"/>
-            </a:pPr>
-            <a:r>
-              <a:rPr lang="he-IL" dirty="0"/>
-              <a:t>אין סימון ברירת מחדל של מין –</a:t>
-            </a:r>
-            <a:r>
-              <a:rPr lang="he-IL" b="1" dirty="0"/>
-              <a:t> מניעת טעויות.</a:t>
-            </a:r>
-          </a:p>
-        </p:txBody>
-      </p:sp>
-    </p:spTree>
-    <p:extLst>
-      <p:ext uri="{BB962C8B-B14F-4D97-AF65-F5344CB8AC3E}">
-        <p14:creationId xmlns:p14="http://schemas.microsoft.com/office/powerpoint/2010/main" val="2598648921"/>
       </p:ext>
     </p:extLst>
   </p:cSld>

</xml_diff>

<commit_message>
adding the missions analysis and usage scripts
</commit_message>
<xml_diff>
--- a/ux_course/מצגת סופית להגשה.pptx
+++ b/ux_course/מצגת סופית להגשה.pptx
@@ -5,7 +5,7 @@
     <p:sldMasterId id="2147483828" r:id="rId1"/>
   </p:sldMasterIdLst>
   <p:notesMasterIdLst>
-    <p:notesMasterId r:id="rId65"/>
+    <p:notesMasterId r:id="rId67"/>
   </p:notesMasterIdLst>
   <p:sldIdLst>
     <p:sldId id="262" r:id="rId2"/>
@@ -69,8 +69,10 @@
     <p:sldId id="313" r:id="rId60"/>
     <p:sldId id="314" r:id="rId61"/>
     <p:sldId id="315" r:id="rId62"/>
-    <p:sldId id="316" r:id="rId63"/>
-    <p:sldId id="312" r:id="rId64"/>
+    <p:sldId id="323" r:id="rId63"/>
+    <p:sldId id="324" r:id="rId64"/>
+    <p:sldId id="316" r:id="rId65"/>
+    <p:sldId id="312" r:id="rId66"/>
   </p:sldIdLst>
   <p:sldSz cx="12192000" cy="6858000"/>
   <p:notesSz cx="6858000" cy="9144000"/>
@@ -29673,6 +29675,2304 @@
       </p:grpSpPr>
       <p:sp>
         <p:nvSpPr>
+          <p:cNvPr id="2" name="Title 1">
+            <a:extLst>
+              <a:ext uri="{FF2B5EF4-FFF2-40B4-BE49-F238E27FC236}">
+                <a16:creationId xmlns:a16="http://schemas.microsoft.com/office/drawing/2014/main" id="{F2E75ACD-C303-46DD-8FB4-27FC6A409857}"/>
+              </a:ext>
+            </a:extLst>
+          </p:cNvPr>
+          <p:cNvSpPr>
+            <a:spLocks noGrp="1"/>
+          </p:cNvSpPr>
+          <p:nvPr>
+            <p:ph type="title"/>
+          </p:nvPr>
+        </p:nvSpPr>
+        <p:spPr/>
+        <p:txBody>
+          <a:bodyPr/>
+          <a:lstStyle/>
+          <a:p>
+            <a:pPr algn="ctr"/>
+            <a:r>
+              <a:rPr lang="he-IL" sz="4800" dirty="0"/>
+              <a:t>ניתוח משימות - קביעת פגישה</a:t>
+            </a:r>
+            <a:endParaRPr lang="en-US" sz="4800" dirty="0"/>
+          </a:p>
+        </p:txBody>
+      </p:sp>
+      <p:sp>
+        <p:nvSpPr>
+          <p:cNvPr id="3" name="TextBox 2">
+            <a:extLst>
+              <a:ext uri="{FF2B5EF4-FFF2-40B4-BE49-F238E27FC236}">
+                <a16:creationId xmlns:a16="http://schemas.microsoft.com/office/drawing/2014/main" id="{6123026F-0A95-427B-BDFE-31E4D167EC0A}"/>
+              </a:ext>
+            </a:extLst>
+          </p:cNvPr>
+          <p:cNvSpPr txBox="1"/>
+          <p:nvPr/>
+        </p:nvSpPr>
+        <p:spPr>
+          <a:xfrm>
+            <a:off x="9078682" y="2463274"/>
+            <a:ext cx="2416629" cy="3657601"/>
+          </a:xfrm>
+          <a:prstGeom prst="rect">
+            <a:avLst/>
+          </a:prstGeom>
+        </p:spPr>
+        <p:style>
+          <a:lnRef idx="2">
+            <a:schemeClr val="accent4"/>
+          </a:lnRef>
+          <a:fillRef idx="1">
+            <a:schemeClr val="lt1"/>
+          </a:fillRef>
+          <a:effectRef idx="0">
+            <a:schemeClr val="accent4"/>
+          </a:effectRef>
+          <a:fontRef idx="minor">
+            <a:schemeClr val="dk1"/>
+          </a:fontRef>
+        </p:style>
+        <p:txBody>
+          <a:bodyPr wrap="square" rtlCol="0">
+            <a:noAutofit/>
+          </a:bodyPr>
+          <a:lstStyle/>
+          <a:p>
+            <a:pPr algn="r" rtl="1">
+              <a:lnSpc>
+                <a:spcPct val="150000"/>
+              </a:lnSpc>
+            </a:pPr>
+            <a:r>
+              <a:rPr lang="he-IL" b="1" u="sng" dirty="0"/>
+              <a:t>יצירת הפגישה</a:t>
+            </a:r>
+          </a:p>
+          <a:p>
+            <a:pPr algn="r" rtl="1">
+              <a:lnSpc>
+                <a:spcPct val="150000"/>
+              </a:lnSpc>
+            </a:pPr>
+            <a:endParaRPr lang="he-IL" sz="800" dirty="0"/>
+          </a:p>
+          <a:p>
+            <a:pPr algn="r" rtl="1">
+              <a:lnSpc>
+                <a:spcPct val="150000"/>
+              </a:lnSpc>
+            </a:pPr>
+            <a:r>
+              <a:rPr lang="he-IL" sz="1600" dirty="0"/>
+              <a:t>1. לחיצה על הוסף פגישה </a:t>
+            </a:r>
+          </a:p>
+          <a:p>
+            <a:pPr algn="r" rtl="1">
+              <a:lnSpc>
+                <a:spcPct val="150000"/>
+              </a:lnSpc>
+            </a:pPr>
+            <a:r>
+              <a:rPr lang="he-IL" sz="1600" dirty="0"/>
+              <a:t>2. הכנסת שם לפגישה </a:t>
+            </a:r>
+          </a:p>
+          <a:p>
+            <a:pPr algn="r" rtl="1">
+              <a:lnSpc>
+                <a:spcPct val="150000"/>
+              </a:lnSpc>
+            </a:pPr>
+            <a:r>
+              <a:rPr lang="he-IL" sz="1600" dirty="0"/>
+              <a:t>3. הכנסת מיקום לפגישה</a:t>
+            </a:r>
+          </a:p>
+          <a:p>
+            <a:pPr algn="r" rtl="1">
+              <a:lnSpc>
+                <a:spcPct val="150000"/>
+              </a:lnSpc>
+            </a:pPr>
+            <a:r>
+              <a:rPr lang="he-IL" sz="1600" dirty="0"/>
+              <a:t>4. הכנסת תיאור לפגישה</a:t>
+            </a:r>
+          </a:p>
+        </p:txBody>
+      </p:sp>
+      <p:sp>
+        <p:nvSpPr>
+          <p:cNvPr id="12" name="TextBox 11">
+            <a:extLst>
+              <a:ext uri="{FF2B5EF4-FFF2-40B4-BE49-F238E27FC236}">
+                <a16:creationId xmlns:a16="http://schemas.microsoft.com/office/drawing/2014/main" id="{591D1850-4846-4A2C-9902-DB3292076FF2}"/>
+              </a:ext>
+            </a:extLst>
+          </p:cNvPr>
+          <p:cNvSpPr txBox="1"/>
+          <p:nvPr/>
+        </p:nvSpPr>
+        <p:spPr>
+          <a:xfrm>
+            <a:off x="6204853" y="2463274"/>
+            <a:ext cx="2416629" cy="3657601"/>
+          </a:xfrm>
+          <a:prstGeom prst="rect">
+            <a:avLst/>
+          </a:prstGeom>
+        </p:spPr>
+        <p:style>
+          <a:lnRef idx="2">
+            <a:schemeClr val="accent4"/>
+          </a:lnRef>
+          <a:fillRef idx="1">
+            <a:schemeClr val="lt1"/>
+          </a:fillRef>
+          <a:effectRef idx="0">
+            <a:schemeClr val="accent4"/>
+          </a:effectRef>
+          <a:fontRef idx="minor">
+            <a:schemeClr val="dk1"/>
+          </a:fontRef>
+        </p:style>
+        <p:txBody>
+          <a:bodyPr wrap="square" rtlCol="0">
+            <a:noAutofit/>
+          </a:bodyPr>
+          <a:lstStyle/>
+          <a:p>
+            <a:pPr algn="r" rtl="1">
+              <a:lnSpc>
+                <a:spcPct val="150000"/>
+              </a:lnSpc>
+            </a:pPr>
+            <a:r>
+              <a:rPr lang="he-IL" b="1" u="sng" dirty="0"/>
+              <a:t>הוספת נמענים</a:t>
+            </a:r>
+          </a:p>
+          <a:p>
+            <a:pPr algn="r" rtl="1">
+              <a:lnSpc>
+                <a:spcPct val="150000"/>
+              </a:lnSpc>
+            </a:pPr>
+            <a:endParaRPr lang="he-IL" sz="800" dirty="0"/>
+          </a:p>
+          <a:p>
+            <a:pPr algn="r" rtl="1">
+              <a:lnSpc>
+                <a:spcPct val="150000"/>
+              </a:lnSpc>
+            </a:pPr>
+            <a:r>
+              <a:rPr lang="he-IL" sz="1600" dirty="0"/>
+              <a:t>1. הקלדת שן הנמען</a:t>
+            </a:r>
+          </a:p>
+          <a:p>
+            <a:pPr algn="r" rtl="1">
+              <a:lnSpc>
+                <a:spcPct val="150000"/>
+              </a:lnSpc>
+            </a:pPr>
+            <a:r>
+              <a:rPr lang="he-IL" sz="1600" dirty="0"/>
+              <a:t>2. בחירת הנמען מהשלמה אוטומטית (אם שמור)</a:t>
+            </a:r>
+          </a:p>
+          <a:p>
+            <a:pPr algn="r" rtl="1">
+              <a:lnSpc>
+                <a:spcPct val="150000"/>
+              </a:lnSpc>
+            </a:pPr>
+            <a:r>
+              <a:rPr lang="he-IL" sz="1600" dirty="0"/>
+              <a:t>3. הכנסת קבוצת נמענים</a:t>
+            </a:r>
+          </a:p>
+          <a:p>
+            <a:pPr algn="r" rtl="1">
+              <a:lnSpc>
+                <a:spcPct val="150000"/>
+              </a:lnSpc>
+            </a:pPr>
+            <a:r>
+              <a:rPr lang="he-IL" sz="1600" dirty="0"/>
+              <a:t>4. הכנסת נמען\קבוצה נוספת</a:t>
+            </a:r>
+          </a:p>
+        </p:txBody>
+      </p:sp>
+      <p:sp>
+        <p:nvSpPr>
+          <p:cNvPr id="13" name="TextBox 12">
+            <a:extLst>
+              <a:ext uri="{FF2B5EF4-FFF2-40B4-BE49-F238E27FC236}">
+                <a16:creationId xmlns:a16="http://schemas.microsoft.com/office/drawing/2014/main" id="{BF039B42-18DA-44F9-A26B-939EEF18FA1C}"/>
+              </a:ext>
+            </a:extLst>
+          </p:cNvPr>
+          <p:cNvSpPr txBox="1"/>
+          <p:nvPr/>
+        </p:nvSpPr>
+        <p:spPr>
+          <a:xfrm>
+            <a:off x="3331025" y="2463273"/>
+            <a:ext cx="2416629" cy="3657601"/>
+          </a:xfrm>
+          <a:prstGeom prst="rect">
+            <a:avLst/>
+          </a:prstGeom>
+        </p:spPr>
+        <p:style>
+          <a:lnRef idx="2">
+            <a:schemeClr val="accent4"/>
+          </a:lnRef>
+          <a:fillRef idx="1">
+            <a:schemeClr val="lt1"/>
+          </a:fillRef>
+          <a:effectRef idx="0">
+            <a:schemeClr val="accent4"/>
+          </a:effectRef>
+          <a:fontRef idx="minor">
+            <a:schemeClr val="dk1"/>
+          </a:fontRef>
+        </p:style>
+        <p:txBody>
+          <a:bodyPr wrap="square" rtlCol="0">
+            <a:noAutofit/>
+          </a:bodyPr>
+          <a:lstStyle/>
+          <a:p>
+            <a:pPr algn="r" rtl="1">
+              <a:lnSpc>
+                <a:spcPct val="150000"/>
+              </a:lnSpc>
+            </a:pPr>
+            <a:r>
+              <a:rPr lang="he-IL" b="1" u="sng" dirty="0"/>
+              <a:t>בחירת התאריך</a:t>
+            </a:r>
+          </a:p>
+          <a:p>
+            <a:pPr algn="r" rtl="1">
+              <a:lnSpc>
+                <a:spcPct val="150000"/>
+              </a:lnSpc>
+            </a:pPr>
+            <a:endParaRPr lang="he-IL" sz="800" dirty="0"/>
+          </a:p>
+          <a:p>
+            <a:pPr algn="r" rtl="1">
+              <a:lnSpc>
+                <a:spcPct val="150000"/>
+              </a:lnSpc>
+            </a:pPr>
+            <a:r>
+              <a:rPr lang="he-IL" sz="1600" dirty="0"/>
+              <a:t>1. כניסה למסך בחירת תאריך</a:t>
+            </a:r>
+          </a:p>
+          <a:p>
+            <a:pPr algn="r" rtl="1">
+              <a:lnSpc>
+                <a:spcPct val="150000"/>
+              </a:lnSpc>
+            </a:pPr>
+            <a:r>
+              <a:rPr lang="he-IL" sz="1600" dirty="0"/>
+              <a:t>2. מעבר על האילוצים של כולם</a:t>
+            </a:r>
+          </a:p>
+          <a:p>
+            <a:pPr algn="r" rtl="1">
+              <a:lnSpc>
+                <a:spcPct val="150000"/>
+              </a:lnSpc>
+            </a:pPr>
+            <a:r>
+              <a:rPr lang="he-IL" sz="1600" dirty="0"/>
+              <a:t>3. אם אין תאריך שמתאים לכולם לברר האם יש משהו שיכול להזיז פגישה אחרת.</a:t>
+            </a:r>
+          </a:p>
+          <a:p>
+            <a:pPr algn="r" rtl="1">
+              <a:lnSpc>
+                <a:spcPct val="150000"/>
+              </a:lnSpc>
+            </a:pPr>
+            <a:r>
+              <a:rPr lang="he-IL" sz="1600" dirty="0"/>
+              <a:t>4. בחירת התאריך הכי מתאים.</a:t>
+            </a:r>
+          </a:p>
+          <a:p>
+            <a:pPr algn="r" rtl="1">
+              <a:lnSpc>
+                <a:spcPct val="150000"/>
+              </a:lnSpc>
+            </a:pPr>
+            <a:endParaRPr lang="he-IL" sz="1600" dirty="0"/>
+          </a:p>
+        </p:txBody>
+      </p:sp>
+      <p:sp>
+        <p:nvSpPr>
+          <p:cNvPr id="14" name="TextBox 13">
+            <a:extLst>
+              <a:ext uri="{FF2B5EF4-FFF2-40B4-BE49-F238E27FC236}">
+                <a16:creationId xmlns:a16="http://schemas.microsoft.com/office/drawing/2014/main" id="{9B28B6E9-FB22-4871-93E4-D43B857ECD11}"/>
+              </a:ext>
+            </a:extLst>
+          </p:cNvPr>
+          <p:cNvSpPr txBox="1"/>
+          <p:nvPr/>
+        </p:nvSpPr>
+        <p:spPr>
+          <a:xfrm>
+            <a:off x="457197" y="2463274"/>
+            <a:ext cx="2416629" cy="4208114"/>
+          </a:xfrm>
+          <a:prstGeom prst="rect">
+            <a:avLst/>
+          </a:prstGeom>
+        </p:spPr>
+        <p:style>
+          <a:lnRef idx="2">
+            <a:schemeClr val="accent4"/>
+          </a:lnRef>
+          <a:fillRef idx="1">
+            <a:schemeClr val="lt1"/>
+          </a:fillRef>
+          <a:effectRef idx="0">
+            <a:schemeClr val="accent4"/>
+          </a:effectRef>
+          <a:fontRef idx="minor">
+            <a:schemeClr val="dk1"/>
+          </a:fontRef>
+        </p:style>
+        <p:txBody>
+          <a:bodyPr wrap="square" rtlCol="0">
+            <a:noAutofit/>
+          </a:bodyPr>
+          <a:lstStyle/>
+          <a:p>
+            <a:pPr algn="r" rtl="1">
+              <a:lnSpc>
+                <a:spcPct val="150000"/>
+              </a:lnSpc>
+            </a:pPr>
+            <a:r>
+              <a:rPr lang="he-IL" b="1" u="sng" dirty="0"/>
+              <a:t>שליחת הזימון לפגישה</a:t>
+            </a:r>
+          </a:p>
+          <a:p>
+            <a:pPr algn="r" rtl="1">
+              <a:lnSpc>
+                <a:spcPct val="150000"/>
+              </a:lnSpc>
+            </a:pPr>
+            <a:endParaRPr lang="he-IL" sz="900" dirty="0"/>
+          </a:p>
+          <a:p>
+            <a:pPr algn="r" rtl="1">
+              <a:lnSpc>
+                <a:spcPct val="150000"/>
+              </a:lnSpc>
+            </a:pPr>
+            <a:r>
+              <a:rPr lang="he-IL" sz="1600" dirty="0"/>
+              <a:t>1. חזרה למסך יצירת הפגישה.</a:t>
+            </a:r>
+          </a:p>
+          <a:p>
+            <a:pPr algn="r" rtl="1">
+              <a:lnSpc>
+                <a:spcPct val="150000"/>
+              </a:lnSpc>
+            </a:pPr>
+            <a:r>
+              <a:rPr lang="he-IL" sz="1600" dirty="0"/>
+              <a:t>2. לחיצה על כפתור השליחה</a:t>
+            </a:r>
+          </a:p>
+        </p:txBody>
+      </p:sp>
+      <p:sp>
+        <p:nvSpPr>
+          <p:cNvPr id="15" name="TextBox 14">
+            <a:extLst>
+              <a:ext uri="{FF2B5EF4-FFF2-40B4-BE49-F238E27FC236}">
+                <a16:creationId xmlns:a16="http://schemas.microsoft.com/office/drawing/2014/main" id="{5386D645-38A3-4F20-8343-E0E27EE71668}"/>
+              </a:ext>
+            </a:extLst>
+          </p:cNvPr>
+          <p:cNvSpPr txBox="1"/>
+          <p:nvPr/>
+        </p:nvSpPr>
+        <p:spPr>
+          <a:xfrm>
+            <a:off x="9078682" y="2463273"/>
+            <a:ext cx="2416629" cy="4208114"/>
+          </a:xfrm>
+          <a:prstGeom prst="rect">
+            <a:avLst/>
+          </a:prstGeom>
+        </p:spPr>
+        <p:style>
+          <a:lnRef idx="2">
+            <a:schemeClr val="accent4"/>
+          </a:lnRef>
+          <a:fillRef idx="1">
+            <a:schemeClr val="lt1"/>
+          </a:fillRef>
+          <a:effectRef idx="0">
+            <a:schemeClr val="accent4"/>
+          </a:effectRef>
+          <a:fontRef idx="minor">
+            <a:schemeClr val="dk1"/>
+          </a:fontRef>
+        </p:style>
+        <p:txBody>
+          <a:bodyPr wrap="square" rtlCol="0">
+            <a:noAutofit/>
+          </a:bodyPr>
+          <a:lstStyle/>
+          <a:p>
+            <a:pPr algn="r" rtl="1">
+              <a:lnSpc>
+                <a:spcPct val="150000"/>
+              </a:lnSpc>
+            </a:pPr>
+            <a:r>
+              <a:rPr lang="he-IL" b="1" u="sng" dirty="0"/>
+              <a:t>יצירת הפגישה</a:t>
+            </a:r>
+          </a:p>
+          <a:p>
+            <a:pPr algn="r" rtl="1">
+              <a:lnSpc>
+                <a:spcPct val="150000"/>
+              </a:lnSpc>
+            </a:pPr>
+            <a:endParaRPr lang="he-IL" sz="800" dirty="0"/>
+          </a:p>
+          <a:p>
+            <a:pPr algn="r" rtl="1">
+              <a:lnSpc>
+                <a:spcPct val="150000"/>
+              </a:lnSpc>
+            </a:pPr>
+            <a:r>
+              <a:rPr lang="he-IL" sz="1600" dirty="0"/>
+              <a:t>1. לחיצה על הוסף פגישה </a:t>
+            </a:r>
+          </a:p>
+          <a:p>
+            <a:pPr algn="r" rtl="1">
+              <a:lnSpc>
+                <a:spcPct val="150000"/>
+              </a:lnSpc>
+            </a:pPr>
+            <a:r>
+              <a:rPr lang="he-IL" sz="1600" dirty="0"/>
+              <a:t>2. הכנסת שם לפגישה </a:t>
+            </a:r>
+          </a:p>
+          <a:p>
+            <a:pPr algn="r" rtl="1">
+              <a:lnSpc>
+                <a:spcPct val="150000"/>
+              </a:lnSpc>
+            </a:pPr>
+            <a:r>
+              <a:rPr lang="he-IL" sz="1600" dirty="0"/>
+              <a:t>3. הכנסת מיקום לפגישה</a:t>
+            </a:r>
+          </a:p>
+          <a:p>
+            <a:pPr algn="r" rtl="1">
+              <a:lnSpc>
+                <a:spcPct val="150000"/>
+              </a:lnSpc>
+            </a:pPr>
+            <a:r>
+              <a:rPr lang="he-IL" sz="1600" dirty="0"/>
+              <a:t>4. הכנסת תיאור לפגישה</a:t>
+            </a:r>
+          </a:p>
+        </p:txBody>
+      </p:sp>
+      <p:sp>
+        <p:nvSpPr>
+          <p:cNvPr id="16" name="TextBox 15">
+            <a:extLst>
+              <a:ext uri="{FF2B5EF4-FFF2-40B4-BE49-F238E27FC236}">
+                <a16:creationId xmlns:a16="http://schemas.microsoft.com/office/drawing/2014/main" id="{59337C64-4B8B-4114-9607-5A71706BE6F3}"/>
+              </a:ext>
+            </a:extLst>
+          </p:cNvPr>
+          <p:cNvSpPr txBox="1"/>
+          <p:nvPr/>
+        </p:nvSpPr>
+        <p:spPr>
+          <a:xfrm>
+            <a:off x="6204853" y="2463273"/>
+            <a:ext cx="2416629" cy="4208114"/>
+          </a:xfrm>
+          <a:prstGeom prst="rect">
+            <a:avLst/>
+          </a:prstGeom>
+        </p:spPr>
+        <p:style>
+          <a:lnRef idx="2">
+            <a:schemeClr val="accent4"/>
+          </a:lnRef>
+          <a:fillRef idx="1">
+            <a:schemeClr val="lt1"/>
+          </a:fillRef>
+          <a:effectRef idx="0">
+            <a:schemeClr val="accent4"/>
+          </a:effectRef>
+          <a:fontRef idx="minor">
+            <a:schemeClr val="dk1"/>
+          </a:fontRef>
+        </p:style>
+        <p:txBody>
+          <a:bodyPr wrap="square" rtlCol="0">
+            <a:noAutofit/>
+          </a:bodyPr>
+          <a:lstStyle/>
+          <a:p>
+            <a:pPr algn="r" rtl="1">
+              <a:lnSpc>
+                <a:spcPct val="150000"/>
+              </a:lnSpc>
+            </a:pPr>
+            <a:r>
+              <a:rPr lang="he-IL" b="1" u="sng" dirty="0"/>
+              <a:t>הוספת נמענים</a:t>
+            </a:r>
+          </a:p>
+          <a:p>
+            <a:pPr algn="r" rtl="1">
+              <a:lnSpc>
+                <a:spcPct val="150000"/>
+              </a:lnSpc>
+            </a:pPr>
+            <a:endParaRPr lang="he-IL" sz="800" dirty="0"/>
+          </a:p>
+          <a:p>
+            <a:pPr algn="r" rtl="1">
+              <a:lnSpc>
+                <a:spcPct val="150000"/>
+              </a:lnSpc>
+            </a:pPr>
+            <a:r>
+              <a:rPr lang="he-IL" sz="1600" dirty="0"/>
+              <a:t>1. הקלדת שן הנמען</a:t>
+            </a:r>
+          </a:p>
+          <a:p>
+            <a:pPr algn="r" rtl="1">
+              <a:lnSpc>
+                <a:spcPct val="150000"/>
+              </a:lnSpc>
+            </a:pPr>
+            <a:r>
+              <a:rPr lang="he-IL" sz="1600" dirty="0"/>
+              <a:t>2. בחירת הנמען מהשלמה אוטומטית (אם שמור)</a:t>
+            </a:r>
+          </a:p>
+          <a:p>
+            <a:pPr algn="r" rtl="1">
+              <a:lnSpc>
+                <a:spcPct val="150000"/>
+              </a:lnSpc>
+            </a:pPr>
+            <a:r>
+              <a:rPr lang="he-IL" sz="1600" dirty="0"/>
+              <a:t>3. הכנסת קבוצת נמענים</a:t>
+            </a:r>
+          </a:p>
+          <a:p>
+            <a:pPr algn="r" rtl="1">
+              <a:lnSpc>
+                <a:spcPct val="150000"/>
+              </a:lnSpc>
+            </a:pPr>
+            <a:r>
+              <a:rPr lang="he-IL" sz="1600" dirty="0"/>
+              <a:t>4. הכנסת נמען\קבוצה נוספת</a:t>
+            </a:r>
+          </a:p>
+        </p:txBody>
+      </p:sp>
+      <p:sp>
+        <p:nvSpPr>
+          <p:cNvPr id="17" name="TextBox 16">
+            <a:extLst>
+              <a:ext uri="{FF2B5EF4-FFF2-40B4-BE49-F238E27FC236}">
+                <a16:creationId xmlns:a16="http://schemas.microsoft.com/office/drawing/2014/main" id="{99630680-7FD6-423B-AB9F-4D4F619BF5EF}"/>
+              </a:ext>
+            </a:extLst>
+          </p:cNvPr>
+          <p:cNvSpPr txBox="1"/>
+          <p:nvPr/>
+        </p:nvSpPr>
+        <p:spPr>
+          <a:xfrm>
+            <a:off x="3331025" y="2463272"/>
+            <a:ext cx="2416629" cy="4208114"/>
+          </a:xfrm>
+          <a:prstGeom prst="rect">
+            <a:avLst/>
+          </a:prstGeom>
+        </p:spPr>
+        <p:style>
+          <a:lnRef idx="2">
+            <a:schemeClr val="accent4"/>
+          </a:lnRef>
+          <a:fillRef idx="1">
+            <a:schemeClr val="lt1"/>
+          </a:fillRef>
+          <a:effectRef idx="0">
+            <a:schemeClr val="accent4"/>
+          </a:effectRef>
+          <a:fontRef idx="minor">
+            <a:schemeClr val="dk1"/>
+          </a:fontRef>
+        </p:style>
+        <p:txBody>
+          <a:bodyPr wrap="square" rtlCol="0">
+            <a:noAutofit/>
+          </a:bodyPr>
+          <a:lstStyle/>
+          <a:p>
+            <a:pPr algn="r" rtl="1">
+              <a:lnSpc>
+                <a:spcPct val="150000"/>
+              </a:lnSpc>
+            </a:pPr>
+            <a:r>
+              <a:rPr lang="he-IL" b="1" u="sng" dirty="0"/>
+              <a:t>בחירת התאריך</a:t>
+            </a:r>
+          </a:p>
+          <a:p>
+            <a:pPr algn="r" rtl="1">
+              <a:lnSpc>
+                <a:spcPct val="150000"/>
+              </a:lnSpc>
+            </a:pPr>
+            <a:endParaRPr lang="he-IL" sz="800" dirty="0"/>
+          </a:p>
+          <a:p>
+            <a:pPr algn="r" rtl="1">
+              <a:lnSpc>
+                <a:spcPct val="150000"/>
+              </a:lnSpc>
+            </a:pPr>
+            <a:r>
+              <a:rPr lang="he-IL" sz="1600" dirty="0"/>
+              <a:t>1. כניסה למסך בחירת תאריך</a:t>
+            </a:r>
+          </a:p>
+          <a:p>
+            <a:pPr algn="r" rtl="1">
+              <a:lnSpc>
+                <a:spcPct val="150000"/>
+              </a:lnSpc>
+            </a:pPr>
+            <a:r>
+              <a:rPr lang="he-IL" sz="1600" dirty="0"/>
+              <a:t>2. מעבר על האילוצים של כולם</a:t>
+            </a:r>
+          </a:p>
+          <a:p>
+            <a:pPr algn="r" rtl="1">
+              <a:lnSpc>
+                <a:spcPct val="150000"/>
+              </a:lnSpc>
+            </a:pPr>
+            <a:r>
+              <a:rPr lang="he-IL" sz="1600" dirty="0"/>
+              <a:t>3. אם אין תאריך שמתאים לכולם לברר האם יש משהו שיכול להזיז פגישה אחרת.</a:t>
+            </a:r>
+          </a:p>
+          <a:p>
+            <a:pPr algn="r" rtl="1">
+              <a:lnSpc>
+                <a:spcPct val="150000"/>
+              </a:lnSpc>
+            </a:pPr>
+            <a:r>
+              <a:rPr lang="he-IL" sz="1600" dirty="0"/>
+              <a:t>4. בחירת התאריך הכי מתאים.</a:t>
+            </a:r>
+          </a:p>
+          <a:p>
+            <a:pPr algn="r" rtl="1">
+              <a:lnSpc>
+                <a:spcPct val="150000"/>
+              </a:lnSpc>
+            </a:pPr>
+            <a:endParaRPr lang="he-IL" sz="1600" dirty="0"/>
+          </a:p>
+        </p:txBody>
+      </p:sp>
+    </p:spTree>
+    <p:extLst>
+      <p:ext uri="{BB962C8B-B14F-4D97-AF65-F5344CB8AC3E}">
+        <p14:creationId xmlns:p14="http://schemas.microsoft.com/office/powerpoint/2010/main" val="2169778793"/>
+      </p:ext>
+    </p:extLst>
+  </p:cSld>
+  <p:clrMapOvr>
+    <a:masterClrMapping/>
+  </p:clrMapOvr>
+</p:sld>
+</file>
+
+<file path=ppt/slides/slide63.xml><?xml version="1.0" encoding="utf-8"?>
+<p:sld xmlns:a="http://schemas.openxmlformats.org/drawingml/2006/main" xmlns:r="http://schemas.openxmlformats.org/officeDocument/2006/relationships" xmlns:p="http://schemas.openxmlformats.org/presentationml/2006/main">
+  <p:cSld>
+    <p:spTree>
+      <p:nvGrpSpPr>
+        <p:cNvPr id="1" name=""/>
+        <p:cNvGrpSpPr/>
+        <p:nvPr/>
+      </p:nvGrpSpPr>
+      <p:grpSpPr>
+        <a:xfrm>
+          <a:off x="0" y="0"/>
+          <a:ext cx="0" cy="0"/>
+          <a:chOff x="0" y="0"/>
+          <a:chExt cx="0" cy="0"/>
+        </a:xfrm>
+      </p:grpSpPr>
+      <p:sp>
+        <p:nvSpPr>
+          <p:cNvPr id="2" name="Title 1">
+            <a:extLst>
+              <a:ext uri="{FF2B5EF4-FFF2-40B4-BE49-F238E27FC236}">
+                <a16:creationId xmlns:a16="http://schemas.microsoft.com/office/drawing/2014/main" id="{F2E75ACD-C303-46DD-8FB4-27FC6A409857}"/>
+              </a:ext>
+            </a:extLst>
+          </p:cNvPr>
+          <p:cNvSpPr>
+            <a:spLocks noGrp="1"/>
+          </p:cNvSpPr>
+          <p:nvPr>
+            <p:ph type="title"/>
+          </p:nvPr>
+        </p:nvSpPr>
+        <p:spPr/>
+        <p:txBody>
+          <a:bodyPr/>
+          <a:lstStyle/>
+          <a:p>
+            <a:pPr algn="ctr"/>
+            <a:r>
+              <a:rPr lang="he-IL" sz="4800" dirty="0"/>
+              <a:t>תסריט שמושיות - קביעת פגישה</a:t>
+            </a:r>
+            <a:endParaRPr lang="en-US" sz="4800" dirty="0"/>
+          </a:p>
+        </p:txBody>
+      </p:sp>
+      <p:grpSp>
+        <p:nvGrpSpPr>
+          <p:cNvPr id="11" name="Group 10">
+            <a:extLst>
+              <a:ext uri="{FF2B5EF4-FFF2-40B4-BE49-F238E27FC236}">
+                <a16:creationId xmlns:a16="http://schemas.microsoft.com/office/drawing/2014/main" id="{EFEFCB8A-6928-4B67-9A92-AB4F8157EB26}"/>
+              </a:ext>
+            </a:extLst>
+          </p:cNvPr>
+          <p:cNvGrpSpPr/>
+          <p:nvPr/>
+        </p:nvGrpSpPr>
+        <p:grpSpPr>
+          <a:xfrm>
+            <a:off x="9769142" y="2453950"/>
+            <a:ext cx="2034074" cy="998376"/>
+            <a:chOff x="653142" y="2696546"/>
+            <a:chExt cx="2034074" cy="998376"/>
+          </a:xfrm>
+        </p:grpSpPr>
+        <p:sp>
+          <p:nvSpPr>
+            <p:cNvPr id="6" name="Rectangle 5">
+              <a:extLst>
+                <a:ext uri="{FF2B5EF4-FFF2-40B4-BE49-F238E27FC236}">
+                  <a16:creationId xmlns:a16="http://schemas.microsoft.com/office/drawing/2014/main" id="{4D513282-2E45-4126-87EC-C48703BD113D}"/>
+                </a:ext>
+              </a:extLst>
+            </p:cNvPr>
+            <p:cNvSpPr/>
+            <p:nvPr/>
+          </p:nvSpPr>
+          <p:spPr>
+            <a:xfrm>
+              <a:off x="653143" y="2715208"/>
+              <a:ext cx="2034073" cy="979714"/>
+            </a:xfrm>
+            <a:prstGeom prst="rect">
+              <a:avLst/>
+            </a:prstGeom>
+          </p:spPr>
+          <p:style>
+            <a:lnRef idx="2">
+              <a:schemeClr val="accent5">
+                <a:shade val="50000"/>
+              </a:schemeClr>
+            </a:lnRef>
+            <a:fillRef idx="1">
+              <a:schemeClr val="accent5"/>
+            </a:fillRef>
+            <a:effectRef idx="0">
+              <a:schemeClr val="accent5"/>
+            </a:effectRef>
+            <a:fontRef idx="minor">
+              <a:schemeClr val="lt1"/>
+            </a:fontRef>
+          </p:style>
+          <p:txBody>
+            <a:bodyPr rtlCol="0" anchor="ctr"/>
+            <a:lstStyle/>
+            <a:p>
+              <a:pPr algn="ctr"/>
+              <a:r>
+                <a:rPr lang="he-IL" sz="1200" dirty="0"/>
+                <a:t>לחיצה על הוספת פגישה</a:t>
+              </a:r>
+              <a:endParaRPr lang="en-US" sz="1200" dirty="0"/>
+            </a:p>
+          </p:txBody>
+        </p:sp>
+        <p:cxnSp>
+          <p:nvCxnSpPr>
+            <p:cNvPr id="8" name="Straight Connector 7">
+              <a:extLst>
+                <a:ext uri="{FF2B5EF4-FFF2-40B4-BE49-F238E27FC236}">
+                  <a16:creationId xmlns:a16="http://schemas.microsoft.com/office/drawing/2014/main" id="{57E33931-64D2-4499-A0CF-3FB5E87165BF}"/>
+                </a:ext>
+              </a:extLst>
+            </p:cNvPr>
+            <p:cNvCxnSpPr>
+              <a:cxnSpLocks/>
+            </p:cNvCxnSpPr>
+            <p:nvPr/>
+          </p:nvCxnSpPr>
+          <p:spPr>
+            <a:xfrm>
+              <a:off x="793102" y="3041782"/>
+              <a:ext cx="1754155" cy="0"/>
+            </a:xfrm>
+            <a:prstGeom prst="line">
+              <a:avLst/>
+            </a:prstGeom>
+          </p:spPr>
+          <p:style>
+            <a:lnRef idx="1">
+              <a:schemeClr val="dk1"/>
+            </a:lnRef>
+            <a:fillRef idx="0">
+              <a:schemeClr val="dk1"/>
+            </a:fillRef>
+            <a:effectRef idx="0">
+              <a:schemeClr val="dk1"/>
+            </a:effectRef>
+            <a:fontRef idx="minor">
+              <a:schemeClr val="tx1"/>
+            </a:fontRef>
+          </p:style>
+        </p:cxnSp>
+        <p:sp>
+          <p:nvSpPr>
+            <p:cNvPr id="10" name="TextBox 9">
+              <a:extLst>
+                <a:ext uri="{FF2B5EF4-FFF2-40B4-BE49-F238E27FC236}">
+                  <a16:creationId xmlns:a16="http://schemas.microsoft.com/office/drawing/2014/main" id="{D0E4B48E-927B-4174-980C-01ED831A18CC}"/>
+                </a:ext>
+              </a:extLst>
+            </p:cNvPr>
+            <p:cNvSpPr txBox="1"/>
+            <p:nvPr/>
+          </p:nvSpPr>
+          <p:spPr>
+            <a:xfrm>
+              <a:off x="653142" y="2696546"/>
+              <a:ext cx="2034073" cy="369332"/>
+            </a:xfrm>
+            <a:prstGeom prst="rect">
+              <a:avLst/>
+            </a:prstGeom>
+            <a:noFill/>
+          </p:spPr>
+          <p:txBody>
+            <a:bodyPr wrap="square" rtlCol="0">
+              <a:spAutoFit/>
+            </a:bodyPr>
+            <a:lstStyle/>
+            <a:p>
+              <a:pPr algn="ctr" rtl="1"/>
+              <a:r>
+                <a:rPr lang="he-IL" dirty="0">
+                  <a:solidFill>
+                    <a:schemeClr val="bg1"/>
+                  </a:solidFill>
+                </a:rPr>
+                <a:t>מסך ראשי</a:t>
+              </a:r>
+              <a:endParaRPr lang="en-US" dirty="0">
+                <a:solidFill>
+                  <a:schemeClr val="bg1"/>
+                </a:solidFill>
+              </a:endParaRPr>
+            </a:p>
+          </p:txBody>
+        </p:sp>
+      </p:grpSp>
+      <p:grpSp>
+        <p:nvGrpSpPr>
+          <p:cNvPr id="31" name="Group 30">
+            <a:extLst>
+              <a:ext uri="{FF2B5EF4-FFF2-40B4-BE49-F238E27FC236}">
+                <a16:creationId xmlns:a16="http://schemas.microsoft.com/office/drawing/2014/main" id="{3857F54E-812F-455F-B664-AC580ACFD144}"/>
+              </a:ext>
+            </a:extLst>
+          </p:cNvPr>
+          <p:cNvGrpSpPr/>
+          <p:nvPr/>
+        </p:nvGrpSpPr>
+        <p:grpSpPr>
+          <a:xfrm>
+            <a:off x="7206331" y="2457059"/>
+            <a:ext cx="2034074" cy="998376"/>
+            <a:chOff x="653142" y="2696546"/>
+            <a:chExt cx="2034074" cy="998376"/>
+          </a:xfrm>
+        </p:grpSpPr>
+        <p:sp>
+          <p:nvSpPr>
+            <p:cNvPr id="32" name="Rectangle 31">
+              <a:extLst>
+                <a:ext uri="{FF2B5EF4-FFF2-40B4-BE49-F238E27FC236}">
+                  <a16:creationId xmlns:a16="http://schemas.microsoft.com/office/drawing/2014/main" id="{9A2A58FF-183D-48BF-BA84-BA291804F680}"/>
+                </a:ext>
+              </a:extLst>
+            </p:cNvPr>
+            <p:cNvSpPr/>
+            <p:nvPr/>
+          </p:nvSpPr>
+          <p:spPr>
+            <a:xfrm>
+              <a:off x="653143" y="2715208"/>
+              <a:ext cx="2034073" cy="979714"/>
+            </a:xfrm>
+            <a:prstGeom prst="rect">
+              <a:avLst/>
+            </a:prstGeom>
+          </p:spPr>
+          <p:style>
+            <a:lnRef idx="2">
+              <a:schemeClr val="accent5">
+                <a:shade val="50000"/>
+              </a:schemeClr>
+            </a:lnRef>
+            <a:fillRef idx="1">
+              <a:schemeClr val="accent5"/>
+            </a:fillRef>
+            <a:effectRef idx="0">
+              <a:schemeClr val="accent5"/>
+            </a:effectRef>
+            <a:fontRef idx="minor">
+              <a:schemeClr val="lt1"/>
+            </a:fontRef>
+          </p:style>
+          <p:txBody>
+            <a:bodyPr rtlCol="0" anchor="ctr"/>
+            <a:lstStyle/>
+            <a:p>
+              <a:pPr algn="ctr"/>
+              <a:endParaRPr lang="he-IL" sz="1200" dirty="0"/>
+            </a:p>
+            <a:p>
+              <a:pPr algn="ctr"/>
+              <a:r>
+                <a:rPr lang="he-IL" sz="1200" dirty="0"/>
+                <a:t>הוספת פרטי הפגישה.</a:t>
+              </a:r>
+            </a:p>
+            <a:p>
+              <a:pPr algn="ctr"/>
+              <a:r>
+                <a:rPr lang="he-IL" sz="1200" dirty="0"/>
+                <a:t>מיקום, נושא, תיאור</a:t>
+              </a:r>
+              <a:endParaRPr lang="en-US" sz="1200" dirty="0"/>
+            </a:p>
+          </p:txBody>
+        </p:sp>
+        <p:cxnSp>
+          <p:nvCxnSpPr>
+            <p:cNvPr id="33" name="Straight Connector 32">
+              <a:extLst>
+                <a:ext uri="{FF2B5EF4-FFF2-40B4-BE49-F238E27FC236}">
+                  <a16:creationId xmlns:a16="http://schemas.microsoft.com/office/drawing/2014/main" id="{D29D9F79-7343-4EF6-9CC0-E91B31692E11}"/>
+                </a:ext>
+              </a:extLst>
+            </p:cNvPr>
+            <p:cNvCxnSpPr>
+              <a:cxnSpLocks/>
+            </p:cNvCxnSpPr>
+            <p:nvPr/>
+          </p:nvCxnSpPr>
+          <p:spPr>
+            <a:xfrm>
+              <a:off x="793102" y="3041782"/>
+              <a:ext cx="1754155" cy="0"/>
+            </a:xfrm>
+            <a:prstGeom prst="line">
+              <a:avLst/>
+            </a:prstGeom>
+          </p:spPr>
+          <p:style>
+            <a:lnRef idx="1">
+              <a:schemeClr val="dk1"/>
+            </a:lnRef>
+            <a:fillRef idx="0">
+              <a:schemeClr val="dk1"/>
+            </a:fillRef>
+            <a:effectRef idx="0">
+              <a:schemeClr val="dk1"/>
+            </a:effectRef>
+            <a:fontRef idx="minor">
+              <a:schemeClr val="tx1"/>
+            </a:fontRef>
+          </p:style>
+        </p:cxnSp>
+        <p:sp>
+          <p:nvSpPr>
+            <p:cNvPr id="34" name="TextBox 33">
+              <a:extLst>
+                <a:ext uri="{FF2B5EF4-FFF2-40B4-BE49-F238E27FC236}">
+                  <a16:creationId xmlns:a16="http://schemas.microsoft.com/office/drawing/2014/main" id="{74C4094C-1968-4C38-A23D-F2A1D1066AEF}"/>
+                </a:ext>
+              </a:extLst>
+            </p:cNvPr>
+            <p:cNvSpPr txBox="1"/>
+            <p:nvPr/>
+          </p:nvSpPr>
+          <p:spPr>
+            <a:xfrm>
+              <a:off x="653142" y="2696546"/>
+              <a:ext cx="2034073" cy="369332"/>
+            </a:xfrm>
+            <a:prstGeom prst="rect">
+              <a:avLst/>
+            </a:prstGeom>
+            <a:noFill/>
+          </p:spPr>
+          <p:txBody>
+            <a:bodyPr wrap="square" rtlCol="0">
+              <a:spAutoFit/>
+            </a:bodyPr>
+            <a:lstStyle/>
+            <a:p>
+              <a:pPr algn="ctr" rtl="1"/>
+              <a:r>
+                <a:rPr lang="he-IL" dirty="0">
+                  <a:solidFill>
+                    <a:schemeClr val="bg1"/>
+                  </a:solidFill>
+                </a:rPr>
+                <a:t>מסך הוספת פגישה</a:t>
+              </a:r>
+              <a:endParaRPr lang="en-US" dirty="0">
+                <a:solidFill>
+                  <a:schemeClr val="bg1"/>
+                </a:solidFill>
+              </a:endParaRPr>
+            </a:p>
+          </p:txBody>
+        </p:sp>
+      </p:grpSp>
+      <p:grpSp>
+        <p:nvGrpSpPr>
+          <p:cNvPr id="35" name="Group 34">
+            <a:extLst>
+              <a:ext uri="{FF2B5EF4-FFF2-40B4-BE49-F238E27FC236}">
+                <a16:creationId xmlns:a16="http://schemas.microsoft.com/office/drawing/2014/main" id="{D9533D1D-4314-4A79-B276-7763967CB9F9}"/>
+              </a:ext>
+            </a:extLst>
+          </p:cNvPr>
+          <p:cNvGrpSpPr/>
+          <p:nvPr/>
+        </p:nvGrpSpPr>
+        <p:grpSpPr>
+          <a:xfrm>
+            <a:off x="4654391" y="2997846"/>
+            <a:ext cx="2034074" cy="998376"/>
+            <a:chOff x="653142" y="2696546"/>
+            <a:chExt cx="2034074" cy="998376"/>
+          </a:xfrm>
+        </p:grpSpPr>
+        <p:sp>
+          <p:nvSpPr>
+            <p:cNvPr id="36" name="Rectangle 35">
+              <a:extLst>
+                <a:ext uri="{FF2B5EF4-FFF2-40B4-BE49-F238E27FC236}">
+                  <a16:creationId xmlns:a16="http://schemas.microsoft.com/office/drawing/2014/main" id="{17B57A99-D1C0-4031-AFC4-B96CBD4749BF}"/>
+                </a:ext>
+              </a:extLst>
+            </p:cNvPr>
+            <p:cNvSpPr/>
+            <p:nvPr/>
+          </p:nvSpPr>
+          <p:spPr>
+            <a:xfrm>
+              <a:off x="653143" y="2715208"/>
+              <a:ext cx="2034073" cy="979714"/>
+            </a:xfrm>
+            <a:prstGeom prst="rect">
+              <a:avLst/>
+            </a:prstGeom>
+          </p:spPr>
+          <p:style>
+            <a:lnRef idx="2">
+              <a:schemeClr val="accent5">
+                <a:shade val="50000"/>
+              </a:schemeClr>
+            </a:lnRef>
+            <a:fillRef idx="1">
+              <a:schemeClr val="accent5"/>
+            </a:fillRef>
+            <a:effectRef idx="0">
+              <a:schemeClr val="accent5"/>
+            </a:effectRef>
+            <a:fontRef idx="minor">
+              <a:schemeClr val="lt1"/>
+            </a:fontRef>
+          </p:style>
+          <p:txBody>
+            <a:bodyPr rtlCol="0" anchor="ctr"/>
+            <a:lstStyle/>
+            <a:p>
+              <a:pPr algn="ctr"/>
+              <a:endParaRPr lang="he-IL" sz="1200" dirty="0"/>
+            </a:p>
+            <a:p>
+              <a:pPr algn="ctr"/>
+              <a:r>
+                <a:rPr lang="he-IL" sz="1200" dirty="0"/>
+                <a:t>לחיצה על שדה נמענים</a:t>
+              </a:r>
+              <a:endParaRPr lang="en-US" sz="1200" dirty="0"/>
+            </a:p>
+          </p:txBody>
+        </p:sp>
+        <p:cxnSp>
+          <p:nvCxnSpPr>
+            <p:cNvPr id="37" name="Straight Connector 36">
+              <a:extLst>
+                <a:ext uri="{FF2B5EF4-FFF2-40B4-BE49-F238E27FC236}">
+                  <a16:creationId xmlns:a16="http://schemas.microsoft.com/office/drawing/2014/main" id="{20DED5BC-0E2E-444E-BCF7-EEF8D5F3A354}"/>
+                </a:ext>
+              </a:extLst>
+            </p:cNvPr>
+            <p:cNvCxnSpPr>
+              <a:cxnSpLocks/>
+            </p:cNvCxnSpPr>
+            <p:nvPr/>
+          </p:nvCxnSpPr>
+          <p:spPr>
+            <a:xfrm>
+              <a:off x="793102" y="3041782"/>
+              <a:ext cx="1754155" cy="0"/>
+            </a:xfrm>
+            <a:prstGeom prst="line">
+              <a:avLst/>
+            </a:prstGeom>
+          </p:spPr>
+          <p:style>
+            <a:lnRef idx="1">
+              <a:schemeClr val="dk1"/>
+            </a:lnRef>
+            <a:fillRef idx="0">
+              <a:schemeClr val="dk1"/>
+            </a:fillRef>
+            <a:effectRef idx="0">
+              <a:schemeClr val="dk1"/>
+            </a:effectRef>
+            <a:fontRef idx="minor">
+              <a:schemeClr val="tx1"/>
+            </a:fontRef>
+          </p:style>
+        </p:cxnSp>
+        <p:sp>
+          <p:nvSpPr>
+            <p:cNvPr id="38" name="TextBox 37">
+              <a:extLst>
+                <a:ext uri="{FF2B5EF4-FFF2-40B4-BE49-F238E27FC236}">
+                  <a16:creationId xmlns:a16="http://schemas.microsoft.com/office/drawing/2014/main" id="{2CEC05B7-8E4B-4F77-8775-F187B3225C09}"/>
+                </a:ext>
+              </a:extLst>
+            </p:cNvPr>
+            <p:cNvSpPr txBox="1"/>
+            <p:nvPr/>
+          </p:nvSpPr>
+          <p:spPr>
+            <a:xfrm>
+              <a:off x="653142" y="2696546"/>
+              <a:ext cx="2034073" cy="369332"/>
+            </a:xfrm>
+            <a:prstGeom prst="rect">
+              <a:avLst/>
+            </a:prstGeom>
+            <a:noFill/>
+          </p:spPr>
+          <p:txBody>
+            <a:bodyPr wrap="square" rtlCol="0">
+              <a:spAutoFit/>
+            </a:bodyPr>
+            <a:lstStyle/>
+            <a:p>
+              <a:pPr algn="ctr" rtl="1"/>
+              <a:r>
+                <a:rPr lang="he-IL" dirty="0">
+                  <a:solidFill>
+                    <a:schemeClr val="bg1"/>
+                  </a:solidFill>
+                </a:rPr>
+                <a:t>מסך הוספת פגישה</a:t>
+              </a:r>
+              <a:endParaRPr lang="en-US" dirty="0">
+                <a:solidFill>
+                  <a:schemeClr val="bg1"/>
+                </a:solidFill>
+              </a:endParaRPr>
+            </a:p>
+          </p:txBody>
+        </p:sp>
+      </p:grpSp>
+      <p:grpSp>
+        <p:nvGrpSpPr>
+          <p:cNvPr id="39" name="Group 38">
+            <a:extLst>
+              <a:ext uri="{FF2B5EF4-FFF2-40B4-BE49-F238E27FC236}">
+                <a16:creationId xmlns:a16="http://schemas.microsoft.com/office/drawing/2014/main" id="{43E0B6DC-7710-4791-80C3-7E8F24460827}"/>
+              </a:ext>
+            </a:extLst>
+          </p:cNvPr>
+          <p:cNvGrpSpPr/>
+          <p:nvPr/>
+        </p:nvGrpSpPr>
+        <p:grpSpPr>
+          <a:xfrm>
+            <a:off x="2183302" y="2997846"/>
+            <a:ext cx="2034074" cy="998376"/>
+            <a:chOff x="653142" y="2696546"/>
+            <a:chExt cx="2034074" cy="998376"/>
+          </a:xfrm>
+        </p:grpSpPr>
+        <p:sp>
+          <p:nvSpPr>
+            <p:cNvPr id="40" name="Rectangle 39">
+              <a:extLst>
+                <a:ext uri="{FF2B5EF4-FFF2-40B4-BE49-F238E27FC236}">
+                  <a16:creationId xmlns:a16="http://schemas.microsoft.com/office/drawing/2014/main" id="{41C3A5FD-1FAB-424F-8896-CC1FA5C455AF}"/>
+                </a:ext>
+              </a:extLst>
+            </p:cNvPr>
+            <p:cNvSpPr/>
+            <p:nvPr/>
+          </p:nvSpPr>
+          <p:spPr>
+            <a:xfrm>
+              <a:off x="653143" y="2715208"/>
+              <a:ext cx="2034073" cy="979714"/>
+            </a:xfrm>
+            <a:prstGeom prst="rect">
+              <a:avLst/>
+            </a:prstGeom>
+          </p:spPr>
+          <p:style>
+            <a:lnRef idx="2">
+              <a:schemeClr val="accent5">
+                <a:shade val="50000"/>
+              </a:schemeClr>
+            </a:lnRef>
+            <a:fillRef idx="1">
+              <a:schemeClr val="accent5"/>
+            </a:fillRef>
+            <a:effectRef idx="0">
+              <a:schemeClr val="accent5"/>
+            </a:effectRef>
+            <a:fontRef idx="minor">
+              <a:schemeClr val="lt1"/>
+            </a:fontRef>
+          </p:style>
+          <p:txBody>
+            <a:bodyPr rtlCol="0" anchor="ctr"/>
+            <a:lstStyle/>
+            <a:p>
+              <a:pPr algn="ctr"/>
+              <a:endParaRPr lang="he-IL" sz="1200" dirty="0"/>
+            </a:p>
+            <a:p>
+              <a:pPr algn="ctr"/>
+              <a:r>
+                <a:rPr lang="he-IL" sz="1200" dirty="0"/>
+                <a:t>הקלדה שם נמען ובחירה מהשלמה אוטומטית (אם קיים)</a:t>
+              </a:r>
+              <a:endParaRPr lang="en-US" sz="1200" dirty="0"/>
+            </a:p>
+          </p:txBody>
+        </p:sp>
+        <p:cxnSp>
+          <p:nvCxnSpPr>
+            <p:cNvPr id="41" name="Straight Connector 40">
+              <a:extLst>
+                <a:ext uri="{FF2B5EF4-FFF2-40B4-BE49-F238E27FC236}">
+                  <a16:creationId xmlns:a16="http://schemas.microsoft.com/office/drawing/2014/main" id="{D115F236-1744-488E-B1DA-7F1E63AF19C8}"/>
+                </a:ext>
+              </a:extLst>
+            </p:cNvPr>
+            <p:cNvCxnSpPr>
+              <a:cxnSpLocks/>
+            </p:cNvCxnSpPr>
+            <p:nvPr/>
+          </p:nvCxnSpPr>
+          <p:spPr>
+            <a:xfrm>
+              <a:off x="793102" y="3041782"/>
+              <a:ext cx="1754155" cy="0"/>
+            </a:xfrm>
+            <a:prstGeom prst="line">
+              <a:avLst/>
+            </a:prstGeom>
+          </p:spPr>
+          <p:style>
+            <a:lnRef idx="1">
+              <a:schemeClr val="dk1"/>
+            </a:lnRef>
+            <a:fillRef idx="0">
+              <a:schemeClr val="dk1"/>
+            </a:fillRef>
+            <a:effectRef idx="0">
+              <a:schemeClr val="dk1"/>
+            </a:effectRef>
+            <a:fontRef idx="minor">
+              <a:schemeClr val="tx1"/>
+            </a:fontRef>
+          </p:style>
+        </p:cxnSp>
+        <p:sp>
+          <p:nvSpPr>
+            <p:cNvPr id="42" name="TextBox 41">
+              <a:extLst>
+                <a:ext uri="{FF2B5EF4-FFF2-40B4-BE49-F238E27FC236}">
+                  <a16:creationId xmlns:a16="http://schemas.microsoft.com/office/drawing/2014/main" id="{1D127530-3F09-4146-B318-3EC8B787782B}"/>
+                </a:ext>
+              </a:extLst>
+            </p:cNvPr>
+            <p:cNvSpPr txBox="1"/>
+            <p:nvPr/>
+          </p:nvSpPr>
+          <p:spPr>
+            <a:xfrm>
+              <a:off x="653142" y="2696546"/>
+              <a:ext cx="2034073" cy="369332"/>
+            </a:xfrm>
+            <a:prstGeom prst="rect">
+              <a:avLst/>
+            </a:prstGeom>
+            <a:noFill/>
+          </p:spPr>
+          <p:txBody>
+            <a:bodyPr wrap="square" rtlCol="0">
+              <a:spAutoFit/>
+            </a:bodyPr>
+            <a:lstStyle/>
+            <a:p>
+              <a:pPr algn="ctr" rtl="1"/>
+              <a:r>
+                <a:rPr lang="he-IL" dirty="0">
+                  <a:solidFill>
+                    <a:schemeClr val="bg1"/>
+                  </a:solidFill>
+                </a:rPr>
+                <a:t>מסך הוספת פגישה</a:t>
+              </a:r>
+              <a:endParaRPr lang="en-US" dirty="0">
+                <a:solidFill>
+                  <a:schemeClr val="bg1"/>
+                </a:solidFill>
+              </a:endParaRPr>
+            </a:p>
+          </p:txBody>
+        </p:sp>
+      </p:grpSp>
+      <p:grpSp>
+        <p:nvGrpSpPr>
+          <p:cNvPr id="43" name="Group 42">
+            <a:extLst>
+              <a:ext uri="{FF2B5EF4-FFF2-40B4-BE49-F238E27FC236}">
+                <a16:creationId xmlns:a16="http://schemas.microsoft.com/office/drawing/2014/main" id="{5063C5A3-26D9-4CB4-A32B-4ABD4CE10A38}"/>
+              </a:ext>
+            </a:extLst>
+          </p:cNvPr>
+          <p:cNvGrpSpPr/>
+          <p:nvPr/>
+        </p:nvGrpSpPr>
+        <p:grpSpPr>
+          <a:xfrm>
+            <a:off x="2183301" y="4341002"/>
+            <a:ext cx="2034074" cy="998376"/>
+            <a:chOff x="653142" y="2696546"/>
+            <a:chExt cx="2034074" cy="998376"/>
+          </a:xfrm>
+        </p:grpSpPr>
+        <p:sp>
+          <p:nvSpPr>
+            <p:cNvPr id="44" name="Rectangle 43">
+              <a:extLst>
+                <a:ext uri="{FF2B5EF4-FFF2-40B4-BE49-F238E27FC236}">
+                  <a16:creationId xmlns:a16="http://schemas.microsoft.com/office/drawing/2014/main" id="{E7CD4D1F-2B82-4334-A0EE-0FD7DD097D7C}"/>
+                </a:ext>
+              </a:extLst>
+            </p:cNvPr>
+            <p:cNvSpPr/>
+            <p:nvPr/>
+          </p:nvSpPr>
+          <p:spPr>
+            <a:xfrm>
+              <a:off x="653143" y="2715208"/>
+              <a:ext cx="2034073" cy="979714"/>
+            </a:xfrm>
+            <a:prstGeom prst="rect">
+              <a:avLst/>
+            </a:prstGeom>
+          </p:spPr>
+          <p:style>
+            <a:lnRef idx="2">
+              <a:schemeClr val="accent5">
+                <a:shade val="50000"/>
+              </a:schemeClr>
+            </a:lnRef>
+            <a:fillRef idx="1">
+              <a:schemeClr val="accent5"/>
+            </a:fillRef>
+            <a:effectRef idx="0">
+              <a:schemeClr val="accent5"/>
+            </a:effectRef>
+            <a:fontRef idx="minor">
+              <a:schemeClr val="lt1"/>
+            </a:fontRef>
+          </p:style>
+          <p:txBody>
+            <a:bodyPr rtlCol="0" anchor="ctr"/>
+            <a:lstStyle/>
+            <a:p>
+              <a:pPr algn="ctr"/>
+              <a:endParaRPr lang="he-IL" sz="1200" dirty="0"/>
+            </a:p>
+            <a:p>
+              <a:pPr algn="ctr"/>
+              <a:r>
+                <a:rPr lang="he-IL" sz="1200" dirty="0"/>
+                <a:t>הוספת נמען או קבוצה </a:t>
+              </a:r>
+            </a:p>
+            <a:p>
+              <a:pPr algn="ctr"/>
+              <a:r>
+                <a:rPr lang="he-IL" sz="1200" dirty="0"/>
+                <a:t>מאנשי קשר</a:t>
+              </a:r>
+              <a:endParaRPr lang="en-US" sz="1200" dirty="0"/>
+            </a:p>
+          </p:txBody>
+        </p:sp>
+        <p:cxnSp>
+          <p:nvCxnSpPr>
+            <p:cNvPr id="45" name="Straight Connector 44">
+              <a:extLst>
+                <a:ext uri="{FF2B5EF4-FFF2-40B4-BE49-F238E27FC236}">
+                  <a16:creationId xmlns:a16="http://schemas.microsoft.com/office/drawing/2014/main" id="{3508D938-9018-4D39-B059-4394A412658E}"/>
+                </a:ext>
+              </a:extLst>
+            </p:cNvPr>
+            <p:cNvCxnSpPr>
+              <a:cxnSpLocks/>
+            </p:cNvCxnSpPr>
+            <p:nvPr/>
+          </p:nvCxnSpPr>
+          <p:spPr>
+            <a:xfrm>
+              <a:off x="793102" y="3041782"/>
+              <a:ext cx="1754155" cy="0"/>
+            </a:xfrm>
+            <a:prstGeom prst="line">
+              <a:avLst/>
+            </a:prstGeom>
+          </p:spPr>
+          <p:style>
+            <a:lnRef idx="1">
+              <a:schemeClr val="dk1"/>
+            </a:lnRef>
+            <a:fillRef idx="0">
+              <a:schemeClr val="dk1"/>
+            </a:fillRef>
+            <a:effectRef idx="0">
+              <a:schemeClr val="dk1"/>
+            </a:effectRef>
+            <a:fontRef idx="minor">
+              <a:schemeClr val="tx1"/>
+            </a:fontRef>
+          </p:style>
+        </p:cxnSp>
+        <p:sp>
+          <p:nvSpPr>
+            <p:cNvPr id="46" name="TextBox 45">
+              <a:extLst>
+                <a:ext uri="{FF2B5EF4-FFF2-40B4-BE49-F238E27FC236}">
+                  <a16:creationId xmlns:a16="http://schemas.microsoft.com/office/drawing/2014/main" id="{F4BC6CEF-0800-4030-992E-5AC1E2575EF5}"/>
+                </a:ext>
+              </a:extLst>
+            </p:cNvPr>
+            <p:cNvSpPr txBox="1"/>
+            <p:nvPr/>
+          </p:nvSpPr>
+          <p:spPr>
+            <a:xfrm>
+              <a:off x="653142" y="2696546"/>
+              <a:ext cx="2034073" cy="369332"/>
+            </a:xfrm>
+            <a:prstGeom prst="rect">
+              <a:avLst/>
+            </a:prstGeom>
+            <a:noFill/>
+          </p:spPr>
+          <p:txBody>
+            <a:bodyPr wrap="square" rtlCol="0">
+              <a:spAutoFit/>
+            </a:bodyPr>
+            <a:lstStyle/>
+            <a:p>
+              <a:pPr algn="ctr" rtl="1"/>
+              <a:r>
+                <a:rPr lang="he-IL" dirty="0">
+                  <a:solidFill>
+                    <a:schemeClr val="bg1"/>
+                  </a:solidFill>
+                </a:rPr>
+                <a:t>מסך הוספת פגישה</a:t>
+              </a:r>
+              <a:endParaRPr lang="en-US" dirty="0">
+                <a:solidFill>
+                  <a:schemeClr val="bg1"/>
+                </a:solidFill>
+              </a:endParaRPr>
+            </a:p>
+          </p:txBody>
+        </p:sp>
+      </p:grpSp>
+      <p:cxnSp>
+        <p:nvCxnSpPr>
+          <p:cNvPr id="48" name="Straight Arrow Connector 47">
+            <a:extLst>
+              <a:ext uri="{FF2B5EF4-FFF2-40B4-BE49-F238E27FC236}">
+                <a16:creationId xmlns:a16="http://schemas.microsoft.com/office/drawing/2014/main" id="{D20A44E5-47DB-447C-B114-344D9FF737CB}"/>
+              </a:ext>
+            </a:extLst>
+          </p:cNvPr>
+          <p:cNvCxnSpPr>
+            <a:stCxn id="36" idx="1"/>
+            <a:endCxn id="40" idx="3"/>
+          </p:cNvCxnSpPr>
+          <p:nvPr/>
+        </p:nvCxnSpPr>
+        <p:spPr>
+          <a:xfrm flipH="1">
+            <a:off x="4217376" y="3506365"/>
+            <a:ext cx="437016" cy="0"/>
+          </a:xfrm>
+          <a:prstGeom prst="straightConnector1">
+            <a:avLst/>
+          </a:prstGeom>
+          <a:ln>
+            <a:tailEnd type="triangle"/>
+          </a:ln>
+        </p:spPr>
+        <p:style>
+          <a:lnRef idx="1">
+            <a:schemeClr val="dk1"/>
+          </a:lnRef>
+          <a:fillRef idx="0">
+            <a:schemeClr val="dk1"/>
+          </a:fillRef>
+          <a:effectRef idx="0">
+            <a:schemeClr val="dk1"/>
+          </a:effectRef>
+          <a:fontRef idx="minor">
+            <a:schemeClr val="tx1"/>
+          </a:fontRef>
+        </p:style>
+      </p:cxnSp>
+      <p:cxnSp>
+        <p:nvCxnSpPr>
+          <p:cNvPr id="49" name="Straight Arrow Connector 48">
+            <a:extLst>
+              <a:ext uri="{FF2B5EF4-FFF2-40B4-BE49-F238E27FC236}">
+                <a16:creationId xmlns:a16="http://schemas.microsoft.com/office/drawing/2014/main" id="{8AAFA0A1-5A29-450D-9D12-0F1EAFF65748}"/>
+              </a:ext>
+            </a:extLst>
+          </p:cNvPr>
+          <p:cNvCxnSpPr>
+            <a:cxnSpLocks/>
+            <a:endCxn id="44" idx="3"/>
+          </p:cNvCxnSpPr>
+          <p:nvPr/>
+        </p:nvCxnSpPr>
+        <p:spPr>
+          <a:xfrm flipH="1">
+            <a:off x="4217375" y="3996222"/>
+            <a:ext cx="437016" cy="853299"/>
+          </a:xfrm>
+          <a:prstGeom prst="straightConnector1">
+            <a:avLst/>
+          </a:prstGeom>
+          <a:ln>
+            <a:tailEnd type="triangle"/>
+          </a:ln>
+        </p:spPr>
+        <p:style>
+          <a:lnRef idx="1">
+            <a:schemeClr val="dk1"/>
+          </a:lnRef>
+          <a:fillRef idx="0">
+            <a:schemeClr val="dk1"/>
+          </a:fillRef>
+          <a:effectRef idx="0">
+            <a:schemeClr val="dk1"/>
+          </a:effectRef>
+          <a:fontRef idx="minor">
+            <a:schemeClr val="tx1"/>
+          </a:fontRef>
+        </p:style>
+      </p:cxnSp>
+      <p:cxnSp>
+        <p:nvCxnSpPr>
+          <p:cNvPr id="51" name="Straight Arrow Connector 50">
+            <a:extLst>
+              <a:ext uri="{FF2B5EF4-FFF2-40B4-BE49-F238E27FC236}">
+                <a16:creationId xmlns:a16="http://schemas.microsoft.com/office/drawing/2014/main" id="{FD9E13BB-05DF-44FB-90E3-6C7C6DD993B2}"/>
+              </a:ext>
+            </a:extLst>
+          </p:cNvPr>
+          <p:cNvCxnSpPr>
+            <a:cxnSpLocks/>
+          </p:cNvCxnSpPr>
+          <p:nvPr/>
+        </p:nvCxnSpPr>
+        <p:spPr>
+          <a:xfrm>
+            <a:off x="4217374" y="3686756"/>
+            <a:ext cx="452566" cy="0"/>
+          </a:xfrm>
+          <a:prstGeom prst="straightConnector1">
+            <a:avLst/>
+          </a:prstGeom>
+          <a:ln>
+            <a:tailEnd type="triangle"/>
+          </a:ln>
+        </p:spPr>
+        <p:style>
+          <a:lnRef idx="1">
+            <a:schemeClr val="dk1"/>
+          </a:lnRef>
+          <a:fillRef idx="0">
+            <a:schemeClr val="dk1"/>
+          </a:fillRef>
+          <a:effectRef idx="0">
+            <a:schemeClr val="dk1"/>
+          </a:effectRef>
+          <a:fontRef idx="minor">
+            <a:schemeClr val="tx1"/>
+          </a:fontRef>
+        </p:style>
+      </p:cxnSp>
+      <p:cxnSp>
+        <p:nvCxnSpPr>
+          <p:cNvPr id="54" name="Straight Arrow Connector 53">
+            <a:extLst>
+              <a:ext uri="{FF2B5EF4-FFF2-40B4-BE49-F238E27FC236}">
+                <a16:creationId xmlns:a16="http://schemas.microsoft.com/office/drawing/2014/main" id="{ABD36C06-B884-4690-8751-260DAE7E39BF}"/>
+              </a:ext>
+            </a:extLst>
+          </p:cNvPr>
+          <p:cNvCxnSpPr>
+            <a:cxnSpLocks/>
+          </p:cNvCxnSpPr>
+          <p:nvPr/>
+        </p:nvCxnSpPr>
+        <p:spPr>
+          <a:xfrm flipV="1">
+            <a:off x="4217374" y="3996222"/>
+            <a:ext cx="576977" cy="1080735"/>
+          </a:xfrm>
+          <a:prstGeom prst="straightConnector1">
+            <a:avLst/>
+          </a:prstGeom>
+          <a:ln>
+            <a:tailEnd type="triangle"/>
+          </a:ln>
+        </p:spPr>
+        <p:style>
+          <a:lnRef idx="1">
+            <a:schemeClr val="dk1"/>
+          </a:lnRef>
+          <a:fillRef idx="0">
+            <a:schemeClr val="dk1"/>
+          </a:fillRef>
+          <a:effectRef idx="0">
+            <a:schemeClr val="dk1"/>
+          </a:effectRef>
+          <a:fontRef idx="minor">
+            <a:schemeClr val="tx1"/>
+          </a:fontRef>
+        </p:style>
+      </p:cxnSp>
+      <p:cxnSp>
+        <p:nvCxnSpPr>
+          <p:cNvPr id="58" name="Straight Arrow Connector 57">
+            <a:extLst>
+              <a:ext uri="{FF2B5EF4-FFF2-40B4-BE49-F238E27FC236}">
+                <a16:creationId xmlns:a16="http://schemas.microsoft.com/office/drawing/2014/main" id="{73E9FDED-BCA9-4C2D-9753-E2686BFC977D}"/>
+              </a:ext>
+            </a:extLst>
+          </p:cNvPr>
+          <p:cNvCxnSpPr>
+            <a:cxnSpLocks/>
+            <a:endCxn id="38" idx="3"/>
+          </p:cNvCxnSpPr>
+          <p:nvPr/>
+        </p:nvCxnSpPr>
+        <p:spPr>
+          <a:xfrm flipH="1">
+            <a:off x="6688464" y="3165016"/>
+            <a:ext cx="517868" cy="17496"/>
+          </a:xfrm>
+          <a:prstGeom prst="straightConnector1">
+            <a:avLst/>
+          </a:prstGeom>
+          <a:ln>
+            <a:tailEnd type="triangle"/>
+          </a:ln>
+        </p:spPr>
+        <p:style>
+          <a:lnRef idx="1">
+            <a:schemeClr val="dk1"/>
+          </a:lnRef>
+          <a:fillRef idx="0">
+            <a:schemeClr val="dk1"/>
+          </a:fillRef>
+          <a:effectRef idx="0">
+            <a:schemeClr val="dk1"/>
+          </a:effectRef>
+          <a:fontRef idx="minor">
+            <a:schemeClr val="tx1"/>
+          </a:fontRef>
+        </p:style>
+      </p:cxnSp>
+      <p:cxnSp>
+        <p:nvCxnSpPr>
+          <p:cNvPr id="65" name="Straight Arrow Connector 64">
+            <a:extLst>
+              <a:ext uri="{FF2B5EF4-FFF2-40B4-BE49-F238E27FC236}">
+                <a16:creationId xmlns:a16="http://schemas.microsoft.com/office/drawing/2014/main" id="{6D93901B-5F95-4F75-843A-A2AF0EF05526}"/>
+              </a:ext>
+            </a:extLst>
+          </p:cNvPr>
+          <p:cNvCxnSpPr>
+            <a:cxnSpLocks/>
+          </p:cNvCxnSpPr>
+          <p:nvPr/>
+        </p:nvCxnSpPr>
+        <p:spPr>
+          <a:xfrm flipH="1">
+            <a:off x="9240404" y="2944973"/>
+            <a:ext cx="517868" cy="17496"/>
+          </a:xfrm>
+          <a:prstGeom prst="straightConnector1">
+            <a:avLst/>
+          </a:prstGeom>
+          <a:ln>
+            <a:tailEnd type="triangle"/>
+          </a:ln>
+        </p:spPr>
+        <p:style>
+          <a:lnRef idx="1">
+            <a:schemeClr val="dk1"/>
+          </a:lnRef>
+          <a:fillRef idx="0">
+            <a:schemeClr val="dk1"/>
+          </a:fillRef>
+          <a:effectRef idx="0">
+            <a:schemeClr val="dk1"/>
+          </a:effectRef>
+          <a:fontRef idx="minor">
+            <a:schemeClr val="tx1"/>
+          </a:fontRef>
+        </p:style>
+      </p:cxnSp>
+      <p:grpSp>
+        <p:nvGrpSpPr>
+          <p:cNvPr id="71" name="Group 70">
+            <a:extLst>
+              <a:ext uri="{FF2B5EF4-FFF2-40B4-BE49-F238E27FC236}">
+                <a16:creationId xmlns:a16="http://schemas.microsoft.com/office/drawing/2014/main" id="{033645C2-3041-4384-8B7F-F8A6EF7F9737}"/>
+              </a:ext>
+            </a:extLst>
+          </p:cNvPr>
+          <p:cNvGrpSpPr/>
+          <p:nvPr/>
+        </p:nvGrpSpPr>
+        <p:grpSpPr>
+          <a:xfrm>
+            <a:off x="5312217" y="4779929"/>
+            <a:ext cx="2034074" cy="998376"/>
+            <a:chOff x="653142" y="2696546"/>
+            <a:chExt cx="2034074" cy="998376"/>
+          </a:xfrm>
+        </p:grpSpPr>
+        <p:sp>
+          <p:nvSpPr>
+            <p:cNvPr id="72" name="Rectangle 71">
+              <a:extLst>
+                <a:ext uri="{FF2B5EF4-FFF2-40B4-BE49-F238E27FC236}">
+                  <a16:creationId xmlns:a16="http://schemas.microsoft.com/office/drawing/2014/main" id="{C85F374C-ED39-48D2-8955-A0C4EA028706}"/>
+                </a:ext>
+              </a:extLst>
+            </p:cNvPr>
+            <p:cNvSpPr/>
+            <p:nvPr/>
+          </p:nvSpPr>
+          <p:spPr>
+            <a:xfrm>
+              <a:off x="653143" y="2715208"/>
+              <a:ext cx="2034073" cy="979714"/>
+            </a:xfrm>
+            <a:prstGeom prst="rect">
+              <a:avLst/>
+            </a:prstGeom>
+          </p:spPr>
+          <p:style>
+            <a:lnRef idx="2">
+              <a:schemeClr val="accent5">
+                <a:shade val="50000"/>
+              </a:schemeClr>
+            </a:lnRef>
+            <a:fillRef idx="1">
+              <a:schemeClr val="accent5"/>
+            </a:fillRef>
+            <a:effectRef idx="0">
+              <a:schemeClr val="accent5"/>
+            </a:effectRef>
+            <a:fontRef idx="minor">
+              <a:schemeClr val="lt1"/>
+            </a:fontRef>
+          </p:style>
+          <p:txBody>
+            <a:bodyPr rtlCol="0" anchor="ctr"/>
+            <a:lstStyle/>
+            <a:p>
+              <a:pPr algn="ctr"/>
+              <a:endParaRPr lang="he-IL" sz="1200" dirty="0"/>
+            </a:p>
+            <a:p>
+              <a:pPr algn="ctr"/>
+              <a:r>
+                <a:rPr lang="he-IL" sz="1200" dirty="0"/>
+                <a:t>מעבר למסך בחירת תאריך עם המלצןת המערכת והאילוצים של כל הנמענים</a:t>
+              </a:r>
+              <a:endParaRPr lang="en-US" sz="1200" dirty="0"/>
+            </a:p>
+          </p:txBody>
+        </p:sp>
+        <p:cxnSp>
+          <p:nvCxnSpPr>
+            <p:cNvPr id="73" name="Straight Connector 72">
+              <a:extLst>
+                <a:ext uri="{FF2B5EF4-FFF2-40B4-BE49-F238E27FC236}">
+                  <a16:creationId xmlns:a16="http://schemas.microsoft.com/office/drawing/2014/main" id="{8A8FA3AC-C629-4EA8-B8BE-3238AA1ED113}"/>
+                </a:ext>
+              </a:extLst>
+            </p:cNvPr>
+            <p:cNvCxnSpPr>
+              <a:cxnSpLocks/>
+            </p:cNvCxnSpPr>
+            <p:nvPr/>
+          </p:nvCxnSpPr>
+          <p:spPr>
+            <a:xfrm>
+              <a:off x="793102" y="3041782"/>
+              <a:ext cx="1754155" cy="0"/>
+            </a:xfrm>
+            <a:prstGeom prst="line">
+              <a:avLst/>
+            </a:prstGeom>
+          </p:spPr>
+          <p:style>
+            <a:lnRef idx="1">
+              <a:schemeClr val="dk1"/>
+            </a:lnRef>
+            <a:fillRef idx="0">
+              <a:schemeClr val="dk1"/>
+            </a:fillRef>
+            <a:effectRef idx="0">
+              <a:schemeClr val="dk1"/>
+            </a:effectRef>
+            <a:fontRef idx="minor">
+              <a:schemeClr val="tx1"/>
+            </a:fontRef>
+          </p:style>
+        </p:cxnSp>
+        <p:sp>
+          <p:nvSpPr>
+            <p:cNvPr id="74" name="TextBox 73">
+              <a:extLst>
+                <a:ext uri="{FF2B5EF4-FFF2-40B4-BE49-F238E27FC236}">
+                  <a16:creationId xmlns:a16="http://schemas.microsoft.com/office/drawing/2014/main" id="{0BFDB4D6-6466-461F-8D8F-EAD7EF0E69B8}"/>
+                </a:ext>
+              </a:extLst>
+            </p:cNvPr>
+            <p:cNvSpPr txBox="1"/>
+            <p:nvPr/>
+          </p:nvSpPr>
+          <p:spPr>
+            <a:xfrm>
+              <a:off x="653142" y="2696546"/>
+              <a:ext cx="2034073" cy="369332"/>
+            </a:xfrm>
+            <a:prstGeom prst="rect">
+              <a:avLst/>
+            </a:prstGeom>
+            <a:noFill/>
+          </p:spPr>
+          <p:txBody>
+            <a:bodyPr wrap="square" rtlCol="0">
+              <a:spAutoFit/>
+            </a:bodyPr>
+            <a:lstStyle/>
+            <a:p>
+              <a:pPr algn="ctr" rtl="1"/>
+              <a:r>
+                <a:rPr lang="he-IL" dirty="0">
+                  <a:solidFill>
+                    <a:schemeClr val="bg1"/>
+                  </a:solidFill>
+                </a:rPr>
+                <a:t>מסך בחירת תאריך</a:t>
+              </a:r>
+              <a:endParaRPr lang="en-US" dirty="0">
+                <a:solidFill>
+                  <a:schemeClr val="bg1"/>
+                </a:solidFill>
+              </a:endParaRPr>
+            </a:p>
+          </p:txBody>
+        </p:sp>
+      </p:grpSp>
+      <p:cxnSp>
+        <p:nvCxnSpPr>
+          <p:cNvPr id="75" name="Straight Arrow Connector 74">
+            <a:extLst>
+              <a:ext uri="{FF2B5EF4-FFF2-40B4-BE49-F238E27FC236}">
+                <a16:creationId xmlns:a16="http://schemas.microsoft.com/office/drawing/2014/main" id="{74B078C5-8ED0-4805-84D3-A7297B141EA6}"/>
+              </a:ext>
+            </a:extLst>
+          </p:cNvPr>
+          <p:cNvCxnSpPr>
+            <a:cxnSpLocks/>
+            <a:stCxn id="36" idx="2"/>
+            <a:endCxn id="74" idx="0"/>
+          </p:cNvCxnSpPr>
+          <p:nvPr/>
+        </p:nvCxnSpPr>
+        <p:spPr>
+          <a:xfrm>
+            <a:off x="5671429" y="3996222"/>
+            <a:ext cx="657825" cy="783707"/>
+          </a:xfrm>
+          <a:prstGeom prst="straightConnector1">
+            <a:avLst/>
+          </a:prstGeom>
+          <a:ln>
+            <a:tailEnd type="triangle"/>
+          </a:ln>
+        </p:spPr>
+        <p:style>
+          <a:lnRef idx="1">
+            <a:schemeClr val="dk1"/>
+          </a:lnRef>
+          <a:fillRef idx="0">
+            <a:schemeClr val="dk1"/>
+          </a:fillRef>
+          <a:effectRef idx="0">
+            <a:schemeClr val="dk1"/>
+          </a:effectRef>
+          <a:fontRef idx="minor">
+            <a:schemeClr val="tx1"/>
+          </a:fontRef>
+        </p:style>
+      </p:cxnSp>
+      <p:grpSp>
+        <p:nvGrpSpPr>
+          <p:cNvPr id="80" name="Group 79">
+            <a:extLst>
+              <a:ext uri="{FF2B5EF4-FFF2-40B4-BE49-F238E27FC236}">
+                <a16:creationId xmlns:a16="http://schemas.microsoft.com/office/drawing/2014/main" id="{CC5A1E11-E969-4E60-9C60-26784D38D334}"/>
+              </a:ext>
+            </a:extLst>
+          </p:cNvPr>
+          <p:cNvGrpSpPr/>
+          <p:nvPr/>
+        </p:nvGrpSpPr>
+        <p:grpSpPr>
+          <a:xfrm>
+            <a:off x="7783251" y="4779929"/>
+            <a:ext cx="2034074" cy="998376"/>
+            <a:chOff x="653142" y="2696546"/>
+            <a:chExt cx="2034074" cy="998376"/>
+          </a:xfrm>
+        </p:grpSpPr>
+        <p:sp>
+          <p:nvSpPr>
+            <p:cNvPr id="81" name="Rectangle 80">
+              <a:extLst>
+                <a:ext uri="{FF2B5EF4-FFF2-40B4-BE49-F238E27FC236}">
+                  <a16:creationId xmlns:a16="http://schemas.microsoft.com/office/drawing/2014/main" id="{09C08D7C-BB22-4125-8665-E9991DEC1750}"/>
+                </a:ext>
+              </a:extLst>
+            </p:cNvPr>
+            <p:cNvSpPr/>
+            <p:nvPr/>
+          </p:nvSpPr>
+          <p:spPr>
+            <a:xfrm>
+              <a:off x="653143" y="2715208"/>
+              <a:ext cx="2034073" cy="979714"/>
+            </a:xfrm>
+            <a:prstGeom prst="rect">
+              <a:avLst/>
+            </a:prstGeom>
+          </p:spPr>
+          <p:style>
+            <a:lnRef idx="2">
+              <a:schemeClr val="accent5">
+                <a:shade val="50000"/>
+              </a:schemeClr>
+            </a:lnRef>
+            <a:fillRef idx="1">
+              <a:schemeClr val="accent5"/>
+            </a:fillRef>
+            <a:effectRef idx="0">
+              <a:schemeClr val="accent5"/>
+            </a:effectRef>
+            <a:fontRef idx="minor">
+              <a:schemeClr val="lt1"/>
+            </a:fontRef>
+          </p:style>
+          <p:txBody>
+            <a:bodyPr rtlCol="0" anchor="ctr"/>
+            <a:lstStyle/>
+            <a:p>
+              <a:pPr algn="ctr"/>
+              <a:endParaRPr lang="he-IL" sz="1200" dirty="0"/>
+            </a:p>
+            <a:p>
+              <a:pPr algn="ctr"/>
+              <a:r>
+                <a:rPr lang="he-IL" sz="1200" dirty="0"/>
+                <a:t>שליחת הזימון לפגישה</a:t>
+              </a:r>
+              <a:endParaRPr lang="en-US" sz="1200" dirty="0"/>
+            </a:p>
+          </p:txBody>
+        </p:sp>
+        <p:cxnSp>
+          <p:nvCxnSpPr>
+            <p:cNvPr id="82" name="Straight Connector 81">
+              <a:extLst>
+                <a:ext uri="{FF2B5EF4-FFF2-40B4-BE49-F238E27FC236}">
+                  <a16:creationId xmlns:a16="http://schemas.microsoft.com/office/drawing/2014/main" id="{375EE725-56BA-4B28-AE41-41047CC72B6F}"/>
+                </a:ext>
+              </a:extLst>
+            </p:cNvPr>
+            <p:cNvCxnSpPr>
+              <a:cxnSpLocks/>
+            </p:cNvCxnSpPr>
+            <p:nvPr/>
+          </p:nvCxnSpPr>
+          <p:spPr>
+            <a:xfrm>
+              <a:off x="793102" y="3041782"/>
+              <a:ext cx="1754155" cy="0"/>
+            </a:xfrm>
+            <a:prstGeom prst="line">
+              <a:avLst/>
+            </a:prstGeom>
+          </p:spPr>
+          <p:style>
+            <a:lnRef idx="1">
+              <a:schemeClr val="dk1"/>
+            </a:lnRef>
+            <a:fillRef idx="0">
+              <a:schemeClr val="dk1"/>
+            </a:fillRef>
+            <a:effectRef idx="0">
+              <a:schemeClr val="dk1"/>
+            </a:effectRef>
+            <a:fontRef idx="minor">
+              <a:schemeClr val="tx1"/>
+            </a:fontRef>
+          </p:style>
+        </p:cxnSp>
+        <p:sp>
+          <p:nvSpPr>
+            <p:cNvPr id="83" name="TextBox 82">
+              <a:extLst>
+                <a:ext uri="{FF2B5EF4-FFF2-40B4-BE49-F238E27FC236}">
+                  <a16:creationId xmlns:a16="http://schemas.microsoft.com/office/drawing/2014/main" id="{34CD74CB-36AA-4F68-8758-D980FFDDD33A}"/>
+                </a:ext>
+              </a:extLst>
+            </p:cNvPr>
+            <p:cNvSpPr txBox="1"/>
+            <p:nvPr/>
+          </p:nvSpPr>
+          <p:spPr>
+            <a:xfrm>
+              <a:off x="653142" y="2696546"/>
+              <a:ext cx="2034073" cy="369332"/>
+            </a:xfrm>
+            <a:prstGeom prst="rect">
+              <a:avLst/>
+            </a:prstGeom>
+            <a:noFill/>
+          </p:spPr>
+          <p:txBody>
+            <a:bodyPr wrap="square" rtlCol="0">
+              <a:spAutoFit/>
+            </a:bodyPr>
+            <a:lstStyle/>
+            <a:p>
+              <a:pPr algn="ctr" rtl="1"/>
+              <a:r>
+                <a:rPr lang="he-IL" dirty="0">
+                  <a:solidFill>
+                    <a:schemeClr val="bg1"/>
+                  </a:solidFill>
+                </a:rPr>
+                <a:t>מסך הוספת פגישה</a:t>
+              </a:r>
+              <a:endParaRPr lang="en-US" dirty="0">
+                <a:solidFill>
+                  <a:schemeClr val="bg1"/>
+                </a:solidFill>
+              </a:endParaRPr>
+            </a:p>
+          </p:txBody>
+        </p:sp>
+      </p:grpSp>
+      <p:cxnSp>
+        <p:nvCxnSpPr>
+          <p:cNvPr id="84" name="Straight Arrow Connector 83">
+            <a:extLst>
+              <a:ext uri="{FF2B5EF4-FFF2-40B4-BE49-F238E27FC236}">
+                <a16:creationId xmlns:a16="http://schemas.microsoft.com/office/drawing/2014/main" id="{D8467879-573C-4E6F-B7DC-8C1786558478}"/>
+              </a:ext>
+            </a:extLst>
+          </p:cNvPr>
+          <p:cNvCxnSpPr>
+            <a:cxnSpLocks/>
+          </p:cNvCxnSpPr>
+          <p:nvPr/>
+        </p:nvCxnSpPr>
+        <p:spPr>
+          <a:xfrm>
+            <a:off x="7346290" y="5315661"/>
+            <a:ext cx="452566" cy="0"/>
+          </a:xfrm>
+          <a:prstGeom prst="straightConnector1">
+            <a:avLst/>
+          </a:prstGeom>
+          <a:ln>
+            <a:tailEnd type="triangle"/>
+          </a:ln>
+        </p:spPr>
+        <p:style>
+          <a:lnRef idx="1">
+            <a:schemeClr val="dk1"/>
+          </a:lnRef>
+          <a:fillRef idx="0">
+            <a:schemeClr val="dk1"/>
+          </a:fillRef>
+          <a:effectRef idx="0">
+            <a:schemeClr val="dk1"/>
+          </a:effectRef>
+          <a:fontRef idx="minor">
+            <a:schemeClr val="tx1"/>
+          </a:fontRef>
+        </p:style>
+      </p:cxnSp>
+    </p:spTree>
+    <p:extLst>
+      <p:ext uri="{BB962C8B-B14F-4D97-AF65-F5344CB8AC3E}">
+        <p14:creationId xmlns:p14="http://schemas.microsoft.com/office/powerpoint/2010/main" val="3292089220"/>
+      </p:ext>
+    </p:extLst>
+  </p:cSld>
+  <p:clrMapOvr>
+    <a:masterClrMapping/>
+  </p:clrMapOvr>
+</p:sld>
+</file>
+
+<file path=ppt/slides/slide64.xml><?xml version="1.0" encoding="utf-8"?>
+<p:sld xmlns:a="http://schemas.openxmlformats.org/drawingml/2006/main" xmlns:r="http://schemas.openxmlformats.org/officeDocument/2006/relationships" xmlns:p="http://schemas.openxmlformats.org/presentationml/2006/main">
+  <p:cSld>
+    <p:spTree>
+      <p:nvGrpSpPr>
+        <p:cNvPr id="1" name=""/>
+        <p:cNvGrpSpPr/>
+        <p:nvPr/>
+      </p:nvGrpSpPr>
+      <p:grpSpPr>
+        <a:xfrm>
+          <a:off x="0" y="0"/>
+          <a:ext cx="0" cy="0"/>
+          <a:chOff x="0" y="0"/>
+          <a:chExt cx="0" cy="0"/>
+        </a:xfrm>
+      </p:grpSpPr>
+      <p:sp>
+        <p:nvSpPr>
           <p:cNvPr id="2" name="כותרת 1">
             <a:extLst>
               <a:ext uri="{FF2B5EF4-FFF2-40B4-BE49-F238E27FC236}">
@@ -29719,7 +32019,7 @@
 </p:sld>
 </file>
 
-<file path=ppt/slides/slide63.xml><?xml version="1.0" encoding="utf-8"?>
+<file path=ppt/slides/slide65.xml><?xml version="1.0" encoding="utf-8"?>
 <p:sld xmlns:a="http://schemas.openxmlformats.org/drawingml/2006/main" xmlns:r="http://schemas.openxmlformats.org/officeDocument/2006/relationships" xmlns:p="http://schemas.openxmlformats.org/presentationml/2006/main">
   <p:cSld>
     <p:spTree>

</xml_diff>

<commit_message>
add IA and navigation
</commit_message>
<xml_diff>
--- a/ux_course/מצגת סופית להגשה.pptx
+++ b/ux_course/מצגת סופית להגשה.pptx
@@ -5,7 +5,7 @@
     <p:sldMasterId id="2147483828" r:id="rId1"/>
   </p:sldMasterIdLst>
   <p:notesMasterIdLst>
-    <p:notesMasterId r:id="rId66"/>
+    <p:notesMasterId r:id="rId70"/>
   </p:notesMasterIdLst>
   <p:sldIdLst>
     <p:sldId id="262" r:id="rId2"/>
@@ -72,6 +72,10 @@
     <p:sldId id="323" r:id="rId63"/>
     <p:sldId id="324" r:id="rId64"/>
     <p:sldId id="316" r:id="rId65"/>
+    <p:sldId id="325" r:id="rId66"/>
+    <p:sldId id="326" r:id="rId67"/>
+    <p:sldId id="327" r:id="rId68"/>
+    <p:sldId id="328" r:id="rId69"/>
   </p:sldIdLst>
   <p:sldSz cx="12192000" cy="6858000"/>
   <p:notesSz cx="6858000" cy="9144000"/>
@@ -32016,6 +32020,1663 @@
     <p:extLst>
       <p:ext uri="{BB962C8B-B14F-4D97-AF65-F5344CB8AC3E}">
         <p14:creationId xmlns:p14="http://schemas.microsoft.com/office/powerpoint/2010/main" val="1412135787"/>
+      </p:ext>
+    </p:extLst>
+  </p:cSld>
+  <p:clrMapOvr>
+    <a:masterClrMapping/>
+  </p:clrMapOvr>
+</p:sld>
+</file>
+
+<file path=ppt/slides/slide65.xml><?xml version="1.0" encoding="utf-8"?>
+<p:sld xmlns:a="http://schemas.openxmlformats.org/drawingml/2006/main" xmlns:r="http://schemas.openxmlformats.org/officeDocument/2006/relationships" xmlns:p="http://schemas.openxmlformats.org/presentationml/2006/main">
+  <p:cSld>
+    <p:spTree>
+      <p:nvGrpSpPr>
+        <p:cNvPr id="1" name=""/>
+        <p:cNvGrpSpPr/>
+        <p:nvPr/>
+      </p:nvGrpSpPr>
+      <p:grpSpPr>
+        <a:xfrm>
+          <a:off x="0" y="0"/>
+          <a:ext cx="0" cy="0"/>
+          <a:chOff x="0" y="0"/>
+          <a:chExt cx="0" cy="0"/>
+        </a:xfrm>
+      </p:grpSpPr>
+      <p:sp>
+        <p:nvSpPr>
+          <p:cNvPr id="2" name="Title 1">
+            <a:extLst>
+              <a:ext uri="{FF2B5EF4-FFF2-40B4-BE49-F238E27FC236}">
+                <a16:creationId xmlns:a16="http://schemas.microsoft.com/office/drawing/2014/main" id="{F2E75ACD-C303-46DD-8FB4-27FC6A409857}"/>
+              </a:ext>
+            </a:extLst>
+          </p:cNvPr>
+          <p:cNvSpPr>
+            <a:spLocks noGrp="1"/>
+          </p:cNvSpPr>
+          <p:nvPr>
+            <p:ph type="title"/>
+          </p:nvPr>
+        </p:nvSpPr>
+        <p:spPr/>
+        <p:txBody>
+          <a:bodyPr/>
+          <a:lstStyle/>
+          <a:p>
+            <a:pPr algn="ctr"/>
+            <a:r>
+              <a:rPr lang="he-IL" sz="4800" dirty="0"/>
+              <a:t>ארכיטקטורת מידע</a:t>
+            </a:r>
+            <a:endParaRPr lang="en-US" sz="4800" dirty="0"/>
+          </a:p>
+        </p:txBody>
+      </p:sp>
+      <p:sp>
+        <p:nvSpPr>
+          <p:cNvPr id="18" name="תיבת טקסט 17">
+            <a:extLst>
+              <a:ext uri="{FF2B5EF4-FFF2-40B4-BE49-F238E27FC236}">
+                <a16:creationId xmlns:a16="http://schemas.microsoft.com/office/drawing/2014/main" id="{8D31B842-4145-4258-9806-37E51F29916E}"/>
+              </a:ext>
+            </a:extLst>
+          </p:cNvPr>
+          <p:cNvSpPr txBox="1"/>
+          <p:nvPr/>
+        </p:nvSpPr>
+        <p:spPr>
+          <a:xfrm>
+            <a:off x="7919696" y="2534088"/>
+            <a:ext cx="4121834" cy="1754326"/>
+          </a:xfrm>
+          <a:prstGeom prst="rect">
+            <a:avLst/>
+          </a:prstGeom>
+          <a:noFill/>
+        </p:spPr>
+        <p:txBody>
+          <a:bodyPr wrap="square" rtlCol="1">
+            <a:spAutoFit/>
+          </a:bodyPr>
+          <a:lstStyle/>
+          <a:p>
+            <a:pPr marL="285750" indent="-285750" algn="r" rtl="1">
+              <a:buFont typeface="Arial" panose="020B0604020202020204" pitchFamily="34" charset="0"/>
+              <a:buChar char="•"/>
+            </a:pPr>
+            <a:r>
+              <a:rPr lang="he-IL" dirty="0"/>
+              <a:t>המערכת שלנו משתמשת בעיקר בארגון מידע כרונולוגי, מכיוון שהמערכת מתעסקת בפגישות, חשוב למשתמש לראות את הפגישות והאילוצים שלו לפי ציר זמן מסוים אשר מאפשר לו ניהול קל של פגישותיו.</a:t>
+            </a:r>
+          </a:p>
+        </p:txBody>
+      </p:sp>
+      <p:pic>
+        <p:nvPicPr>
+          <p:cNvPr id="19" name="תמונה 18">
+            <a:extLst>
+              <a:ext uri="{FF2B5EF4-FFF2-40B4-BE49-F238E27FC236}">
+                <a16:creationId xmlns:a16="http://schemas.microsoft.com/office/drawing/2014/main" id="{87AAD36D-EE7B-4176-9B99-0EEC6B084F75}"/>
+              </a:ext>
+            </a:extLst>
+          </p:cNvPr>
+          <p:cNvPicPr>
+            <a:picLocks noChangeAspect="1"/>
+          </p:cNvPicPr>
+          <p:nvPr/>
+        </p:nvPicPr>
+        <p:blipFill>
+          <a:blip r:embed="rId2"/>
+          <a:stretch>
+            <a:fillRect/>
+          </a:stretch>
+        </p:blipFill>
+        <p:spPr>
+          <a:xfrm>
+            <a:off x="150470" y="2400030"/>
+            <a:ext cx="7642893" cy="3139322"/>
+          </a:xfrm>
+          <a:prstGeom prst="rect">
+            <a:avLst/>
+          </a:prstGeom>
+        </p:spPr>
+      </p:pic>
+      <p:cxnSp>
+        <p:nvCxnSpPr>
+          <p:cNvPr id="6" name="מחבר חץ ישר 5">
+            <a:extLst>
+              <a:ext uri="{FF2B5EF4-FFF2-40B4-BE49-F238E27FC236}">
+                <a16:creationId xmlns:a16="http://schemas.microsoft.com/office/drawing/2014/main" id="{217F64C3-70A6-4928-B05A-2BDDDF39AEB0}"/>
+              </a:ext>
+            </a:extLst>
+          </p:cNvPr>
+          <p:cNvCxnSpPr/>
+          <p:nvPr/>
+        </p:nvCxnSpPr>
+        <p:spPr>
+          <a:xfrm>
+            <a:off x="3910818" y="3429000"/>
+            <a:ext cx="0" cy="1793795"/>
+          </a:xfrm>
+          <a:prstGeom prst="straightConnector1">
+            <a:avLst/>
+          </a:prstGeom>
+          <a:ln>
+            <a:tailEnd type="triangle"/>
+          </a:ln>
+        </p:spPr>
+        <p:style>
+          <a:lnRef idx="1">
+            <a:schemeClr val="accent1"/>
+          </a:lnRef>
+          <a:fillRef idx="0">
+            <a:schemeClr val="accent1"/>
+          </a:fillRef>
+          <a:effectRef idx="0">
+            <a:schemeClr val="accent1"/>
+          </a:effectRef>
+          <a:fontRef idx="minor">
+            <a:schemeClr val="tx1"/>
+          </a:fontRef>
+        </p:style>
+      </p:cxnSp>
+      <p:sp>
+        <p:nvSpPr>
+          <p:cNvPr id="7" name="תיבת טקסט 6">
+            <a:extLst>
+              <a:ext uri="{FF2B5EF4-FFF2-40B4-BE49-F238E27FC236}">
+                <a16:creationId xmlns:a16="http://schemas.microsoft.com/office/drawing/2014/main" id="{2F2F805E-428B-48F0-BB48-EFDFA9157D27}"/>
+              </a:ext>
+            </a:extLst>
+          </p:cNvPr>
+          <p:cNvSpPr txBox="1"/>
+          <p:nvPr/>
+        </p:nvSpPr>
+        <p:spPr>
+          <a:xfrm>
+            <a:off x="1856942" y="3334044"/>
+            <a:ext cx="1927544" cy="1200329"/>
+          </a:xfrm>
+          <a:prstGeom prst="rect">
+            <a:avLst/>
+          </a:prstGeom>
+          <a:noFill/>
+        </p:spPr>
+        <p:txBody>
+          <a:bodyPr wrap="square" rtlCol="1">
+            <a:spAutoFit/>
+          </a:bodyPr>
+          <a:lstStyle/>
+          <a:p>
+            <a:pPr algn="r"/>
+            <a:r>
+              <a:rPr lang="he-IL" dirty="0"/>
+              <a:t>הפגישות ממוינות מהפגישה הקרובה ביותר לרחוקה ביותר</a:t>
+            </a:r>
+          </a:p>
+        </p:txBody>
+      </p:sp>
+    </p:spTree>
+    <p:extLst>
+      <p:ext uri="{BB962C8B-B14F-4D97-AF65-F5344CB8AC3E}">
+        <p14:creationId xmlns:p14="http://schemas.microsoft.com/office/powerpoint/2010/main" val="971213103"/>
+      </p:ext>
+    </p:extLst>
+  </p:cSld>
+  <p:clrMapOvr>
+    <a:masterClrMapping/>
+  </p:clrMapOvr>
+</p:sld>
+</file>
+
+<file path=ppt/slides/slide66.xml><?xml version="1.0" encoding="utf-8"?>
+<p:sld xmlns:a="http://schemas.openxmlformats.org/drawingml/2006/main" xmlns:r="http://schemas.openxmlformats.org/officeDocument/2006/relationships" xmlns:p="http://schemas.openxmlformats.org/presentationml/2006/main">
+  <p:cSld>
+    <p:spTree>
+      <p:nvGrpSpPr>
+        <p:cNvPr id="1" name=""/>
+        <p:cNvGrpSpPr/>
+        <p:nvPr/>
+      </p:nvGrpSpPr>
+      <p:grpSpPr>
+        <a:xfrm>
+          <a:off x="0" y="0"/>
+          <a:ext cx="0" cy="0"/>
+          <a:chOff x="0" y="0"/>
+          <a:chExt cx="0" cy="0"/>
+        </a:xfrm>
+      </p:grpSpPr>
+      <p:sp>
+        <p:nvSpPr>
+          <p:cNvPr id="2" name="Title 1">
+            <a:extLst>
+              <a:ext uri="{FF2B5EF4-FFF2-40B4-BE49-F238E27FC236}">
+                <a16:creationId xmlns:a16="http://schemas.microsoft.com/office/drawing/2014/main" id="{F2E75ACD-C303-46DD-8FB4-27FC6A409857}"/>
+              </a:ext>
+            </a:extLst>
+          </p:cNvPr>
+          <p:cNvSpPr>
+            <a:spLocks noGrp="1"/>
+          </p:cNvSpPr>
+          <p:nvPr>
+            <p:ph type="title"/>
+          </p:nvPr>
+        </p:nvSpPr>
+        <p:spPr/>
+        <p:txBody>
+          <a:bodyPr/>
+          <a:lstStyle/>
+          <a:p>
+            <a:pPr algn="ctr"/>
+            <a:r>
+              <a:rPr lang="he-IL" sz="4800" dirty="0"/>
+              <a:t>ארכיטקטורת מידע</a:t>
+            </a:r>
+            <a:endParaRPr lang="en-US" sz="4800" dirty="0"/>
+          </a:p>
+        </p:txBody>
+      </p:sp>
+      <p:pic>
+        <p:nvPicPr>
+          <p:cNvPr id="3" name="תמונה 2">
+            <a:extLst>
+              <a:ext uri="{FF2B5EF4-FFF2-40B4-BE49-F238E27FC236}">
+                <a16:creationId xmlns:a16="http://schemas.microsoft.com/office/drawing/2014/main" id="{A55282CC-442F-4983-9221-06D6A8EDAF5D}"/>
+              </a:ext>
+            </a:extLst>
+          </p:cNvPr>
+          <p:cNvPicPr>
+            <a:picLocks noChangeAspect="1"/>
+          </p:cNvPicPr>
+          <p:nvPr/>
+        </p:nvPicPr>
+        <p:blipFill>
+          <a:blip r:embed="rId2"/>
+          <a:stretch>
+            <a:fillRect/>
+          </a:stretch>
+        </p:blipFill>
+        <p:spPr>
+          <a:xfrm>
+            <a:off x="0" y="2257425"/>
+            <a:ext cx="8210550" cy="4600575"/>
+          </a:xfrm>
+          <a:prstGeom prst="rect">
+            <a:avLst/>
+          </a:prstGeom>
+        </p:spPr>
+      </p:pic>
+      <p:sp>
+        <p:nvSpPr>
+          <p:cNvPr id="12" name="תיבת טקסט 11">
+            <a:extLst>
+              <a:ext uri="{FF2B5EF4-FFF2-40B4-BE49-F238E27FC236}">
+                <a16:creationId xmlns:a16="http://schemas.microsoft.com/office/drawing/2014/main" id="{77AF2D51-D00C-40F2-9B31-0894F6F09F0E}"/>
+              </a:ext>
+            </a:extLst>
+          </p:cNvPr>
+          <p:cNvSpPr txBox="1"/>
+          <p:nvPr/>
+        </p:nvSpPr>
+        <p:spPr>
+          <a:xfrm>
+            <a:off x="8361020" y="2257425"/>
+            <a:ext cx="3830980" cy="923330"/>
+          </a:xfrm>
+          <a:prstGeom prst="rect">
+            <a:avLst/>
+          </a:prstGeom>
+          <a:noFill/>
+        </p:spPr>
+        <p:txBody>
+          <a:bodyPr wrap="square" rtlCol="1">
+            <a:spAutoFit/>
+          </a:bodyPr>
+          <a:lstStyle/>
+          <a:p>
+            <a:pPr marL="285750" indent="-285750" algn="r" rtl="1">
+              <a:buFont typeface="Arial" panose="020B0604020202020204" pitchFamily="34" charset="0"/>
+              <a:buChar char="•"/>
+            </a:pPr>
+            <a:r>
+              <a:rPr lang="he-IL" dirty="0"/>
+              <a:t>לוח השנה בנוי כך שהמעבר של הזמן והפגישות ממוקמות מצד ימין לשמאל (לפי סדר הכתיבה בעברית).</a:t>
+            </a:r>
+          </a:p>
+        </p:txBody>
+      </p:sp>
+      <p:cxnSp>
+        <p:nvCxnSpPr>
+          <p:cNvPr id="5" name="מחבר חץ ישר 4">
+            <a:extLst>
+              <a:ext uri="{FF2B5EF4-FFF2-40B4-BE49-F238E27FC236}">
+                <a16:creationId xmlns:a16="http://schemas.microsoft.com/office/drawing/2014/main" id="{3133421B-8C58-408C-8386-659EE009EF4D}"/>
+              </a:ext>
+            </a:extLst>
+          </p:cNvPr>
+          <p:cNvCxnSpPr/>
+          <p:nvPr/>
+        </p:nvCxnSpPr>
+        <p:spPr>
+          <a:xfrm flipH="1">
+            <a:off x="1152144" y="4712678"/>
+            <a:ext cx="5980176" cy="0"/>
+          </a:xfrm>
+          <a:prstGeom prst="straightConnector1">
+            <a:avLst/>
+          </a:prstGeom>
+          <a:ln>
+            <a:headEnd type="triangle"/>
+            <a:tailEnd type="triangle"/>
+          </a:ln>
+        </p:spPr>
+        <p:style>
+          <a:lnRef idx="1">
+            <a:schemeClr val="accent1"/>
+          </a:lnRef>
+          <a:fillRef idx="0">
+            <a:schemeClr val="accent1"/>
+          </a:fillRef>
+          <a:effectRef idx="0">
+            <a:schemeClr val="accent1"/>
+          </a:effectRef>
+          <a:fontRef idx="minor">
+            <a:schemeClr val="tx1"/>
+          </a:fontRef>
+        </p:style>
+      </p:cxnSp>
+      <p:sp>
+        <p:nvSpPr>
+          <p:cNvPr id="13" name="תיבת טקסט 12">
+            <a:extLst>
+              <a:ext uri="{FF2B5EF4-FFF2-40B4-BE49-F238E27FC236}">
+                <a16:creationId xmlns:a16="http://schemas.microsoft.com/office/drawing/2014/main" id="{E18D7AFE-6819-46E8-91E9-7633BA2436D1}"/>
+              </a:ext>
+            </a:extLst>
+          </p:cNvPr>
+          <p:cNvSpPr txBox="1"/>
+          <p:nvPr/>
+        </p:nvSpPr>
+        <p:spPr>
+          <a:xfrm>
+            <a:off x="6344530" y="4343346"/>
+            <a:ext cx="787790" cy="369332"/>
+          </a:xfrm>
+          <a:prstGeom prst="rect">
+            <a:avLst/>
+          </a:prstGeom>
+          <a:noFill/>
+        </p:spPr>
+        <p:txBody>
+          <a:bodyPr wrap="square" rtlCol="1">
+            <a:spAutoFit/>
+          </a:bodyPr>
+          <a:lstStyle/>
+          <a:p>
+            <a:pPr algn="r"/>
+            <a:r>
+              <a:rPr lang="he-IL" dirty="0">
+                <a:solidFill>
+                  <a:srgbClr val="C00000"/>
+                </a:solidFill>
+              </a:rPr>
+              <a:t>עבר</a:t>
+            </a:r>
+          </a:p>
+        </p:txBody>
+      </p:sp>
+      <p:cxnSp>
+        <p:nvCxnSpPr>
+          <p:cNvPr id="15" name="מחבר ישר 14">
+            <a:extLst>
+              <a:ext uri="{FF2B5EF4-FFF2-40B4-BE49-F238E27FC236}">
+                <a16:creationId xmlns:a16="http://schemas.microsoft.com/office/drawing/2014/main" id="{C679A093-27E5-4BE4-A986-E68C743F804F}"/>
+              </a:ext>
+            </a:extLst>
+          </p:cNvPr>
+          <p:cNvCxnSpPr/>
+          <p:nvPr/>
+        </p:nvCxnSpPr>
+        <p:spPr>
+          <a:xfrm>
+            <a:off x="4142232" y="4712678"/>
+            <a:ext cx="0" cy="0"/>
+          </a:xfrm>
+          <a:prstGeom prst="line">
+            <a:avLst/>
+          </a:prstGeom>
+        </p:spPr>
+        <p:style>
+          <a:lnRef idx="1">
+            <a:schemeClr val="accent1"/>
+          </a:lnRef>
+          <a:fillRef idx="0">
+            <a:schemeClr val="accent1"/>
+          </a:fillRef>
+          <a:effectRef idx="0">
+            <a:schemeClr val="accent1"/>
+          </a:effectRef>
+          <a:fontRef idx="minor">
+            <a:schemeClr val="tx1"/>
+          </a:fontRef>
+        </p:style>
+      </p:cxnSp>
+      <p:cxnSp>
+        <p:nvCxnSpPr>
+          <p:cNvPr id="17" name="מחבר ישר 16">
+            <a:extLst>
+              <a:ext uri="{FF2B5EF4-FFF2-40B4-BE49-F238E27FC236}">
+                <a16:creationId xmlns:a16="http://schemas.microsoft.com/office/drawing/2014/main" id="{1079B52E-1461-48B2-9F6E-C88EBEBDC8D8}"/>
+              </a:ext>
+            </a:extLst>
+          </p:cNvPr>
+          <p:cNvCxnSpPr>
+            <a:cxnSpLocks/>
+          </p:cNvCxnSpPr>
+          <p:nvPr/>
+        </p:nvCxnSpPr>
+        <p:spPr>
+          <a:xfrm>
+            <a:off x="4105275" y="4557712"/>
+            <a:ext cx="0" cy="154966"/>
+          </a:xfrm>
+          <a:prstGeom prst="line">
+            <a:avLst/>
+          </a:prstGeom>
+        </p:spPr>
+        <p:style>
+          <a:lnRef idx="1">
+            <a:schemeClr val="accent1"/>
+          </a:lnRef>
+          <a:fillRef idx="0">
+            <a:schemeClr val="accent1"/>
+          </a:fillRef>
+          <a:effectRef idx="0">
+            <a:schemeClr val="accent1"/>
+          </a:effectRef>
+          <a:fontRef idx="minor">
+            <a:schemeClr val="tx1"/>
+          </a:fontRef>
+        </p:style>
+      </p:cxnSp>
+      <p:sp>
+        <p:nvSpPr>
+          <p:cNvPr id="21" name="תיבת טקסט 20">
+            <a:extLst>
+              <a:ext uri="{FF2B5EF4-FFF2-40B4-BE49-F238E27FC236}">
+                <a16:creationId xmlns:a16="http://schemas.microsoft.com/office/drawing/2014/main" id="{4EC281CE-1594-427B-9064-3DC2F005CB96}"/>
+              </a:ext>
+            </a:extLst>
+          </p:cNvPr>
+          <p:cNvSpPr txBox="1"/>
+          <p:nvPr/>
+        </p:nvSpPr>
+        <p:spPr>
+          <a:xfrm>
+            <a:off x="3584917" y="4158680"/>
+            <a:ext cx="787790" cy="369332"/>
+          </a:xfrm>
+          <a:prstGeom prst="rect">
+            <a:avLst/>
+          </a:prstGeom>
+          <a:noFill/>
+        </p:spPr>
+        <p:txBody>
+          <a:bodyPr wrap="square" rtlCol="1">
+            <a:spAutoFit/>
+          </a:bodyPr>
+          <a:lstStyle/>
+          <a:p>
+            <a:pPr algn="r"/>
+            <a:r>
+              <a:rPr lang="he-IL" dirty="0">
+                <a:solidFill>
+                  <a:srgbClr val="C00000"/>
+                </a:solidFill>
+              </a:rPr>
+              <a:t>הווה</a:t>
+            </a:r>
+          </a:p>
+        </p:txBody>
+      </p:sp>
+      <p:sp>
+        <p:nvSpPr>
+          <p:cNvPr id="22" name="תיבת טקסט 21">
+            <a:extLst>
+              <a:ext uri="{FF2B5EF4-FFF2-40B4-BE49-F238E27FC236}">
+                <a16:creationId xmlns:a16="http://schemas.microsoft.com/office/drawing/2014/main" id="{B260147D-5FCC-4F73-AAE8-C6EA39016CB7}"/>
+              </a:ext>
+            </a:extLst>
+          </p:cNvPr>
+          <p:cNvSpPr txBox="1"/>
+          <p:nvPr/>
+        </p:nvSpPr>
+        <p:spPr>
+          <a:xfrm>
+            <a:off x="1004669" y="4290462"/>
+            <a:ext cx="787790" cy="369332"/>
+          </a:xfrm>
+          <a:prstGeom prst="rect">
+            <a:avLst/>
+          </a:prstGeom>
+          <a:noFill/>
+        </p:spPr>
+        <p:txBody>
+          <a:bodyPr wrap="square" rtlCol="1">
+            <a:spAutoFit/>
+          </a:bodyPr>
+          <a:lstStyle/>
+          <a:p>
+            <a:pPr algn="r"/>
+            <a:r>
+              <a:rPr lang="he-IL" dirty="0">
+                <a:solidFill>
+                  <a:srgbClr val="C00000"/>
+                </a:solidFill>
+              </a:rPr>
+              <a:t>עתיד</a:t>
+            </a:r>
+          </a:p>
+        </p:txBody>
+      </p:sp>
+    </p:spTree>
+    <p:extLst>
+      <p:ext uri="{BB962C8B-B14F-4D97-AF65-F5344CB8AC3E}">
+        <p14:creationId xmlns:p14="http://schemas.microsoft.com/office/powerpoint/2010/main" val="1816347366"/>
+      </p:ext>
+    </p:extLst>
+  </p:cSld>
+  <p:clrMapOvr>
+    <a:masterClrMapping/>
+  </p:clrMapOvr>
+</p:sld>
+</file>
+
+<file path=ppt/slides/slide67.xml><?xml version="1.0" encoding="utf-8"?>
+<p:sld xmlns:a="http://schemas.openxmlformats.org/drawingml/2006/main" xmlns:r="http://schemas.openxmlformats.org/officeDocument/2006/relationships" xmlns:p="http://schemas.openxmlformats.org/presentationml/2006/main">
+  <p:cSld>
+    <p:spTree>
+      <p:nvGrpSpPr>
+        <p:cNvPr id="1" name=""/>
+        <p:cNvGrpSpPr/>
+        <p:nvPr/>
+      </p:nvGrpSpPr>
+      <p:grpSpPr>
+        <a:xfrm>
+          <a:off x="0" y="0"/>
+          <a:ext cx="0" cy="0"/>
+          <a:chOff x="0" y="0"/>
+          <a:chExt cx="0" cy="0"/>
+        </a:xfrm>
+      </p:grpSpPr>
+      <p:sp>
+        <p:nvSpPr>
+          <p:cNvPr id="2" name="Title 1">
+            <a:extLst>
+              <a:ext uri="{FF2B5EF4-FFF2-40B4-BE49-F238E27FC236}">
+                <a16:creationId xmlns:a16="http://schemas.microsoft.com/office/drawing/2014/main" id="{F2E75ACD-C303-46DD-8FB4-27FC6A409857}"/>
+              </a:ext>
+            </a:extLst>
+          </p:cNvPr>
+          <p:cNvSpPr>
+            <a:spLocks noGrp="1"/>
+          </p:cNvSpPr>
+          <p:nvPr>
+            <p:ph type="title"/>
+          </p:nvPr>
+        </p:nvSpPr>
+        <p:spPr/>
+        <p:txBody>
+          <a:bodyPr/>
+          <a:lstStyle/>
+          <a:p>
+            <a:pPr algn="ctr"/>
+            <a:r>
+              <a:rPr lang="he-IL" sz="4800" dirty="0"/>
+              <a:t>ארכיטקטורת מידע</a:t>
+            </a:r>
+            <a:endParaRPr lang="en-US" sz="4800" dirty="0"/>
+          </a:p>
+        </p:txBody>
+      </p:sp>
+      <p:sp>
+        <p:nvSpPr>
+          <p:cNvPr id="12" name="תיבת טקסט 11">
+            <a:extLst>
+              <a:ext uri="{FF2B5EF4-FFF2-40B4-BE49-F238E27FC236}">
+                <a16:creationId xmlns:a16="http://schemas.microsoft.com/office/drawing/2014/main" id="{77AF2D51-D00C-40F2-9B31-0894F6F09F0E}"/>
+              </a:ext>
+            </a:extLst>
+          </p:cNvPr>
+          <p:cNvSpPr txBox="1"/>
+          <p:nvPr/>
+        </p:nvSpPr>
+        <p:spPr>
+          <a:xfrm>
+            <a:off x="8361020" y="2257425"/>
+            <a:ext cx="3830980" cy="1200329"/>
+          </a:xfrm>
+          <a:prstGeom prst="rect">
+            <a:avLst/>
+          </a:prstGeom>
+          <a:noFill/>
+        </p:spPr>
+        <p:txBody>
+          <a:bodyPr wrap="square" rtlCol="1">
+            <a:spAutoFit/>
+          </a:bodyPr>
+          <a:lstStyle/>
+          <a:p>
+            <a:pPr marL="285750" indent="-285750" algn="r" rtl="1">
+              <a:buFont typeface="Arial" panose="020B0604020202020204" pitchFamily="34" charset="0"/>
+              <a:buChar char="•"/>
+            </a:pPr>
+            <a:r>
+              <a:rPr lang="he-IL" dirty="0"/>
+              <a:t>בנוסף חלק מהמערכת בנויה לפי נושאים, זאת כדי לאפשר למשתמש להתמצא בקלות בין כל הפגישות או המיקומים ומצבי הפגישות. </a:t>
+            </a:r>
+          </a:p>
+        </p:txBody>
+      </p:sp>
+      <p:cxnSp>
+        <p:nvCxnSpPr>
+          <p:cNvPr id="15" name="מחבר ישר 14">
+            <a:extLst>
+              <a:ext uri="{FF2B5EF4-FFF2-40B4-BE49-F238E27FC236}">
+                <a16:creationId xmlns:a16="http://schemas.microsoft.com/office/drawing/2014/main" id="{C679A093-27E5-4BE4-A986-E68C743F804F}"/>
+              </a:ext>
+            </a:extLst>
+          </p:cNvPr>
+          <p:cNvCxnSpPr/>
+          <p:nvPr/>
+        </p:nvCxnSpPr>
+        <p:spPr>
+          <a:xfrm>
+            <a:off x="4142232" y="4712678"/>
+            <a:ext cx="0" cy="0"/>
+          </a:xfrm>
+          <a:prstGeom prst="line">
+            <a:avLst/>
+          </a:prstGeom>
+        </p:spPr>
+        <p:style>
+          <a:lnRef idx="1">
+            <a:schemeClr val="accent1"/>
+          </a:lnRef>
+          <a:fillRef idx="0">
+            <a:schemeClr val="accent1"/>
+          </a:fillRef>
+          <a:effectRef idx="0">
+            <a:schemeClr val="accent1"/>
+          </a:effectRef>
+          <a:fontRef idx="minor">
+            <a:schemeClr val="tx1"/>
+          </a:fontRef>
+        </p:style>
+      </p:cxnSp>
+      <p:pic>
+        <p:nvPicPr>
+          <p:cNvPr id="11" name="תמונה 10">
+            <a:extLst>
+              <a:ext uri="{FF2B5EF4-FFF2-40B4-BE49-F238E27FC236}">
+                <a16:creationId xmlns:a16="http://schemas.microsoft.com/office/drawing/2014/main" id="{29878191-761A-4093-8102-7EE9E370FBC4}"/>
+              </a:ext>
+            </a:extLst>
+          </p:cNvPr>
+          <p:cNvPicPr>
+            <a:picLocks noChangeAspect="1"/>
+          </p:cNvPicPr>
+          <p:nvPr/>
+        </p:nvPicPr>
+        <p:blipFill>
+          <a:blip r:embed="rId2"/>
+          <a:stretch>
+            <a:fillRect/>
+          </a:stretch>
+        </p:blipFill>
+        <p:spPr>
+          <a:xfrm>
+            <a:off x="0" y="2328127"/>
+            <a:ext cx="8060788" cy="4529874"/>
+          </a:xfrm>
+          <a:prstGeom prst="rect">
+            <a:avLst/>
+          </a:prstGeom>
+        </p:spPr>
+      </p:pic>
+      <p:cxnSp>
+        <p:nvCxnSpPr>
+          <p:cNvPr id="6" name="מחבר ישר 5">
+            <a:extLst>
+              <a:ext uri="{FF2B5EF4-FFF2-40B4-BE49-F238E27FC236}">
+                <a16:creationId xmlns:a16="http://schemas.microsoft.com/office/drawing/2014/main" id="{C97B8B9E-511F-437D-A6A1-0CDA55A9C098}"/>
+              </a:ext>
+            </a:extLst>
+          </p:cNvPr>
+          <p:cNvCxnSpPr>
+            <a:endCxn id="11" idx="2"/>
+          </p:cNvCxnSpPr>
+          <p:nvPr/>
+        </p:nvCxnSpPr>
+        <p:spPr>
+          <a:xfrm>
+            <a:off x="4009292" y="2869809"/>
+            <a:ext cx="21102" cy="3988192"/>
+          </a:xfrm>
+          <a:prstGeom prst="line">
+            <a:avLst/>
+          </a:prstGeom>
+        </p:spPr>
+        <p:style>
+          <a:lnRef idx="1">
+            <a:schemeClr val="accent1"/>
+          </a:lnRef>
+          <a:fillRef idx="0">
+            <a:schemeClr val="accent1"/>
+          </a:fillRef>
+          <a:effectRef idx="0">
+            <a:schemeClr val="accent1"/>
+          </a:effectRef>
+          <a:fontRef idx="minor">
+            <a:schemeClr val="tx1"/>
+          </a:fontRef>
+        </p:style>
+      </p:cxnSp>
+      <p:cxnSp>
+        <p:nvCxnSpPr>
+          <p:cNvPr id="8" name="מחבר ישר 7">
+            <a:extLst>
+              <a:ext uri="{FF2B5EF4-FFF2-40B4-BE49-F238E27FC236}">
+                <a16:creationId xmlns:a16="http://schemas.microsoft.com/office/drawing/2014/main" id="{27BBCB68-329B-4B19-A8F6-B4E111045CC0}"/>
+              </a:ext>
+            </a:extLst>
+          </p:cNvPr>
+          <p:cNvCxnSpPr/>
+          <p:nvPr/>
+        </p:nvCxnSpPr>
+        <p:spPr>
+          <a:xfrm>
+            <a:off x="0" y="4895557"/>
+            <a:ext cx="8060788" cy="0"/>
+          </a:xfrm>
+          <a:prstGeom prst="line">
+            <a:avLst/>
+          </a:prstGeom>
+        </p:spPr>
+        <p:style>
+          <a:lnRef idx="1">
+            <a:schemeClr val="accent1"/>
+          </a:lnRef>
+          <a:fillRef idx="0">
+            <a:schemeClr val="accent1"/>
+          </a:fillRef>
+          <a:effectRef idx="0">
+            <a:schemeClr val="accent1"/>
+          </a:effectRef>
+          <a:fontRef idx="minor">
+            <a:schemeClr val="tx1"/>
+          </a:fontRef>
+        </p:style>
+      </p:cxnSp>
+    </p:spTree>
+    <p:extLst>
+      <p:ext uri="{BB962C8B-B14F-4D97-AF65-F5344CB8AC3E}">
+        <p14:creationId xmlns:p14="http://schemas.microsoft.com/office/powerpoint/2010/main" val="2281359754"/>
+      </p:ext>
+    </p:extLst>
+  </p:cSld>
+  <p:clrMapOvr>
+    <a:masterClrMapping/>
+  </p:clrMapOvr>
+</p:sld>
+</file>
+
+<file path=ppt/slides/slide68.xml><?xml version="1.0" encoding="utf-8"?>
+<p:sld xmlns:a="http://schemas.openxmlformats.org/drawingml/2006/main" xmlns:r="http://schemas.openxmlformats.org/officeDocument/2006/relationships" xmlns:p="http://schemas.openxmlformats.org/presentationml/2006/main">
+  <p:cSld>
+    <p:spTree>
+      <p:nvGrpSpPr>
+        <p:cNvPr id="1" name=""/>
+        <p:cNvGrpSpPr/>
+        <p:nvPr/>
+      </p:nvGrpSpPr>
+      <p:grpSpPr>
+        <a:xfrm>
+          <a:off x="0" y="0"/>
+          <a:ext cx="0" cy="0"/>
+          <a:chOff x="0" y="0"/>
+          <a:chExt cx="0" cy="0"/>
+        </a:xfrm>
+      </p:grpSpPr>
+      <p:sp>
+        <p:nvSpPr>
+          <p:cNvPr id="2" name="Title 1">
+            <a:extLst>
+              <a:ext uri="{FF2B5EF4-FFF2-40B4-BE49-F238E27FC236}">
+                <a16:creationId xmlns:a16="http://schemas.microsoft.com/office/drawing/2014/main" id="{F2E75ACD-C303-46DD-8FB4-27FC6A409857}"/>
+              </a:ext>
+            </a:extLst>
+          </p:cNvPr>
+          <p:cNvSpPr>
+            <a:spLocks noGrp="1"/>
+          </p:cNvSpPr>
+          <p:nvPr>
+            <p:ph type="title"/>
+          </p:nvPr>
+        </p:nvSpPr>
+        <p:spPr/>
+        <p:txBody>
+          <a:bodyPr/>
+          <a:lstStyle/>
+          <a:p>
+            <a:pPr algn="ctr"/>
+            <a:r>
+              <a:rPr lang="he-IL" sz="4800" dirty="0"/>
+              <a:t>מודל הניווט</a:t>
+            </a:r>
+            <a:endParaRPr lang="en-US" sz="4800" dirty="0"/>
+          </a:p>
+        </p:txBody>
+      </p:sp>
+      <p:sp>
+        <p:nvSpPr>
+          <p:cNvPr id="12" name="תיבת טקסט 11">
+            <a:extLst>
+              <a:ext uri="{FF2B5EF4-FFF2-40B4-BE49-F238E27FC236}">
+                <a16:creationId xmlns:a16="http://schemas.microsoft.com/office/drawing/2014/main" id="{77AF2D51-D00C-40F2-9B31-0894F6F09F0E}"/>
+              </a:ext>
+            </a:extLst>
+          </p:cNvPr>
+          <p:cNvSpPr txBox="1"/>
+          <p:nvPr/>
+        </p:nvSpPr>
+        <p:spPr>
+          <a:xfrm>
+            <a:off x="1561514" y="2257425"/>
+            <a:ext cx="10630486" cy="369332"/>
+          </a:xfrm>
+          <a:prstGeom prst="rect">
+            <a:avLst/>
+          </a:prstGeom>
+          <a:noFill/>
+        </p:spPr>
+        <p:txBody>
+          <a:bodyPr wrap="square" rtlCol="1">
+            <a:spAutoFit/>
+          </a:bodyPr>
+          <a:lstStyle/>
+          <a:p>
+            <a:pPr marL="285750" indent="-285750" algn="r" rtl="1">
+              <a:buFont typeface="Arial" panose="020B0604020202020204" pitchFamily="34" charset="0"/>
+              <a:buChar char="•"/>
+            </a:pPr>
+            <a:r>
+              <a:rPr lang="he-IL" dirty="0"/>
+              <a:t>מודל הניווט של המערכת הינה ניווט </a:t>
+            </a:r>
+            <a:r>
+              <a:rPr lang="he-IL" dirty="0" err="1"/>
+              <a:t>מטריציוני</a:t>
+            </a:r>
+            <a:r>
+              <a:rPr lang="he-IL" dirty="0"/>
+              <a:t>, זאת על מנת לאפשר למשתמש גישה נוחה לכל המסכים מכל מקום.</a:t>
+            </a:r>
+          </a:p>
+        </p:txBody>
+      </p:sp>
+      <p:cxnSp>
+        <p:nvCxnSpPr>
+          <p:cNvPr id="15" name="מחבר ישר 14">
+            <a:extLst>
+              <a:ext uri="{FF2B5EF4-FFF2-40B4-BE49-F238E27FC236}">
+                <a16:creationId xmlns:a16="http://schemas.microsoft.com/office/drawing/2014/main" id="{C679A093-27E5-4BE4-A986-E68C743F804F}"/>
+              </a:ext>
+            </a:extLst>
+          </p:cNvPr>
+          <p:cNvCxnSpPr/>
+          <p:nvPr/>
+        </p:nvCxnSpPr>
+        <p:spPr>
+          <a:xfrm>
+            <a:off x="4142232" y="4712678"/>
+            <a:ext cx="0" cy="0"/>
+          </a:xfrm>
+          <a:prstGeom prst="line">
+            <a:avLst/>
+          </a:prstGeom>
+        </p:spPr>
+        <p:style>
+          <a:lnRef idx="1">
+            <a:schemeClr val="accent1"/>
+          </a:lnRef>
+          <a:fillRef idx="0">
+            <a:schemeClr val="accent1"/>
+          </a:fillRef>
+          <a:effectRef idx="0">
+            <a:schemeClr val="accent1"/>
+          </a:effectRef>
+          <a:fontRef idx="minor">
+            <a:schemeClr val="tx1"/>
+          </a:fontRef>
+        </p:style>
+      </p:cxnSp>
+      <p:sp>
+        <p:nvSpPr>
+          <p:cNvPr id="5" name="מלבן 4">
+            <a:extLst>
+              <a:ext uri="{FF2B5EF4-FFF2-40B4-BE49-F238E27FC236}">
+                <a16:creationId xmlns:a16="http://schemas.microsoft.com/office/drawing/2014/main" id="{4C73EFEC-90BB-40F0-A252-B466176492A4}"/>
+              </a:ext>
+            </a:extLst>
+          </p:cNvPr>
+          <p:cNvSpPr/>
+          <p:nvPr/>
+        </p:nvSpPr>
+        <p:spPr>
+          <a:xfrm>
+            <a:off x="1152144" y="3692769"/>
+            <a:ext cx="1069144" cy="829994"/>
+          </a:xfrm>
+          <a:prstGeom prst="rect">
+            <a:avLst/>
+          </a:prstGeom>
+          <a:solidFill>
+            <a:srgbClr val="B4D0E7"/>
+          </a:solidFill>
+          <a:ln>
+            <a:solidFill>
+              <a:srgbClr val="B4D0E7"/>
+            </a:solidFill>
+          </a:ln>
+        </p:spPr>
+        <p:style>
+          <a:lnRef idx="2">
+            <a:schemeClr val="accent1">
+              <a:shade val="50000"/>
+            </a:schemeClr>
+          </a:lnRef>
+          <a:fillRef idx="1">
+            <a:schemeClr val="accent1"/>
+          </a:fillRef>
+          <a:effectRef idx="0">
+            <a:schemeClr val="accent1"/>
+          </a:effectRef>
+          <a:fontRef idx="minor">
+            <a:schemeClr val="lt1"/>
+          </a:fontRef>
+        </p:style>
+        <p:txBody>
+          <a:bodyPr rtlCol="1" anchor="ctr"/>
+          <a:lstStyle/>
+          <a:p>
+            <a:pPr algn="ctr"/>
+            <a:r>
+              <a:rPr lang="he-IL" dirty="0"/>
+              <a:t>התחברות\הרשמה</a:t>
+            </a:r>
+          </a:p>
+        </p:txBody>
+      </p:sp>
+      <p:sp>
+        <p:nvSpPr>
+          <p:cNvPr id="14" name="מלבן 13">
+            <a:extLst>
+              <a:ext uri="{FF2B5EF4-FFF2-40B4-BE49-F238E27FC236}">
+                <a16:creationId xmlns:a16="http://schemas.microsoft.com/office/drawing/2014/main" id="{68D58D64-E668-452C-9ED8-016BEFFCCF82}"/>
+              </a:ext>
+            </a:extLst>
+          </p:cNvPr>
+          <p:cNvSpPr/>
+          <p:nvPr/>
+        </p:nvSpPr>
+        <p:spPr>
+          <a:xfrm>
+            <a:off x="3479878" y="3692769"/>
+            <a:ext cx="1069144" cy="829994"/>
+          </a:xfrm>
+          <a:prstGeom prst="rect">
+            <a:avLst/>
+          </a:prstGeom>
+          <a:solidFill>
+            <a:srgbClr val="B4D0E7"/>
+          </a:solidFill>
+          <a:ln>
+            <a:solidFill>
+              <a:srgbClr val="B4D0E7"/>
+            </a:solidFill>
+          </a:ln>
+        </p:spPr>
+        <p:style>
+          <a:lnRef idx="2">
+            <a:schemeClr val="accent1">
+              <a:shade val="50000"/>
+            </a:schemeClr>
+          </a:lnRef>
+          <a:fillRef idx="1">
+            <a:schemeClr val="accent1"/>
+          </a:fillRef>
+          <a:effectRef idx="0">
+            <a:schemeClr val="accent1"/>
+          </a:effectRef>
+          <a:fontRef idx="minor">
+            <a:schemeClr val="lt1"/>
+          </a:fontRef>
+        </p:style>
+        <p:txBody>
+          <a:bodyPr rtlCol="1" anchor="ctr"/>
+          <a:lstStyle/>
+          <a:p>
+            <a:pPr algn="ctr"/>
+            <a:r>
+              <a:rPr lang="he-IL" dirty="0"/>
+              <a:t>לוח שנה</a:t>
+            </a:r>
+          </a:p>
+        </p:txBody>
+      </p:sp>
+      <p:sp>
+        <p:nvSpPr>
+          <p:cNvPr id="16" name="מלבן 15">
+            <a:extLst>
+              <a:ext uri="{FF2B5EF4-FFF2-40B4-BE49-F238E27FC236}">
+                <a16:creationId xmlns:a16="http://schemas.microsoft.com/office/drawing/2014/main" id="{FE00933F-4AAF-4B27-A1EA-5441F5FD5DF2}"/>
+              </a:ext>
+            </a:extLst>
+          </p:cNvPr>
+          <p:cNvSpPr/>
+          <p:nvPr/>
+        </p:nvSpPr>
+        <p:spPr>
+          <a:xfrm>
+            <a:off x="3479878" y="5293288"/>
+            <a:ext cx="1069144" cy="829994"/>
+          </a:xfrm>
+          <a:prstGeom prst="rect">
+            <a:avLst/>
+          </a:prstGeom>
+          <a:solidFill>
+            <a:srgbClr val="B4D0E7"/>
+          </a:solidFill>
+          <a:ln>
+            <a:solidFill>
+              <a:srgbClr val="B4D0E7"/>
+            </a:solidFill>
+          </a:ln>
+        </p:spPr>
+        <p:style>
+          <a:lnRef idx="2">
+            <a:schemeClr val="accent1">
+              <a:shade val="50000"/>
+            </a:schemeClr>
+          </a:lnRef>
+          <a:fillRef idx="1">
+            <a:schemeClr val="accent1"/>
+          </a:fillRef>
+          <a:effectRef idx="0">
+            <a:schemeClr val="accent1"/>
+          </a:effectRef>
+          <a:fontRef idx="minor">
+            <a:schemeClr val="lt1"/>
+          </a:fontRef>
+        </p:style>
+        <p:txBody>
+          <a:bodyPr rtlCol="1" anchor="ctr"/>
+          <a:lstStyle/>
+          <a:p>
+            <a:pPr algn="ctr"/>
+            <a:r>
+              <a:rPr lang="he-IL" dirty="0"/>
+              <a:t>אזור אישי</a:t>
+            </a:r>
+          </a:p>
+        </p:txBody>
+      </p:sp>
+      <p:cxnSp>
+        <p:nvCxnSpPr>
+          <p:cNvPr id="17" name="מחבר חץ ישר 16">
+            <a:extLst>
+              <a:ext uri="{FF2B5EF4-FFF2-40B4-BE49-F238E27FC236}">
+                <a16:creationId xmlns:a16="http://schemas.microsoft.com/office/drawing/2014/main" id="{2CA02720-FE38-4745-BF27-DB559CBE6472}"/>
+              </a:ext>
+            </a:extLst>
+          </p:cNvPr>
+          <p:cNvCxnSpPr>
+            <a:stCxn id="5" idx="3"/>
+            <a:endCxn id="14" idx="1"/>
+          </p:cNvCxnSpPr>
+          <p:nvPr/>
+        </p:nvCxnSpPr>
+        <p:spPr>
+          <a:xfrm>
+            <a:off x="2221288" y="4107766"/>
+            <a:ext cx="1258590" cy="0"/>
+          </a:xfrm>
+          <a:prstGeom prst="straightConnector1">
+            <a:avLst/>
+          </a:prstGeom>
+          <a:ln>
+            <a:solidFill>
+              <a:schemeClr val="tx1"/>
+            </a:solidFill>
+            <a:tailEnd type="triangle"/>
+          </a:ln>
+        </p:spPr>
+        <p:style>
+          <a:lnRef idx="1">
+            <a:schemeClr val="accent1"/>
+          </a:lnRef>
+          <a:fillRef idx="0">
+            <a:schemeClr val="accent1"/>
+          </a:fillRef>
+          <a:effectRef idx="0">
+            <a:schemeClr val="accent1"/>
+          </a:effectRef>
+          <a:fontRef idx="minor">
+            <a:schemeClr val="tx1"/>
+          </a:fontRef>
+        </p:style>
+      </p:cxnSp>
+      <p:cxnSp>
+        <p:nvCxnSpPr>
+          <p:cNvPr id="19" name="מחבר חץ ישר 18">
+            <a:extLst>
+              <a:ext uri="{FF2B5EF4-FFF2-40B4-BE49-F238E27FC236}">
+                <a16:creationId xmlns:a16="http://schemas.microsoft.com/office/drawing/2014/main" id="{A28AAAA7-474F-455E-9FFE-2E92353FF025}"/>
+              </a:ext>
+            </a:extLst>
+          </p:cNvPr>
+          <p:cNvCxnSpPr>
+            <a:stCxn id="14" idx="2"/>
+            <a:endCxn id="16" idx="0"/>
+          </p:cNvCxnSpPr>
+          <p:nvPr/>
+        </p:nvCxnSpPr>
+        <p:spPr>
+          <a:xfrm>
+            <a:off x="4014450" y="4522763"/>
+            <a:ext cx="0" cy="770525"/>
+          </a:xfrm>
+          <a:prstGeom prst="straightConnector1">
+            <a:avLst/>
+          </a:prstGeom>
+          <a:ln>
+            <a:solidFill>
+              <a:schemeClr val="tx1"/>
+            </a:solidFill>
+            <a:headEnd type="triangle"/>
+            <a:tailEnd type="triangle"/>
+          </a:ln>
+        </p:spPr>
+        <p:style>
+          <a:lnRef idx="1">
+            <a:schemeClr val="accent1"/>
+          </a:lnRef>
+          <a:fillRef idx="0">
+            <a:schemeClr val="accent1"/>
+          </a:fillRef>
+          <a:effectRef idx="0">
+            <a:schemeClr val="accent1"/>
+          </a:effectRef>
+          <a:fontRef idx="minor">
+            <a:schemeClr val="tx1"/>
+          </a:fontRef>
+        </p:style>
+      </p:cxnSp>
+      <p:sp>
+        <p:nvSpPr>
+          <p:cNvPr id="21" name="מלבן 20">
+            <a:extLst>
+              <a:ext uri="{FF2B5EF4-FFF2-40B4-BE49-F238E27FC236}">
+                <a16:creationId xmlns:a16="http://schemas.microsoft.com/office/drawing/2014/main" id="{5EC87226-741E-4C41-832B-50FC792F64A6}"/>
+              </a:ext>
+            </a:extLst>
+          </p:cNvPr>
+          <p:cNvSpPr/>
+          <p:nvPr/>
+        </p:nvSpPr>
+        <p:spPr>
+          <a:xfrm>
+            <a:off x="6989299" y="3037769"/>
+            <a:ext cx="1069144" cy="829994"/>
+          </a:xfrm>
+          <a:prstGeom prst="rect">
+            <a:avLst/>
+          </a:prstGeom>
+          <a:solidFill>
+            <a:srgbClr val="B4D0E7"/>
+          </a:solidFill>
+          <a:ln>
+            <a:solidFill>
+              <a:srgbClr val="B4D0E7"/>
+            </a:solidFill>
+          </a:ln>
+        </p:spPr>
+        <p:style>
+          <a:lnRef idx="2">
+            <a:schemeClr val="accent1">
+              <a:shade val="50000"/>
+            </a:schemeClr>
+          </a:lnRef>
+          <a:fillRef idx="1">
+            <a:schemeClr val="accent1"/>
+          </a:fillRef>
+          <a:effectRef idx="0">
+            <a:schemeClr val="accent1"/>
+          </a:effectRef>
+          <a:fontRef idx="minor">
+            <a:schemeClr val="lt1"/>
+          </a:fontRef>
+        </p:style>
+        <p:txBody>
+          <a:bodyPr rtlCol="1" anchor="ctr"/>
+          <a:lstStyle/>
+          <a:p>
+            <a:pPr algn="ctr"/>
+            <a:r>
+              <a:rPr lang="he-IL" dirty="0"/>
+              <a:t>יצירת פגישה</a:t>
+            </a:r>
+          </a:p>
+        </p:txBody>
+      </p:sp>
+      <p:sp>
+        <p:nvSpPr>
+          <p:cNvPr id="22" name="מלבן 21">
+            <a:extLst>
+              <a:ext uri="{FF2B5EF4-FFF2-40B4-BE49-F238E27FC236}">
+                <a16:creationId xmlns:a16="http://schemas.microsoft.com/office/drawing/2014/main" id="{8FE29AE8-B766-4490-AC03-308875E417BD}"/>
+              </a:ext>
+            </a:extLst>
+          </p:cNvPr>
+          <p:cNvSpPr/>
+          <p:nvPr/>
+        </p:nvSpPr>
+        <p:spPr>
+          <a:xfrm>
+            <a:off x="6989299" y="4231244"/>
+            <a:ext cx="1069144" cy="829994"/>
+          </a:xfrm>
+          <a:prstGeom prst="rect">
+            <a:avLst/>
+          </a:prstGeom>
+          <a:solidFill>
+            <a:srgbClr val="B4D0E7"/>
+          </a:solidFill>
+          <a:ln>
+            <a:solidFill>
+              <a:srgbClr val="B4D0E7"/>
+            </a:solidFill>
+          </a:ln>
+        </p:spPr>
+        <p:style>
+          <a:lnRef idx="2">
+            <a:schemeClr val="accent1">
+              <a:shade val="50000"/>
+            </a:schemeClr>
+          </a:lnRef>
+          <a:fillRef idx="1">
+            <a:schemeClr val="accent1"/>
+          </a:fillRef>
+          <a:effectRef idx="0">
+            <a:schemeClr val="accent1"/>
+          </a:effectRef>
+          <a:fontRef idx="minor">
+            <a:schemeClr val="lt1"/>
+          </a:fontRef>
+        </p:style>
+        <p:txBody>
+          <a:bodyPr rtlCol="1" anchor="ctr"/>
+          <a:lstStyle/>
+          <a:p>
+            <a:pPr algn="ctr"/>
+            <a:r>
+              <a:rPr lang="he-IL" dirty="0"/>
+              <a:t>יצירת אילוץ</a:t>
+            </a:r>
+          </a:p>
+        </p:txBody>
+      </p:sp>
+      <p:sp>
+        <p:nvSpPr>
+          <p:cNvPr id="23" name="מלבן 22">
+            <a:extLst>
+              <a:ext uri="{FF2B5EF4-FFF2-40B4-BE49-F238E27FC236}">
+                <a16:creationId xmlns:a16="http://schemas.microsoft.com/office/drawing/2014/main" id="{91E5B70A-D921-4664-80F0-C84C5ADA2917}"/>
+              </a:ext>
+            </a:extLst>
+          </p:cNvPr>
+          <p:cNvSpPr/>
+          <p:nvPr/>
+        </p:nvSpPr>
+        <p:spPr>
+          <a:xfrm>
+            <a:off x="6989299" y="5521270"/>
+            <a:ext cx="1069144" cy="829994"/>
+          </a:xfrm>
+          <a:prstGeom prst="rect">
+            <a:avLst/>
+          </a:prstGeom>
+          <a:solidFill>
+            <a:srgbClr val="B4D0E7"/>
+          </a:solidFill>
+          <a:ln>
+            <a:solidFill>
+              <a:srgbClr val="B4D0E7"/>
+            </a:solidFill>
+          </a:ln>
+        </p:spPr>
+        <p:style>
+          <a:lnRef idx="2">
+            <a:schemeClr val="accent1">
+              <a:shade val="50000"/>
+            </a:schemeClr>
+          </a:lnRef>
+          <a:fillRef idx="1">
+            <a:schemeClr val="accent1"/>
+          </a:fillRef>
+          <a:effectRef idx="0">
+            <a:schemeClr val="accent1"/>
+          </a:effectRef>
+          <a:fontRef idx="minor">
+            <a:schemeClr val="lt1"/>
+          </a:fontRef>
+        </p:style>
+        <p:txBody>
+          <a:bodyPr rtlCol="1" anchor="ctr"/>
+          <a:lstStyle/>
+          <a:p>
+            <a:pPr algn="ctr"/>
+            <a:r>
+              <a:rPr lang="he-IL" dirty="0"/>
+              <a:t>יצירת מקום</a:t>
+            </a:r>
+          </a:p>
+        </p:txBody>
+      </p:sp>
+      <p:cxnSp>
+        <p:nvCxnSpPr>
+          <p:cNvPr id="25" name="מחבר חץ ישר 24">
+            <a:extLst>
+              <a:ext uri="{FF2B5EF4-FFF2-40B4-BE49-F238E27FC236}">
+                <a16:creationId xmlns:a16="http://schemas.microsoft.com/office/drawing/2014/main" id="{FF17E7FF-B123-4821-954B-3F8431F71456}"/>
+              </a:ext>
+            </a:extLst>
+          </p:cNvPr>
+          <p:cNvCxnSpPr>
+            <a:stCxn id="14" idx="3"/>
+            <a:endCxn id="21" idx="1"/>
+          </p:cNvCxnSpPr>
+          <p:nvPr/>
+        </p:nvCxnSpPr>
+        <p:spPr>
+          <a:xfrm flipV="1">
+            <a:off x="4549022" y="3452766"/>
+            <a:ext cx="2440277" cy="655000"/>
+          </a:xfrm>
+          <a:prstGeom prst="straightConnector1">
+            <a:avLst/>
+          </a:prstGeom>
+          <a:ln>
+            <a:solidFill>
+              <a:schemeClr val="tx1"/>
+            </a:solidFill>
+            <a:tailEnd type="triangle"/>
+          </a:ln>
+        </p:spPr>
+        <p:style>
+          <a:lnRef idx="1">
+            <a:schemeClr val="accent1"/>
+          </a:lnRef>
+          <a:fillRef idx="0">
+            <a:schemeClr val="accent1"/>
+          </a:fillRef>
+          <a:effectRef idx="0">
+            <a:schemeClr val="accent1"/>
+          </a:effectRef>
+          <a:fontRef idx="minor">
+            <a:schemeClr val="tx1"/>
+          </a:fontRef>
+        </p:style>
+      </p:cxnSp>
+      <p:cxnSp>
+        <p:nvCxnSpPr>
+          <p:cNvPr id="26" name="מחבר חץ ישר 25">
+            <a:extLst>
+              <a:ext uri="{FF2B5EF4-FFF2-40B4-BE49-F238E27FC236}">
+                <a16:creationId xmlns:a16="http://schemas.microsoft.com/office/drawing/2014/main" id="{A62B8856-7061-41B1-A07E-9F1BC4122F50}"/>
+              </a:ext>
+            </a:extLst>
+          </p:cNvPr>
+          <p:cNvCxnSpPr>
+            <a:cxnSpLocks/>
+            <a:stCxn id="14" idx="3"/>
+            <a:endCxn id="22" idx="1"/>
+          </p:cNvCxnSpPr>
+          <p:nvPr/>
+        </p:nvCxnSpPr>
+        <p:spPr>
+          <a:xfrm>
+            <a:off x="4549022" y="4107766"/>
+            <a:ext cx="2440277" cy="538475"/>
+          </a:xfrm>
+          <a:prstGeom prst="straightConnector1">
+            <a:avLst/>
+          </a:prstGeom>
+          <a:ln>
+            <a:solidFill>
+              <a:schemeClr val="tx1"/>
+            </a:solidFill>
+            <a:tailEnd type="triangle"/>
+          </a:ln>
+        </p:spPr>
+        <p:style>
+          <a:lnRef idx="1">
+            <a:schemeClr val="accent1"/>
+          </a:lnRef>
+          <a:fillRef idx="0">
+            <a:schemeClr val="accent1"/>
+          </a:fillRef>
+          <a:effectRef idx="0">
+            <a:schemeClr val="accent1"/>
+          </a:effectRef>
+          <a:fontRef idx="minor">
+            <a:schemeClr val="tx1"/>
+          </a:fontRef>
+        </p:style>
+      </p:cxnSp>
+      <p:cxnSp>
+        <p:nvCxnSpPr>
+          <p:cNvPr id="29" name="מחבר חץ ישר 28">
+            <a:extLst>
+              <a:ext uri="{FF2B5EF4-FFF2-40B4-BE49-F238E27FC236}">
+                <a16:creationId xmlns:a16="http://schemas.microsoft.com/office/drawing/2014/main" id="{A9F2B92A-E577-49E2-9F1B-D28695092BC8}"/>
+              </a:ext>
+            </a:extLst>
+          </p:cNvPr>
+          <p:cNvCxnSpPr>
+            <a:cxnSpLocks/>
+            <a:stCxn id="14" idx="3"/>
+            <a:endCxn id="23" idx="1"/>
+          </p:cNvCxnSpPr>
+          <p:nvPr/>
+        </p:nvCxnSpPr>
+        <p:spPr>
+          <a:xfrm>
+            <a:off x="4549022" y="4107766"/>
+            <a:ext cx="2440277" cy="1828501"/>
+          </a:xfrm>
+          <a:prstGeom prst="straightConnector1">
+            <a:avLst/>
+          </a:prstGeom>
+          <a:ln>
+            <a:solidFill>
+              <a:schemeClr val="tx1"/>
+            </a:solidFill>
+            <a:tailEnd type="triangle"/>
+          </a:ln>
+        </p:spPr>
+        <p:style>
+          <a:lnRef idx="1">
+            <a:schemeClr val="accent1"/>
+          </a:lnRef>
+          <a:fillRef idx="0">
+            <a:schemeClr val="accent1"/>
+          </a:fillRef>
+          <a:effectRef idx="0">
+            <a:schemeClr val="accent1"/>
+          </a:effectRef>
+          <a:fontRef idx="minor">
+            <a:schemeClr val="tx1"/>
+          </a:fontRef>
+        </p:style>
+      </p:cxnSp>
+      <p:cxnSp>
+        <p:nvCxnSpPr>
+          <p:cNvPr id="32" name="מחבר חץ ישר 31">
+            <a:extLst>
+              <a:ext uri="{FF2B5EF4-FFF2-40B4-BE49-F238E27FC236}">
+                <a16:creationId xmlns:a16="http://schemas.microsoft.com/office/drawing/2014/main" id="{21C1BA36-1D0E-4469-AB1C-5BF33725CA56}"/>
+              </a:ext>
+            </a:extLst>
+          </p:cNvPr>
+          <p:cNvCxnSpPr>
+            <a:cxnSpLocks/>
+            <a:stCxn id="16" idx="3"/>
+            <a:endCxn id="21" idx="1"/>
+          </p:cNvCxnSpPr>
+          <p:nvPr/>
+        </p:nvCxnSpPr>
+        <p:spPr>
+          <a:xfrm flipV="1">
+            <a:off x="4549022" y="3452766"/>
+            <a:ext cx="2440277" cy="2255519"/>
+          </a:xfrm>
+          <a:prstGeom prst="straightConnector1">
+            <a:avLst/>
+          </a:prstGeom>
+          <a:ln>
+            <a:solidFill>
+              <a:schemeClr val="tx1"/>
+            </a:solidFill>
+            <a:tailEnd type="triangle"/>
+          </a:ln>
+        </p:spPr>
+        <p:style>
+          <a:lnRef idx="1">
+            <a:schemeClr val="accent1"/>
+          </a:lnRef>
+          <a:fillRef idx="0">
+            <a:schemeClr val="accent1"/>
+          </a:fillRef>
+          <a:effectRef idx="0">
+            <a:schemeClr val="accent1"/>
+          </a:effectRef>
+          <a:fontRef idx="minor">
+            <a:schemeClr val="tx1"/>
+          </a:fontRef>
+        </p:style>
+      </p:cxnSp>
+      <p:cxnSp>
+        <p:nvCxnSpPr>
+          <p:cNvPr id="35" name="מחבר חץ ישר 34">
+            <a:extLst>
+              <a:ext uri="{FF2B5EF4-FFF2-40B4-BE49-F238E27FC236}">
+                <a16:creationId xmlns:a16="http://schemas.microsoft.com/office/drawing/2014/main" id="{F8DE0F0A-007D-475F-952B-773D0A440844}"/>
+              </a:ext>
+            </a:extLst>
+          </p:cNvPr>
+          <p:cNvCxnSpPr>
+            <a:cxnSpLocks/>
+            <a:stCxn id="16" idx="3"/>
+            <a:endCxn id="22" idx="1"/>
+          </p:cNvCxnSpPr>
+          <p:nvPr/>
+        </p:nvCxnSpPr>
+        <p:spPr>
+          <a:xfrm flipV="1">
+            <a:off x="4549022" y="4646241"/>
+            <a:ext cx="2440277" cy="1062044"/>
+          </a:xfrm>
+          <a:prstGeom prst="straightConnector1">
+            <a:avLst/>
+          </a:prstGeom>
+          <a:ln>
+            <a:solidFill>
+              <a:schemeClr val="tx1"/>
+            </a:solidFill>
+            <a:tailEnd type="triangle"/>
+          </a:ln>
+        </p:spPr>
+        <p:style>
+          <a:lnRef idx="1">
+            <a:schemeClr val="accent1"/>
+          </a:lnRef>
+          <a:fillRef idx="0">
+            <a:schemeClr val="accent1"/>
+          </a:fillRef>
+          <a:effectRef idx="0">
+            <a:schemeClr val="accent1"/>
+          </a:effectRef>
+          <a:fontRef idx="minor">
+            <a:schemeClr val="tx1"/>
+          </a:fontRef>
+        </p:style>
+      </p:cxnSp>
+      <p:cxnSp>
+        <p:nvCxnSpPr>
+          <p:cNvPr id="38" name="מחבר חץ ישר 37">
+            <a:extLst>
+              <a:ext uri="{FF2B5EF4-FFF2-40B4-BE49-F238E27FC236}">
+                <a16:creationId xmlns:a16="http://schemas.microsoft.com/office/drawing/2014/main" id="{07A16A20-BDAD-46A3-9CA5-CF870C045834}"/>
+              </a:ext>
+            </a:extLst>
+          </p:cNvPr>
+          <p:cNvCxnSpPr>
+            <a:cxnSpLocks/>
+            <a:stCxn id="16" idx="3"/>
+            <a:endCxn id="23" idx="1"/>
+          </p:cNvCxnSpPr>
+          <p:nvPr/>
+        </p:nvCxnSpPr>
+        <p:spPr>
+          <a:xfrm>
+            <a:off x="4549022" y="5708285"/>
+            <a:ext cx="2440277" cy="227982"/>
+          </a:xfrm>
+          <a:prstGeom prst="straightConnector1">
+            <a:avLst/>
+          </a:prstGeom>
+          <a:ln>
+            <a:solidFill>
+              <a:schemeClr val="tx1"/>
+            </a:solidFill>
+            <a:tailEnd type="triangle"/>
+          </a:ln>
+        </p:spPr>
+        <p:style>
+          <a:lnRef idx="1">
+            <a:schemeClr val="accent1"/>
+          </a:lnRef>
+          <a:fillRef idx="0">
+            <a:schemeClr val="accent1"/>
+          </a:fillRef>
+          <a:effectRef idx="0">
+            <a:schemeClr val="accent1"/>
+          </a:effectRef>
+          <a:fontRef idx="minor">
+            <a:schemeClr val="tx1"/>
+          </a:fontRef>
+        </p:style>
+      </p:cxnSp>
+    </p:spTree>
+    <p:extLst>
+      <p:ext uri="{BB962C8B-B14F-4D97-AF65-F5344CB8AC3E}">
+        <p14:creationId xmlns:p14="http://schemas.microsoft.com/office/powerpoint/2010/main" val="2063610563"/>
       </p:ext>
     </p:extLst>
   </p:cSld>

</xml_diff>

<commit_message>
add after of add meeting and add restiction
</commit_message>
<xml_diff>
--- a/ux_course/מצגת סופית להגשה.pptx
+++ b/ux_course/מצגת סופית להגשה.pptx
@@ -5,7 +5,7 @@
     <p:sldMasterId id="2147483828" r:id="rId1"/>
   </p:sldMasterIdLst>
   <p:notesMasterIdLst>
-    <p:notesMasterId r:id="rId70"/>
+    <p:notesMasterId r:id="rId73"/>
   </p:notesMasterIdLst>
   <p:sldIdLst>
     <p:sldId id="262" r:id="rId2"/>
@@ -45,37 +45,40 @@
     <p:sldId id="321" r:id="rId36"/>
     <p:sldId id="322" r:id="rId37"/>
     <p:sldId id="319" r:id="rId38"/>
-    <p:sldId id="282" r:id="rId39"/>
-    <p:sldId id="283" r:id="rId40"/>
-    <p:sldId id="284" r:id="rId41"/>
-    <p:sldId id="285" r:id="rId42"/>
-    <p:sldId id="286" r:id="rId43"/>
-    <p:sldId id="287" r:id="rId44"/>
-    <p:sldId id="288" r:id="rId45"/>
-    <p:sldId id="289" r:id="rId46"/>
-    <p:sldId id="297" r:id="rId47"/>
-    <p:sldId id="299" r:id="rId48"/>
-    <p:sldId id="310" r:id="rId49"/>
-    <p:sldId id="300" r:id="rId50"/>
-    <p:sldId id="301" r:id="rId51"/>
-    <p:sldId id="302" r:id="rId52"/>
-    <p:sldId id="303" r:id="rId53"/>
-    <p:sldId id="305" r:id="rId54"/>
-    <p:sldId id="304" r:id="rId55"/>
-    <p:sldId id="306" r:id="rId56"/>
-    <p:sldId id="296" r:id="rId57"/>
-    <p:sldId id="295" r:id="rId58"/>
-    <p:sldId id="311" r:id="rId59"/>
-    <p:sldId id="313" r:id="rId60"/>
-    <p:sldId id="314" r:id="rId61"/>
-    <p:sldId id="315" r:id="rId62"/>
-    <p:sldId id="323" r:id="rId63"/>
-    <p:sldId id="324" r:id="rId64"/>
-    <p:sldId id="316" r:id="rId65"/>
-    <p:sldId id="325" r:id="rId66"/>
-    <p:sldId id="326" r:id="rId67"/>
-    <p:sldId id="327" r:id="rId68"/>
-    <p:sldId id="328" r:id="rId69"/>
+    <p:sldId id="329" r:id="rId39"/>
+    <p:sldId id="331" r:id="rId40"/>
+    <p:sldId id="330" r:id="rId41"/>
+    <p:sldId id="282" r:id="rId42"/>
+    <p:sldId id="283" r:id="rId43"/>
+    <p:sldId id="284" r:id="rId44"/>
+    <p:sldId id="285" r:id="rId45"/>
+    <p:sldId id="286" r:id="rId46"/>
+    <p:sldId id="287" r:id="rId47"/>
+    <p:sldId id="288" r:id="rId48"/>
+    <p:sldId id="289" r:id="rId49"/>
+    <p:sldId id="297" r:id="rId50"/>
+    <p:sldId id="299" r:id="rId51"/>
+    <p:sldId id="310" r:id="rId52"/>
+    <p:sldId id="300" r:id="rId53"/>
+    <p:sldId id="301" r:id="rId54"/>
+    <p:sldId id="302" r:id="rId55"/>
+    <p:sldId id="303" r:id="rId56"/>
+    <p:sldId id="305" r:id="rId57"/>
+    <p:sldId id="304" r:id="rId58"/>
+    <p:sldId id="306" r:id="rId59"/>
+    <p:sldId id="296" r:id="rId60"/>
+    <p:sldId id="295" r:id="rId61"/>
+    <p:sldId id="311" r:id="rId62"/>
+    <p:sldId id="313" r:id="rId63"/>
+    <p:sldId id="314" r:id="rId64"/>
+    <p:sldId id="315" r:id="rId65"/>
+    <p:sldId id="323" r:id="rId66"/>
+    <p:sldId id="324" r:id="rId67"/>
+    <p:sldId id="316" r:id="rId68"/>
+    <p:sldId id="325" r:id="rId69"/>
+    <p:sldId id="326" r:id="rId70"/>
+    <p:sldId id="327" r:id="rId71"/>
+    <p:sldId id="328" r:id="rId72"/>
   </p:sldIdLst>
   <p:sldSz cx="12192000" cy="6858000"/>
   <p:notesSz cx="6858000" cy="9144000"/>
@@ -264,7 +267,7 @@
           <a:p>
             <a:fld id="{EECBF3D3-3F3C-4185-B7B9-1B22B8E19755}" type="datetimeFigureOut">
               <a:rPr lang="en-US" smtClean="0"/>
-              <a:t>8/28/2019</a:t>
+              <a:t>8/29/2019</a:t>
             </a:fld>
             <a:endParaRPr lang="en-US"/>
           </a:p>
@@ -680,7 +683,7 @@
           <a:p>
             <a:fld id="{6E084796-162D-476E-82D2-4B26235D4C2C}" type="slidenum">
               <a:rPr lang="en-US" smtClean="0"/>
-              <a:t>52</a:t>
+              <a:t>55</a:t>
             </a:fld>
             <a:endParaRPr lang="en-US"/>
           </a:p>
@@ -1207,7 +1210,7 @@
           <a:p>
             <a:fld id="{C4112ACB-F900-457F-BFCF-7AFE3E0F446C}" type="datetimeFigureOut">
               <a:rPr lang="en-US" smtClean="0"/>
-              <a:t>8/28/2019</a:t>
+              <a:t>8/29/2019</a:t>
             </a:fld>
             <a:endParaRPr lang="en-US"/>
           </a:p>
@@ -2189,7 +2192,7 @@
           <a:p>
             <a:fld id="{C4112ACB-F900-457F-BFCF-7AFE3E0F446C}" type="datetimeFigureOut">
               <a:rPr lang="en-US" smtClean="0"/>
-              <a:t>8/28/2019</a:t>
+              <a:t>8/29/2019</a:t>
             </a:fld>
             <a:endParaRPr lang="en-US"/>
           </a:p>
@@ -3059,7 +3062,7 @@
           <a:p>
             <a:fld id="{C4112ACB-F900-457F-BFCF-7AFE3E0F446C}" type="datetimeFigureOut">
               <a:rPr lang="en-US" smtClean="0"/>
-              <a:t>8/28/2019</a:t>
+              <a:t>8/29/2019</a:t>
             </a:fld>
             <a:endParaRPr lang="en-US"/>
           </a:p>
@@ -4080,7 +4083,7 @@
           <a:p>
             <a:fld id="{C4112ACB-F900-457F-BFCF-7AFE3E0F446C}" type="datetimeFigureOut">
               <a:rPr lang="en-US" smtClean="0"/>
-              <a:t>8/28/2019</a:t>
+              <a:t>8/29/2019</a:t>
             </a:fld>
             <a:endParaRPr lang="en-US"/>
           </a:p>
@@ -5000,7 +5003,7 @@
           <a:p>
             <a:fld id="{C4112ACB-F900-457F-BFCF-7AFE3E0F446C}" type="datetimeFigureOut">
               <a:rPr lang="en-US" smtClean="0"/>
-              <a:t>8/28/2019</a:t>
+              <a:t>8/29/2019</a:t>
             </a:fld>
             <a:endParaRPr lang="en-US"/>
           </a:p>
@@ -5656,7 +5659,7 @@
           <a:p>
             <a:fld id="{C4112ACB-F900-457F-BFCF-7AFE3E0F446C}" type="datetimeFigureOut">
               <a:rPr lang="en-US" smtClean="0"/>
-              <a:t>8/28/2019</a:t>
+              <a:t>8/29/2019</a:t>
             </a:fld>
             <a:endParaRPr lang="en-US"/>
           </a:p>
@@ -6513,7 +6516,7 @@
           <a:p>
             <a:fld id="{C4112ACB-F900-457F-BFCF-7AFE3E0F446C}" type="datetimeFigureOut">
               <a:rPr lang="en-US" smtClean="0"/>
-              <a:t>8/28/2019</a:t>
+              <a:t>8/29/2019</a:t>
             </a:fld>
             <a:endParaRPr lang="en-US"/>
           </a:p>
@@ -6696,7 +6699,7 @@
           <a:p>
             <a:fld id="{C4112ACB-F900-457F-BFCF-7AFE3E0F446C}" type="datetimeFigureOut">
               <a:rPr lang="en-US" smtClean="0"/>
-              <a:t>8/28/2019</a:t>
+              <a:t>8/29/2019</a:t>
             </a:fld>
             <a:endParaRPr lang="en-US"/>
           </a:p>
@@ -7553,7 +7556,7 @@
           <a:p>
             <a:fld id="{C4112ACB-F900-457F-BFCF-7AFE3E0F446C}" type="datetimeFigureOut">
               <a:rPr lang="en-US" smtClean="0"/>
-              <a:t>8/28/2019</a:t>
+              <a:t>8/29/2019</a:t>
             </a:fld>
             <a:endParaRPr lang="en-US"/>
           </a:p>
@@ -7772,7 +7775,7 @@
           <a:p>
             <a:fld id="{C4112ACB-F900-457F-BFCF-7AFE3E0F446C}" type="datetimeFigureOut">
               <a:rPr lang="en-US" smtClean="0"/>
-              <a:t>8/28/2019</a:t>
+              <a:t>8/29/2019</a:t>
             </a:fld>
             <a:endParaRPr lang="en-US"/>
           </a:p>
@@ -8697,7 +8700,7 @@
           <a:p>
             <a:fld id="{C4112ACB-F900-457F-BFCF-7AFE3E0F446C}" type="datetimeFigureOut">
               <a:rPr lang="en-US" smtClean="0"/>
-              <a:t>8/28/2019</a:t>
+              <a:t>8/29/2019</a:t>
             </a:fld>
             <a:endParaRPr lang="en-US"/>
           </a:p>
@@ -8981,7 +8984,7 @@
           <a:p>
             <a:fld id="{C4112ACB-F900-457F-BFCF-7AFE3E0F446C}" type="datetimeFigureOut">
               <a:rPr lang="en-US" smtClean="0"/>
-              <a:t>8/28/2019</a:t>
+              <a:t>8/29/2019</a:t>
             </a:fld>
             <a:endParaRPr lang="en-US"/>
           </a:p>
@@ -9371,7 +9374,7 @@
           <a:p>
             <a:fld id="{C4112ACB-F900-457F-BFCF-7AFE3E0F446C}" type="datetimeFigureOut">
               <a:rPr lang="en-US" smtClean="0"/>
-              <a:t>8/28/2019</a:t>
+              <a:t>8/29/2019</a:t>
             </a:fld>
             <a:endParaRPr lang="en-US"/>
           </a:p>
@@ -9497,7 +9500,7 @@
           <a:p>
             <a:fld id="{C4112ACB-F900-457F-BFCF-7AFE3E0F446C}" type="datetimeFigureOut">
               <a:rPr lang="en-US" smtClean="0"/>
-              <a:t>8/28/2019</a:t>
+              <a:t>8/29/2019</a:t>
             </a:fld>
             <a:endParaRPr lang="en-US"/>
           </a:p>
@@ -9592,7 +9595,7 @@
           <a:p>
             <a:fld id="{C4112ACB-F900-457F-BFCF-7AFE3E0F446C}" type="datetimeFigureOut">
               <a:rPr lang="en-US" smtClean="0"/>
-              <a:t>8/28/2019</a:t>
+              <a:t>8/29/2019</a:t>
             </a:fld>
             <a:endParaRPr lang="en-US"/>
           </a:p>
@@ -10563,7 +10566,7 @@
           <a:p>
             <a:fld id="{C4112ACB-F900-457F-BFCF-7AFE3E0F446C}" type="datetimeFigureOut">
               <a:rPr lang="en-US" smtClean="0"/>
-              <a:t>8/28/2019</a:t>
+              <a:t>8/29/2019</a:t>
             </a:fld>
             <a:endParaRPr lang="en-US"/>
           </a:p>
@@ -11558,7 +11561,7 @@
           <a:p>
             <a:fld id="{C4112ACB-F900-457F-BFCF-7AFE3E0F446C}" type="datetimeFigureOut">
               <a:rPr lang="en-US" smtClean="0"/>
-              <a:t>8/28/2019</a:t>
+              <a:t>8/29/2019</a:t>
             </a:fld>
             <a:endParaRPr lang="en-US"/>
           </a:p>
@@ -12442,7 +12445,7 @@
           <a:p>
             <a:fld id="{C4112ACB-F900-457F-BFCF-7AFE3E0F446C}" type="datetimeFigureOut">
               <a:rPr lang="en-US" smtClean="0"/>
-              <a:t>8/28/2019</a:t>
+              <a:t>8/29/2019</a:t>
             </a:fld>
             <a:endParaRPr lang="en-US"/>
           </a:p>
@@ -18686,10 +18689,10 @@
       </p:grpSpPr>
       <p:sp>
         <p:nvSpPr>
-          <p:cNvPr id="4" name="כותרת 1">
+          <p:cNvPr id="2" name="כותרת 1">
             <a:extLst>
               <a:ext uri="{FF2B5EF4-FFF2-40B4-BE49-F238E27FC236}">
-                <a16:creationId xmlns:a16="http://schemas.microsoft.com/office/drawing/2014/main" id="{9CE63F66-44FD-481E-9FC0-03A70DA8B208}"/>
+                <a16:creationId xmlns:a16="http://schemas.microsoft.com/office/drawing/2014/main" id="{DE777293-170B-4164-A212-000191C56DFE}"/>
               </a:ext>
             </a:extLst>
           </p:cNvPr>
@@ -18700,12 +18703,7 @@
             <p:ph type="title"/>
           </p:nvPr>
         </p:nvSpPr>
-        <p:spPr>
-          <a:xfrm>
-            <a:off x="1154954" y="973669"/>
-            <a:ext cx="8825659" cy="706964"/>
-          </a:xfrm>
-        </p:spPr>
+        <p:spPr/>
         <p:txBody>
           <a:bodyPr/>
           <a:lstStyle/>
@@ -18713,7 +18711,7 @@
             <a:pPr algn="ctr" rtl="1"/>
             <a:r>
               <a:rPr lang="he-IL" dirty="0"/>
-              <a:t>אזור אישי</a:t>
+              <a:t>מסך הוספת פגישה והוספת אילוץ</a:t>
             </a:r>
           </a:p>
         </p:txBody>
@@ -18723,7 +18721,7 @@
           <p:cNvPr id="5" name="תיבת טקסט 4">
             <a:extLst>
               <a:ext uri="{FF2B5EF4-FFF2-40B4-BE49-F238E27FC236}">
-                <a16:creationId xmlns:a16="http://schemas.microsoft.com/office/drawing/2014/main" id="{D36CFA63-7BB9-43CF-8ED1-B5D1EE2F78F6}"/>
+                <a16:creationId xmlns:a16="http://schemas.microsoft.com/office/drawing/2014/main" id="{49C1F48E-4344-478F-B955-03346A467B7E}"/>
               </a:ext>
             </a:extLst>
           </p:cNvPr>
@@ -18732,8 +18730,8 @@
         </p:nvSpPr>
         <p:spPr>
           <a:xfrm>
-            <a:off x="7919696" y="2534088"/>
-            <a:ext cx="4121834" cy="1754326"/>
+            <a:off x="1462310" y="2477527"/>
+            <a:ext cx="9267379" cy="369332"/>
           </a:xfrm>
           <a:prstGeom prst="rect">
             <a:avLst/>
@@ -18746,30 +18744,20 @@
           </a:bodyPr>
           <a:lstStyle/>
           <a:p>
-            <a:pPr marL="285750" indent="-285750" algn="r" rtl="1">
-              <a:buFont typeface="Arial" panose="020B0604020202020204" pitchFamily="34" charset="0"/>
-              <a:buChar char="•"/>
-            </a:pPr>
+            <a:pPr algn="r" rtl="1"/>
             <a:r>
               <a:rPr lang="he-IL" dirty="0"/>
-              <a:t>תחילה, רצינו לשנות את אופן הפריסה של המשבצות במסך כך שהן יעבירו את האינפורמציה הרצויה למשתמש בצורה הטובה ביותר.</a:t>
-            </a:r>
-            <a:br>
-              <a:rPr lang="en-US" dirty="0"/>
-            </a:br>
-            <a:r>
-              <a:rPr lang="he-IL" dirty="0"/>
-              <a:t>הניסיון הראשון היה להעביר אותן לרשימה אחת אחרי השנייה.</a:t>
+              <a:t>את אותם שינויים שעשינו במסך ההתחברות ובמסך ההרשמה הוספנו למסך הוספת פגישה והוספת אילוץ</a:t>
             </a:r>
           </a:p>
         </p:txBody>
       </p:sp>
       <p:pic>
         <p:nvPicPr>
-          <p:cNvPr id="7" name="תמונה 6">
+          <p:cNvPr id="3" name="תמונה 2">
             <a:extLst>
               <a:ext uri="{FF2B5EF4-FFF2-40B4-BE49-F238E27FC236}">
-                <a16:creationId xmlns:a16="http://schemas.microsoft.com/office/drawing/2014/main" id="{CFDF37F6-ABAD-4A8F-9414-5C0E624ADA4B}"/>
+                <a16:creationId xmlns:a16="http://schemas.microsoft.com/office/drawing/2014/main" id="{F74805F7-6C4A-4A1C-A406-9BDF74A7EE20}"/>
               </a:ext>
             </a:extLst>
           </p:cNvPr>
@@ -18786,8 +18774,8 @@
         </p:blipFill>
         <p:spPr>
           <a:xfrm>
-            <a:off x="2638" y="2639504"/>
-            <a:ext cx="7496301" cy="4218495"/>
+            <a:off x="3346188" y="2846858"/>
+            <a:ext cx="4778254" cy="4023793"/>
           </a:xfrm>
           <a:prstGeom prst="rect">
             <a:avLst/>
@@ -18797,7 +18785,7 @@
     </p:spTree>
     <p:extLst>
       <p:ext uri="{BB962C8B-B14F-4D97-AF65-F5344CB8AC3E}">
-        <p14:creationId xmlns:p14="http://schemas.microsoft.com/office/powerpoint/2010/main" val="326088053"/>
+        <p14:creationId xmlns:p14="http://schemas.microsoft.com/office/powerpoint/2010/main" val="2560866086"/>
       </p:ext>
     </p:extLst>
   </p:cSld>
@@ -18826,10 +18814,10 @@
       </p:grpSpPr>
       <p:sp>
         <p:nvSpPr>
-          <p:cNvPr id="7" name="כותרת 1">
+          <p:cNvPr id="2" name="כותרת 1">
             <a:extLst>
               <a:ext uri="{FF2B5EF4-FFF2-40B4-BE49-F238E27FC236}">
-                <a16:creationId xmlns:a16="http://schemas.microsoft.com/office/drawing/2014/main" id="{6662C6A5-8295-439A-895D-B86DC7C49A08}"/>
+                <a16:creationId xmlns:a16="http://schemas.microsoft.com/office/drawing/2014/main" id="{DE777293-170B-4164-A212-000191C56DFE}"/>
               </a:ext>
             </a:extLst>
           </p:cNvPr>
@@ -18840,12 +18828,7 @@
             <p:ph type="title"/>
           </p:nvPr>
         </p:nvSpPr>
-        <p:spPr>
-          <a:xfrm>
-            <a:off x="1154954" y="973669"/>
-            <a:ext cx="8825659" cy="706964"/>
-          </a:xfrm>
-        </p:spPr>
+        <p:spPr/>
         <p:txBody>
           <a:bodyPr/>
           <a:lstStyle/>
@@ -18853,17 +18836,17 @@
             <a:pPr algn="ctr" rtl="1"/>
             <a:r>
               <a:rPr lang="he-IL" dirty="0"/>
-              <a:t>אזור אישי</a:t>
+              <a:t>מסך הוספת פגישה והוספת אילוץ</a:t>
             </a:r>
           </a:p>
         </p:txBody>
       </p:sp>
       <p:sp>
         <p:nvSpPr>
-          <p:cNvPr id="8" name="תיבת טקסט 7">
+          <p:cNvPr id="5" name="תיבת טקסט 4">
             <a:extLst>
               <a:ext uri="{FF2B5EF4-FFF2-40B4-BE49-F238E27FC236}">
-                <a16:creationId xmlns:a16="http://schemas.microsoft.com/office/drawing/2014/main" id="{574778D9-918E-4D7E-9B1A-A7F55F23F17F}"/>
+                <a16:creationId xmlns:a16="http://schemas.microsoft.com/office/drawing/2014/main" id="{49C1F48E-4344-478F-B955-03346A467B7E}"/>
               </a:ext>
             </a:extLst>
           </p:cNvPr>
@@ -18872,8 +18855,8 @@
         </p:nvSpPr>
         <p:spPr>
           <a:xfrm>
-            <a:off x="7919696" y="2534088"/>
-            <a:ext cx="4121834" cy="2031325"/>
+            <a:off x="450166" y="2477527"/>
+            <a:ext cx="11591364" cy="369332"/>
           </a:xfrm>
           <a:prstGeom prst="rect">
             <a:avLst/>
@@ -18886,23 +18869,20 @@
           </a:bodyPr>
           <a:lstStyle/>
           <a:p>
-            <a:pPr marL="285750" indent="-285750" algn="r" rtl="1">
-              <a:buFont typeface="Arial" panose="020B0604020202020204" pitchFamily="34" charset="0"/>
-              <a:buChar char="•"/>
-            </a:pPr>
+            <a:pPr algn="r" rtl="1"/>
             <a:r>
               <a:rPr lang="he-IL" dirty="0"/>
-              <a:t>בניסיון השני, הגדלנו את משבצת הפגישות שלי, המטרה היא לתת לה משקל גדול יותר מהמשבצות האחרות מכיוון שזהו מידע שיכול להיות יותר רלוונטי למשתמש מאשר משבצת המיקומים שלו שבדרך כלל מכילה את אותו המידע כל הזמן.</a:t>
+              <a:t>את אותם שינויים שעשינו במסך ההתחברות ובמסך ההרשמה הוספנו למסך הוספת פגישה והוספת אילוץ</a:t>
             </a:r>
           </a:p>
         </p:txBody>
       </p:sp>
       <p:pic>
         <p:nvPicPr>
-          <p:cNvPr id="2" name="תמונה 1">
+          <p:cNvPr id="3" name="תמונה 2">
             <a:extLst>
               <a:ext uri="{FF2B5EF4-FFF2-40B4-BE49-F238E27FC236}">
-                <a16:creationId xmlns:a16="http://schemas.microsoft.com/office/drawing/2014/main" id="{1D0A558C-F366-4223-9BC4-B052EF278C55}"/>
+                <a16:creationId xmlns:a16="http://schemas.microsoft.com/office/drawing/2014/main" id="{9C4C959D-044E-406B-A4A7-F12197FD45EA}"/>
               </a:ext>
             </a:extLst>
           </p:cNvPr>
@@ -18919,8 +18899,8 @@
         </p:blipFill>
         <p:spPr>
           <a:xfrm>
-            <a:off x="34780" y="2771480"/>
-            <a:ext cx="7223475" cy="4086520"/>
+            <a:off x="3924888" y="2846859"/>
+            <a:ext cx="4038672" cy="3988314"/>
           </a:xfrm>
           <a:prstGeom prst="rect">
             <a:avLst/>
@@ -18930,7 +18910,7 @@
     </p:spTree>
     <p:extLst>
       <p:ext uri="{BB962C8B-B14F-4D97-AF65-F5344CB8AC3E}">
-        <p14:creationId xmlns:p14="http://schemas.microsoft.com/office/powerpoint/2010/main" val="3822788990"/>
+        <p14:creationId xmlns:p14="http://schemas.microsoft.com/office/powerpoint/2010/main" val="3541591789"/>
       </p:ext>
     </p:extLst>
   </p:cSld>
@@ -19161,6 +19141,416 @@
       </p:grpSpPr>
       <p:sp>
         <p:nvSpPr>
+          <p:cNvPr id="2" name="כותרת 1">
+            <a:extLst>
+              <a:ext uri="{FF2B5EF4-FFF2-40B4-BE49-F238E27FC236}">
+                <a16:creationId xmlns:a16="http://schemas.microsoft.com/office/drawing/2014/main" id="{DE777293-170B-4164-A212-000191C56DFE}"/>
+              </a:ext>
+            </a:extLst>
+          </p:cNvPr>
+          <p:cNvSpPr>
+            <a:spLocks noGrp="1"/>
+          </p:cNvSpPr>
+          <p:nvPr>
+            <p:ph type="title"/>
+          </p:nvPr>
+        </p:nvSpPr>
+        <p:spPr/>
+        <p:txBody>
+          <a:bodyPr/>
+          <a:lstStyle/>
+          <a:p>
+            <a:pPr algn="ctr" rtl="1"/>
+            <a:r>
+              <a:rPr lang="he-IL"/>
+              <a:t>מסך </a:t>
+            </a:r>
+            <a:r>
+              <a:rPr lang="he-IL" dirty="0"/>
+              <a:t>הרשמה</a:t>
+            </a:r>
+          </a:p>
+        </p:txBody>
+      </p:sp>
+      <p:sp>
+        <p:nvSpPr>
+          <p:cNvPr id="5" name="תיבת טקסט 4">
+            <a:extLst>
+              <a:ext uri="{FF2B5EF4-FFF2-40B4-BE49-F238E27FC236}">
+                <a16:creationId xmlns:a16="http://schemas.microsoft.com/office/drawing/2014/main" id="{49C1F48E-4344-478F-B955-03346A467B7E}"/>
+              </a:ext>
+            </a:extLst>
+          </p:cNvPr>
+          <p:cNvSpPr txBox="1"/>
+          <p:nvPr/>
+        </p:nvSpPr>
+        <p:spPr>
+          <a:xfrm>
+            <a:off x="7919696" y="2477527"/>
+            <a:ext cx="4121834" cy="923330"/>
+          </a:xfrm>
+          <a:prstGeom prst="rect">
+            <a:avLst/>
+          </a:prstGeom>
+          <a:noFill/>
+        </p:spPr>
+        <p:txBody>
+          <a:bodyPr wrap="square" rtlCol="1">
+            <a:spAutoFit/>
+          </a:bodyPr>
+          <a:lstStyle/>
+          <a:p>
+            <a:pPr marL="285750" indent="-285750" algn="r" rtl="1">
+              <a:buFont typeface="Arial" panose="020B0604020202020204" pitchFamily="34" charset="0"/>
+              <a:buChar char="•"/>
+            </a:pPr>
+            <a:r>
+              <a:rPr lang="he-IL" dirty="0"/>
+              <a:t>כאשר אחד או יותר מהשדות חובה ריקות לא נאפשר ללחוץ על כפתור ה"הירשם" – </a:t>
+            </a:r>
+            <a:r>
+              <a:rPr lang="he-IL" b="1" dirty="0"/>
+              <a:t>מניעת טעויות.</a:t>
+            </a:r>
+            <a:endParaRPr lang="he-IL" dirty="0"/>
+          </a:p>
+        </p:txBody>
+      </p:sp>
+      <p:pic>
+        <p:nvPicPr>
+          <p:cNvPr id="4" name="תמונה 3">
+            <a:extLst>
+              <a:ext uri="{FF2B5EF4-FFF2-40B4-BE49-F238E27FC236}">
+                <a16:creationId xmlns:a16="http://schemas.microsoft.com/office/drawing/2014/main" id="{407C7C72-7DE0-4C9C-963E-8C4B6AD52CAF}"/>
+              </a:ext>
+            </a:extLst>
+          </p:cNvPr>
+          <p:cNvPicPr>
+            <a:picLocks noChangeAspect="1"/>
+          </p:cNvPicPr>
+          <p:nvPr/>
+        </p:nvPicPr>
+        <p:blipFill>
+          <a:blip r:embed="rId2"/>
+          <a:stretch>
+            <a:fillRect/>
+          </a:stretch>
+        </p:blipFill>
+        <p:spPr>
+          <a:xfrm>
+            <a:off x="0" y="2477527"/>
+            <a:ext cx="7790531" cy="4380473"/>
+          </a:xfrm>
+          <a:prstGeom prst="rect">
+            <a:avLst/>
+          </a:prstGeom>
+        </p:spPr>
+      </p:pic>
+    </p:spTree>
+    <p:extLst>
+      <p:ext uri="{BB962C8B-B14F-4D97-AF65-F5344CB8AC3E}">
+        <p14:creationId xmlns:p14="http://schemas.microsoft.com/office/powerpoint/2010/main" val="1150286925"/>
+      </p:ext>
+    </p:extLst>
+  </p:cSld>
+  <p:clrMapOvr>
+    <a:masterClrMapping/>
+  </p:clrMapOvr>
+</p:sld>
+</file>
+
+<file path=ppt/slides/slide41.xml><?xml version="1.0" encoding="utf-8"?>
+<p:sld xmlns:a="http://schemas.openxmlformats.org/drawingml/2006/main" xmlns:r="http://schemas.openxmlformats.org/officeDocument/2006/relationships" xmlns:p="http://schemas.openxmlformats.org/presentationml/2006/main">
+  <p:cSld>
+    <p:spTree>
+      <p:nvGrpSpPr>
+        <p:cNvPr id="1" name=""/>
+        <p:cNvGrpSpPr/>
+        <p:nvPr/>
+      </p:nvGrpSpPr>
+      <p:grpSpPr>
+        <a:xfrm>
+          <a:off x="0" y="0"/>
+          <a:ext cx="0" cy="0"/>
+          <a:chOff x="0" y="0"/>
+          <a:chExt cx="0" cy="0"/>
+        </a:xfrm>
+      </p:grpSpPr>
+      <p:sp>
+        <p:nvSpPr>
+          <p:cNvPr id="4" name="כותרת 1">
+            <a:extLst>
+              <a:ext uri="{FF2B5EF4-FFF2-40B4-BE49-F238E27FC236}">
+                <a16:creationId xmlns:a16="http://schemas.microsoft.com/office/drawing/2014/main" id="{9CE63F66-44FD-481E-9FC0-03A70DA8B208}"/>
+              </a:ext>
+            </a:extLst>
+          </p:cNvPr>
+          <p:cNvSpPr>
+            <a:spLocks noGrp="1"/>
+          </p:cNvSpPr>
+          <p:nvPr>
+            <p:ph type="title"/>
+          </p:nvPr>
+        </p:nvSpPr>
+        <p:spPr>
+          <a:xfrm>
+            <a:off x="1154954" y="973669"/>
+            <a:ext cx="8825659" cy="706964"/>
+          </a:xfrm>
+        </p:spPr>
+        <p:txBody>
+          <a:bodyPr/>
+          <a:lstStyle/>
+          <a:p>
+            <a:pPr algn="ctr" rtl="1"/>
+            <a:r>
+              <a:rPr lang="he-IL" dirty="0"/>
+              <a:t>אזור אישי</a:t>
+            </a:r>
+          </a:p>
+        </p:txBody>
+      </p:sp>
+      <p:sp>
+        <p:nvSpPr>
+          <p:cNvPr id="5" name="תיבת טקסט 4">
+            <a:extLst>
+              <a:ext uri="{FF2B5EF4-FFF2-40B4-BE49-F238E27FC236}">
+                <a16:creationId xmlns:a16="http://schemas.microsoft.com/office/drawing/2014/main" id="{D36CFA63-7BB9-43CF-8ED1-B5D1EE2F78F6}"/>
+              </a:ext>
+            </a:extLst>
+          </p:cNvPr>
+          <p:cNvSpPr txBox="1"/>
+          <p:nvPr/>
+        </p:nvSpPr>
+        <p:spPr>
+          <a:xfrm>
+            <a:off x="7919696" y="2534088"/>
+            <a:ext cx="4121834" cy="1754326"/>
+          </a:xfrm>
+          <a:prstGeom prst="rect">
+            <a:avLst/>
+          </a:prstGeom>
+          <a:noFill/>
+        </p:spPr>
+        <p:txBody>
+          <a:bodyPr wrap="square" rtlCol="1">
+            <a:spAutoFit/>
+          </a:bodyPr>
+          <a:lstStyle/>
+          <a:p>
+            <a:pPr marL="285750" indent="-285750" algn="r" rtl="1">
+              <a:buFont typeface="Arial" panose="020B0604020202020204" pitchFamily="34" charset="0"/>
+              <a:buChar char="•"/>
+            </a:pPr>
+            <a:r>
+              <a:rPr lang="he-IL" dirty="0"/>
+              <a:t>תחילה, רצינו לשנות את אופן הפריסה של המשבצות במסך כך שהן יעבירו את האינפורמציה הרצויה למשתמש בצורה הטובה ביותר.</a:t>
+            </a:r>
+            <a:br>
+              <a:rPr lang="en-US" dirty="0"/>
+            </a:br>
+            <a:r>
+              <a:rPr lang="he-IL" dirty="0"/>
+              <a:t>הניסיון הראשון היה להעביר אותן לרשימה אחת אחרי השנייה.</a:t>
+            </a:r>
+          </a:p>
+        </p:txBody>
+      </p:sp>
+      <p:pic>
+        <p:nvPicPr>
+          <p:cNvPr id="7" name="תמונה 6">
+            <a:extLst>
+              <a:ext uri="{FF2B5EF4-FFF2-40B4-BE49-F238E27FC236}">
+                <a16:creationId xmlns:a16="http://schemas.microsoft.com/office/drawing/2014/main" id="{CFDF37F6-ABAD-4A8F-9414-5C0E624ADA4B}"/>
+              </a:ext>
+            </a:extLst>
+          </p:cNvPr>
+          <p:cNvPicPr>
+            <a:picLocks noChangeAspect="1"/>
+          </p:cNvPicPr>
+          <p:nvPr/>
+        </p:nvPicPr>
+        <p:blipFill>
+          <a:blip r:embed="rId2"/>
+          <a:stretch>
+            <a:fillRect/>
+          </a:stretch>
+        </p:blipFill>
+        <p:spPr>
+          <a:xfrm>
+            <a:off x="2638" y="2639504"/>
+            <a:ext cx="7496301" cy="4218495"/>
+          </a:xfrm>
+          <a:prstGeom prst="rect">
+            <a:avLst/>
+          </a:prstGeom>
+        </p:spPr>
+      </p:pic>
+    </p:spTree>
+    <p:extLst>
+      <p:ext uri="{BB962C8B-B14F-4D97-AF65-F5344CB8AC3E}">
+        <p14:creationId xmlns:p14="http://schemas.microsoft.com/office/powerpoint/2010/main" val="326088053"/>
+      </p:ext>
+    </p:extLst>
+  </p:cSld>
+  <p:clrMapOvr>
+    <a:masterClrMapping/>
+  </p:clrMapOvr>
+</p:sld>
+</file>
+
+<file path=ppt/slides/slide42.xml><?xml version="1.0" encoding="utf-8"?>
+<p:sld xmlns:a="http://schemas.openxmlformats.org/drawingml/2006/main" xmlns:r="http://schemas.openxmlformats.org/officeDocument/2006/relationships" xmlns:p="http://schemas.openxmlformats.org/presentationml/2006/main">
+  <p:cSld>
+    <p:spTree>
+      <p:nvGrpSpPr>
+        <p:cNvPr id="1" name=""/>
+        <p:cNvGrpSpPr/>
+        <p:nvPr/>
+      </p:nvGrpSpPr>
+      <p:grpSpPr>
+        <a:xfrm>
+          <a:off x="0" y="0"/>
+          <a:ext cx="0" cy="0"/>
+          <a:chOff x="0" y="0"/>
+          <a:chExt cx="0" cy="0"/>
+        </a:xfrm>
+      </p:grpSpPr>
+      <p:sp>
+        <p:nvSpPr>
+          <p:cNvPr id="7" name="כותרת 1">
+            <a:extLst>
+              <a:ext uri="{FF2B5EF4-FFF2-40B4-BE49-F238E27FC236}">
+                <a16:creationId xmlns:a16="http://schemas.microsoft.com/office/drawing/2014/main" id="{6662C6A5-8295-439A-895D-B86DC7C49A08}"/>
+              </a:ext>
+            </a:extLst>
+          </p:cNvPr>
+          <p:cNvSpPr>
+            <a:spLocks noGrp="1"/>
+          </p:cNvSpPr>
+          <p:nvPr>
+            <p:ph type="title"/>
+          </p:nvPr>
+        </p:nvSpPr>
+        <p:spPr>
+          <a:xfrm>
+            <a:off x="1154954" y="973669"/>
+            <a:ext cx="8825659" cy="706964"/>
+          </a:xfrm>
+        </p:spPr>
+        <p:txBody>
+          <a:bodyPr/>
+          <a:lstStyle/>
+          <a:p>
+            <a:pPr algn="ctr" rtl="1"/>
+            <a:r>
+              <a:rPr lang="he-IL" dirty="0"/>
+              <a:t>אזור אישי</a:t>
+            </a:r>
+          </a:p>
+        </p:txBody>
+      </p:sp>
+      <p:sp>
+        <p:nvSpPr>
+          <p:cNvPr id="8" name="תיבת טקסט 7">
+            <a:extLst>
+              <a:ext uri="{FF2B5EF4-FFF2-40B4-BE49-F238E27FC236}">
+                <a16:creationId xmlns:a16="http://schemas.microsoft.com/office/drawing/2014/main" id="{574778D9-918E-4D7E-9B1A-A7F55F23F17F}"/>
+              </a:ext>
+            </a:extLst>
+          </p:cNvPr>
+          <p:cNvSpPr txBox="1"/>
+          <p:nvPr/>
+        </p:nvSpPr>
+        <p:spPr>
+          <a:xfrm>
+            <a:off x="7919696" y="2534088"/>
+            <a:ext cx="4121834" cy="2031325"/>
+          </a:xfrm>
+          <a:prstGeom prst="rect">
+            <a:avLst/>
+          </a:prstGeom>
+          <a:noFill/>
+        </p:spPr>
+        <p:txBody>
+          <a:bodyPr wrap="square" rtlCol="1">
+            <a:spAutoFit/>
+          </a:bodyPr>
+          <a:lstStyle/>
+          <a:p>
+            <a:pPr marL="285750" indent="-285750" algn="r" rtl="1">
+              <a:buFont typeface="Arial" panose="020B0604020202020204" pitchFamily="34" charset="0"/>
+              <a:buChar char="•"/>
+            </a:pPr>
+            <a:r>
+              <a:rPr lang="he-IL" dirty="0"/>
+              <a:t>בניסיון השני, הגדלנו את משבצת הפגישות שלי, המטרה היא לתת לה משקל גדול יותר מהמשבצות האחרות מכיוון שזהו מידע שיכול להיות יותר רלוונטי למשתמש מאשר משבצת המיקומים שלו שבדרך כלל מכילה את אותו המידע כל הזמן.</a:t>
+            </a:r>
+          </a:p>
+        </p:txBody>
+      </p:sp>
+      <p:pic>
+        <p:nvPicPr>
+          <p:cNvPr id="2" name="תמונה 1">
+            <a:extLst>
+              <a:ext uri="{FF2B5EF4-FFF2-40B4-BE49-F238E27FC236}">
+                <a16:creationId xmlns:a16="http://schemas.microsoft.com/office/drawing/2014/main" id="{1D0A558C-F366-4223-9BC4-B052EF278C55}"/>
+              </a:ext>
+            </a:extLst>
+          </p:cNvPr>
+          <p:cNvPicPr>
+            <a:picLocks noChangeAspect="1"/>
+          </p:cNvPicPr>
+          <p:nvPr/>
+        </p:nvPicPr>
+        <p:blipFill>
+          <a:blip r:embed="rId2"/>
+          <a:stretch>
+            <a:fillRect/>
+          </a:stretch>
+        </p:blipFill>
+        <p:spPr>
+          <a:xfrm>
+            <a:off x="34780" y="2771480"/>
+            <a:ext cx="7223475" cy="4086520"/>
+          </a:xfrm>
+          <a:prstGeom prst="rect">
+            <a:avLst/>
+          </a:prstGeom>
+        </p:spPr>
+      </p:pic>
+    </p:spTree>
+    <p:extLst>
+      <p:ext uri="{BB962C8B-B14F-4D97-AF65-F5344CB8AC3E}">
+        <p14:creationId xmlns:p14="http://schemas.microsoft.com/office/powerpoint/2010/main" val="3822788990"/>
+      </p:ext>
+    </p:extLst>
+  </p:cSld>
+  <p:clrMapOvr>
+    <a:masterClrMapping/>
+  </p:clrMapOvr>
+</p:sld>
+</file>
+
+<file path=ppt/slides/slide43.xml><?xml version="1.0" encoding="utf-8"?>
+<p:sld xmlns:a="http://schemas.openxmlformats.org/drawingml/2006/main" xmlns:r="http://schemas.openxmlformats.org/officeDocument/2006/relationships" xmlns:p="http://schemas.openxmlformats.org/presentationml/2006/main">
+  <p:cSld>
+    <p:spTree>
+      <p:nvGrpSpPr>
+        <p:cNvPr id="1" name=""/>
+        <p:cNvGrpSpPr/>
+        <p:nvPr/>
+      </p:nvGrpSpPr>
+      <p:grpSpPr>
+        <a:xfrm>
+          <a:off x="0" y="0"/>
+          <a:ext cx="0" cy="0"/>
+          <a:chOff x="0" y="0"/>
+          <a:chExt cx="0" cy="0"/>
+        </a:xfrm>
+      </p:grpSpPr>
+      <p:sp>
+        <p:nvSpPr>
           <p:cNvPr id="4" name="כותרת 1">
             <a:extLst>
               <a:ext uri="{FF2B5EF4-FFF2-40B4-BE49-F238E27FC236}">
@@ -19289,7 +19679,7 @@
 </p:sld>
 </file>
 
-<file path=ppt/slides/slide41.xml><?xml version="1.0" encoding="utf-8"?>
+<file path=ppt/slides/slide44.xml><?xml version="1.0" encoding="utf-8"?>
 <p:sld xmlns:a="http://schemas.openxmlformats.org/drawingml/2006/main" xmlns:r="http://schemas.openxmlformats.org/officeDocument/2006/relationships" xmlns:p="http://schemas.openxmlformats.org/presentationml/2006/main">
   <p:cSld>
     <p:spTree>
@@ -19480,7 +19870,7 @@
 </p:sld>
 </file>
 
-<file path=ppt/slides/slide42.xml><?xml version="1.0" encoding="utf-8"?>
+<file path=ppt/slides/slide45.xml><?xml version="1.0" encoding="utf-8"?>
 <p:sld xmlns:a="http://schemas.openxmlformats.org/drawingml/2006/main" xmlns:r="http://schemas.openxmlformats.org/officeDocument/2006/relationships" xmlns:p="http://schemas.openxmlformats.org/presentationml/2006/main">
   <p:cSld>
     <p:spTree>
@@ -19680,7 +20070,7 @@
 </p:sld>
 </file>
 
-<file path=ppt/slides/slide43.xml><?xml version="1.0" encoding="utf-8"?>
+<file path=ppt/slides/slide46.xml><?xml version="1.0" encoding="utf-8"?>
 <p:sld xmlns:a="http://schemas.openxmlformats.org/drawingml/2006/main" xmlns:r="http://schemas.openxmlformats.org/officeDocument/2006/relationships" xmlns:p="http://schemas.openxmlformats.org/presentationml/2006/main">
   <p:cSld>
     <p:spTree>
@@ -19858,7 +20248,7 @@
 </p:sld>
 </file>
 
-<file path=ppt/slides/slide44.xml><?xml version="1.0" encoding="utf-8"?>
+<file path=ppt/slides/slide47.xml><?xml version="1.0" encoding="utf-8"?>
 <p:sld xmlns:a="http://schemas.openxmlformats.org/drawingml/2006/main" xmlns:r="http://schemas.openxmlformats.org/officeDocument/2006/relationships" xmlns:p="http://schemas.openxmlformats.org/presentationml/2006/main">
   <p:cSld>
     <p:spTree>
@@ -20078,7 +20468,7 @@
 </p:sld>
 </file>
 
-<file path=ppt/slides/slide45.xml><?xml version="1.0" encoding="utf-8"?>
+<file path=ppt/slides/slide48.xml><?xml version="1.0" encoding="utf-8"?>
 <p:sld xmlns:a="http://schemas.openxmlformats.org/drawingml/2006/main" xmlns:r="http://schemas.openxmlformats.org/officeDocument/2006/relationships" xmlns:p="http://schemas.openxmlformats.org/presentationml/2006/main">
   <p:cSld>
     <p:spTree>
@@ -20240,7 +20630,7 @@
 </p:sld>
 </file>
 
-<file path=ppt/slides/slide46.xml><?xml version="1.0" encoding="utf-8"?>
+<file path=ppt/slides/slide49.xml><?xml version="1.0" encoding="utf-8"?>
 <p:sld xmlns:a="http://schemas.openxmlformats.org/drawingml/2006/main" xmlns:r="http://schemas.openxmlformats.org/officeDocument/2006/relationships" xmlns:p="http://schemas.openxmlformats.org/presentationml/2006/main">
   <p:cSld>
     <p:spTree>
@@ -20697,7 +21087,208 @@
 </p:sld>
 </file>
 
-<file path=ppt/slides/slide47.xml><?xml version="1.0" encoding="utf-8"?>
+<file path=ppt/slides/slide5.xml><?xml version="1.0" encoding="utf-8"?>
+<p:sld xmlns:a="http://schemas.openxmlformats.org/drawingml/2006/main" xmlns:r="http://schemas.openxmlformats.org/officeDocument/2006/relationships" xmlns:p="http://schemas.openxmlformats.org/presentationml/2006/main">
+  <p:cSld>
+    <p:spTree>
+      <p:nvGrpSpPr>
+        <p:cNvPr id="1" name=""/>
+        <p:cNvGrpSpPr/>
+        <p:nvPr/>
+      </p:nvGrpSpPr>
+      <p:grpSpPr>
+        <a:xfrm>
+          <a:off x="0" y="0"/>
+          <a:ext cx="0" cy="0"/>
+          <a:chOff x="0" y="0"/>
+          <a:chExt cx="0" cy="0"/>
+        </a:xfrm>
+      </p:grpSpPr>
+      <p:sp>
+        <p:nvSpPr>
+          <p:cNvPr id="2" name="כותרת 1">
+            <a:extLst>
+              <a:ext uri="{FF2B5EF4-FFF2-40B4-BE49-F238E27FC236}">
+                <a16:creationId xmlns:a16="http://schemas.microsoft.com/office/drawing/2014/main" id="{92A500EE-F6C5-4C79-92F1-D2FDEE8174A4}"/>
+              </a:ext>
+            </a:extLst>
+          </p:cNvPr>
+          <p:cNvSpPr>
+            <a:spLocks noGrp="1"/>
+          </p:cNvSpPr>
+          <p:nvPr>
+            <p:ph type="title"/>
+          </p:nvPr>
+        </p:nvSpPr>
+        <p:spPr/>
+        <p:txBody>
+          <a:bodyPr/>
+          <a:lstStyle/>
+          <a:p>
+            <a:pPr algn="ctr"/>
+            <a:r>
+              <a:rPr lang="he-IL" dirty="0"/>
+              <a:t>מסך התחברות</a:t>
+            </a:r>
+          </a:p>
+        </p:txBody>
+      </p:sp>
+      <p:pic>
+        <p:nvPicPr>
+          <p:cNvPr id="16" name="תמונה 15">
+            <a:extLst>
+              <a:ext uri="{FF2B5EF4-FFF2-40B4-BE49-F238E27FC236}">
+                <a16:creationId xmlns:a16="http://schemas.microsoft.com/office/drawing/2014/main" id="{4FD9B8E5-98A3-4C79-8EC6-1523FF6B0199}"/>
+              </a:ext>
+            </a:extLst>
+          </p:cNvPr>
+          <p:cNvPicPr>
+            <a:picLocks noChangeAspect="1"/>
+          </p:cNvPicPr>
+          <p:nvPr/>
+        </p:nvPicPr>
+        <p:blipFill>
+          <a:blip r:embed="rId2"/>
+          <a:stretch>
+            <a:fillRect/>
+          </a:stretch>
+        </p:blipFill>
+        <p:spPr>
+          <a:xfrm>
+            <a:off x="531944" y="2813539"/>
+            <a:ext cx="6851533" cy="3844516"/>
+          </a:xfrm>
+          <a:prstGeom prst="rect">
+            <a:avLst/>
+          </a:prstGeom>
+        </p:spPr>
+      </p:pic>
+      <p:sp>
+        <p:nvSpPr>
+          <p:cNvPr id="17" name="תיבת טקסט 16">
+            <a:extLst>
+              <a:ext uri="{FF2B5EF4-FFF2-40B4-BE49-F238E27FC236}">
+                <a16:creationId xmlns:a16="http://schemas.microsoft.com/office/drawing/2014/main" id="{2F642565-7D83-416E-A7D1-4FA3B48B83E1}"/>
+              </a:ext>
+            </a:extLst>
+          </p:cNvPr>
+          <p:cNvSpPr txBox="1"/>
+          <p:nvPr/>
+        </p:nvSpPr>
+        <p:spPr>
+          <a:xfrm>
+            <a:off x="7540282" y="2610683"/>
+            <a:ext cx="4487594" cy="3693319"/>
+          </a:xfrm>
+          <a:prstGeom prst="rect">
+            <a:avLst/>
+          </a:prstGeom>
+          <a:noFill/>
+        </p:spPr>
+        <p:txBody>
+          <a:bodyPr wrap="square" rtlCol="1">
+            <a:spAutoFit/>
+          </a:bodyPr>
+          <a:lstStyle/>
+          <a:p>
+            <a:pPr marL="285750" indent="-285750" algn="r" rtl="1">
+              <a:buFont typeface="Arial" panose="020B0604020202020204" pitchFamily="34" charset="0"/>
+              <a:buChar char="•"/>
+            </a:pPr>
+            <a:r>
+              <a:rPr lang="he-IL" dirty="0"/>
+              <a:t>כפתור ההתחברות וההרשמה דומים ויכולים לגרום לבלבול בזמן ההתחברות.</a:t>
+            </a:r>
+          </a:p>
+          <a:p>
+            <a:pPr marL="285750" indent="-285750" algn="r" rtl="1">
+              <a:buFont typeface="Arial" panose="020B0604020202020204" pitchFamily="34" charset="0"/>
+              <a:buChar char="•"/>
+            </a:pPr>
+            <a:r>
+              <a:rPr lang="he-IL" dirty="0"/>
+              <a:t>אין אפשרות לשחזור סיסמת המשתמש – </a:t>
+            </a:r>
+            <a:r>
+              <a:rPr lang="he-IL" b="1" dirty="0"/>
+              <a:t>שליטת משתמש וחופש פעולה.</a:t>
+            </a:r>
+            <a:endParaRPr lang="he-IL" dirty="0"/>
+          </a:p>
+          <a:p>
+            <a:pPr marL="285750" indent="-285750" algn="r" rtl="1">
+              <a:buFont typeface="Arial" panose="020B0604020202020204" pitchFamily="34" charset="0"/>
+              <a:buChar char="•"/>
+            </a:pPr>
+            <a:r>
+              <a:rPr lang="he-IL" dirty="0"/>
+              <a:t>אין חיווי המראה למשתמש היכן הוא ממלא את פרטיו – </a:t>
+            </a:r>
+            <a:r>
+              <a:rPr lang="he-IL" b="1" dirty="0"/>
+              <a:t>חיווי מצב המערכת.</a:t>
+            </a:r>
+            <a:endParaRPr lang="he-IL" dirty="0"/>
+          </a:p>
+          <a:p>
+            <a:pPr marL="285750" indent="-285750" algn="r" rtl="1">
+              <a:buFont typeface="Arial" panose="020B0604020202020204" pitchFamily="34" charset="0"/>
+              <a:buChar char="•"/>
+            </a:pPr>
+            <a:r>
+              <a:rPr lang="he-IL" dirty="0"/>
+              <a:t>אין סמלים\אייקונים שמאפיינים את שדות הקלט – </a:t>
+            </a:r>
+            <a:r>
+              <a:rPr lang="he-IL" b="1" dirty="0"/>
+              <a:t>זיהוי ולא זיכרון.</a:t>
+            </a:r>
+          </a:p>
+          <a:p>
+            <a:pPr marL="285750" indent="-285750" algn="r" rtl="1">
+              <a:buFont typeface="Arial" panose="020B0604020202020204" pitchFamily="34" charset="0"/>
+              <a:buChar char="•"/>
+            </a:pPr>
+            <a:r>
+              <a:rPr lang="he-IL" dirty="0"/>
+              <a:t>על המשתמש ללחוץ על כל שדה קלט עם העכבר על מנת להכניס את הפרטים – </a:t>
+            </a:r>
+            <a:r>
+              <a:rPr lang="he-IL" b="1" dirty="0"/>
+              <a:t>גמישות ויעילות שימוש.</a:t>
+            </a:r>
+          </a:p>
+          <a:p>
+            <a:pPr marL="285750" indent="-285750" algn="r" rtl="1">
+              <a:buFont typeface="Arial" panose="020B0604020202020204" pitchFamily="34" charset="0"/>
+              <a:buChar char="•"/>
+            </a:pPr>
+            <a:r>
+              <a:rPr lang="he-IL" dirty="0"/>
+              <a:t>אין אפשרות "זכור אותי" – </a:t>
+            </a:r>
+            <a:r>
+              <a:rPr lang="he-IL" b="1" dirty="0"/>
+              <a:t>גמישות ויעילות שימוש.</a:t>
+            </a:r>
+            <a:endParaRPr lang="he-IL" dirty="0"/>
+          </a:p>
+        </p:txBody>
+      </p:sp>
+    </p:spTree>
+    <p:extLst>
+      <p:ext uri="{BB962C8B-B14F-4D97-AF65-F5344CB8AC3E}">
+        <p14:creationId xmlns:p14="http://schemas.microsoft.com/office/powerpoint/2010/main" val="2576447696"/>
+      </p:ext>
+    </p:extLst>
+  </p:cSld>
+  <p:clrMapOvr>
+    <a:masterClrMapping/>
+  </p:clrMapOvr>
+</p:sld>
+</file>
+
+<file path=ppt/slides/slide50.xml><?xml version="1.0" encoding="utf-8"?>
 <p:sld xmlns:a="http://schemas.openxmlformats.org/drawingml/2006/main" xmlns:r="http://schemas.openxmlformats.org/officeDocument/2006/relationships" xmlns:p="http://schemas.openxmlformats.org/presentationml/2006/main">
   <p:cSld>
     <p:spTree>
@@ -21294,7 +21885,7 @@
 </p:sld>
 </file>
 
-<file path=ppt/slides/slide48.xml><?xml version="1.0" encoding="utf-8"?>
+<file path=ppt/slides/slide51.xml><?xml version="1.0" encoding="utf-8"?>
 <p:sld xmlns:a="http://schemas.openxmlformats.org/drawingml/2006/main" xmlns:r="http://schemas.openxmlformats.org/officeDocument/2006/relationships" xmlns:p="http://schemas.openxmlformats.org/presentationml/2006/main">
   <p:cSld>
     <p:spTree>
@@ -21833,7 +22424,7 @@
 </p:sld>
 </file>
 
-<file path=ppt/slides/slide49.xml><?xml version="1.0" encoding="utf-8"?>
+<file path=ppt/slides/slide52.xml><?xml version="1.0" encoding="utf-8"?>
 <p:sld xmlns:a="http://schemas.openxmlformats.org/drawingml/2006/main" xmlns:r="http://schemas.openxmlformats.org/officeDocument/2006/relationships" xmlns:p="http://schemas.openxmlformats.org/presentationml/2006/main">
   <p:cSld>
     <p:spTree>
@@ -22372,208 +22963,7 @@
 </p:sld>
 </file>
 
-<file path=ppt/slides/slide5.xml><?xml version="1.0" encoding="utf-8"?>
-<p:sld xmlns:a="http://schemas.openxmlformats.org/drawingml/2006/main" xmlns:r="http://schemas.openxmlformats.org/officeDocument/2006/relationships" xmlns:p="http://schemas.openxmlformats.org/presentationml/2006/main">
-  <p:cSld>
-    <p:spTree>
-      <p:nvGrpSpPr>
-        <p:cNvPr id="1" name=""/>
-        <p:cNvGrpSpPr/>
-        <p:nvPr/>
-      </p:nvGrpSpPr>
-      <p:grpSpPr>
-        <a:xfrm>
-          <a:off x="0" y="0"/>
-          <a:ext cx="0" cy="0"/>
-          <a:chOff x="0" y="0"/>
-          <a:chExt cx="0" cy="0"/>
-        </a:xfrm>
-      </p:grpSpPr>
-      <p:sp>
-        <p:nvSpPr>
-          <p:cNvPr id="2" name="כותרת 1">
-            <a:extLst>
-              <a:ext uri="{FF2B5EF4-FFF2-40B4-BE49-F238E27FC236}">
-                <a16:creationId xmlns:a16="http://schemas.microsoft.com/office/drawing/2014/main" id="{92A500EE-F6C5-4C79-92F1-D2FDEE8174A4}"/>
-              </a:ext>
-            </a:extLst>
-          </p:cNvPr>
-          <p:cNvSpPr>
-            <a:spLocks noGrp="1"/>
-          </p:cNvSpPr>
-          <p:nvPr>
-            <p:ph type="title"/>
-          </p:nvPr>
-        </p:nvSpPr>
-        <p:spPr/>
-        <p:txBody>
-          <a:bodyPr/>
-          <a:lstStyle/>
-          <a:p>
-            <a:pPr algn="ctr"/>
-            <a:r>
-              <a:rPr lang="he-IL" dirty="0"/>
-              <a:t>מסך התחברות</a:t>
-            </a:r>
-          </a:p>
-        </p:txBody>
-      </p:sp>
-      <p:pic>
-        <p:nvPicPr>
-          <p:cNvPr id="16" name="תמונה 15">
-            <a:extLst>
-              <a:ext uri="{FF2B5EF4-FFF2-40B4-BE49-F238E27FC236}">
-                <a16:creationId xmlns:a16="http://schemas.microsoft.com/office/drawing/2014/main" id="{4FD9B8E5-98A3-4C79-8EC6-1523FF6B0199}"/>
-              </a:ext>
-            </a:extLst>
-          </p:cNvPr>
-          <p:cNvPicPr>
-            <a:picLocks noChangeAspect="1"/>
-          </p:cNvPicPr>
-          <p:nvPr/>
-        </p:nvPicPr>
-        <p:blipFill>
-          <a:blip r:embed="rId2"/>
-          <a:stretch>
-            <a:fillRect/>
-          </a:stretch>
-        </p:blipFill>
-        <p:spPr>
-          <a:xfrm>
-            <a:off x="531944" y="2813539"/>
-            <a:ext cx="6851533" cy="3844516"/>
-          </a:xfrm>
-          <a:prstGeom prst="rect">
-            <a:avLst/>
-          </a:prstGeom>
-        </p:spPr>
-      </p:pic>
-      <p:sp>
-        <p:nvSpPr>
-          <p:cNvPr id="17" name="תיבת טקסט 16">
-            <a:extLst>
-              <a:ext uri="{FF2B5EF4-FFF2-40B4-BE49-F238E27FC236}">
-                <a16:creationId xmlns:a16="http://schemas.microsoft.com/office/drawing/2014/main" id="{2F642565-7D83-416E-A7D1-4FA3B48B83E1}"/>
-              </a:ext>
-            </a:extLst>
-          </p:cNvPr>
-          <p:cNvSpPr txBox="1"/>
-          <p:nvPr/>
-        </p:nvSpPr>
-        <p:spPr>
-          <a:xfrm>
-            <a:off x="7540282" y="2610683"/>
-            <a:ext cx="4487594" cy="3693319"/>
-          </a:xfrm>
-          <a:prstGeom prst="rect">
-            <a:avLst/>
-          </a:prstGeom>
-          <a:noFill/>
-        </p:spPr>
-        <p:txBody>
-          <a:bodyPr wrap="square" rtlCol="1">
-            <a:spAutoFit/>
-          </a:bodyPr>
-          <a:lstStyle/>
-          <a:p>
-            <a:pPr marL="285750" indent="-285750" algn="r" rtl="1">
-              <a:buFont typeface="Arial" panose="020B0604020202020204" pitchFamily="34" charset="0"/>
-              <a:buChar char="•"/>
-            </a:pPr>
-            <a:r>
-              <a:rPr lang="he-IL" dirty="0"/>
-              <a:t>כפתור ההתחברות וההרשמה דומים ויכולים לגרום לבלבול בזמן ההתחברות.</a:t>
-            </a:r>
-          </a:p>
-          <a:p>
-            <a:pPr marL="285750" indent="-285750" algn="r" rtl="1">
-              <a:buFont typeface="Arial" panose="020B0604020202020204" pitchFamily="34" charset="0"/>
-              <a:buChar char="•"/>
-            </a:pPr>
-            <a:r>
-              <a:rPr lang="he-IL" dirty="0"/>
-              <a:t>אין אפשרות לשחזור סיסמת המשתמש – </a:t>
-            </a:r>
-            <a:r>
-              <a:rPr lang="he-IL" b="1" dirty="0"/>
-              <a:t>שליטת משתמש וחופש פעולה.</a:t>
-            </a:r>
-            <a:endParaRPr lang="he-IL" dirty="0"/>
-          </a:p>
-          <a:p>
-            <a:pPr marL="285750" indent="-285750" algn="r" rtl="1">
-              <a:buFont typeface="Arial" panose="020B0604020202020204" pitchFamily="34" charset="0"/>
-              <a:buChar char="•"/>
-            </a:pPr>
-            <a:r>
-              <a:rPr lang="he-IL" dirty="0"/>
-              <a:t>אין חיווי המראה למשתמש היכן הוא ממלא את פרטיו – </a:t>
-            </a:r>
-            <a:r>
-              <a:rPr lang="he-IL" b="1" dirty="0"/>
-              <a:t>חיווי מצב המערכת.</a:t>
-            </a:r>
-            <a:endParaRPr lang="he-IL" dirty="0"/>
-          </a:p>
-          <a:p>
-            <a:pPr marL="285750" indent="-285750" algn="r" rtl="1">
-              <a:buFont typeface="Arial" panose="020B0604020202020204" pitchFamily="34" charset="0"/>
-              <a:buChar char="•"/>
-            </a:pPr>
-            <a:r>
-              <a:rPr lang="he-IL" dirty="0"/>
-              <a:t>אין סמלים\אייקונים שמאפיינים את שדות הקלט – </a:t>
-            </a:r>
-            <a:r>
-              <a:rPr lang="he-IL" b="1" dirty="0"/>
-              <a:t>זיהוי ולא זיכרון.</a:t>
-            </a:r>
-          </a:p>
-          <a:p>
-            <a:pPr marL="285750" indent="-285750" algn="r" rtl="1">
-              <a:buFont typeface="Arial" panose="020B0604020202020204" pitchFamily="34" charset="0"/>
-              <a:buChar char="•"/>
-            </a:pPr>
-            <a:r>
-              <a:rPr lang="he-IL" dirty="0"/>
-              <a:t>על המשתמש ללחוץ על כל שדה קלט עם העכבר על מנת להכניס את הפרטים – </a:t>
-            </a:r>
-            <a:r>
-              <a:rPr lang="he-IL" b="1" dirty="0"/>
-              <a:t>גמישות ויעילות שימוש.</a:t>
-            </a:r>
-          </a:p>
-          <a:p>
-            <a:pPr marL="285750" indent="-285750" algn="r" rtl="1">
-              <a:buFont typeface="Arial" panose="020B0604020202020204" pitchFamily="34" charset="0"/>
-              <a:buChar char="•"/>
-            </a:pPr>
-            <a:r>
-              <a:rPr lang="he-IL" dirty="0"/>
-              <a:t>אין אפשרות "זכור אותי" – </a:t>
-            </a:r>
-            <a:r>
-              <a:rPr lang="he-IL" b="1" dirty="0"/>
-              <a:t>גמישות ויעילות שימוש.</a:t>
-            </a:r>
-            <a:endParaRPr lang="he-IL" dirty="0"/>
-          </a:p>
-        </p:txBody>
-      </p:sp>
-    </p:spTree>
-    <p:extLst>
-      <p:ext uri="{BB962C8B-B14F-4D97-AF65-F5344CB8AC3E}">
-        <p14:creationId xmlns:p14="http://schemas.microsoft.com/office/powerpoint/2010/main" val="2576447696"/>
-      </p:ext>
-    </p:extLst>
-  </p:cSld>
-  <p:clrMapOvr>
-    <a:masterClrMapping/>
-  </p:clrMapOvr>
-</p:sld>
-</file>
-
-<file path=ppt/slides/slide50.xml><?xml version="1.0" encoding="utf-8"?>
+<file path=ppt/slides/slide53.xml><?xml version="1.0" encoding="utf-8"?>
 <p:sld xmlns:a="http://schemas.openxmlformats.org/drawingml/2006/main" xmlns:r="http://schemas.openxmlformats.org/officeDocument/2006/relationships" xmlns:p="http://schemas.openxmlformats.org/presentationml/2006/main">
   <p:cSld>
     <p:spTree>
@@ -23046,7 +23436,7 @@
 </p:sld>
 </file>
 
-<file path=ppt/slides/slide51.xml><?xml version="1.0" encoding="utf-8"?>
+<file path=ppt/slides/slide54.xml><?xml version="1.0" encoding="utf-8"?>
 <p:sld xmlns:a="http://schemas.openxmlformats.org/drawingml/2006/main" xmlns:r="http://schemas.openxmlformats.org/officeDocument/2006/relationships" xmlns:p="http://schemas.openxmlformats.org/presentationml/2006/main">
   <p:cSld>
     <p:spTree>
@@ -23670,7 +24060,7 @@
 </p:sld>
 </file>
 
-<file path=ppt/slides/slide52.xml><?xml version="1.0" encoding="utf-8"?>
+<file path=ppt/slides/slide55.xml><?xml version="1.0" encoding="utf-8"?>
 <p:sld xmlns:a="http://schemas.openxmlformats.org/drawingml/2006/main" xmlns:r="http://schemas.openxmlformats.org/officeDocument/2006/relationships" xmlns:p="http://schemas.openxmlformats.org/presentationml/2006/main">
   <p:cSld>
     <p:spTree>
@@ -24158,7 +24548,7 @@
 </p:sld>
 </file>
 
-<file path=ppt/slides/slide53.xml><?xml version="1.0" encoding="utf-8"?>
+<file path=ppt/slides/slide56.xml><?xml version="1.0" encoding="utf-8"?>
 <p:sld xmlns:a="http://schemas.openxmlformats.org/drawingml/2006/main" xmlns:r="http://schemas.openxmlformats.org/officeDocument/2006/relationships" xmlns:p="http://schemas.openxmlformats.org/presentationml/2006/main">
   <p:cSld>
     <p:spTree>
@@ -24574,7 +24964,7 @@
 </p:sld>
 </file>
 
-<file path=ppt/slides/slide54.xml><?xml version="1.0" encoding="utf-8"?>
+<file path=ppt/slides/slide57.xml><?xml version="1.0" encoding="utf-8"?>
 <p:sld xmlns:a="http://schemas.openxmlformats.org/drawingml/2006/main" xmlns:r="http://schemas.openxmlformats.org/officeDocument/2006/relationships" xmlns:p="http://schemas.openxmlformats.org/presentationml/2006/main">
   <p:cSld>
     <p:spTree>
@@ -25048,7 +25438,7 @@
 </p:sld>
 </file>
 
-<file path=ppt/slides/slide55.xml><?xml version="1.0" encoding="utf-8"?>
+<file path=ppt/slides/slide58.xml><?xml version="1.0" encoding="utf-8"?>
 <p:sld xmlns:a="http://schemas.openxmlformats.org/drawingml/2006/main" xmlns:r="http://schemas.openxmlformats.org/officeDocument/2006/relationships" xmlns:p="http://schemas.openxmlformats.org/presentationml/2006/main">
   <p:cSld>
     <p:spTree>
@@ -25553,7 +25943,7 @@
 </p:sld>
 </file>
 
-<file path=ppt/slides/slide56.xml><?xml version="1.0" encoding="utf-8"?>
+<file path=ppt/slides/slide59.xml><?xml version="1.0" encoding="utf-8"?>
 <p:sld xmlns:a="http://schemas.openxmlformats.org/drawingml/2006/main" xmlns:r="http://schemas.openxmlformats.org/officeDocument/2006/relationships" xmlns:p="http://schemas.openxmlformats.org/presentationml/2006/main">
   <p:cSld>
     <p:spTree>
@@ -25824,7 +26214,200 @@
 </p:sld>
 </file>
 
-<file path=ppt/slides/slide57.xml><?xml version="1.0" encoding="utf-8"?>
+<file path=ppt/slides/slide6.xml><?xml version="1.0" encoding="utf-8"?>
+<p:sld xmlns:a="http://schemas.openxmlformats.org/drawingml/2006/main" xmlns:r="http://schemas.openxmlformats.org/officeDocument/2006/relationships" xmlns:p="http://schemas.openxmlformats.org/presentationml/2006/main">
+  <p:cSld>
+    <p:spTree>
+      <p:nvGrpSpPr>
+        <p:cNvPr id="1" name=""/>
+        <p:cNvGrpSpPr/>
+        <p:nvPr/>
+      </p:nvGrpSpPr>
+      <p:grpSpPr>
+        <a:xfrm>
+          <a:off x="0" y="0"/>
+          <a:ext cx="0" cy="0"/>
+          <a:chOff x="0" y="0"/>
+          <a:chExt cx="0" cy="0"/>
+        </a:xfrm>
+      </p:grpSpPr>
+      <p:sp>
+        <p:nvSpPr>
+          <p:cNvPr id="2" name="כותרת 1">
+            <a:extLst>
+              <a:ext uri="{FF2B5EF4-FFF2-40B4-BE49-F238E27FC236}">
+                <a16:creationId xmlns:a16="http://schemas.microsoft.com/office/drawing/2014/main" id="{DE777293-170B-4164-A212-000191C56DFE}"/>
+              </a:ext>
+            </a:extLst>
+          </p:cNvPr>
+          <p:cNvSpPr>
+            <a:spLocks noGrp="1"/>
+          </p:cNvSpPr>
+          <p:nvPr>
+            <p:ph type="title"/>
+          </p:nvPr>
+        </p:nvSpPr>
+        <p:spPr/>
+        <p:txBody>
+          <a:bodyPr/>
+          <a:lstStyle/>
+          <a:p>
+            <a:pPr algn="ctr" rtl="1"/>
+            <a:r>
+              <a:rPr lang="he-IL"/>
+              <a:t>מסך </a:t>
+            </a:r>
+            <a:r>
+              <a:rPr lang="he-IL" dirty="0"/>
+              <a:t>הרשמה</a:t>
+            </a:r>
+          </a:p>
+        </p:txBody>
+      </p:sp>
+      <p:pic>
+        <p:nvPicPr>
+          <p:cNvPr id="4" name="תמונה 3">
+            <a:extLst>
+              <a:ext uri="{FF2B5EF4-FFF2-40B4-BE49-F238E27FC236}">
+                <a16:creationId xmlns:a16="http://schemas.microsoft.com/office/drawing/2014/main" id="{2B8550E2-EBB3-4A16-B677-A16EF0998913}"/>
+              </a:ext>
+            </a:extLst>
+          </p:cNvPr>
+          <p:cNvPicPr>
+            <a:picLocks noChangeAspect="1"/>
+          </p:cNvPicPr>
+          <p:nvPr/>
+        </p:nvPicPr>
+        <p:blipFill>
+          <a:blip r:embed="rId2"/>
+          <a:stretch>
+            <a:fillRect/>
+          </a:stretch>
+        </p:blipFill>
+        <p:spPr>
+          <a:xfrm>
+            <a:off x="331177" y="2477527"/>
+            <a:ext cx="7434189" cy="4212128"/>
+          </a:xfrm>
+          <a:prstGeom prst="rect">
+            <a:avLst/>
+          </a:prstGeom>
+        </p:spPr>
+      </p:pic>
+      <p:sp>
+        <p:nvSpPr>
+          <p:cNvPr id="5" name="תיבת טקסט 4">
+            <a:extLst>
+              <a:ext uri="{FF2B5EF4-FFF2-40B4-BE49-F238E27FC236}">
+                <a16:creationId xmlns:a16="http://schemas.microsoft.com/office/drawing/2014/main" id="{49C1F48E-4344-478F-B955-03346A467B7E}"/>
+              </a:ext>
+            </a:extLst>
+          </p:cNvPr>
+          <p:cNvSpPr txBox="1"/>
+          <p:nvPr/>
+        </p:nvSpPr>
+        <p:spPr>
+          <a:xfrm>
+            <a:off x="7919696" y="2477527"/>
+            <a:ext cx="4121834" cy="3139321"/>
+          </a:xfrm>
+          <a:prstGeom prst="rect">
+            <a:avLst/>
+          </a:prstGeom>
+          <a:noFill/>
+        </p:spPr>
+        <p:txBody>
+          <a:bodyPr wrap="square" rtlCol="1">
+            <a:spAutoFit/>
+          </a:bodyPr>
+          <a:lstStyle/>
+          <a:p>
+            <a:pPr marL="285750" indent="-285750" algn="r" rtl="1">
+              <a:buFont typeface="Arial" panose="020B0604020202020204" pitchFamily="34" charset="0"/>
+              <a:buChar char="•"/>
+            </a:pPr>
+            <a:r>
+              <a:rPr lang="he-IL" dirty="0"/>
+              <a:t>אין כפתור חזרה למסך ההתחברות – </a:t>
+            </a:r>
+            <a:r>
+              <a:rPr lang="he-IL" b="1" dirty="0"/>
+              <a:t>שליטת משתמש וחופש פעולה.</a:t>
+            </a:r>
+          </a:p>
+          <a:p>
+            <a:pPr marL="285750" indent="-285750" algn="r" rtl="1">
+              <a:buFont typeface="Arial" panose="020B0604020202020204" pitchFamily="34" charset="0"/>
+              <a:buChar char="•"/>
+            </a:pPr>
+            <a:r>
+              <a:rPr lang="he-IL" dirty="0"/>
+              <a:t>אין שדה לאימות סיסמה בשנית – </a:t>
+            </a:r>
+            <a:r>
+              <a:rPr lang="he-IL" b="1" dirty="0"/>
+              <a:t>מניעת טעויות.</a:t>
+            </a:r>
+          </a:p>
+          <a:p>
+            <a:pPr marL="285750" indent="-285750" algn="r" rtl="1">
+              <a:buFont typeface="Arial" panose="020B0604020202020204" pitchFamily="34" charset="0"/>
+              <a:buChar char="•"/>
+            </a:pPr>
+            <a:r>
+              <a:rPr lang="he-IL" dirty="0"/>
+              <a:t>אין חיווי למשתמש לגביי מה הדרישות לסיסמה תקינה – </a:t>
+            </a:r>
+            <a:r>
+              <a:rPr lang="he-IL" b="1" dirty="0"/>
+              <a:t>עזרה ומסמכים.</a:t>
+            </a:r>
+            <a:endParaRPr lang="he-IL" dirty="0"/>
+          </a:p>
+          <a:p>
+            <a:pPr marL="285750" indent="-285750" algn="r" rtl="1">
+              <a:buFont typeface="Arial" panose="020B0604020202020204" pitchFamily="34" charset="0"/>
+              <a:buChar char="•"/>
+            </a:pPr>
+            <a:r>
+              <a:rPr lang="he-IL" dirty="0"/>
+              <a:t>אין ולידציה בעת מילוי האימייל (לפני לחיצת כפתור "הירשם") או תבנית של אימייל המונעות טעויות – </a:t>
+            </a:r>
+            <a:r>
+              <a:rPr lang="he-IL" b="1" dirty="0"/>
+              <a:t>מניעת טעויות.</a:t>
+            </a:r>
+          </a:p>
+          <a:p>
+            <a:pPr marL="285750" indent="-285750" algn="r" rtl="1">
+              <a:buFont typeface="Arial" panose="020B0604020202020204" pitchFamily="34" charset="0"/>
+              <a:buChar char="•"/>
+            </a:pPr>
+            <a:r>
+              <a:rPr lang="he-IL" dirty="0"/>
+              <a:t>אין סימון ברירת מחדל של מין –</a:t>
+            </a:r>
+            <a:r>
+              <a:rPr lang="he-IL" b="1" dirty="0"/>
+              <a:t> מניעת טעויות.</a:t>
+            </a:r>
+          </a:p>
+        </p:txBody>
+      </p:sp>
+    </p:spTree>
+    <p:extLst>
+      <p:ext uri="{BB962C8B-B14F-4D97-AF65-F5344CB8AC3E}">
+        <p14:creationId xmlns:p14="http://schemas.microsoft.com/office/powerpoint/2010/main" val="2598648921"/>
+      </p:ext>
+    </p:extLst>
+  </p:cSld>
+  <p:clrMapOvr>
+    <a:masterClrMapping/>
+  </p:clrMapOvr>
+</p:sld>
+</file>
+
+<file path=ppt/slides/slide60.xml><?xml version="1.0" encoding="utf-8"?>
 <p:sld xmlns:a="http://schemas.openxmlformats.org/drawingml/2006/main" xmlns:r="http://schemas.openxmlformats.org/officeDocument/2006/relationships" xmlns:p="http://schemas.openxmlformats.org/presentationml/2006/main">
   <p:cSld>
     <p:spTree>
@@ -26099,7 +26682,7 @@
 </p:sld>
 </file>
 
-<file path=ppt/slides/slide58.xml><?xml version="1.0" encoding="utf-8"?>
+<file path=ppt/slides/slide61.xml><?xml version="1.0" encoding="utf-8"?>
 <p:sld xmlns:a="http://schemas.openxmlformats.org/drawingml/2006/main" xmlns:r="http://schemas.openxmlformats.org/officeDocument/2006/relationships" xmlns:p="http://schemas.openxmlformats.org/presentationml/2006/main">
   <p:cSld>
     <p:spTree>
@@ -26171,7 +26754,7 @@
 </p:sld>
 </file>
 
-<file path=ppt/slides/slide59.xml><?xml version="1.0" encoding="utf-8"?>
+<file path=ppt/slides/slide62.xml><?xml version="1.0" encoding="utf-8"?>
 <p:sld xmlns:a="http://schemas.openxmlformats.org/drawingml/2006/main" xmlns:r="http://schemas.openxmlformats.org/officeDocument/2006/relationships" xmlns:p="http://schemas.openxmlformats.org/presentationml/2006/main">
   <p:cSld>
     <p:spTree>
@@ -27644,200 +28227,7 @@
 </p:sld>
 </file>
 
-<file path=ppt/slides/slide6.xml><?xml version="1.0" encoding="utf-8"?>
-<p:sld xmlns:a="http://schemas.openxmlformats.org/drawingml/2006/main" xmlns:r="http://schemas.openxmlformats.org/officeDocument/2006/relationships" xmlns:p="http://schemas.openxmlformats.org/presentationml/2006/main">
-  <p:cSld>
-    <p:spTree>
-      <p:nvGrpSpPr>
-        <p:cNvPr id="1" name=""/>
-        <p:cNvGrpSpPr/>
-        <p:nvPr/>
-      </p:nvGrpSpPr>
-      <p:grpSpPr>
-        <a:xfrm>
-          <a:off x="0" y="0"/>
-          <a:ext cx="0" cy="0"/>
-          <a:chOff x="0" y="0"/>
-          <a:chExt cx="0" cy="0"/>
-        </a:xfrm>
-      </p:grpSpPr>
-      <p:sp>
-        <p:nvSpPr>
-          <p:cNvPr id="2" name="כותרת 1">
-            <a:extLst>
-              <a:ext uri="{FF2B5EF4-FFF2-40B4-BE49-F238E27FC236}">
-                <a16:creationId xmlns:a16="http://schemas.microsoft.com/office/drawing/2014/main" id="{DE777293-170B-4164-A212-000191C56DFE}"/>
-              </a:ext>
-            </a:extLst>
-          </p:cNvPr>
-          <p:cNvSpPr>
-            <a:spLocks noGrp="1"/>
-          </p:cNvSpPr>
-          <p:nvPr>
-            <p:ph type="title"/>
-          </p:nvPr>
-        </p:nvSpPr>
-        <p:spPr/>
-        <p:txBody>
-          <a:bodyPr/>
-          <a:lstStyle/>
-          <a:p>
-            <a:pPr algn="ctr" rtl="1"/>
-            <a:r>
-              <a:rPr lang="he-IL"/>
-              <a:t>מסך </a:t>
-            </a:r>
-            <a:r>
-              <a:rPr lang="he-IL" dirty="0"/>
-              <a:t>הרשמה</a:t>
-            </a:r>
-          </a:p>
-        </p:txBody>
-      </p:sp>
-      <p:pic>
-        <p:nvPicPr>
-          <p:cNvPr id="4" name="תמונה 3">
-            <a:extLst>
-              <a:ext uri="{FF2B5EF4-FFF2-40B4-BE49-F238E27FC236}">
-                <a16:creationId xmlns:a16="http://schemas.microsoft.com/office/drawing/2014/main" id="{2B8550E2-EBB3-4A16-B677-A16EF0998913}"/>
-              </a:ext>
-            </a:extLst>
-          </p:cNvPr>
-          <p:cNvPicPr>
-            <a:picLocks noChangeAspect="1"/>
-          </p:cNvPicPr>
-          <p:nvPr/>
-        </p:nvPicPr>
-        <p:blipFill>
-          <a:blip r:embed="rId2"/>
-          <a:stretch>
-            <a:fillRect/>
-          </a:stretch>
-        </p:blipFill>
-        <p:spPr>
-          <a:xfrm>
-            <a:off x="331177" y="2477527"/>
-            <a:ext cx="7434189" cy="4212128"/>
-          </a:xfrm>
-          <a:prstGeom prst="rect">
-            <a:avLst/>
-          </a:prstGeom>
-        </p:spPr>
-      </p:pic>
-      <p:sp>
-        <p:nvSpPr>
-          <p:cNvPr id="5" name="תיבת טקסט 4">
-            <a:extLst>
-              <a:ext uri="{FF2B5EF4-FFF2-40B4-BE49-F238E27FC236}">
-                <a16:creationId xmlns:a16="http://schemas.microsoft.com/office/drawing/2014/main" id="{49C1F48E-4344-478F-B955-03346A467B7E}"/>
-              </a:ext>
-            </a:extLst>
-          </p:cNvPr>
-          <p:cNvSpPr txBox="1"/>
-          <p:nvPr/>
-        </p:nvSpPr>
-        <p:spPr>
-          <a:xfrm>
-            <a:off x="7919696" y="2477527"/>
-            <a:ext cx="4121834" cy="3139321"/>
-          </a:xfrm>
-          <a:prstGeom prst="rect">
-            <a:avLst/>
-          </a:prstGeom>
-          <a:noFill/>
-        </p:spPr>
-        <p:txBody>
-          <a:bodyPr wrap="square" rtlCol="1">
-            <a:spAutoFit/>
-          </a:bodyPr>
-          <a:lstStyle/>
-          <a:p>
-            <a:pPr marL="285750" indent="-285750" algn="r" rtl="1">
-              <a:buFont typeface="Arial" panose="020B0604020202020204" pitchFamily="34" charset="0"/>
-              <a:buChar char="•"/>
-            </a:pPr>
-            <a:r>
-              <a:rPr lang="he-IL" dirty="0"/>
-              <a:t>אין כפתור חזרה למסך ההתחברות – </a:t>
-            </a:r>
-            <a:r>
-              <a:rPr lang="he-IL" b="1" dirty="0"/>
-              <a:t>שליטת משתמש וחופש פעולה.</a:t>
-            </a:r>
-          </a:p>
-          <a:p>
-            <a:pPr marL="285750" indent="-285750" algn="r" rtl="1">
-              <a:buFont typeface="Arial" panose="020B0604020202020204" pitchFamily="34" charset="0"/>
-              <a:buChar char="•"/>
-            </a:pPr>
-            <a:r>
-              <a:rPr lang="he-IL" dirty="0"/>
-              <a:t>אין שדה לאימות סיסמה בשנית – </a:t>
-            </a:r>
-            <a:r>
-              <a:rPr lang="he-IL" b="1" dirty="0"/>
-              <a:t>מניעת טעויות.</a:t>
-            </a:r>
-          </a:p>
-          <a:p>
-            <a:pPr marL="285750" indent="-285750" algn="r" rtl="1">
-              <a:buFont typeface="Arial" panose="020B0604020202020204" pitchFamily="34" charset="0"/>
-              <a:buChar char="•"/>
-            </a:pPr>
-            <a:r>
-              <a:rPr lang="he-IL" dirty="0"/>
-              <a:t>אין חיווי למשתמש לגביי מה הדרישות לסיסמה תקינה – </a:t>
-            </a:r>
-            <a:r>
-              <a:rPr lang="he-IL" b="1" dirty="0"/>
-              <a:t>עזרה ומסמכים.</a:t>
-            </a:r>
-            <a:endParaRPr lang="he-IL" dirty="0"/>
-          </a:p>
-          <a:p>
-            <a:pPr marL="285750" indent="-285750" algn="r" rtl="1">
-              <a:buFont typeface="Arial" panose="020B0604020202020204" pitchFamily="34" charset="0"/>
-              <a:buChar char="•"/>
-            </a:pPr>
-            <a:r>
-              <a:rPr lang="he-IL" dirty="0"/>
-              <a:t>אין ולידציה בעת מילוי האימייל (לפני לחיצת כפתור "הירשם") או תבנית של אימייל המונעות טעויות – </a:t>
-            </a:r>
-            <a:r>
-              <a:rPr lang="he-IL" b="1" dirty="0"/>
-              <a:t>מניעת טעויות.</a:t>
-            </a:r>
-          </a:p>
-          <a:p>
-            <a:pPr marL="285750" indent="-285750" algn="r" rtl="1">
-              <a:buFont typeface="Arial" panose="020B0604020202020204" pitchFamily="34" charset="0"/>
-              <a:buChar char="•"/>
-            </a:pPr>
-            <a:r>
-              <a:rPr lang="he-IL" dirty="0"/>
-              <a:t>אין סימון ברירת מחדל של מין –</a:t>
-            </a:r>
-            <a:r>
-              <a:rPr lang="he-IL" b="1" dirty="0"/>
-              <a:t> מניעת טעויות.</a:t>
-            </a:r>
-          </a:p>
-        </p:txBody>
-      </p:sp>
-    </p:spTree>
-    <p:extLst>
-      <p:ext uri="{BB962C8B-B14F-4D97-AF65-F5344CB8AC3E}">
-        <p14:creationId xmlns:p14="http://schemas.microsoft.com/office/powerpoint/2010/main" val="2598648921"/>
-      </p:ext>
-    </p:extLst>
-  </p:cSld>
-  <p:clrMapOvr>
-    <a:masterClrMapping/>
-  </p:clrMapOvr>
-</p:sld>
-</file>
-
-<file path=ppt/slides/slide60.xml><?xml version="1.0" encoding="utf-8"?>
+<file path=ppt/slides/slide63.xml><?xml version="1.0" encoding="utf-8"?>
 <p:sld xmlns:a="http://schemas.openxmlformats.org/drawingml/2006/main" xmlns:r="http://schemas.openxmlformats.org/officeDocument/2006/relationships" xmlns:p="http://schemas.openxmlformats.org/presentationml/2006/main">
   <p:cSld>
     <p:spTree>
@@ -29704,7 +30094,7 @@
 </p:sld>
 </file>
 
-<file path=ppt/slides/slide61.xml><?xml version="1.0" encoding="utf-8"?>
+<file path=ppt/slides/slide64.xml><?xml version="1.0" encoding="utf-8"?>
 <p:sld xmlns:a="http://schemas.openxmlformats.org/drawingml/2006/main" xmlns:r="http://schemas.openxmlformats.org/officeDocument/2006/relationships" xmlns:p="http://schemas.openxmlformats.org/presentationml/2006/main">
   <p:cSld>
     <p:spTree>
@@ -29769,7 +30159,7 @@
 </p:sld>
 </file>
 
-<file path=ppt/slides/slide62.xml><?xml version="1.0" encoding="utf-8"?>
+<file path=ppt/slides/slide65.xml><?xml version="1.0" encoding="utf-8"?>
 <p:sld xmlns:a="http://schemas.openxmlformats.org/drawingml/2006/main" xmlns:r="http://schemas.openxmlformats.org/officeDocument/2006/relationships" xmlns:p="http://schemas.openxmlformats.org/presentationml/2006/main">
   <p:cSld>
     <p:spTree>
@@ -30558,7 +30948,7 @@
 </p:sld>
 </file>
 
-<file path=ppt/slides/slide63.xml><?xml version="1.0" encoding="utf-8"?>
+<file path=ppt/slides/slide66.xml><?xml version="1.0" encoding="utf-8"?>
 <p:sld xmlns:a="http://schemas.openxmlformats.org/drawingml/2006/main" xmlns:r="http://schemas.openxmlformats.org/officeDocument/2006/relationships" xmlns:p="http://schemas.openxmlformats.org/presentationml/2006/main">
   <p:cSld>
     <p:spTree>
@@ -32067,7 +32457,7 @@
 </p:sld>
 </file>
 
-<file path=ppt/slides/slide64.xml><?xml version="1.0" encoding="utf-8"?>
+<file path=ppt/slides/slide67.xml><?xml version="1.0" encoding="utf-8"?>
 <p:sld xmlns:a="http://schemas.openxmlformats.org/drawingml/2006/main" xmlns:r="http://schemas.openxmlformats.org/officeDocument/2006/relationships" xmlns:p="http://schemas.openxmlformats.org/presentationml/2006/main">
   <p:cSld>
     <p:spTree>
@@ -32130,812 +32520,6 @@
     <p:extLst>
       <p:ext uri="{BB962C8B-B14F-4D97-AF65-F5344CB8AC3E}">
         <p14:creationId xmlns:p14="http://schemas.microsoft.com/office/powerpoint/2010/main" val="1412135787"/>
-      </p:ext>
-    </p:extLst>
-  </p:cSld>
-  <p:clrMapOvr>
-    <a:masterClrMapping/>
-  </p:clrMapOvr>
-</p:sld>
-</file>
-
-<file path=ppt/slides/slide65.xml><?xml version="1.0" encoding="utf-8"?>
-<p:sld xmlns:a="http://schemas.openxmlformats.org/drawingml/2006/main" xmlns:r="http://schemas.openxmlformats.org/officeDocument/2006/relationships" xmlns:p="http://schemas.openxmlformats.org/presentationml/2006/main">
-  <p:cSld>
-    <p:spTree>
-      <p:nvGrpSpPr>
-        <p:cNvPr id="1" name=""/>
-        <p:cNvGrpSpPr/>
-        <p:nvPr/>
-      </p:nvGrpSpPr>
-      <p:grpSpPr>
-        <a:xfrm>
-          <a:off x="0" y="0"/>
-          <a:ext cx="0" cy="0"/>
-          <a:chOff x="0" y="0"/>
-          <a:chExt cx="0" cy="0"/>
-        </a:xfrm>
-      </p:grpSpPr>
-      <p:sp>
-        <p:nvSpPr>
-          <p:cNvPr id="2" name="Title 1">
-            <a:extLst>
-              <a:ext uri="{FF2B5EF4-FFF2-40B4-BE49-F238E27FC236}">
-                <a16:creationId xmlns:a16="http://schemas.microsoft.com/office/drawing/2014/main" id="{F2E75ACD-C303-46DD-8FB4-27FC6A409857}"/>
-              </a:ext>
-            </a:extLst>
-          </p:cNvPr>
-          <p:cNvSpPr>
-            <a:spLocks noGrp="1"/>
-          </p:cNvSpPr>
-          <p:nvPr>
-            <p:ph type="title"/>
-          </p:nvPr>
-        </p:nvSpPr>
-        <p:spPr/>
-        <p:txBody>
-          <a:bodyPr/>
-          <a:lstStyle/>
-          <a:p>
-            <a:pPr algn="ctr"/>
-            <a:r>
-              <a:rPr lang="he-IL" sz="4800" dirty="0"/>
-              <a:t>ארכיטקטורת מידע</a:t>
-            </a:r>
-            <a:endParaRPr lang="en-US" sz="4800" dirty="0"/>
-          </a:p>
-        </p:txBody>
-      </p:sp>
-      <p:sp>
-        <p:nvSpPr>
-          <p:cNvPr id="18" name="תיבת טקסט 17">
-            <a:extLst>
-              <a:ext uri="{FF2B5EF4-FFF2-40B4-BE49-F238E27FC236}">
-                <a16:creationId xmlns:a16="http://schemas.microsoft.com/office/drawing/2014/main" id="{8D31B842-4145-4258-9806-37E51F29916E}"/>
-              </a:ext>
-            </a:extLst>
-          </p:cNvPr>
-          <p:cNvSpPr txBox="1"/>
-          <p:nvPr/>
-        </p:nvSpPr>
-        <p:spPr>
-          <a:xfrm>
-            <a:off x="7919696" y="2534088"/>
-            <a:ext cx="4121834" cy="1754326"/>
-          </a:xfrm>
-          <a:prstGeom prst="rect">
-            <a:avLst/>
-          </a:prstGeom>
-          <a:noFill/>
-        </p:spPr>
-        <p:txBody>
-          <a:bodyPr wrap="square" rtlCol="1">
-            <a:spAutoFit/>
-          </a:bodyPr>
-          <a:lstStyle/>
-          <a:p>
-            <a:pPr marL="285750" indent="-285750" algn="r" rtl="1">
-              <a:buFont typeface="Arial" panose="020B0604020202020204" pitchFamily="34" charset="0"/>
-              <a:buChar char="•"/>
-            </a:pPr>
-            <a:r>
-              <a:rPr lang="he-IL" dirty="0"/>
-              <a:t>המערכת שלנו משתמשת בעיקר בארגון מידע כרונולוגי, מכיוון שהמערכת מתעסקת בפגישות, חשוב למשתמש לראות את הפגישות והאילוצים שלו לפי ציר זמן מסוים אשר מאפשר לו ניהול קל של פגישותיו.</a:t>
-            </a:r>
-          </a:p>
-        </p:txBody>
-      </p:sp>
-      <p:pic>
-        <p:nvPicPr>
-          <p:cNvPr id="19" name="תמונה 18">
-            <a:extLst>
-              <a:ext uri="{FF2B5EF4-FFF2-40B4-BE49-F238E27FC236}">
-                <a16:creationId xmlns:a16="http://schemas.microsoft.com/office/drawing/2014/main" id="{87AAD36D-EE7B-4176-9B99-0EEC6B084F75}"/>
-              </a:ext>
-            </a:extLst>
-          </p:cNvPr>
-          <p:cNvPicPr>
-            <a:picLocks noChangeAspect="1"/>
-          </p:cNvPicPr>
-          <p:nvPr/>
-        </p:nvPicPr>
-        <p:blipFill>
-          <a:blip r:embed="rId2"/>
-          <a:stretch>
-            <a:fillRect/>
-          </a:stretch>
-        </p:blipFill>
-        <p:spPr>
-          <a:xfrm>
-            <a:off x="150470" y="2400030"/>
-            <a:ext cx="7642893" cy="3139322"/>
-          </a:xfrm>
-          <a:prstGeom prst="rect">
-            <a:avLst/>
-          </a:prstGeom>
-        </p:spPr>
-      </p:pic>
-      <p:cxnSp>
-        <p:nvCxnSpPr>
-          <p:cNvPr id="6" name="מחבר חץ ישר 5">
-            <a:extLst>
-              <a:ext uri="{FF2B5EF4-FFF2-40B4-BE49-F238E27FC236}">
-                <a16:creationId xmlns:a16="http://schemas.microsoft.com/office/drawing/2014/main" id="{217F64C3-70A6-4928-B05A-2BDDDF39AEB0}"/>
-              </a:ext>
-            </a:extLst>
-          </p:cNvPr>
-          <p:cNvCxnSpPr/>
-          <p:nvPr/>
-        </p:nvCxnSpPr>
-        <p:spPr>
-          <a:xfrm>
-            <a:off x="3910818" y="3429000"/>
-            <a:ext cx="0" cy="1793795"/>
-          </a:xfrm>
-          <a:prstGeom prst="straightConnector1">
-            <a:avLst/>
-          </a:prstGeom>
-          <a:ln>
-            <a:tailEnd type="triangle"/>
-          </a:ln>
-        </p:spPr>
-        <p:style>
-          <a:lnRef idx="1">
-            <a:schemeClr val="accent1"/>
-          </a:lnRef>
-          <a:fillRef idx="0">
-            <a:schemeClr val="accent1"/>
-          </a:fillRef>
-          <a:effectRef idx="0">
-            <a:schemeClr val="accent1"/>
-          </a:effectRef>
-          <a:fontRef idx="minor">
-            <a:schemeClr val="tx1"/>
-          </a:fontRef>
-        </p:style>
-      </p:cxnSp>
-      <p:sp>
-        <p:nvSpPr>
-          <p:cNvPr id="7" name="תיבת טקסט 6">
-            <a:extLst>
-              <a:ext uri="{FF2B5EF4-FFF2-40B4-BE49-F238E27FC236}">
-                <a16:creationId xmlns:a16="http://schemas.microsoft.com/office/drawing/2014/main" id="{2F2F805E-428B-48F0-BB48-EFDFA9157D27}"/>
-              </a:ext>
-            </a:extLst>
-          </p:cNvPr>
-          <p:cNvSpPr txBox="1"/>
-          <p:nvPr/>
-        </p:nvSpPr>
-        <p:spPr>
-          <a:xfrm>
-            <a:off x="1856942" y="3334044"/>
-            <a:ext cx="1927544" cy="1200329"/>
-          </a:xfrm>
-          <a:prstGeom prst="rect">
-            <a:avLst/>
-          </a:prstGeom>
-          <a:noFill/>
-        </p:spPr>
-        <p:txBody>
-          <a:bodyPr wrap="square" rtlCol="1">
-            <a:spAutoFit/>
-          </a:bodyPr>
-          <a:lstStyle/>
-          <a:p>
-            <a:pPr algn="r"/>
-            <a:r>
-              <a:rPr lang="he-IL" dirty="0"/>
-              <a:t>הפגישות ממוינות מהפגישה הקרובה ביותר לרחוקה ביותר</a:t>
-            </a:r>
-          </a:p>
-        </p:txBody>
-      </p:sp>
-    </p:spTree>
-    <p:extLst>
-      <p:ext uri="{BB962C8B-B14F-4D97-AF65-F5344CB8AC3E}">
-        <p14:creationId xmlns:p14="http://schemas.microsoft.com/office/powerpoint/2010/main" val="971213103"/>
-      </p:ext>
-    </p:extLst>
-  </p:cSld>
-  <p:clrMapOvr>
-    <a:masterClrMapping/>
-  </p:clrMapOvr>
-</p:sld>
-</file>
-
-<file path=ppt/slides/slide66.xml><?xml version="1.0" encoding="utf-8"?>
-<p:sld xmlns:a="http://schemas.openxmlformats.org/drawingml/2006/main" xmlns:r="http://schemas.openxmlformats.org/officeDocument/2006/relationships" xmlns:p="http://schemas.openxmlformats.org/presentationml/2006/main">
-  <p:cSld>
-    <p:spTree>
-      <p:nvGrpSpPr>
-        <p:cNvPr id="1" name=""/>
-        <p:cNvGrpSpPr/>
-        <p:nvPr/>
-      </p:nvGrpSpPr>
-      <p:grpSpPr>
-        <a:xfrm>
-          <a:off x="0" y="0"/>
-          <a:ext cx="0" cy="0"/>
-          <a:chOff x="0" y="0"/>
-          <a:chExt cx="0" cy="0"/>
-        </a:xfrm>
-      </p:grpSpPr>
-      <p:sp>
-        <p:nvSpPr>
-          <p:cNvPr id="2" name="Title 1">
-            <a:extLst>
-              <a:ext uri="{FF2B5EF4-FFF2-40B4-BE49-F238E27FC236}">
-                <a16:creationId xmlns:a16="http://schemas.microsoft.com/office/drawing/2014/main" id="{F2E75ACD-C303-46DD-8FB4-27FC6A409857}"/>
-              </a:ext>
-            </a:extLst>
-          </p:cNvPr>
-          <p:cNvSpPr>
-            <a:spLocks noGrp="1"/>
-          </p:cNvSpPr>
-          <p:nvPr>
-            <p:ph type="title"/>
-          </p:nvPr>
-        </p:nvSpPr>
-        <p:spPr/>
-        <p:txBody>
-          <a:bodyPr/>
-          <a:lstStyle/>
-          <a:p>
-            <a:pPr algn="ctr"/>
-            <a:r>
-              <a:rPr lang="he-IL" sz="4800" dirty="0"/>
-              <a:t>ארכיטקטורת מידע</a:t>
-            </a:r>
-            <a:endParaRPr lang="en-US" sz="4800" dirty="0"/>
-          </a:p>
-        </p:txBody>
-      </p:sp>
-      <p:pic>
-        <p:nvPicPr>
-          <p:cNvPr id="3" name="תמונה 2">
-            <a:extLst>
-              <a:ext uri="{FF2B5EF4-FFF2-40B4-BE49-F238E27FC236}">
-                <a16:creationId xmlns:a16="http://schemas.microsoft.com/office/drawing/2014/main" id="{A55282CC-442F-4983-9221-06D6A8EDAF5D}"/>
-              </a:ext>
-            </a:extLst>
-          </p:cNvPr>
-          <p:cNvPicPr>
-            <a:picLocks noChangeAspect="1"/>
-          </p:cNvPicPr>
-          <p:nvPr/>
-        </p:nvPicPr>
-        <p:blipFill>
-          <a:blip r:embed="rId2"/>
-          <a:stretch>
-            <a:fillRect/>
-          </a:stretch>
-        </p:blipFill>
-        <p:spPr>
-          <a:xfrm>
-            <a:off x="0" y="2257425"/>
-            <a:ext cx="8210550" cy="4600575"/>
-          </a:xfrm>
-          <a:prstGeom prst="rect">
-            <a:avLst/>
-          </a:prstGeom>
-        </p:spPr>
-      </p:pic>
-      <p:sp>
-        <p:nvSpPr>
-          <p:cNvPr id="12" name="תיבת טקסט 11">
-            <a:extLst>
-              <a:ext uri="{FF2B5EF4-FFF2-40B4-BE49-F238E27FC236}">
-                <a16:creationId xmlns:a16="http://schemas.microsoft.com/office/drawing/2014/main" id="{77AF2D51-D00C-40F2-9B31-0894F6F09F0E}"/>
-              </a:ext>
-            </a:extLst>
-          </p:cNvPr>
-          <p:cNvSpPr txBox="1"/>
-          <p:nvPr/>
-        </p:nvSpPr>
-        <p:spPr>
-          <a:xfrm>
-            <a:off x="8361020" y="2257425"/>
-            <a:ext cx="3830980" cy="923330"/>
-          </a:xfrm>
-          <a:prstGeom prst="rect">
-            <a:avLst/>
-          </a:prstGeom>
-          <a:noFill/>
-        </p:spPr>
-        <p:txBody>
-          <a:bodyPr wrap="square" rtlCol="1">
-            <a:spAutoFit/>
-          </a:bodyPr>
-          <a:lstStyle/>
-          <a:p>
-            <a:pPr marL="285750" indent="-285750" algn="r" rtl="1">
-              <a:buFont typeface="Arial" panose="020B0604020202020204" pitchFamily="34" charset="0"/>
-              <a:buChar char="•"/>
-            </a:pPr>
-            <a:r>
-              <a:rPr lang="he-IL" dirty="0"/>
-              <a:t>לוח השנה בנוי כך שהמעבר של הזמן והפגישות ממוקמות מצד ימין לשמאל (לפי סדר הכתיבה בעברית).</a:t>
-            </a:r>
-          </a:p>
-        </p:txBody>
-      </p:sp>
-      <p:cxnSp>
-        <p:nvCxnSpPr>
-          <p:cNvPr id="5" name="מחבר חץ ישר 4">
-            <a:extLst>
-              <a:ext uri="{FF2B5EF4-FFF2-40B4-BE49-F238E27FC236}">
-                <a16:creationId xmlns:a16="http://schemas.microsoft.com/office/drawing/2014/main" id="{3133421B-8C58-408C-8386-659EE009EF4D}"/>
-              </a:ext>
-            </a:extLst>
-          </p:cNvPr>
-          <p:cNvCxnSpPr/>
-          <p:nvPr/>
-        </p:nvCxnSpPr>
-        <p:spPr>
-          <a:xfrm flipH="1">
-            <a:off x="1152144" y="4712678"/>
-            <a:ext cx="5980176" cy="0"/>
-          </a:xfrm>
-          <a:prstGeom prst="straightConnector1">
-            <a:avLst/>
-          </a:prstGeom>
-          <a:ln>
-            <a:headEnd type="triangle"/>
-            <a:tailEnd type="triangle"/>
-          </a:ln>
-        </p:spPr>
-        <p:style>
-          <a:lnRef idx="1">
-            <a:schemeClr val="accent1"/>
-          </a:lnRef>
-          <a:fillRef idx="0">
-            <a:schemeClr val="accent1"/>
-          </a:fillRef>
-          <a:effectRef idx="0">
-            <a:schemeClr val="accent1"/>
-          </a:effectRef>
-          <a:fontRef idx="minor">
-            <a:schemeClr val="tx1"/>
-          </a:fontRef>
-        </p:style>
-      </p:cxnSp>
-      <p:sp>
-        <p:nvSpPr>
-          <p:cNvPr id="13" name="תיבת טקסט 12">
-            <a:extLst>
-              <a:ext uri="{FF2B5EF4-FFF2-40B4-BE49-F238E27FC236}">
-                <a16:creationId xmlns:a16="http://schemas.microsoft.com/office/drawing/2014/main" id="{E18D7AFE-6819-46E8-91E9-7633BA2436D1}"/>
-              </a:ext>
-            </a:extLst>
-          </p:cNvPr>
-          <p:cNvSpPr txBox="1"/>
-          <p:nvPr/>
-        </p:nvSpPr>
-        <p:spPr>
-          <a:xfrm>
-            <a:off x="6344530" y="4343346"/>
-            <a:ext cx="787790" cy="369332"/>
-          </a:xfrm>
-          <a:prstGeom prst="rect">
-            <a:avLst/>
-          </a:prstGeom>
-          <a:noFill/>
-        </p:spPr>
-        <p:txBody>
-          <a:bodyPr wrap="square" rtlCol="1">
-            <a:spAutoFit/>
-          </a:bodyPr>
-          <a:lstStyle/>
-          <a:p>
-            <a:pPr algn="r"/>
-            <a:r>
-              <a:rPr lang="he-IL" dirty="0">
-                <a:solidFill>
-                  <a:srgbClr val="C00000"/>
-                </a:solidFill>
-              </a:rPr>
-              <a:t>עבר</a:t>
-            </a:r>
-          </a:p>
-        </p:txBody>
-      </p:sp>
-      <p:cxnSp>
-        <p:nvCxnSpPr>
-          <p:cNvPr id="15" name="מחבר ישר 14">
-            <a:extLst>
-              <a:ext uri="{FF2B5EF4-FFF2-40B4-BE49-F238E27FC236}">
-                <a16:creationId xmlns:a16="http://schemas.microsoft.com/office/drawing/2014/main" id="{C679A093-27E5-4BE4-A986-E68C743F804F}"/>
-              </a:ext>
-            </a:extLst>
-          </p:cNvPr>
-          <p:cNvCxnSpPr/>
-          <p:nvPr/>
-        </p:nvCxnSpPr>
-        <p:spPr>
-          <a:xfrm>
-            <a:off x="4142232" y="4712678"/>
-            <a:ext cx="0" cy="0"/>
-          </a:xfrm>
-          <a:prstGeom prst="line">
-            <a:avLst/>
-          </a:prstGeom>
-        </p:spPr>
-        <p:style>
-          <a:lnRef idx="1">
-            <a:schemeClr val="accent1"/>
-          </a:lnRef>
-          <a:fillRef idx="0">
-            <a:schemeClr val="accent1"/>
-          </a:fillRef>
-          <a:effectRef idx="0">
-            <a:schemeClr val="accent1"/>
-          </a:effectRef>
-          <a:fontRef idx="minor">
-            <a:schemeClr val="tx1"/>
-          </a:fontRef>
-        </p:style>
-      </p:cxnSp>
-      <p:cxnSp>
-        <p:nvCxnSpPr>
-          <p:cNvPr id="17" name="מחבר ישר 16">
-            <a:extLst>
-              <a:ext uri="{FF2B5EF4-FFF2-40B4-BE49-F238E27FC236}">
-                <a16:creationId xmlns:a16="http://schemas.microsoft.com/office/drawing/2014/main" id="{1079B52E-1461-48B2-9F6E-C88EBEBDC8D8}"/>
-              </a:ext>
-            </a:extLst>
-          </p:cNvPr>
-          <p:cNvCxnSpPr>
-            <a:cxnSpLocks/>
-          </p:cNvCxnSpPr>
-          <p:nvPr/>
-        </p:nvCxnSpPr>
-        <p:spPr>
-          <a:xfrm>
-            <a:off x="4105275" y="4557712"/>
-            <a:ext cx="0" cy="154966"/>
-          </a:xfrm>
-          <a:prstGeom prst="line">
-            <a:avLst/>
-          </a:prstGeom>
-        </p:spPr>
-        <p:style>
-          <a:lnRef idx="1">
-            <a:schemeClr val="accent1"/>
-          </a:lnRef>
-          <a:fillRef idx="0">
-            <a:schemeClr val="accent1"/>
-          </a:fillRef>
-          <a:effectRef idx="0">
-            <a:schemeClr val="accent1"/>
-          </a:effectRef>
-          <a:fontRef idx="minor">
-            <a:schemeClr val="tx1"/>
-          </a:fontRef>
-        </p:style>
-      </p:cxnSp>
-      <p:sp>
-        <p:nvSpPr>
-          <p:cNvPr id="21" name="תיבת טקסט 20">
-            <a:extLst>
-              <a:ext uri="{FF2B5EF4-FFF2-40B4-BE49-F238E27FC236}">
-                <a16:creationId xmlns:a16="http://schemas.microsoft.com/office/drawing/2014/main" id="{4EC281CE-1594-427B-9064-3DC2F005CB96}"/>
-              </a:ext>
-            </a:extLst>
-          </p:cNvPr>
-          <p:cNvSpPr txBox="1"/>
-          <p:nvPr/>
-        </p:nvSpPr>
-        <p:spPr>
-          <a:xfrm>
-            <a:off x="3584917" y="4158680"/>
-            <a:ext cx="787790" cy="369332"/>
-          </a:xfrm>
-          <a:prstGeom prst="rect">
-            <a:avLst/>
-          </a:prstGeom>
-          <a:noFill/>
-        </p:spPr>
-        <p:txBody>
-          <a:bodyPr wrap="square" rtlCol="1">
-            <a:spAutoFit/>
-          </a:bodyPr>
-          <a:lstStyle/>
-          <a:p>
-            <a:pPr algn="r"/>
-            <a:r>
-              <a:rPr lang="he-IL" dirty="0">
-                <a:solidFill>
-                  <a:srgbClr val="C00000"/>
-                </a:solidFill>
-              </a:rPr>
-              <a:t>הווה</a:t>
-            </a:r>
-          </a:p>
-        </p:txBody>
-      </p:sp>
-      <p:sp>
-        <p:nvSpPr>
-          <p:cNvPr id="22" name="תיבת טקסט 21">
-            <a:extLst>
-              <a:ext uri="{FF2B5EF4-FFF2-40B4-BE49-F238E27FC236}">
-                <a16:creationId xmlns:a16="http://schemas.microsoft.com/office/drawing/2014/main" id="{B260147D-5FCC-4F73-AAE8-C6EA39016CB7}"/>
-              </a:ext>
-            </a:extLst>
-          </p:cNvPr>
-          <p:cNvSpPr txBox="1"/>
-          <p:nvPr/>
-        </p:nvSpPr>
-        <p:spPr>
-          <a:xfrm>
-            <a:off x="1004669" y="4290462"/>
-            <a:ext cx="787790" cy="369332"/>
-          </a:xfrm>
-          <a:prstGeom prst="rect">
-            <a:avLst/>
-          </a:prstGeom>
-          <a:noFill/>
-        </p:spPr>
-        <p:txBody>
-          <a:bodyPr wrap="square" rtlCol="1">
-            <a:spAutoFit/>
-          </a:bodyPr>
-          <a:lstStyle/>
-          <a:p>
-            <a:pPr algn="r"/>
-            <a:r>
-              <a:rPr lang="he-IL" dirty="0">
-                <a:solidFill>
-                  <a:srgbClr val="C00000"/>
-                </a:solidFill>
-              </a:rPr>
-              <a:t>עתיד</a:t>
-            </a:r>
-          </a:p>
-        </p:txBody>
-      </p:sp>
-    </p:spTree>
-    <p:extLst>
-      <p:ext uri="{BB962C8B-B14F-4D97-AF65-F5344CB8AC3E}">
-        <p14:creationId xmlns:p14="http://schemas.microsoft.com/office/powerpoint/2010/main" val="1816347366"/>
-      </p:ext>
-    </p:extLst>
-  </p:cSld>
-  <p:clrMapOvr>
-    <a:masterClrMapping/>
-  </p:clrMapOvr>
-</p:sld>
-</file>
-
-<file path=ppt/slides/slide67.xml><?xml version="1.0" encoding="utf-8"?>
-<p:sld xmlns:a="http://schemas.openxmlformats.org/drawingml/2006/main" xmlns:r="http://schemas.openxmlformats.org/officeDocument/2006/relationships" xmlns:p="http://schemas.openxmlformats.org/presentationml/2006/main">
-  <p:cSld>
-    <p:spTree>
-      <p:nvGrpSpPr>
-        <p:cNvPr id="1" name=""/>
-        <p:cNvGrpSpPr/>
-        <p:nvPr/>
-      </p:nvGrpSpPr>
-      <p:grpSpPr>
-        <a:xfrm>
-          <a:off x="0" y="0"/>
-          <a:ext cx="0" cy="0"/>
-          <a:chOff x="0" y="0"/>
-          <a:chExt cx="0" cy="0"/>
-        </a:xfrm>
-      </p:grpSpPr>
-      <p:sp>
-        <p:nvSpPr>
-          <p:cNvPr id="2" name="Title 1">
-            <a:extLst>
-              <a:ext uri="{FF2B5EF4-FFF2-40B4-BE49-F238E27FC236}">
-                <a16:creationId xmlns:a16="http://schemas.microsoft.com/office/drawing/2014/main" id="{F2E75ACD-C303-46DD-8FB4-27FC6A409857}"/>
-              </a:ext>
-            </a:extLst>
-          </p:cNvPr>
-          <p:cNvSpPr>
-            <a:spLocks noGrp="1"/>
-          </p:cNvSpPr>
-          <p:nvPr>
-            <p:ph type="title"/>
-          </p:nvPr>
-        </p:nvSpPr>
-        <p:spPr/>
-        <p:txBody>
-          <a:bodyPr/>
-          <a:lstStyle/>
-          <a:p>
-            <a:pPr algn="ctr"/>
-            <a:r>
-              <a:rPr lang="he-IL" sz="4800" dirty="0"/>
-              <a:t>ארכיטקטורת מידע</a:t>
-            </a:r>
-            <a:endParaRPr lang="en-US" sz="4800" dirty="0"/>
-          </a:p>
-        </p:txBody>
-      </p:sp>
-      <p:sp>
-        <p:nvSpPr>
-          <p:cNvPr id="12" name="תיבת טקסט 11">
-            <a:extLst>
-              <a:ext uri="{FF2B5EF4-FFF2-40B4-BE49-F238E27FC236}">
-                <a16:creationId xmlns:a16="http://schemas.microsoft.com/office/drawing/2014/main" id="{77AF2D51-D00C-40F2-9B31-0894F6F09F0E}"/>
-              </a:ext>
-            </a:extLst>
-          </p:cNvPr>
-          <p:cNvSpPr txBox="1"/>
-          <p:nvPr/>
-        </p:nvSpPr>
-        <p:spPr>
-          <a:xfrm>
-            <a:off x="8361020" y="2257425"/>
-            <a:ext cx="3830980" cy="1200329"/>
-          </a:xfrm>
-          <a:prstGeom prst="rect">
-            <a:avLst/>
-          </a:prstGeom>
-          <a:noFill/>
-        </p:spPr>
-        <p:txBody>
-          <a:bodyPr wrap="square" rtlCol="1">
-            <a:spAutoFit/>
-          </a:bodyPr>
-          <a:lstStyle/>
-          <a:p>
-            <a:pPr marL="285750" indent="-285750" algn="r" rtl="1">
-              <a:buFont typeface="Arial" panose="020B0604020202020204" pitchFamily="34" charset="0"/>
-              <a:buChar char="•"/>
-            </a:pPr>
-            <a:r>
-              <a:rPr lang="he-IL" dirty="0"/>
-              <a:t>בנוסף חלק מהמערכת בנויה לפי נושאים, זאת כדי לאפשר למשתמש להתמצא בקלות בין כל הפגישות או המיקומים ומצבי הפגישות. </a:t>
-            </a:r>
-          </a:p>
-        </p:txBody>
-      </p:sp>
-      <p:cxnSp>
-        <p:nvCxnSpPr>
-          <p:cNvPr id="15" name="מחבר ישר 14">
-            <a:extLst>
-              <a:ext uri="{FF2B5EF4-FFF2-40B4-BE49-F238E27FC236}">
-                <a16:creationId xmlns:a16="http://schemas.microsoft.com/office/drawing/2014/main" id="{C679A093-27E5-4BE4-A986-E68C743F804F}"/>
-              </a:ext>
-            </a:extLst>
-          </p:cNvPr>
-          <p:cNvCxnSpPr/>
-          <p:nvPr/>
-        </p:nvCxnSpPr>
-        <p:spPr>
-          <a:xfrm>
-            <a:off x="4142232" y="4712678"/>
-            <a:ext cx="0" cy="0"/>
-          </a:xfrm>
-          <a:prstGeom prst="line">
-            <a:avLst/>
-          </a:prstGeom>
-        </p:spPr>
-        <p:style>
-          <a:lnRef idx="1">
-            <a:schemeClr val="accent1"/>
-          </a:lnRef>
-          <a:fillRef idx="0">
-            <a:schemeClr val="accent1"/>
-          </a:fillRef>
-          <a:effectRef idx="0">
-            <a:schemeClr val="accent1"/>
-          </a:effectRef>
-          <a:fontRef idx="minor">
-            <a:schemeClr val="tx1"/>
-          </a:fontRef>
-        </p:style>
-      </p:cxnSp>
-      <p:pic>
-        <p:nvPicPr>
-          <p:cNvPr id="11" name="תמונה 10">
-            <a:extLst>
-              <a:ext uri="{FF2B5EF4-FFF2-40B4-BE49-F238E27FC236}">
-                <a16:creationId xmlns:a16="http://schemas.microsoft.com/office/drawing/2014/main" id="{29878191-761A-4093-8102-7EE9E370FBC4}"/>
-              </a:ext>
-            </a:extLst>
-          </p:cNvPr>
-          <p:cNvPicPr>
-            <a:picLocks noChangeAspect="1"/>
-          </p:cNvPicPr>
-          <p:nvPr/>
-        </p:nvPicPr>
-        <p:blipFill>
-          <a:blip r:embed="rId2"/>
-          <a:stretch>
-            <a:fillRect/>
-          </a:stretch>
-        </p:blipFill>
-        <p:spPr>
-          <a:xfrm>
-            <a:off x="0" y="2328127"/>
-            <a:ext cx="8060788" cy="4529874"/>
-          </a:xfrm>
-          <a:prstGeom prst="rect">
-            <a:avLst/>
-          </a:prstGeom>
-        </p:spPr>
-      </p:pic>
-      <p:cxnSp>
-        <p:nvCxnSpPr>
-          <p:cNvPr id="6" name="מחבר ישר 5">
-            <a:extLst>
-              <a:ext uri="{FF2B5EF4-FFF2-40B4-BE49-F238E27FC236}">
-                <a16:creationId xmlns:a16="http://schemas.microsoft.com/office/drawing/2014/main" id="{C97B8B9E-511F-437D-A6A1-0CDA55A9C098}"/>
-              </a:ext>
-            </a:extLst>
-          </p:cNvPr>
-          <p:cNvCxnSpPr>
-            <a:endCxn id="11" idx="2"/>
-          </p:cNvCxnSpPr>
-          <p:nvPr/>
-        </p:nvCxnSpPr>
-        <p:spPr>
-          <a:xfrm>
-            <a:off x="4009292" y="2869809"/>
-            <a:ext cx="21102" cy="3988192"/>
-          </a:xfrm>
-          <a:prstGeom prst="line">
-            <a:avLst/>
-          </a:prstGeom>
-        </p:spPr>
-        <p:style>
-          <a:lnRef idx="1">
-            <a:schemeClr val="accent1"/>
-          </a:lnRef>
-          <a:fillRef idx="0">
-            <a:schemeClr val="accent1"/>
-          </a:fillRef>
-          <a:effectRef idx="0">
-            <a:schemeClr val="accent1"/>
-          </a:effectRef>
-          <a:fontRef idx="minor">
-            <a:schemeClr val="tx1"/>
-          </a:fontRef>
-        </p:style>
-      </p:cxnSp>
-      <p:cxnSp>
-        <p:nvCxnSpPr>
-          <p:cNvPr id="8" name="מחבר ישר 7">
-            <a:extLst>
-              <a:ext uri="{FF2B5EF4-FFF2-40B4-BE49-F238E27FC236}">
-                <a16:creationId xmlns:a16="http://schemas.microsoft.com/office/drawing/2014/main" id="{27BBCB68-329B-4B19-A8F6-B4E111045CC0}"/>
-              </a:ext>
-            </a:extLst>
-          </p:cNvPr>
-          <p:cNvCxnSpPr/>
-          <p:nvPr/>
-        </p:nvCxnSpPr>
-        <p:spPr>
-          <a:xfrm>
-            <a:off x="0" y="4895557"/>
-            <a:ext cx="8060788" cy="0"/>
-          </a:xfrm>
-          <a:prstGeom prst="line">
-            <a:avLst/>
-          </a:prstGeom>
-        </p:spPr>
-        <p:style>
-          <a:lnRef idx="1">
-            <a:schemeClr val="accent1"/>
-          </a:lnRef>
-          <a:fillRef idx="0">
-            <a:schemeClr val="accent1"/>
-          </a:fillRef>
-          <a:effectRef idx="0">
-            <a:schemeClr val="accent1"/>
-          </a:effectRef>
-          <a:fontRef idx="minor">
-            <a:schemeClr val="tx1"/>
-          </a:fontRef>
-        </p:style>
-      </p:cxnSp>
-    </p:spTree>
-    <p:extLst>
-      <p:ext uri="{BB962C8B-B14F-4D97-AF65-F5344CB8AC3E}">
-        <p14:creationId xmlns:p14="http://schemas.microsoft.com/office/powerpoint/2010/main" val="2281359754"/>
       </p:ext>
     </p:extLst>
   </p:cSld>
@@ -32986,12 +32570,246 @@
             <a:pPr algn="ctr"/>
             <a:r>
               <a:rPr lang="he-IL" sz="4800" dirty="0"/>
-              <a:t>מודל הניווט</a:t>
+              <a:t>ארכיטקטורת מידע</a:t>
             </a:r>
             <a:endParaRPr lang="en-US" sz="4800" dirty="0"/>
           </a:p>
         </p:txBody>
       </p:sp>
+      <p:sp>
+        <p:nvSpPr>
+          <p:cNvPr id="18" name="תיבת טקסט 17">
+            <a:extLst>
+              <a:ext uri="{FF2B5EF4-FFF2-40B4-BE49-F238E27FC236}">
+                <a16:creationId xmlns:a16="http://schemas.microsoft.com/office/drawing/2014/main" id="{8D31B842-4145-4258-9806-37E51F29916E}"/>
+              </a:ext>
+            </a:extLst>
+          </p:cNvPr>
+          <p:cNvSpPr txBox="1"/>
+          <p:nvPr/>
+        </p:nvSpPr>
+        <p:spPr>
+          <a:xfrm>
+            <a:off x="7919696" y="2534088"/>
+            <a:ext cx="4121834" cy="1754326"/>
+          </a:xfrm>
+          <a:prstGeom prst="rect">
+            <a:avLst/>
+          </a:prstGeom>
+          <a:noFill/>
+        </p:spPr>
+        <p:txBody>
+          <a:bodyPr wrap="square" rtlCol="1">
+            <a:spAutoFit/>
+          </a:bodyPr>
+          <a:lstStyle/>
+          <a:p>
+            <a:pPr marL="285750" indent="-285750" algn="r" rtl="1">
+              <a:buFont typeface="Arial" panose="020B0604020202020204" pitchFamily="34" charset="0"/>
+              <a:buChar char="•"/>
+            </a:pPr>
+            <a:r>
+              <a:rPr lang="he-IL" dirty="0"/>
+              <a:t>המערכת שלנו משתמשת בעיקר בארגון מידע כרונולוגי, מכיוון שהמערכת מתעסקת בפגישות, חשוב למשתמש לראות את הפגישות והאילוצים שלו לפי ציר זמן מסוים אשר מאפשר לו ניהול קל של פגישותיו.</a:t>
+            </a:r>
+          </a:p>
+        </p:txBody>
+      </p:sp>
+      <p:pic>
+        <p:nvPicPr>
+          <p:cNvPr id="19" name="תמונה 18">
+            <a:extLst>
+              <a:ext uri="{FF2B5EF4-FFF2-40B4-BE49-F238E27FC236}">
+                <a16:creationId xmlns:a16="http://schemas.microsoft.com/office/drawing/2014/main" id="{87AAD36D-EE7B-4176-9B99-0EEC6B084F75}"/>
+              </a:ext>
+            </a:extLst>
+          </p:cNvPr>
+          <p:cNvPicPr>
+            <a:picLocks noChangeAspect="1"/>
+          </p:cNvPicPr>
+          <p:nvPr/>
+        </p:nvPicPr>
+        <p:blipFill>
+          <a:blip r:embed="rId2"/>
+          <a:stretch>
+            <a:fillRect/>
+          </a:stretch>
+        </p:blipFill>
+        <p:spPr>
+          <a:xfrm>
+            <a:off x="150470" y="2400030"/>
+            <a:ext cx="7642893" cy="3139322"/>
+          </a:xfrm>
+          <a:prstGeom prst="rect">
+            <a:avLst/>
+          </a:prstGeom>
+        </p:spPr>
+      </p:pic>
+      <p:cxnSp>
+        <p:nvCxnSpPr>
+          <p:cNvPr id="6" name="מחבר חץ ישר 5">
+            <a:extLst>
+              <a:ext uri="{FF2B5EF4-FFF2-40B4-BE49-F238E27FC236}">
+                <a16:creationId xmlns:a16="http://schemas.microsoft.com/office/drawing/2014/main" id="{217F64C3-70A6-4928-B05A-2BDDDF39AEB0}"/>
+              </a:ext>
+            </a:extLst>
+          </p:cNvPr>
+          <p:cNvCxnSpPr/>
+          <p:nvPr/>
+        </p:nvCxnSpPr>
+        <p:spPr>
+          <a:xfrm>
+            <a:off x="3910818" y="3429000"/>
+            <a:ext cx="0" cy="1793795"/>
+          </a:xfrm>
+          <a:prstGeom prst="straightConnector1">
+            <a:avLst/>
+          </a:prstGeom>
+          <a:ln>
+            <a:tailEnd type="triangle"/>
+          </a:ln>
+        </p:spPr>
+        <p:style>
+          <a:lnRef idx="1">
+            <a:schemeClr val="accent1"/>
+          </a:lnRef>
+          <a:fillRef idx="0">
+            <a:schemeClr val="accent1"/>
+          </a:fillRef>
+          <a:effectRef idx="0">
+            <a:schemeClr val="accent1"/>
+          </a:effectRef>
+          <a:fontRef idx="minor">
+            <a:schemeClr val="tx1"/>
+          </a:fontRef>
+        </p:style>
+      </p:cxnSp>
+      <p:sp>
+        <p:nvSpPr>
+          <p:cNvPr id="7" name="תיבת טקסט 6">
+            <a:extLst>
+              <a:ext uri="{FF2B5EF4-FFF2-40B4-BE49-F238E27FC236}">
+                <a16:creationId xmlns:a16="http://schemas.microsoft.com/office/drawing/2014/main" id="{2F2F805E-428B-48F0-BB48-EFDFA9157D27}"/>
+              </a:ext>
+            </a:extLst>
+          </p:cNvPr>
+          <p:cNvSpPr txBox="1"/>
+          <p:nvPr/>
+        </p:nvSpPr>
+        <p:spPr>
+          <a:xfrm>
+            <a:off x="1856942" y="3334044"/>
+            <a:ext cx="1927544" cy="1200329"/>
+          </a:xfrm>
+          <a:prstGeom prst="rect">
+            <a:avLst/>
+          </a:prstGeom>
+          <a:noFill/>
+        </p:spPr>
+        <p:txBody>
+          <a:bodyPr wrap="square" rtlCol="1">
+            <a:spAutoFit/>
+          </a:bodyPr>
+          <a:lstStyle/>
+          <a:p>
+            <a:pPr algn="r"/>
+            <a:r>
+              <a:rPr lang="he-IL" dirty="0"/>
+              <a:t>הפגישות ממוינות מהפגישה הקרובה ביותר לרחוקה ביותר</a:t>
+            </a:r>
+          </a:p>
+        </p:txBody>
+      </p:sp>
+    </p:spTree>
+    <p:extLst>
+      <p:ext uri="{BB962C8B-B14F-4D97-AF65-F5344CB8AC3E}">
+        <p14:creationId xmlns:p14="http://schemas.microsoft.com/office/powerpoint/2010/main" val="971213103"/>
+      </p:ext>
+    </p:extLst>
+  </p:cSld>
+  <p:clrMapOvr>
+    <a:masterClrMapping/>
+  </p:clrMapOvr>
+</p:sld>
+</file>
+
+<file path=ppt/slides/slide69.xml><?xml version="1.0" encoding="utf-8"?>
+<p:sld xmlns:a="http://schemas.openxmlformats.org/drawingml/2006/main" xmlns:r="http://schemas.openxmlformats.org/officeDocument/2006/relationships" xmlns:p="http://schemas.openxmlformats.org/presentationml/2006/main">
+  <p:cSld>
+    <p:spTree>
+      <p:nvGrpSpPr>
+        <p:cNvPr id="1" name=""/>
+        <p:cNvGrpSpPr/>
+        <p:nvPr/>
+      </p:nvGrpSpPr>
+      <p:grpSpPr>
+        <a:xfrm>
+          <a:off x="0" y="0"/>
+          <a:ext cx="0" cy="0"/>
+          <a:chOff x="0" y="0"/>
+          <a:chExt cx="0" cy="0"/>
+        </a:xfrm>
+      </p:grpSpPr>
+      <p:sp>
+        <p:nvSpPr>
+          <p:cNvPr id="2" name="Title 1">
+            <a:extLst>
+              <a:ext uri="{FF2B5EF4-FFF2-40B4-BE49-F238E27FC236}">
+                <a16:creationId xmlns:a16="http://schemas.microsoft.com/office/drawing/2014/main" id="{F2E75ACD-C303-46DD-8FB4-27FC6A409857}"/>
+              </a:ext>
+            </a:extLst>
+          </p:cNvPr>
+          <p:cNvSpPr>
+            <a:spLocks noGrp="1"/>
+          </p:cNvSpPr>
+          <p:nvPr>
+            <p:ph type="title"/>
+          </p:nvPr>
+        </p:nvSpPr>
+        <p:spPr/>
+        <p:txBody>
+          <a:bodyPr/>
+          <a:lstStyle/>
+          <a:p>
+            <a:pPr algn="ctr"/>
+            <a:r>
+              <a:rPr lang="he-IL" sz="4800" dirty="0"/>
+              <a:t>ארכיטקטורת מידע</a:t>
+            </a:r>
+            <a:endParaRPr lang="en-US" sz="4800" dirty="0"/>
+          </a:p>
+        </p:txBody>
+      </p:sp>
+      <p:pic>
+        <p:nvPicPr>
+          <p:cNvPr id="3" name="תמונה 2">
+            <a:extLst>
+              <a:ext uri="{FF2B5EF4-FFF2-40B4-BE49-F238E27FC236}">
+                <a16:creationId xmlns:a16="http://schemas.microsoft.com/office/drawing/2014/main" id="{A55282CC-442F-4983-9221-06D6A8EDAF5D}"/>
+              </a:ext>
+            </a:extLst>
+          </p:cNvPr>
+          <p:cNvPicPr>
+            <a:picLocks noChangeAspect="1"/>
+          </p:cNvPicPr>
+          <p:nvPr/>
+        </p:nvPicPr>
+        <p:blipFill>
+          <a:blip r:embed="rId2"/>
+          <a:stretch>
+            <a:fillRect/>
+          </a:stretch>
+        </p:blipFill>
+        <p:spPr>
+          <a:xfrm>
+            <a:off x="0" y="2257425"/>
+            <a:ext cx="8210550" cy="4600575"/>
+          </a:xfrm>
+          <a:prstGeom prst="rect">
+            <a:avLst/>
+          </a:prstGeom>
+        </p:spPr>
+      </p:pic>
       <p:sp>
         <p:nvSpPr>
           <p:cNvPr id="12" name="תיבת טקסט 11">
@@ -33006,8 +32824,8 @@
         </p:nvSpPr>
         <p:spPr>
           <a:xfrm>
-            <a:off x="1561514" y="2257425"/>
-            <a:ext cx="10630486" cy="646331"/>
+            <a:off x="8361020" y="2257425"/>
+            <a:ext cx="3830980" cy="923330"/>
           </a:xfrm>
           <a:prstGeom prst="rect">
             <a:avLst/>
@@ -33026,7 +32844,87 @@
             </a:pPr>
             <a:r>
               <a:rPr lang="he-IL" dirty="0"/>
-              <a:t>מודל הניווט של המערכת הינה ניווט סיקוונסיאלי, זאת מכיוון שהפעולות במערכת תלויות האחת בשנייה צריך להתחבר בכדי להגיע ללוח השנה\האיזור האישי שלך צריך לבחור טווח בלוח שנה כדי לקבוע פגישה וכו'</a:t>
+              <a:t>לוח השנה בנוי כך שהמעבר של הזמן והפגישות ממוקמות מצד ימין לשמאל (לפי סדר הכתיבה בעברית).</a:t>
+            </a:r>
+          </a:p>
+        </p:txBody>
+      </p:sp>
+      <p:cxnSp>
+        <p:nvCxnSpPr>
+          <p:cNvPr id="5" name="מחבר חץ ישר 4">
+            <a:extLst>
+              <a:ext uri="{FF2B5EF4-FFF2-40B4-BE49-F238E27FC236}">
+                <a16:creationId xmlns:a16="http://schemas.microsoft.com/office/drawing/2014/main" id="{3133421B-8C58-408C-8386-659EE009EF4D}"/>
+              </a:ext>
+            </a:extLst>
+          </p:cNvPr>
+          <p:cNvCxnSpPr/>
+          <p:nvPr/>
+        </p:nvCxnSpPr>
+        <p:spPr>
+          <a:xfrm flipH="1">
+            <a:off x="1152144" y="4712678"/>
+            <a:ext cx="5980176" cy="0"/>
+          </a:xfrm>
+          <a:prstGeom prst="straightConnector1">
+            <a:avLst/>
+          </a:prstGeom>
+          <a:ln>
+            <a:headEnd type="triangle"/>
+            <a:tailEnd type="triangle"/>
+          </a:ln>
+        </p:spPr>
+        <p:style>
+          <a:lnRef idx="1">
+            <a:schemeClr val="accent1"/>
+          </a:lnRef>
+          <a:fillRef idx="0">
+            <a:schemeClr val="accent1"/>
+          </a:fillRef>
+          <a:effectRef idx="0">
+            <a:schemeClr val="accent1"/>
+          </a:effectRef>
+          <a:fontRef idx="minor">
+            <a:schemeClr val="tx1"/>
+          </a:fontRef>
+        </p:style>
+      </p:cxnSp>
+      <p:sp>
+        <p:nvSpPr>
+          <p:cNvPr id="13" name="תיבת טקסט 12">
+            <a:extLst>
+              <a:ext uri="{FF2B5EF4-FFF2-40B4-BE49-F238E27FC236}">
+                <a16:creationId xmlns:a16="http://schemas.microsoft.com/office/drawing/2014/main" id="{E18D7AFE-6819-46E8-91E9-7633BA2436D1}"/>
+              </a:ext>
+            </a:extLst>
+          </p:cNvPr>
+          <p:cNvSpPr txBox="1"/>
+          <p:nvPr/>
+        </p:nvSpPr>
+        <p:spPr>
+          <a:xfrm>
+            <a:off x="6344530" y="4343346"/>
+            <a:ext cx="787790" cy="369332"/>
+          </a:xfrm>
+          <a:prstGeom prst="rect">
+            <a:avLst/>
+          </a:prstGeom>
+          <a:noFill/>
+        </p:spPr>
+        <p:txBody>
+          <a:bodyPr wrap="square" rtlCol="1">
+            <a:spAutoFit/>
+          </a:bodyPr>
+          <a:lstStyle/>
+          <a:p>
+            <a:pPr algn="r"/>
+            <a:r>
+              <a:rPr lang="he-IL" dirty="0">
+                <a:solidFill>
+                  <a:srgbClr val="C00000"/>
+                </a:solidFill>
+              </a:rPr>
+              <a:t>עבר</a:t>
             </a:r>
           </a:p>
         </p:txBody>
@@ -33047,6 +32945,44 @@
           <a:xfrm>
             <a:off x="4142232" y="4712678"/>
             <a:ext cx="0" cy="0"/>
+          </a:xfrm>
+          <a:prstGeom prst="line">
+            <a:avLst/>
+          </a:prstGeom>
+        </p:spPr>
+        <p:style>
+          <a:lnRef idx="1">
+            <a:schemeClr val="accent1"/>
+          </a:lnRef>
+          <a:fillRef idx="0">
+            <a:schemeClr val="accent1"/>
+          </a:fillRef>
+          <a:effectRef idx="0">
+            <a:schemeClr val="accent1"/>
+          </a:effectRef>
+          <a:fontRef idx="minor">
+            <a:schemeClr val="tx1"/>
+          </a:fontRef>
+        </p:style>
+      </p:cxnSp>
+      <p:cxnSp>
+        <p:nvCxnSpPr>
+          <p:cNvPr id="17" name="מחבר ישר 16">
+            <a:extLst>
+              <a:ext uri="{FF2B5EF4-FFF2-40B4-BE49-F238E27FC236}">
+                <a16:creationId xmlns:a16="http://schemas.microsoft.com/office/drawing/2014/main" id="{1079B52E-1461-48B2-9F6E-C88EBEBDC8D8}"/>
+              </a:ext>
+            </a:extLst>
+          </p:cNvPr>
+          <p:cNvCxnSpPr>
+            <a:cxnSpLocks/>
+          </p:cNvCxnSpPr>
+          <p:nvPr/>
+        </p:nvCxnSpPr>
+        <p:spPr>
+          <a:xfrm>
+            <a:off x="4105275" y="4557712"/>
+            <a:ext cx="0" cy="154966"/>
           </a:xfrm>
           <a:prstGeom prst="line">
             <a:avLst/>
@@ -33069,578 +33005,88 @@
       </p:cxnSp>
       <p:sp>
         <p:nvSpPr>
-          <p:cNvPr id="5" name="מלבן 4">
+          <p:cNvPr id="21" name="תיבת טקסט 20">
             <a:extLst>
               <a:ext uri="{FF2B5EF4-FFF2-40B4-BE49-F238E27FC236}">
-                <a16:creationId xmlns:a16="http://schemas.microsoft.com/office/drawing/2014/main" id="{4C73EFEC-90BB-40F0-A252-B466176492A4}"/>
+                <a16:creationId xmlns:a16="http://schemas.microsoft.com/office/drawing/2014/main" id="{4EC281CE-1594-427B-9064-3DC2F005CB96}"/>
               </a:ext>
             </a:extLst>
           </p:cNvPr>
-          <p:cNvSpPr/>
+          <p:cNvSpPr txBox="1"/>
           <p:nvPr/>
         </p:nvSpPr>
         <p:spPr>
           <a:xfrm>
-            <a:off x="1152144" y="3692769"/>
-            <a:ext cx="1069144" cy="829994"/>
+            <a:off x="3584917" y="4158680"/>
+            <a:ext cx="787790" cy="369332"/>
           </a:xfrm>
           <a:prstGeom prst="rect">
             <a:avLst/>
           </a:prstGeom>
-          <a:solidFill>
-            <a:srgbClr val="B4D0E7"/>
-          </a:solidFill>
-          <a:ln>
-            <a:solidFill>
-              <a:srgbClr val="B4D0E7"/>
-            </a:solidFill>
-          </a:ln>
+          <a:noFill/>
         </p:spPr>
-        <p:style>
-          <a:lnRef idx="2">
-            <a:schemeClr val="accent1">
-              <a:shade val="50000"/>
-            </a:schemeClr>
-          </a:lnRef>
-          <a:fillRef idx="1">
-            <a:schemeClr val="accent1"/>
-          </a:fillRef>
-          <a:effectRef idx="0">
-            <a:schemeClr val="accent1"/>
-          </a:effectRef>
-          <a:fontRef idx="minor">
-            <a:schemeClr val="lt1"/>
-          </a:fontRef>
-        </p:style>
         <p:txBody>
-          <a:bodyPr rtlCol="1" anchor="ctr"/>
+          <a:bodyPr wrap="square" rtlCol="1">
+            <a:spAutoFit/>
+          </a:bodyPr>
           <a:lstStyle/>
           <a:p>
-            <a:pPr algn="ctr"/>
-            <a:r>
-              <a:rPr lang="he-IL" dirty="0"/>
-              <a:t>התחברות\הרשמה</a:t>
+            <a:pPr algn="r"/>
+            <a:r>
+              <a:rPr lang="he-IL" dirty="0">
+                <a:solidFill>
+                  <a:srgbClr val="C00000"/>
+                </a:solidFill>
+              </a:rPr>
+              <a:t>הווה</a:t>
             </a:r>
           </a:p>
         </p:txBody>
       </p:sp>
       <p:sp>
         <p:nvSpPr>
-          <p:cNvPr id="14" name="מלבן 13">
+          <p:cNvPr id="22" name="תיבת טקסט 21">
             <a:extLst>
               <a:ext uri="{FF2B5EF4-FFF2-40B4-BE49-F238E27FC236}">
-                <a16:creationId xmlns:a16="http://schemas.microsoft.com/office/drawing/2014/main" id="{68D58D64-E668-452C-9ED8-016BEFFCCF82}"/>
+                <a16:creationId xmlns:a16="http://schemas.microsoft.com/office/drawing/2014/main" id="{B260147D-5FCC-4F73-AAE8-C6EA39016CB7}"/>
               </a:ext>
             </a:extLst>
           </p:cNvPr>
-          <p:cNvSpPr/>
+          <p:cNvSpPr txBox="1"/>
           <p:nvPr/>
         </p:nvSpPr>
         <p:spPr>
           <a:xfrm>
-            <a:off x="3479878" y="3692769"/>
-            <a:ext cx="1069144" cy="829994"/>
+            <a:off x="1004669" y="4290462"/>
+            <a:ext cx="787790" cy="369332"/>
           </a:xfrm>
           <a:prstGeom prst="rect">
             <a:avLst/>
           </a:prstGeom>
-          <a:solidFill>
-            <a:srgbClr val="B4D0E7"/>
-          </a:solidFill>
-          <a:ln>
-            <a:solidFill>
-              <a:srgbClr val="B4D0E7"/>
-            </a:solidFill>
-          </a:ln>
+          <a:noFill/>
         </p:spPr>
-        <p:style>
-          <a:lnRef idx="2">
-            <a:schemeClr val="accent1">
-              <a:shade val="50000"/>
-            </a:schemeClr>
-          </a:lnRef>
-          <a:fillRef idx="1">
-            <a:schemeClr val="accent1"/>
-          </a:fillRef>
-          <a:effectRef idx="0">
-            <a:schemeClr val="accent1"/>
-          </a:effectRef>
-          <a:fontRef idx="minor">
-            <a:schemeClr val="lt1"/>
-          </a:fontRef>
-        </p:style>
         <p:txBody>
-          <a:bodyPr rtlCol="1" anchor="ctr"/>
+          <a:bodyPr wrap="square" rtlCol="1">
+            <a:spAutoFit/>
+          </a:bodyPr>
           <a:lstStyle/>
           <a:p>
-            <a:pPr algn="ctr"/>
-            <a:r>
-              <a:rPr lang="he-IL" dirty="0"/>
-              <a:t>לוח שנה</a:t>
+            <a:pPr algn="r"/>
+            <a:r>
+              <a:rPr lang="he-IL" dirty="0">
+                <a:solidFill>
+                  <a:srgbClr val="C00000"/>
+                </a:solidFill>
+              </a:rPr>
+              <a:t>עתיד</a:t>
             </a:r>
           </a:p>
         </p:txBody>
       </p:sp>
-      <p:sp>
-        <p:nvSpPr>
-          <p:cNvPr id="16" name="מלבן 15">
-            <a:extLst>
-              <a:ext uri="{FF2B5EF4-FFF2-40B4-BE49-F238E27FC236}">
-                <a16:creationId xmlns:a16="http://schemas.microsoft.com/office/drawing/2014/main" id="{FE00933F-4AAF-4B27-A1EA-5441F5FD5DF2}"/>
-              </a:ext>
-            </a:extLst>
-          </p:cNvPr>
-          <p:cNvSpPr/>
-          <p:nvPr/>
-        </p:nvSpPr>
-        <p:spPr>
-          <a:xfrm>
-            <a:off x="3479878" y="5293288"/>
-            <a:ext cx="1069144" cy="829994"/>
-          </a:xfrm>
-          <a:prstGeom prst="rect">
-            <a:avLst/>
-          </a:prstGeom>
-          <a:solidFill>
-            <a:srgbClr val="B4D0E7"/>
-          </a:solidFill>
-          <a:ln>
-            <a:solidFill>
-              <a:srgbClr val="B4D0E7"/>
-            </a:solidFill>
-          </a:ln>
-        </p:spPr>
-        <p:style>
-          <a:lnRef idx="2">
-            <a:schemeClr val="accent1">
-              <a:shade val="50000"/>
-            </a:schemeClr>
-          </a:lnRef>
-          <a:fillRef idx="1">
-            <a:schemeClr val="accent1"/>
-          </a:fillRef>
-          <a:effectRef idx="0">
-            <a:schemeClr val="accent1"/>
-          </a:effectRef>
-          <a:fontRef idx="minor">
-            <a:schemeClr val="lt1"/>
-          </a:fontRef>
-        </p:style>
-        <p:txBody>
-          <a:bodyPr rtlCol="1" anchor="ctr"/>
-          <a:lstStyle/>
-          <a:p>
-            <a:pPr algn="ctr"/>
-            <a:r>
-              <a:rPr lang="he-IL" dirty="0"/>
-              <a:t>אזור אישי</a:t>
-            </a:r>
-          </a:p>
-        </p:txBody>
-      </p:sp>
-      <p:cxnSp>
-        <p:nvCxnSpPr>
-          <p:cNvPr id="17" name="מחבר חץ ישר 16">
-            <a:extLst>
-              <a:ext uri="{FF2B5EF4-FFF2-40B4-BE49-F238E27FC236}">
-                <a16:creationId xmlns:a16="http://schemas.microsoft.com/office/drawing/2014/main" id="{2CA02720-FE38-4745-BF27-DB559CBE6472}"/>
-              </a:ext>
-            </a:extLst>
-          </p:cNvPr>
-          <p:cNvCxnSpPr>
-            <a:stCxn id="5" idx="3"/>
-            <a:endCxn id="14" idx="1"/>
-          </p:cNvCxnSpPr>
-          <p:nvPr/>
-        </p:nvCxnSpPr>
-        <p:spPr>
-          <a:xfrm>
-            <a:off x="2221288" y="4107766"/>
-            <a:ext cx="1258590" cy="0"/>
-          </a:xfrm>
-          <a:prstGeom prst="straightConnector1">
-            <a:avLst/>
-          </a:prstGeom>
-          <a:ln>
-            <a:solidFill>
-              <a:schemeClr val="tx1"/>
-            </a:solidFill>
-            <a:tailEnd type="triangle"/>
-          </a:ln>
-        </p:spPr>
-        <p:style>
-          <a:lnRef idx="1">
-            <a:schemeClr val="accent1"/>
-          </a:lnRef>
-          <a:fillRef idx="0">
-            <a:schemeClr val="accent1"/>
-          </a:fillRef>
-          <a:effectRef idx="0">
-            <a:schemeClr val="accent1"/>
-          </a:effectRef>
-          <a:fontRef idx="minor">
-            <a:schemeClr val="tx1"/>
-          </a:fontRef>
-        </p:style>
-      </p:cxnSp>
-      <p:cxnSp>
-        <p:nvCxnSpPr>
-          <p:cNvPr id="19" name="מחבר חץ ישר 18">
-            <a:extLst>
-              <a:ext uri="{FF2B5EF4-FFF2-40B4-BE49-F238E27FC236}">
-                <a16:creationId xmlns:a16="http://schemas.microsoft.com/office/drawing/2014/main" id="{A28AAAA7-474F-455E-9FFE-2E92353FF025}"/>
-              </a:ext>
-            </a:extLst>
-          </p:cNvPr>
-          <p:cNvCxnSpPr>
-            <a:stCxn id="14" idx="2"/>
-            <a:endCxn id="16" idx="0"/>
-          </p:cNvCxnSpPr>
-          <p:nvPr/>
-        </p:nvCxnSpPr>
-        <p:spPr>
-          <a:xfrm>
-            <a:off x="4014450" y="4522763"/>
-            <a:ext cx="0" cy="770525"/>
-          </a:xfrm>
-          <a:prstGeom prst="straightConnector1">
-            <a:avLst/>
-          </a:prstGeom>
-          <a:ln>
-            <a:solidFill>
-              <a:schemeClr val="tx1"/>
-            </a:solidFill>
-            <a:headEnd type="triangle"/>
-            <a:tailEnd type="triangle"/>
-          </a:ln>
-        </p:spPr>
-        <p:style>
-          <a:lnRef idx="1">
-            <a:schemeClr val="accent1"/>
-          </a:lnRef>
-          <a:fillRef idx="0">
-            <a:schemeClr val="accent1"/>
-          </a:fillRef>
-          <a:effectRef idx="0">
-            <a:schemeClr val="accent1"/>
-          </a:effectRef>
-          <a:fontRef idx="minor">
-            <a:schemeClr val="tx1"/>
-          </a:fontRef>
-        </p:style>
-      </p:cxnSp>
-      <p:sp>
-        <p:nvSpPr>
-          <p:cNvPr id="21" name="מלבן 20">
-            <a:extLst>
-              <a:ext uri="{FF2B5EF4-FFF2-40B4-BE49-F238E27FC236}">
-                <a16:creationId xmlns:a16="http://schemas.microsoft.com/office/drawing/2014/main" id="{5EC87226-741E-4C41-832B-50FC792F64A6}"/>
-              </a:ext>
-            </a:extLst>
-          </p:cNvPr>
-          <p:cNvSpPr/>
-          <p:nvPr/>
-        </p:nvSpPr>
-        <p:spPr>
-          <a:xfrm>
-            <a:off x="6989299" y="3037769"/>
-            <a:ext cx="1069144" cy="829994"/>
-          </a:xfrm>
-          <a:prstGeom prst="rect">
-            <a:avLst/>
-          </a:prstGeom>
-          <a:solidFill>
-            <a:srgbClr val="B4D0E7"/>
-          </a:solidFill>
-          <a:ln>
-            <a:solidFill>
-              <a:srgbClr val="B4D0E7"/>
-            </a:solidFill>
-          </a:ln>
-        </p:spPr>
-        <p:style>
-          <a:lnRef idx="2">
-            <a:schemeClr val="accent1">
-              <a:shade val="50000"/>
-            </a:schemeClr>
-          </a:lnRef>
-          <a:fillRef idx="1">
-            <a:schemeClr val="accent1"/>
-          </a:fillRef>
-          <a:effectRef idx="0">
-            <a:schemeClr val="accent1"/>
-          </a:effectRef>
-          <a:fontRef idx="minor">
-            <a:schemeClr val="lt1"/>
-          </a:fontRef>
-        </p:style>
-        <p:txBody>
-          <a:bodyPr rtlCol="1" anchor="ctr"/>
-          <a:lstStyle/>
-          <a:p>
-            <a:pPr algn="ctr"/>
-            <a:r>
-              <a:rPr lang="he-IL" dirty="0"/>
-              <a:t>יצירת פגישה</a:t>
-            </a:r>
-          </a:p>
-        </p:txBody>
-      </p:sp>
-      <p:sp>
-        <p:nvSpPr>
-          <p:cNvPr id="22" name="מלבן 21">
-            <a:extLst>
-              <a:ext uri="{FF2B5EF4-FFF2-40B4-BE49-F238E27FC236}">
-                <a16:creationId xmlns:a16="http://schemas.microsoft.com/office/drawing/2014/main" id="{8FE29AE8-B766-4490-AC03-308875E417BD}"/>
-              </a:ext>
-            </a:extLst>
-          </p:cNvPr>
-          <p:cNvSpPr/>
-          <p:nvPr/>
-        </p:nvSpPr>
-        <p:spPr>
-          <a:xfrm>
-            <a:off x="6989299" y="4231244"/>
-            <a:ext cx="1069144" cy="829994"/>
-          </a:xfrm>
-          <a:prstGeom prst="rect">
-            <a:avLst/>
-          </a:prstGeom>
-          <a:solidFill>
-            <a:srgbClr val="B4D0E7"/>
-          </a:solidFill>
-          <a:ln>
-            <a:solidFill>
-              <a:srgbClr val="B4D0E7"/>
-            </a:solidFill>
-          </a:ln>
-        </p:spPr>
-        <p:style>
-          <a:lnRef idx="2">
-            <a:schemeClr val="accent1">
-              <a:shade val="50000"/>
-            </a:schemeClr>
-          </a:lnRef>
-          <a:fillRef idx="1">
-            <a:schemeClr val="accent1"/>
-          </a:fillRef>
-          <a:effectRef idx="0">
-            <a:schemeClr val="accent1"/>
-          </a:effectRef>
-          <a:fontRef idx="minor">
-            <a:schemeClr val="lt1"/>
-          </a:fontRef>
-        </p:style>
-        <p:txBody>
-          <a:bodyPr rtlCol="1" anchor="ctr"/>
-          <a:lstStyle/>
-          <a:p>
-            <a:pPr algn="ctr"/>
-            <a:r>
-              <a:rPr lang="he-IL" dirty="0"/>
-              <a:t>יצירת אילוץ</a:t>
-            </a:r>
-          </a:p>
-        </p:txBody>
-      </p:sp>
-      <p:sp>
-        <p:nvSpPr>
-          <p:cNvPr id="23" name="מלבן 22">
-            <a:extLst>
-              <a:ext uri="{FF2B5EF4-FFF2-40B4-BE49-F238E27FC236}">
-                <a16:creationId xmlns:a16="http://schemas.microsoft.com/office/drawing/2014/main" id="{91E5B70A-D921-4664-80F0-C84C5ADA2917}"/>
-              </a:ext>
-            </a:extLst>
-          </p:cNvPr>
-          <p:cNvSpPr/>
-          <p:nvPr/>
-        </p:nvSpPr>
-        <p:spPr>
-          <a:xfrm>
-            <a:off x="6989299" y="5521270"/>
-            <a:ext cx="1069144" cy="829994"/>
-          </a:xfrm>
-          <a:prstGeom prst="rect">
-            <a:avLst/>
-          </a:prstGeom>
-          <a:solidFill>
-            <a:srgbClr val="B4D0E7"/>
-          </a:solidFill>
-          <a:ln>
-            <a:solidFill>
-              <a:srgbClr val="B4D0E7"/>
-            </a:solidFill>
-          </a:ln>
-        </p:spPr>
-        <p:style>
-          <a:lnRef idx="2">
-            <a:schemeClr val="accent1">
-              <a:shade val="50000"/>
-            </a:schemeClr>
-          </a:lnRef>
-          <a:fillRef idx="1">
-            <a:schemeClr val="accent1"/>
-          </a:fillRef>
-          <a:effectRef idx="0">
-            <a:schemeClr val="accent1"/>
-          </a:effectRef>
-          <a:fontRef idx="minor">
-            <a:schemeClr val="lt1"/>
-          </a:fontRef>
-        </p:style>
-        <p:txBody>
-          <a:bodyPr rtlCol="1" anchor="ctr"/>
-          <a:lstStyle/>
-          <a:p>
-            <a:pPr algn="ctr"/>
-            <a:r>
-              <a:rPr lang="he-IL" dirty="0"/>
-              <a:t>יצירת מקום</a:t>
-            </a:r>
-          </a:p>
-        </p:txBody>
-      </p:sp>
-      <p:cxnSp>
-        <p:nvCxnSpPr>
-          <p:cNvPr id="25" name="מחבר חץ ישר 24">
-            <a:extLst>
-              <a:ext uri="{FF2B5EF4-FFF2-40B4-BE49-F238E27FC236}">
-                <a16:creationId xmlns:a16="http://schemas.microsoft.com/office/drawing/2014/main" id="{FF17E7FF-B123-4821-954B-3F8431F71456}"/>
-              </a:ext>
-            </a:extLst>
-          </p:cNvPr>
-          <p:cNvCxnSpPr>
-            <a:stCxn id="14" idx="3"/>
-            <a:endCxn id="21" idx="1"/>
-          </p:cNvCxnSpPr>
-          <p:nvPr/>
-        </p:nvCxnSpPr>
-        <p:spPr>
-          <a:xfrm flipV="1">
-            <a:off x="4549022" y="3452766"/>
-            <a:ext cx="2440277" cy="655000"/>
-          </a:xfrm>
-          <a:prstGeom prst="straightConnector1">
-            <a:avLst/>
-          </a:prstGeom>
-          <a:ln>
-            <a:solidFill>
-              <a:schemeClr val="tx1"/>
-            </a:solidFill>
-            <a:tailEnd type="triangle"/>
-          </a:ln>
-        </p:spPr>
-        <p:style>
-          <a:lnRef idx="1">
-            <a:schemeClr val="accent1"/>
-          </a:lnRef>
-          <a:fillRef idx="0">
-            <a:schemeClr val="accent1"/>
-          </a:fillRef>
-          <a:effectRef idx="0">
-            <a:schemeClr val="accent1"/>
-          </a:effectRef>
-          <a:fontRef idx="minor">
-            <a:schemeClr val="tx1"/>
-          </a:fontRef>
-        </p:style>
-      </p:cxnSp>
-      <p:cxnSp>
-        <p:nvCxnSpPr>
-          <p:cNvPr id="26" name="מחבר חץ ישר 25">
-            <a:extLst>
-              <a:ext uri="{FF2B5EF4-FFF2-40B4-BE49-F238E27FC236}">
-                <a16:creationId xmlns:a16="http://schemas.microsoft.com/office/drawing/2014/main" id="{A62B8856-7061-41B1-A07E-9F1BC4122F50}"/>
-              </a:ext>
-            </a:extLst>
-          </p:cNvPr>
-          <p:cNvCxnSpPr>
-            <a:cxnSpLocks/>
-            <a:stCxn id="14" idx="3"/>
-            <a:endCxn id="22" idx="1"/>
-          </p:cNvCxnSpPr>
-          <p:nvPr/>
-        </p:nvCxnSpPr>
-        <p:spPr>
-          <a:xfrm>
-            <a:off x="4549022" y="4107766"/>
-            <a:ext cx="2440277" cy="538475"/>
-          </a:xfrm>
-          <a:prstGeom prst="straightConnector1">
-            <a:avLst/>
-          </a:prstGeom>
-          <a:ln>
-            <a:solidFill>
-              <a:schemeClr val="tx1"/>
-            </a:solidFill>
-            <a:tailEnd type="triangle"/>
-          </a:ln>
-        </p:spPr>
-        <p:style>
-          <a:lnRef idx="1">
-            <a:schemeClr val="accent1"/>
-          </a:lnRef>
-          <a:fillRef idx="0">
-            <a:schemeClr val="accent1"/>
-          </a:fillRef>
-          <a:effectRef idx="0">
-            <a:schemeClr val="accent1"/>
-          </a:effectRef>
-          <a:fontRef idx="minor">
-            <a:schemeClr val="tx1"/>
-          </a:fontRef>
-        </p:style>
-      </p:cxnSp>
-      <p:cxnSp>
-        <p:nvCxnSpPr>
-          <p:cNvPr id="38" name="מחבר חץ ישר 37">
-            <a:extLst>
-              <a:ext uri="{FF2B5EF4-FFF2-40B4-BE49-F238E27FC236}">
-                <a16:creationId xmlns:a16="http://schemas.microsoft.com/office/drawing/2014/main" id="{07A16A20-BDAD-46A3-9CA5-CF870C045834}"/>
-              </a:ext>
-            </a:extLst>
-          </p:cNvPr>
-          <p:cNvCxnSpPr>
-            <a:cxnSpLocks/>
-            <a:stCxn id="16" idx="3"/>
-            <a:endCxn id="23" idx="1"/>
-          </p:cNvCxnSpPr>
-          <p:nvPr/>
-        </p:nvCxnSpPr>
-        <p:spPr>
-          <a:xfrm>
-            <a:off x="4549022" y="5708285"/>
-            <a:ext cx="2440277" cy="227982"/>
-          </a:xfrm>
-          <a:prstGeom prst="straightConnector1">
-            <a:avLst/>
-          </a:prstGeom>
-          <a:ln>
-            <a:solidFill>
-              <a:schemeClr val="tx1"/>
-            </a:solidFill>
-            <a:tailEnd type="triangle"/>
-          </a:ln>
-        </p:spPr>
-        <p:style>
-          <a:lnRef idx="1">
-            <a:schemeClr val="accent1"/>
-          </a:lnRef>
-          <a:fillRef idx="0">
-            <a:schemeClr val="accent1"/>
-          </a:fillRef>
-          <a:effectRef idx="0">
-            <a:schemeClr val="accent1"/>
-          </a:effectRef>
-          <a:fontRef idx="minor">
-            <a:schemeClr val="tx1"/>
-          </a:fontRef>
-        </p:style>
-      </p:cxnSp>
     </p:spTree>
     <p:extLst>
       <p:ext uri="{BB962C8B-B14F-4D97-AF65-F5344CB8AC3E}">
-        <p14:creationId xmlns:p14="http://schemas.microsoft.com/office/powerpoint/2010/main" val="2063610563"/>
+        <p14:creationId xmlns:p14="http://schemas.microsoft.com/office/powerpoint/2010/main" val="1816347366"/>
       </p:ext>
     </p:extLst>
   </p:cSld>
@@ -34187,6 +33633,950 @@
     <p:extLst>
       <p:ext uri="{BB962C8B-B14F-4D97-AF65-F5344CB8AC3E}">
         <p14:creationId xmlns:p14="http://schemas.microsoft.com/office/powerpoint/2010/main" val="1675124401"/>
+      </p:ext>
+    </p:extLst>
+  </p:cSld>
+  <p:clrMapOvr>
+    <a:masterClrMapping/>
+  </p:clrMapOvr>
+</p:sld>
+</file>
+
+<file path=ppt/slides/slide70.xml><?xml version="1.0" encoding="utf-8"?>
+<p:sld xmlns:a="http://schemas.openxmlformats.org/drawingml/2006/main" xmlns:r="http://schemas.openxmlformats.org/officeDocument/2006/relationships" xmlns:p="http://schemas.openxmlformats.org/presentationml/2006/main">
+  <p:cSld>
+    <p:spTree>
+      <p:nvGrpSpPr>
+        <p:cNvPr id="1" name=""/>
+        <p:cNvGrpSpPr/>
+        <p:nvPr/>
+      </p:nvGrpSpPr>
+      <p:grpSpPr>
+        <a:xfrm>
+          <a:off x="0" y="0"/>
+          <a:ext cx="0" cy="0"/>
+          <a:chOff x="0" y="0"/>
+          <a:chExt cx="0" cy="0"/>
+        </a:xfrm>
+      </p:grpSpPr>
+      <p:sp>
+        <p:nvSpPr>
+          <p:cNvPr id="2" name="Title 1">
+            <a:extLst>
+              <a:ext uri="{FF2B5EF4-FFF2-40B4-BE49-F238E27FC236}">
+                <a16:creationId xmlns:a16="http://schemas.microsoft.com/office/drawing/2014/main" id="{F2E75ACD-C303-46DD-8FB4-27FC6A409857}"/>
+              </a:ext>
+            </a:extLst>
+          </p:cNvPr>
+          <p:cNvSpPr>
+            <a:spLocks noGrp="1"/>
+          </p:cNvSpPr>
+          <p:nvPr>
+            <p:ph type="title"/>
+          </p:nvPr>
+        </p:nvSpPr>
+        <p:spPr/>
+        <p:txBody>
+          <a:bodyPr/>
+          <a:lstStyle/>
+          <a:p>
+            <a:pPr algn="ctr"/>
+            <a:r>
+              <a:rPr lang="he-IL" sz="4800" dirty="0"/>
+              <a:t>ארכיטקטורת מידע</a:t>
+            </a:r>
+            <a:endParaRPr lang="en-US" sz="4800" dirty="0"/>
+          </a:p>
+        </p:txBody>
+      </p:sp>
+      <p:sp>
+        <p:nvSpPr>
+          <p:cNvPr id="12" name="תיבת טקסט 11">
+            <a:extLst>
+              <a:ext uri="{FF2B5EF4-FFF2-40B4-BE49-F238E27FC236}">
+                <a16:creationId xmlns:a16="http://schemas.microsoft.com/office/drawing/2014/main" id="{77AF2D51-D00C-40F2-9B31-0894F6F09F0E}"/>
+              </a:ext>
+            </a:extLst>
+          </p:cNvPr>
+          <p:cNvSpPr txBox="1"/>
+          <p:nvPr/>
+        </p:nvSpPr>
+        <p:spPr>
+          <a:xfrm>
+            <a:off x="8361020" y="2257425"/>
+            <a:ext cx="3830980" cy="1200329"/>
+          </a:xfrm>
+          <a:prstGeom prst="rect">
+            <a:avLst/>
+          </a:prstGeom>
+          <a:noFill/>
+        </p:spPr>
+        <p:txBody>
+          <a:bodyPr wrap="square" rtlCol="1">
+            <a:spAutoFit/>
+          </a:bodyPr>
+          <a:lstStyle/>
+          <a:p>
+            <a:pPr marL="285750" indent="-285750" algn="r" rtl="1">
+              <a:buFont typeface="Arial" panose="020B0604020202020204" pitchFamily="34" charset="0"/>
+              <a:buChar char="•"/>
+            </a:pPr>
+            <a:r>
+              <a:rPr lang="he-IL" dirty="0"/>
+              <a:t>בנוסף חלק מהמערכת בנויה לפי נושאים, זאת כדי לאפשר למשתמש להתמצא בקלות בין כל הפגישות או המיקומים ומצבי הפגישות. </a:t>
+            </a:r>
+          </a:p>
+        </p:txBody>
+      </p:sp>
+      <p:cxnSp>
+        <p:nvCxnSpPr>
+          <p:cNvPr id="15" name="מחבר ישר 14">
+            <a:extLst>
+              <a:ext uri="{FF2B5EF4-FFF2-40B4-BE49-F238E27FC236}">
+                <a16:creationId xmlns:a16="http://schemas.microsoft.com/office/drawing/2014/main" id="{C679A093-27E5-4BE4-A986-E68C743F804F}"/>
+              </a:ext>
+            </a:extLst>
+          </p:cNvPr>
+          <p:cNvCxnSpPr/>
+          <p:nvPr/>
+        </p:nvCxnSpPr>
+        <p:spPr>
+          <a:xfrm>
+            <a:off x="4142232" y="4712678"/>
+            <a:ext cx="0" cy="0"/>
+          </a:xfrm>
+          <a:prstGeom prst="line">
+            <a:avLst/>
+          </a:prstGeom>
+        </p:spPr>
+        <p:style>
+          <a:lnRef idx="1">
+            <a:schemeClr val="accent1"/>
+          </a:lnRef>
+          <a:fillRef idx="0">
+            <a:schemeClr val="accent1"/>
+          </a:fillRef>
+          <a:effectRef idx="0">
+            <a:schemeClr val="accent1"/>
+          </a:effectRef>
+          <a:fontRef idx="minor">
+            <a:schemeClr val="tx1"/>
+          </a:fontRef>
+        </p:style>
+      </p:cxnSp>
+      <p:pic>
+        <p:nvPicPr>
+          <p:cNvPr id="11" name="תמונה 10">
+            <a:extLst>
+              <a:ext uri="{FF2B5EF4-FFF2-40B4-BE49-F238E27FC236}">
+                <a16:creationId xmlns:a16="http://schemas.microsoft.com/office/drawing/2014/main" id="{29878191-761A-4093-8102-7EE9E370FBC4}"/>
+              </a:ext>
+            </a:extLst>
+          </p:cNvPr>
+          <p:cNvPicPr>
+            <a:picLocks noChangeAspect="1"/>
+          </p:cNvPicPr>
+          <p:nvPr/>
+        </p:nvPicPr>
+        <p:blipFill>
+          <a:blip r:embed="rId2"/>
+          <a:stretch>
+            <a:fillRect/>
+          </a:stretch>
+        </p:blipFill>
+        <p:spPr>
+          <a:xfrm>
+            <a:off x="0" y="2328127"/>
+            <a:ext cx="8060788" cy="4529874"/>
+          </a:xfrm>
+          <a:prstGeom prst="rect">
+            <a:avLst/>
+          </a:prstGeom>
+        </p:spPr>
+      </p:pic>
+      <p:cxnSp>
+        <p:nvCxnSpPr>
+          <p:cNvPr id="6" name="מחבר ישר 5">
+            <a:extLst>
+              <a:ext uri="{FF2B5EF4-FFF2-40B4-BE49-F238E27FC236}">
+                <a16:creationId xmlns:a16="http://schemas.microsoft.com/office/drawing/2014/main" id="{C97B8B9E-511F-437D-A6A1-0CDA55A9C098}"/>
+              </a:ext>
+            </a:extLst>
+          </p:cNvPr>
+          <p:cNvCxnSpPr>
+            <a:endCxn id="11" idx="2"/>
+          </p:cNvCxnSpPr>
+          <p:nvPr/>
+        </p:nvCxnSpPr>
+        <p:spPr>
+          <a:xfrm>
+            <a:off x="4009292" y="2869809"/>
+            <a:ext cx="21102" cy="3988192"/>
+          </a:xfrm>
+          <a:prstGeom prst="line">
+            <a:avLst/>
+          </a:prstGeom>
+        </p:spPr>
+        <p:style>
+          <a:lnRef idx="1">
+            <a:schemeClr val="accent1"/>
+          </a:lnRef>
+          <a:fillRef idx="0">
+            <a:schemeClr val="accent1"/>
+          </a:fillRef>
+          <a:effectRef idx="0">
+            <a:schemeClr val="accent1"/>
+          </a:effectRef>
+          <a:fontRef idx="minor">
+            <a:schemeClr val="tx1"/>
+          </a:fontRef>
+        </p:style>
+      </p:cxnSp>
+      <p:cxnSp>
+        <p:nvCxnSpPr>
+          <p:cNvPr id="8" name="מחבר ישר 7">
+            <a:extLst>
+              <a:ext uri="{FF2B5EF4-FFF2-40B4-BE49-F238E27FC236}">
+                <a16:creationId xmlns:a16="http://schemas.microsoft.com/office/drawing/2014/main" id="{27BBCB68-329B-4B19-A8F6-B4E111045CC0}"/>
+              </a:ext>
+            </a:extLst>
+          </p:cNvPr>
+          <p:cNvCxnSpPr/>
+          <p:nvPr/>
+        </p:nvCxnSpPr>
+        <p:spPr>
+          <a:xfrm>
+            <a:off x="0" y="4895557"/>
+            <a:ext cx="8060788" cy="0"/>
+          </a:xfrm>
+          <a:prstGeom prst="line">
+            <a:avLst/>
+          </a:prstGeom>
+        </p:spPr>
+        <p:style>
+          <a:lnRef idx="1">
+            <a:schemeClr val="accent1"/>
+          </a:lnRef>
+          <a:fillRef idx="0">
+            <a:schemeClr val="accent1"/>
+          </a:fillRef>
+          <a:effectRef idx="0">
+            <a:schemeClr val="accent1"/>
+          </a:effectRef>
+          <a:fontRef idx="minor">
+            <a:schemeClr val="tx1"/>
+          </a:fontRef>
+        </p:style>
+      </p:cxnSp>
+    </p:spTree>
+    <p:extLst>
+      <p:ext uri="{BB962C8B-B14F-4D97-AF65-F5344CB8AC3E}">
+        <p14:creationId xmlns:p14="http://schemas.microsoft.com/office/powerpoint/2010/main" val="2281359754"/>
+      </p:ext>
+    </p:extLst>
+  </p:cSld>
+  <p:clrMapOvr>
+    <a:masterClrMapping/>
+  </p:clrMapOvr>
+</p:sld>
+</file>
+
+<file path=ppt/slides/slide71.xml><?xml version="1.0" encoding="utf-8"?>
+<p:sld xmlns:a="http://schemas.openxmlformats.org/drawingml/2006/main" xmlns:r="http://schemas.openxmlformats.org/officeDocument/2006/relationships" xmlns:p="http://schemas.openxmlformats.org/presentationml/2006/main">
+  <p:cSld>
+    <p:spTree>
+      <p:nvGrpSpPr>
+        <p:cNvPr id="1" name=""/>
+        <p:cNvGrpSpPr/>
+        <p:nvPr/>
+      </p:nvGrpSpPr>
+      <p:grpSpPr>
+        <a:xfrm>
+          <a:off x="0" y="0"/>
+          <a:ext cx="0" cy="0"/>
+          <a:chOff x="0" y="0"/>
+          <a:chExt cx="0" cy="0"/>
+        </a:xfrm>
+      </p:grpSpPr>
+      <p:sp>
+        <p:nvSpPr>
+          <p:cNvPr id="2" name="Title 1">
+            <a:extLst>
+              <a:ext uri="{FF2B5EF4-FFF2-40B4-BE49-F238E27FC236}">
+                <a16:creationId xmlns:a16="http://schemas.microsoft.com/office/drawing/2014/main" id="{F2E75ACD-C303-46DD-8FB4-27FC6A409857}"/>
+              </a:ext>
+            </a:extLst>
+          </p:cNvPr>
+          <p:cNvSpPr>
+            <a:spLocks noGrp="1"/>
+          </p:cNvSpPr>
+          <p:nvPr>
+            <p:ph type="title"/>
+          </p:nvPr>
+        </p:nvSpPr>
+        <p:spPr/>
+        <p:txBody>
+          <a:bodyPr/>
+          <a:lstStyle/>
+          <a:p>
+            <a:pPr algn="ctr"/>
+            <a:r>
+              <a:rPr lang="he-IL" sz="4800" dirty="0"/>
+              <a:t>מודל הניווט</a:t>
+            </a:r>
+            <a:endParaRPr lang="en-US" sz="4800" dirty="0"/>
+          </a:p>
+        </p:txBody>
+      </p:sp>
+      <p:sp>
+        <p:nvSpPr>
+          <p:cNvPr id="12" name="תיבת טקסט 11">
+            <a:extLst>
+              <a:ext uri="{FF2B5EF4-FFF2-40B4-BE49-F238E27FC236}">
+                <a16:creationId xmlns:a16="http://schemas.microsoft.com/office/drawing/2014/main" id="{77AF2D51-D00C-40F2-9B31-0894F6F09F0E}"/>
+              </a:ext>
+            </a:extLst>
+          </p:cNvPr>
+          <p:cNvSpPr txBox="1"/>
+          <p:nvPr/>
+        </p:nvSpPr>
+        <p:spPr>
+          <a:xfrm>
+            <a:off x="1561514" y="2257425"/>
+            <a:ext cx="10630486" cy="646331"/>
+          </a:xfrm>
+          <a:prstGeom prst="rect">
+            <a:avLst/>
+          </a:prstGeom>
+          <a:noFill/>
+        </p:spPr>
+        <p:txBody>
+          <a:bodyPr wrap="square" rtlCol="1">
+            <a:spAutoFit/>
+          </a:bodyPr>
+          <a:lstStyle/>
+          <a:p>
+            <a:pPr marL="285750" indent="-285750" algn="r" rtl="1">
+              <a:buFont typeface="Arial" panose="020B0604020202020204" pitchFamily="34" charset="0"/>
+              <a:buChar char="•"/>
+            </a:pPr>
+            <a:r>
+              <a:rPr lang="he-IL" dirty="0"/>
+              <a:t>מודל הניווט של המערכת הינה ניווט סיקוונסיאלי, זאת מכיוון שהפעולות במערכת תלויות האחת בשנייה צריך להתחבר בכדי להגיע ללוח השנה\האיזור האישי שלך צריך לבחור טווח בלוח שנה כדי לקבוע פגישה וכו'</a:t>
+            </a:r>
+          </a:p>
+        </p:txBody>
+      </p:sp>
+      <p:cxnSp>
+        <p:nvCxnSpPr>
+          <p:cNvPr id="15" name="מחבר ישר 14">
+            <a:extLst>
+              <a:ext uri="{FF2B5EF4-FFF2-40B4-BE49-F238E27FC236}">
+                <a16:creationId xmlns:a16="http://schemas.microsoft.com/office/drawing/2014/main" id="{C679A093-27E5-4BE4-A986-E68C743F804F}"/>
+              </a:ext>
+            </a:extLst>
+          </p:cNvPr>
+          <p:cNvCxnSpPr/>
+          <p:nvPr/>
+        </p:nvCxnSpPr>
+        <p:spPr>
+          <a:xfrm>
+            <a:off x="4142232" y="4712678"/>
+            <a:ext cx="0" cy="0"/>
+          </a:xfrm>
+          <a:prstGeom prst="line">
+            <a:avLst/>
+          </a:prstGeom>
+        </p:spPr>
+        <p:style>
+          <a:lnRef idx="1">
+            <a:schemeClr val="accent1"/>
+          </a:lnRef>
+          <a:fillRef idx="0">
+            <a:schemeClr val="accent1"/>
+          </a:fillRef>
+          <a:effectRef idx="0">
+            <a:schemeClr val="accent1"/>
+          </a:effectRef>
+          <a:fontRef idx="minor">
+            <a:schemeClr val="tx1"/>
+          </a:fontRef>
+        </p:style>
+      </p:cxnSp>
+      <p:sp>
+        <p:nvSpPr>
+          <p:cNvPr id="5" name="מלבן 4">
+            <a:extLst>
+              <a:ext uri="{FF2B5EF4-FFF2-40B4-BE49-F238E27FC236}">
+                <a16:creationId xmlns:a16="http://schemas.microsoft.com/office/drawing/2014/main" id="{4C73EFEC-90BB-40F0-A252-B466176492A4}"/>
+              </a:ext>
+            </a:extLst>
+          </p:cNvPr>
+          <p:cNvSpPr/>
+          <p:nvPr/>
+        </p:nvSpPr>
+        <p:spPr>
+          <a:xfrm>
+            <a:off x="1152144" y="3692769"/>
+            <a:ext cx="1069144" cy="829994"/>
+          </a:xfrm>
+          <a:prstGeom prst="rect">
+            <a:avLst/>
+          </a:prstGeom>
+          <a:solidFill>
+            <a:srgbClr val="B4D0E7"/>
+          </a:solidFill>
+          <a:ln>
+            <a:solidFill>
+              <a:srgbClr val="B4D0E7"/>
+            </a:solidFill>
+          </a:ln>
+        </p:spPr>
+        <p:style>
+          <a:lnRef idx="2">
+            <a:schemeClr val="accent1">
+              <a:shade val="50000"/>
+            </a:schemeClr>
+          </a:lnRef>
+          <a:fillRef idx="1">
+            <a:schemeClr val="accent1"/>
+          </a:fillRef>
+          <a:effectRef idx="0">
+            <a:schemeClr val="accent1"/>
+          </a:effectRef>
+          <a:fontRef idx="minor">
+            <a:schemeClr val="lt1"/>
+          </a:fontRef>
+        </p:style>
+        <p:txBody>
+          <a:bodyPr rtlCol="1" anchor="ctr"/>
+          <a:lstStyle/>
+          <a:p>
+            <a:pPr algn="ctr"/>
+            <a:r>
+              <a:rPr lang="he-IL" dirty="0"/>
+              <a:t>התחברות\הרשמה</a:t>
+            </a:r>
+          </a:p>
+        </p:txBody>
+      </p:sp>
+      <p:sp>
+        <p:nvSpPr>
+          <p:cNvPr id="14" name="מלבן 13">
+            <a:extLst>
+              <a:ext uri="{FF2B5EF4-FFF2-40B4-BE49-F238E27FC236}">
+                <a16:creationId xmlns:a16="http://schemas.microsoft.com/office/drawing/2014/main" id="{68D58D64-E668-452C-9ED8-016BEFFCCF82}"/>
+              </a:ext>
+            </a:extLst>
+          </p:cNvPr>
+          <p:cNvSpPr/>
+          <p:nvPr/>
+        </p:nvSpPr>
+        <p:spPr>
+          <a:xfrm>
+            <a:off x="3479878" y="3692769"/>
+            <a:ext cx="1069144" cy="829994"/>
+          </a:xfrm>
+          <a:prstGeom prst="rect">
+            <a:avLst/>
+          </a:prstGeom>
+          <a:solidFill>
+            <a:srgbClr val="B4D0E7"/>
+          </a:solidFill>
+          <a:ln>
+            <a:solidFill>
+              <a:srgbClr val="B4D0E7"/>
+            </a:solidFill>
+          </a:ln>
+        </p:spPr>
+        <p:style>
+          <a:lnRef idx="2">
+            <a:schemeClr val="accent1">
+              <a:shade val="50000"/>
+            </a:schemeClr>
+          </a:lnRef>
+          <a:fillRef idx="1">
+            <a:schemeClr val="accent1"/>
+          </a:fillRef>
+          <a:effectRef idx="0">
+            <a:schemeClr val="accent1"/>
+          </a:effectRef>
+          <a:fontRef idx="minor">
+            <a:schemeClr val="lt1"/>
+          </a:fontRef>
+        </p:style>
+        <p:txBody>
+          <a:bodyPr rtlCol="1" anchor="ctr"/>
+          <a:lstStyle/>
+          <a:p>
+            <a:pPr algn="ctr"/>
+            <a:r>
+              <a:rPr lang="he-IL" dirty="0"/>
+              <a:t>לוח שנה</a:t>
+            </a:r>
+          </a:p>
+        </p:txBody>
+      </p:sp>
+      <p:sp>
+        <p:nvSpPr>
+          <p:cNvPr id="16" name="מלבן 15">
+            <a:extLst>
+              <a:ext uri="{FF2B5EF4-FFF2-40B4-BE49-F238E27FC236}">
+                <a16:creationId xmlns:a16="http://schemas.microsoft.com/office/drawing/2014/main" id="{FE00933F-4AAF-4B27-A1EA-5441F5FD5DF2}"/>
+              </a:ext>
+            </a:extLst>
+          </p:cNvPr>
+          <p:cNvSpPr/>
+          <p:nvPr/>
+        </p:nvSpPr>
+        <p:spPr>
+          <a:xfrm>
+            <a:off x="3479878" y="5293288"/>
+            <a:ext cx="1069144" cy="829994"/>
+          </a:xfrm>
+          <a:prstGeom prst="rect">
+            <a:avLst/>
+          </a:prstGeom>
+          <a:solidFill>
+            <a:srgbClr val="B4D0E7"/>
+          </a:solidFill>
+          <a:ln>
+            <a:solidFill>
+              <a:srgbClr val="B4D0E7"/>
+            </a:solidFill>
+          </a:ln>
+        </p:spPr>
+        <p:style>
+          <a:lnRef idx="2">
+            <a:schemeClr val="accent1">
+              <a:shade val="50000"/>
+            </a:schemeClr>
+          </a:lnRef>
+          <a:fillRef idx="1">
+            <a:schemeClr val="accent1"/>
+          </a:fillRef>
+          <a:effectRef idx="0">
+            <a:schemeClr val="accent1"/>
+          </a:effectRef>
+          <a:fontRef idx="minor">
+            <a:schemeClr val="lt1"/>
+          </a:fontRef>
+        </p:style>
+        <p:txBody>
+          <a:bodyPr rtlCol="1" anchor="ctr"/>
+          <a:lstStyle/>
+          <a:p>
+            <a:pPr algn="ctr"/>
+            <a:r>
+              <a:rPr lang="he-IL" dirty="0"/>
+              <a:t>אזור אישי</a:t>
+            </a:r>
+          </a:p>
+        </p:txBody>
+      </p:sp>
+      <p:cxnSp>
+        <p:nvCxnSpPr>
+          <p:cNvPr id="17" name="מחבר חץ ישר 16">
+            <a:extLst>
+              <a:ext uri="{FF2B5EF4-FFF2-40B4-BE49-F238E27FC236}">
+                <a16:creationId xmlns:a16="http://schemas.microsoft.com/office/drawing/2014/main" id="{2CA02720-FE38-4745-BF27-DB559CBE6472}"/>
+              </a:ext>
+            </a:extLst>
+          </p:cNvPr>
+          <p:cNvCxnSpPr>
+            <a:stCxn id="5" idx="3"/>
+            <a:endCxn id="14" idx="1"/>
+          </p:cNvCxnSpPr>
+          <p:nvPr/>
+        </p:nvCxnSpPr>
+        <p:spPr>
+          <a:xfrm>
+            <a:off x="2221288" y="4107766"/>
+            <a:ext cx="1258590" cy="0"/>
+          </a:xfrm>
+          <a:prstGeom prst="straightConnector1">
+            <a:avLst/>
+          </a:prstGeom>
+          <a:ln>
+            <a:solidFill>
+              <a:schemeClr val="tx1"/>
+            </a:solidFill>
+            <a:tailEnd type="triangle"/>
+          </a:ln>
+        </p:spPr>
+        <p:style>
+          <a:lnRef idx="1">
+            <a:schemeClr val="accent1"/>
+          </a:lnRef>
+          <a:fillRef idx="0">
+            <a:schemeClr val="accent1"/>
+          </a:fillRef>
+          <a:effectRef idx="0">
+            <a:schemeClr val="accent1"/>
+          </a:effectRef>
+          <a:fontRef idx="minor">
+            <a:schemeClr val="tx1"/>
+          </a:fontRef>
+        </p:style>
+      </p:cxnSp>
+      <p:cxnSp>
+        <p:nvCxnSpPr>
+          <p:cNvPr id="19" name="מחבר חץ ישר 18">
+            <a:extLst>
+              <a:ext uri="{FF2B5EF4-FFF2-40B4-BE49-F238E27FC236}">
+                <a16:creationId xmlns:a16="http://schemas.microsoft.com/office/drawing/2014/main" id="{A28AAAA7-474F-455E-9FFE-2E92353FF025}"/>
+              </a:ext>
+            </a:extLst>
+          </p:cNvPr>
+          <p:cNvCxnSpPr>
+            <a:stCxn id="14" idx="2"/>
+            <a:endCxn id="16" idx="0"/>
+          </p:cNvCxnSpPr>
+          <p:nvPr/>
+        </p:nvCxnSpPr>
+        <p:spPr>
+          <a:xfrm>
+            <a:off x="4014450" y="4522763"/>
+            <a:ext cx="0" cy="770525"/>
+          </a:xfrm>
+          <a:prstGeom prst="straightConnector1">
+            <a:avLst/>
+          </a:prstGeom>
+          <a:ln>
+            <a:solidFill>
+              <a:schemeClr val="tx1"/>
+            </a:solidFill>
+            <a:headEnd type="triangle"/>
+            <a:tailEnd type="triangle"/>
+          </a:ln>
+        </p:spPr>
+        <p:style>
+          <a:lnRef idx="1">
+            <a:schemeClr val="accent1"/>
+          </a:lnRef>
+          <a:fillRef idx="0">
+            <a:schemeClr val="accent1"/>
+          </a:fillRef>
+          <a:effectRef idx="0">
+            <a:schemeClr val="accent1"/>
+          </a:effectRef>
+          <a:fontRef idx="minor">
+            <a:schemeClr val="tx1"/>
+          </a:fontRef>
+        </p:style>
+      </p:cxnSp>
+      <p:sp>
+        <p:nvSpPr>
+          <p:cNvPr id="21" name="מלבן 20">
+            <a:extLst>
+              <a:ext uri="{FF2B5EF4-FFF2-40B4-BE49-F238E27FC236}">
+                <a16:creationId xmlns:a16="http://schemas.microsoft.com/office/drawing/2014/main" id="{5EC87226-741E-4C41-832B-50FC792F64A6}"/>
+              </a:ext>
+            </a:extLst>
+          </p:cNvPr>
+          <p:cNvSpPr/>
+          <p:nvPr/>
+        </p:nvSpPr>
+        <p:spPr>
+          <a:xfrm>
+            <a:off x="6989299" y="3037769"/>
+            <a:ext cx="1069144" cy="829994"/>
+          </a:xfrm>
+          <a:prstGeom prst="rect">
+            <a:avLst/>
+          </a:prstGeom>
+          <a:solidFill>
+            <a:srgbClr val="B4D0E7"/>
+          </a:solidFill>
+          <a:ln>
+            <a:solidFill>
+              <a:srgbClr val="B4D0E7"/>
+            </a:solidFill>
+          </a:ln>
+        </p:spPr>
+        <p:style>
+          <a:lnRef idx="2">
+            <a:schemeClr val="accent1">
+              <a:shade val="50000"/>
+            </a:schemeClr>
+          </a:lnRef>
+          <a:fillRef idx="1">
+            <a:schemeClr val="accent1"/>
+          </a:fillRef>
+          <a:effectRef idx="0">
+            <a:schemeClr val="accent1"/>
+          </a:effectRef>
+          <a:fontRef idx="minor">
+            <a:schemeClr val="lt1"/>
+          </a:fontRef>
+        </p:style>
+        <p:txBody>
+          <a:bodyPr rtlCol="1" anchor="ctr"/>
+          <a:lstStyle/>
+          <a:p>
+            <a:pPr algn="ctr"/>
+            <a:r>
+              <a:rPr lang="he-IL" dirty="0"/>
+              <a:t>יצירת פגישה</a:t>
+            </a:r>
+          </a:p>
+        </p:txBody>
+      </p:sp>
+      <p:sp>
+        <p:nvSpPr>
+          <p:cNvPr id="22" name="מלבן 21">
+            <a:extLst>
+              <a:ext uri="{FF2B5EF4-FFF2-40B4-BE49-F238E27FC236}">
+                <a16:creationId xmlns:a16="http://schemas.microsoft.com/office/drawing/2014/main" id="{8FE29AE8-B766-4490-AC03-308875E417BD}"/>
+              </a:ext>
+            </a:extLst>
+          </p:cNvPr>
+          <p:cNvSpPr/>
+          <p:nvPr/>
+        </p:nvSpPr>
+        <p:spPr>
+          <a:xfrm>
+            <a:off x="6989299" y="4231244"/>
+            <a:ext cx="1069144" cy="829994"/>
+          </a:xfrm>
+          <a:prstGeom prst="rect">
+            <a:avLst/>
+          </a:prstGeom>
+          <a:solidFill>
+            <a:srgbClr val="B4D0E7"/>
+          </a:solidFill>
+          <a:ln>
+            <a:solidFill>
+              <a:srgbClr val="B4D0E7"/>
+            </a:solidFill>
+          </a:ln>
+        </p:spPr>
+        <p:style>
+          <a:lnRef idx="2">
+            <a:schemeClr val="accent1">
+              <a:shade val="50000"/>
+            </a:schemeClr>
+          </a:lnRef>
+          <a:fillRef idx="1">
+            <a:schemeClr val="accent1"/>
+          </a:fillRef>
+          <a:effectRef idx="0">
+            <a:schemeClr val="accent1"/>
+          </a:effectRef>
+          <a:fontRef idx="minor">
+            <a:schemeClr val="lt1"/>
+          </a:fontRef>
+        </p:style>
+        <p:txBody>
+          <a:bodyPr rtlCol="1" anchor="ctr"/>
+          <a:lstStyle/>
+          <a:p>
+            <a:pPr algn="ctr"/>
+            <a:r>
+              <a:rPr lang="he-IL" dirty="0"/>
+              <a:t>יצירת אילוץ</a:t>
+            </a:r>
+          </a:p>
+        </p:txBody>
+      </p:sp>
+      <p:sp>
+        <p:nvSpPr>
+          <p:cNvPr id="23" name="מלבן 22">
+            <a:extLst>
+              <a:ext uri="{FF2B5EF4-FFF2-40B4-BE49-F238E27FC236}">
+                <a16:creationId xmlns:a16="http://schemas.microsoft.com/office/drawing/2014/main" id="{91E5B70A-D921-4664-80F0-C84C5ADA2917}"/>
+              </a:ext>
+            </a:extLst>
+          </p:cNvPr>
+          <p:cNvSpPr/>
+          <p:nvPr/>
+        </p:nvSpPr>
+        <p:spPr>
+          <a:xfrm>
+            <a:off x="6989299" y="5521270"/>
+            <a:ext cx="1069144" cy="829994"/>
+          </a:xfrm>
+          <a:prstGeom prst="rect">
+            <a:avLst/>
+          </a:prstGeom>
+          <a:solidFill>
+            <a:srgbClr val="B4D0E7"/>
+          </a:solidFill>
+          <a:ln>
+            <a:solidFill>
+              <a:srgbClr val="B4D0E7"/>
+            </a:solidFill>
+          </a:ln>
+        </p:spPr>
+        <p:style>
+          <a:lnRef idx="2">
+            <a:schemeClr val="accent1">
+              <a:shade val="50000"/>
+            </a:schemeClr>
+          </a:lnRef>
+          <a:fillRef idx="1">
+            <a:schemeClr val="accent1"/>
+          </a:fillRef>
+          <a:effectRef idx="0">
+            <a:schemeClr val="accent1"/>
+          </a:effectRef>
+          <a:fontRef idx="minor">
+            <a:schemeClr val="lt1"/>
+          </a:fontRef>
+        </p:style>
+        <p:txBody>
+          <a:bodyPr rtlCol="1" anchor="ctr"/>
+          <a:lstStyle/>
+          <a:p>
+            <a:pPr algn="ctr"/>
+            <a:r>
+              <a:rPr lang="he-IL" dirty="0"/>
+              <a:t>יצירת מקום</a:t>
+            </a:r>
+          </a:p>
+        </p:txBody>
+      </p:sp>
+      <p:cxnSp>
+        <p:nvCxnSpPr>
+          <p:cNvPr id="25" name="מחבר חץ ישר 24">
+            <a:extLst>
+              <a:ext uri="{FF2B5EF4-FFF2-40B4-BE49-F238E27FC236}">
+                <a16:creationId xmlns:a16="http://schemas.microsoft.com/office/drawing/2014/main" id="{FF17E7FF-B123-4821-954B-3F8431F71456}"/>
+              </a:ext>
+            </a:extLst>
+          </p:cNvPr>
+          <p:cNvCxnSpPr>
+            <a:stCxn id="14" idx="3"/>
+            <a:endCxn id="21" idx="1"/>
+          </p:cNvCxnSpPr>
+          <p:nvPr/>
+        </p:nvCxnSpPr>
+        <p:spPr>
+          <a:xfrm flipV="1">
+            <a:off x="4549022" y="3452766"/>
+            <a:ext cx="2440277" cy="655000"/>
+          </a:xfrm>
+          <a:prstGeom prst="straightConnector1">
+            <a:avLst/>
+          </a:prstGeom>
+          <a:ln>
+            <a:solidFill>
+              <a:schemeClr val="tx1"/>
+            </a:solidFill>
+            <a:tailEnd type="triangle"/>
+          </a:ln>
+        </p:spPr>
+        <p:style>
+          <a:lnRef idx="1">
+            <a:schemeClr val="accent1"/>
+          </a:lnRef>
+          <a:fillRef idx="0">
+            <a:schemeClr val="accent1"/>
+          </a:fillRef>
+          <a:effectRef idx="0">
+            <a:schemeClr val="accent1"/>
+          </a:effectRef>
+          <a:fontRef idx="minor">
+            <a:schemeClr val="tx1"/>
+          </a:fontRef>
+        </p:style>
+      </p:cxnSp>
+      <p:cxnSp>
+        <p:nvCxnSpPr>
+          <p:cNvPr id="26" name="מחבר חץ ישר 25">
+            <a:extLst>
+              <a:ext uri="{FF2B5EF4-FFF2-40B4-BE49-F238E27FC236}">
+                <a16:creationId xmlns:a16="http://schemas.microsoft.com/office/drawing/2014/main" id="{A62B8856-7061-41B1-A07E-9F1BC4122F50}"/>
+              </a:ext>
+            </a:extLst>
+          </p:cNvPr>
+          <p:cNvCxnSpPr>
+            <a:cxnSpLocks/>
+            <a:stCxn id="14" idx="3"/>
+            <a:endCxn id="22" idx="1"/>
+          </p:cNvCxnSpPr>
+          <p:nvPr/>
+        </p:nvCxnSpPr>
+        <p:spPr>
+          <a:xfrm>
+            <a:off x="4549022" y="4107766"/>
+            <a:ext cx="2440277" cy="538475"/>
+          </a:xfrm>
+          <a:prstGeom prst="straightConnector1">
+            <a:avLst/>
+          </a:prstGeom>
+          <a:ln>
+            <a:solidFill>
+              <a:schemeClr val="tx1"/>
+            </a:solidFill>
+            <a:tailEnd type="triangle"/>
+          </a:ln>
+        </p:spPr>
+        <p:style>
+          <a:lnRef idx="1">
+            <a:schemeClr val="accent1"/>
+          </a:lnRef>
+          <a:fillRef idx="0">
+            <a:schemeClr val="accent1"/>
+          </a:fillRef>
+          <a:effectRef idx="0">
+            <a:schemeClr val="accent1"/>
+          </a:effectRef>
+          <a:fontRef idx="minor">
+            <a:schemeClr val="tx1"/>
+          </a:fontRef>
+        </p:style>
+      </p:cxnSp>
+      <p:cxnSp>
+        <p:nvCxnSpPr>
+          <p:cNvPr id="38" name="מחבר חץ ישר 37">
+            <a:extLst>
+              <a:ext uri="{FF2B5EF4-FFF2-40B4-BE49-F238E27FC236}">
+                <a16:creationId xmlns:a16="http://schemas.microsoft.com/office/drawing/2014/main" id="{07A16A20-BDAD-46A3-9CA5-CF870C045834}"/>
+              </a:ext>
+            </a:extLst>
+          </p:cNvPr>
+          <p:cNvCxnSpPr>
+            <a:cxnSpLocks/>
+            <a:stCxn id="16" idx="3"/>
+            <a:endCxn id="23" idx="1"/>
+          </p:cNvCxnSpPr>
+          <p:nvPr/>
+        </p:nvCxnSpPr>
+        <p:spPr>
+          <a:xfrm>
+            <a:off x="4549022" y="5708285"/>
+            <a:ext cx="2440277" cy="227982"/>
+          </a:xfrm>
+          <a:prstGeom prst="straightConnector1">
+            <a:avLst/>
+          </a:prstGeom>
+          <a:ln>
+            <a:solidFill>
+              <a:schemeClr val="tx1"/>
+            </a:solidFill>
+            <a:tailEnd type="triangle"/>
+          </a:ln>
+        </p:spPr>
+        <p:style>
+          <a:lnRef idx="1">
+            <a:schemeClr val="accent1"/>
+          </a:lnRef>
+          <a:fillRef idx="0">
+            <a:schemeClr val="accent1"/>
+          </a:fillRef>
+          <a:effectRef idx="0">
+            <a:schemeClr val="accent1"/>
+          </a:effectRef>
+          <a:fontRef idx="minor">
+            <a:schemeClr val="tx1"/>
+          </a:fontRef>
+        </p:style>
+      </p:cxnSp>
+    </p:spTree>
+    <p:extLst>
+      <p:ext uri="{BB962C8B-B14F-4D97-AF65-F5344CB8AC3E}">
+        <p14:creationId xmlns:p14="http://schemas.microsoft.com/office/powerpoint/2010/main" val="2063610563"/>
       </p:ext>
     </p:extLst>
   </p:cSld>

</xml_diff>